<commit_message>
changed some components names in the model and corrected duplicated references on thesis work.
</commit_message>
<xml_diff>
--- a/model.pptx
+++ b/model.pptx
@@ -296,7 +296,7 @@
           <a:p>
             <a:fld id="{FF687007-1232-7342-B707-C90C2F451591}" type="datetimeFigureOut">
               <a:rPr lang="en-US" smtClean="0"/>
-              <a:t>11/08/16</a:t>
+              <a:t>13/08/16</a:t>
             </a:fld>
             <a:endParaRPr lang="en-US"/>
           </a:p>
@@ -466,7 +466,7 @@
           <a:p>
             <a:fld id="{FF687007-1232-7342-B707-C90C2F451591}" type="datetimeFigureOut">
               <a:rPr lang="en-US" smtClean="0"/>
-              <a:t>11/08/16</a:t>
+              <a:t>13/08/16</a:t>
             </a:fld>
             <a:endParaRPr lang="en-US"/>
           </a:p>
@@ -646,7 +646,7 @@
           <a:p>
             <a:fld id="{FF687007-1232-7342-B707-C90C2F451591}" type="datetimeFigureOut">
               <a:rPr lang="en-US" smtClean="0"/>
-              <a:t>11/08/16</a:t>
+              <a:t>13/08/16</a:t>
             </a:fld>
             <a:endParaRPr lang="en-US"/>
           </a:p>
@@ -816,7 +816,7 @@
           <a:p>
             <a:fld id="{FF687007-1232-7342-B707-C90C2F451591}" type="datetimeFigureOut">
               <a:rPr lang="en-US" smtClean="0"/>
-              <a:t>11/08/16</a:t>
+              <a:t>13/08/16</a:t>
             </a:fld>
             <a:endParaRPr lang="en-US"/>
           </a:p>
@@ -1062,7 +1062,7 @@
           <a:p>
             <a:fld id="{FF687007-1232-7342-B707-C90C2F451591}" type="datetimeFigureOut">
               <a:rPr lang="en-US" smtClean="0"/>
-              <a:t>11/08/16</a:t>
+              <a:t>13/08/16</a:t>
             </a:fld>
             <a:endParaRPr lang="en-US"/>
           </a:p>
@@ -1350,7 +1350,7 @@
           <a:p>
             <a:fld id="{FF687007-1232-7342-B707-C90C2F451591}" type="datetimeFigureOut">
               <a:rPr lang="en-US" smtClean="0"/>
-              <a:t>11/08/16</a:t>
+              <a:t>13/08/16</a:t>
             </a:fld>
             <a:endParaRPr lang="en-US"/>
           </a:p>
@@ -1772,7 +1772,7 @@
           <a:p>
             <a:fld id="{FF687007-1232-7342-B707-C90C2F451591}" type="datetimeFigureOut">
               <a:rPr lang="en-US" smtClean="0"/>
-              <a:t>11/08/16</a:t>
+              <a:t>13/08/16</a:t>
             </a:fld>
             <a:endParaRPr lang="en-US"/>
           </a:p>
@@ -1890,7 +1890,7 @@
           <a:p>
             <a:fld id="{FF687007-1232-7342-B707-C90C2F451591}" type="datetimeFigureOut">
               <a:rPr lang="en-US" smtClean="0"/>
-              <a:t>11/08/16</a:t>
+              <a:t>13/08/16</a:t>
             </a:fld>
             <a:endParaRPr lang="en-US"/>
           </a:p>
@@ -1985,7 +1985,7 @@
           <a:p>
             <a:fld id="{FF687007-1232-7342-B707-C90C2F451591}" type="datetimeFigureOut">
               <a:rPr lang="en-US" smtClean="0"/>
-              <a:t>11/08/16</a:t>
+              <a:t>13/08/16</a:t>
             </a:fld>
             <a:endParaRPr lang="en-US"/>
           </a:p>
@@ -2262,7 +2262,7 @@
           <a:p>
             <a:fld id="{FF687007-1232-7342-B707-C90C2F451591}" type="datetimeFigureOut">
               <a:rPr lang="en-US" smtClean="0"/>
-              <a:t>11/08/16</a:t>
+              <a:t>13/08/16</a:t>
             </a:fld>
             <a:endParaRPr lang="en-US"/>
           </a:p>
@@ -2515,7 +2515,7 @@
           <a:p>
             <a:fld id="{FF687007-1232-7342-B707-C90C2F451591}" type="datetimeFigureOut">
               <a:rPr lang="en-US" smtClean="0"/>
-              <a:t>11/08/16</a:t>
+              <a:t>13/08/16</a:t>
             </a:fld>
             <a:endParaRPr lang="en-US"/>
           </a:p>
@@ -2728,7 +2728,7 @@
           <a:p>
             <a:fld id="{FF687007-1232-7342-B707-C90C2F451591}" type="datetimeFigureOut">
               <a:rPr lang="en-US" smtClean="0"/>
-              <a:t>11/08/16</a:t>
+              <a:t>13/08/16</a:t>
             </a:fld>
             <a:endParaRPr lang="en-US"/>
           </a:p>
@@ -3111,7 +3111,7 @@
         </p:nvSpPr>
         <p:spPr>
           <a:xfrm>
-            <a:off x="4953487" y="309297"/>
+            <a:off x="2318712" y="746624"/>
             <a:ext cx="1137920" cy="294640"/>
           </a:xfrm>
           <a:prstGeom prst="roundRect">
@@ -3156,7 +3156,7 @@
         </p:nvSpPr>
         <p:spPr>
           <a:xfrm>
-            <a:off x="4953487" y="1137338"/>
+            <a:off x="3826767" y="750199"/>
             <a:ext cx="1137920" cy="294640"/>
           </a:xfrm>
           <a:prstGeom prst="roundRect">
@@ -3201,7 +3201,7 @@
         </p:nvSpPr>
         <p:spPr>
           <a:xfrm>
-            <a:off x="4801087" y="2034592"/>
+            <a:off x="5332483" y="753774"/>
             <a:ext cx="1290320" cy="294640"/>
           </a:xfrm>
           <a:prstGeom prst="roundRect">
@@ -3246,7 +3246,7 @@
         </p:nvSpPr>
         <p:spPr>
           <a:xfrm>
-            <a:off x="1099587" y="4905904"/>
+            <a:off x="4349683" y="2127635"/>
             <a:ext cx="1137920" cy="294640"/>
           </a:xfrm>
           <a:prstGeom prst="roundRect">
@@ -3294,7 +3294,7 @@
         </p:nvSpPr>
         <p:spPr>
           <a:xfrm>
-            <a:off x="853441" y="5916926"/>
+            <a:off x="5915395" y="2127635"/>
             <a:ext cx="1137920" cy="294640"/>
           </a:xfrm>
           <a:prstGeom prst="roundRect">
@@ -3342,7 +3342,7 @@
         </p:nvSpPr>
         <p:spPr>
           <a:xfrm>
-            <a:off x="731613" y="4170256"/>
+            <a:off x="2619618" y="2135035"/>
             <a:ext cx="1361441" cy="323973"/>
           </a:xfrm>
           <a:prstGeom prst="roundRect">
@@ -3378,7 +3378,6 @@
               <a:rPr lang="en-US" sz="1200" dirty="0"/>
               <a:t>Compatibility</a:t>
             </a:r>
-            <a:endParaRPr lang="en-US" sz="1200" dirty="0"/>
           </a:p>
         </p:txBody>
       </p:sp>
@@ -3390,8 +3389,8 @@
         </p:nvSpPr>
         <p:spPr>
           <a:xfrm>
-            <a:off x="496976" y="636816"/>
-            <a:ext cx="1740531" cy="369332"/>
+            <a:off x="475394" y="569266"/>
+            <a:ext cx="1345478" cy="646331"/>
           </a:xfrm>
           <a:prstGeom prst="rect">
             <a:avLst/>
@@ -3406,7 +3405,13 @@
           <a:p>
             <a:r>
               <a:rPr lang="en-US" dirty="0" smtClean="0"/>
-              <a:t>User satisfaction </a:t>
+              <a:t>User Quality</a:t>
+            </a:r>
+          </a:p>
+          <a:p>
+            <a:r>
+              <a:rPr lang="en-US" dirty="0" smtClean="0"/>
+              <a:t>Perception</a:t>
             </a:r>
             <a:endParaRPr lang="en-US" dirty="0"/>
           </a:p>
@@ -3420,7 +3425,7 @@
         </p:nvSpPr>
         <p:spPr>
           <a:xfrm>
-            <a:off x="4350990" y="2999739"/>
+            <a:off x="7053315" y="677346"/>
             <a:ext cx="1361441" cy="460375"/>
           </a:xfrm>
           <a:prstGeom prst="roundRect">
@@ -3454,6 +3459,358 @@
               <a:t>Compatibility</a:t>
             </a:r>
             <a:endParaRPr lang="en-US" sz="1200" dirty="0"/>
+          </a:p>
+        </p:txBody>
+      </p:sp>
+      <p:sp>
+        <p:nvSpPr>
+          <p:cNvPr id="3" name="Plus 2"/>
+          <p:cNvSpPr/>
+          <p:nvPr/>
+        </p:nvSpPr>
+        <p:spPr>
+          <a:xfrm>
+            <a:off x="3499506" y="744044"/>
+            <a:ext cx="297256" cy="297220"/>
+          </a:xfrm>
+          <a:prstGeom prst="mathPlus">
+            <a:avLst/>
+          </a:prstGeom>
+          <a:ln>
+            <a:solidFill>
+              <a:srgbClr val="FFFFFF"/>
+            </a:solidFill>
+          </a:ln>
+          <a:effectLst/>
+        </p:spPr>
+        <p:style>
+          <a:lnRef idx="1">
+            <a:schemeClr val="accent1"/>
+          </a:lnRef>
+          <a:fillRef idx="3">
+            <a:schemeClr val="accent1"/>
+          </a:fillRef>
+          <a:effectRef idx="2">
+            <a:schemeClr val="accent1"/>
+          </a:effectRef>
+          <a:fontRef idx="minor">
+            <a:schemeClr val="lt1"/>
+          </a:fontRef>
+        </p:style>
+        <p:txBody>
+          <a:bodyPr rtlCol="0" anchor="ctr"/>
+          <a:lstStyle/>
+          <a:p>
+            <a:pPr algn="ctr"/>
+            <a:endParaRPr lang="en-US"/>
+          </a:p>
+        </p:txBody>
+      </p:sp>
+      <p:sp>
+        <p:nvSpPr>
+          <p:cNvPr id="12" name="Plus 11"/>
+          <p:cNvSpPr/>
+          <p:nvPr/>
+        </p:nvSpPr>
+        <p:spPr>
+          <a:xfrm>
+            <a:off x="4994691" y="753774"/>
+            <a:ext cx="297256" cy="297220"/>
+          </a:xfrm>
+          <a:prstGeom prst="mathPlus">
+            <a:avLst/>
+          </a:prstGeom>
+          <a:ln>
+            <a:solidFill>
+              <a:srgbClr val="FFFFFF"/>
+            </a:solidFill>
+          </a:ln>
+          <a:effectLst/>
+        </p:spPr>
+        <p:style>
+          <a:lnRef idx="1">
+            <a:schemeClr val="accent1"/>
+          </a:lnRef>
+          <a:fillRef idx="3">
+            <a:schemeClr val="accent1"/>
+          </a:fillRef>
+          <a:effectRef idx="2">
+            <a:schemeClr val="accent1"/>
+          </a:effectRef>
+          <a:fontRef idx="minor">
+            <a:schemeClr val="lt1"/>
+          </a:fontRef>
+        </p:style>
+        <p:txBody>
+          <a:bodyPr rtlCol="0" anchor="ctr"/>
+          <a:lstStyle/>
+          <a:p>
+            <a:pPr algn="ctr"/>
+            <a:endParaRPr lang="en-US"/>
+          </a:p>
+        </p:txBody>
+      </p:sp>
+      <p:sp>
+        <p:nvSpPr>
+          <p:cNvPr id="10" name="Equal 9"/>
+          <p:cNvSpPr/>
+          <p:nvPr/>
+        </p:nvSpPr>
+        <p:spPr>
+          <a:xfrm>
+            <a:off x="1846623" y="744044"/>
+            <a:ext cx="359664" cy="337749"/>
+          </a:xfrm>
+          <a:prstGeom prst="mathEqual">
+            <a:avLst/>
+          </a:prstGeom>
+          <a:ln>
+            <a:solidFill>
+              <a:srgbClr val="FFFFFF"/>
+            </a:solidFill>
+          </a:ln>
+          <a:effectLst/>
+        </p:spPr>
+        <p:style>
+          <a:lnRef idx="1">
+            <a:schemeClr val="accent1"/>
+          </a:lnRef>
+          <a:fillRef idx="3">
+            <a:schemeClr val="accent1"/>
+          </a:fillRef>
+          <a:effectRef idx="2">
+            <a:schemeClr val="accent1"/>
+          </a:effectRef>
+          <a:fontRef idx="minor">
+            <a:schemeClr val="lt1"/>
+          </a:fontRef>
+        </p:style>
+        <p:txBody>
+          <a:bodyPr rtlCol="0" anchor="ctr"/>
+          <a:lstStyle/>
+          <a:p>
+            <a:pPr algn="ctr"/>
+            <a:endParaRPr lang="en-US">
+              <a:solidFill>
+                <a:schemeClr val="tx1"/>
+              </a:solidFill>
+            </a:endParaRPr>
+          </a:p>
+        </p:txBody>
+      </p:sp>
+      <p:sp>
+        <p:nvSpPr>
+          <p:cNvPr id="16" name="Plus 15"/>
+          <p:cNvSpPr/>
+          <p:nvPr/>
+        </p:nvSpPr>
+        <p:spPr>
+          <a:xfrm>
+            <a:off x="6673904" y="753774"/>
+            <a:ext cx="297256" cy="297220"/>
+          </a:xfrm>
+          <a:prstGeom prst="mathPlus">
+            <a:avLst/>
+          </a:prstGeom>
+          <a:ln>
+            <a:solidFill>
+              <a:srgbClr val="FFFFFF"/>
+            </a:solidFill>
+          </a:ln>
+          <a:effectLst/>
+        </p:spPr>
+        <p:style>
+          <a:lnRef idx="1">
+            <a:schemeClr val="accent1"/>
+          </a:lnRef>
+          <a:fillRef idx="3">
+            <a:schemeClr val="accent1"/>
+          </a:fillRef>
+          <a:effectRef idx="2">
+            <a:schemeClr val="accent1"/>
+          </a:effectRef>
+          <a:fontRef idx="minor">
+            <a:schemeClr val="lt1"/>
+          </a:fontRef>
+        </p:style>
+        <p:txBody>
+          <a:bodyPr rtlCol="0" anchor="ctr"/>
+          <a:lstStyle/>
+          <a:p>
+            <a:pPr algn="ctr"/>
+            <a:endParaRPr lang="en-US"/>
+          </a:p>
+        </p:txBody>
+      </p:sp>
+      <p:sp>
+        <p:nvSpPr>
+          <p:cNvPr id="18" name="TextBox 17"/>
+          <p:cNvSpPr txBox="1"/>
+          <p:nvPr/>
+        </p:nvSpPr>
+        <p:spPr>
+          <a:xfrm>
+            <a:off x="475394" y="1951074"/>
+            <a:ext cx="1710725" cy="646331"/>
+          </a:xfrm>
+          <a:prstGeom prst="rect">
+            <a:avLst/>
+          </a:prstGeom>
+          <a:noFill/>
+        </p:spPr>
+        <p:txBody>
+          <a:bodyPr wrap="none" rtlCol="0">
+            <a:spAutoFit/>
+          </a:bodyPr>
+          <a:lstStyle/>
+          <a:p>
+            <a:r>
+              <a:rPr lang="en-US" dirty="0" smtClean="0"/>
+              <a:t>Provider Quality</a:t>
+            </a:r>
+          </a:p>
+          <a:p>
+            <a:r>
+              <a:rPr lang="en-US" dirty="0" smtClean="0"/>
+              <a:t>Perception</a:t>
+            </a:r>
+            <a:endParaRPr lang="en-US" dirty="0"/>
+          </a:p>
+        </p:txBody>
+      </p:sp>
+      <p:sp>
+        <p:nvSpPr>
+          <p:cNvPr id="19" name="Plus 18"/>
+          <p:cNvSpPr/>
+          <p:nvPr/>
+        </p:nvSpPr>
+        <p:spPr>
+          <a:xfrm>
+            <a:off x="4025403" y="2152871"/>
+            <a:ext cx="297256" cy="297220"/>
+          </a:xfrm>
+          <a:prstGeom prst="mathPlus">
+            <a:avLst/>
+          </a:prstGeom>
+          <a:ln>
+            <a:solidFill>
+              <a:srgbClr val="FFFFFF"/>
+            </a:solidFill>
+          </a:ln>
+          <a:effectLst/>
+        </p:spPr>
+        <p:style>
+          <a:lnRef idx="1">
+            <a:schemeClr val="accent1"/>
+          </a:lnRef>
+          <a:fillRef idx="3">
+            <a:schemeClr val="accent1"/>
+          </a:fillRef>
+          <a:effectRef idx="2">
+            <a:schemeClr val="accent1"/>
+          </a:effectRef>
+          <a:fontRef idx="minor">
+            <a:schemeClr val="lt1"/>
+          </a:fontRef>
+        </p:style>
+        <p:txBody>
+          <a:bodyPr rtlCol="0" anchor="ctr"/>
+          <a:lstStyle/>
+          <a:p>
+            <a:pPr algn="ctr"/>
+            <a:endParaRPr lang="en-US"/>
+          </a:p>
+        </p:txBody>
+      </p:sp>
+      <p:sp>
+        <p:nvSpPr>
+          <p:cNvPr id="20" name="Plus 19"/>
+          <p:cNvSpPr/>
+          <p:nvPr/>
+        </p:nvSpPr>
+        <p:spPr>
+          <a:xfrm>
+            <a:off x="5520588" y="2162601"/>
+            <a:ext cx="297256" cy="297220"/>
+          </a:xfrm>
+          <a:prstGeom prst="mathPlus">
+            <a:avLst/>
+          </a:prstGeom>
+          <a:ln>
+            <a:solidFill>
+              <a:srgbClr val="FFFFFF"/>
+            </a:solidFill>
+          </a:ln>
+          <a:effectLst/>
+        </p:spPr>
+        <p:style>
+          <a:lnRef idx="1">
+            <a:schemeClr val="accent1"/>
+          </a:lnRef>
+          <a:fillRef idx="3">
+            <a:schemeClr val="accent1"/>
+          </a:fillRef>
+          <a:effectRef idx="2">
+            <a:schemeClr val="accent1"/>
+          </a:effectRef>
+          <a:fontRef idx="minor">
+            <a:schemeClr val="lt1"/>
+          </a:fontRef>
+        </p:style>
+        <p:txBody>
+          <a:bodyPr rtlCol="0" anchor="ctr"/>
+          <a:lstStyle/>
+          <a:p>
+            <a:pPr algn="ctr"/>
+            <a:endParaRPr lang="en-US"/>
+          </a:p>
+        </p:txBody>
+      </p:sp>
+      <p:sp>
+        <p:nvSpPr>
+          <p:cNvPr id="21" name="Equal 20"/>
+          <p:cNvSpPr/>
+          <p:nvPr/>
+        </p:nvSpPr>
+        <p:spPr>
+          <a:xfrm>
+            <a:off x="2210376" y="2112341"/>
+            <a:ext cx="359664" cy="337749"/>
+          </a:xfrm>
+          <a:prstGeom prst="mathEqual">
+            <a:avLst/>
+          </a:prstGeom>
+          <a:ln>
+            <a:solidFill>
+              <a:srgbClr val="FFFFFF"/>
+            </a:solidFill>
+          </a:ln>
+          <a:effectLst/>
+        </p:spPr>
+        <p:style>
+          <a:lnRef idx="1">
+            <a:schemeClr val="accent1"/>
+          </a:lnRef>
+          <a:fillRef idx="3">
+            <a:schemeClr val="accent1"/>
+          </a:fillRef>
+          <a:effectRef idx="2">
+            <a:schemeClr val="accent1"/>
+          </a:effectRef>
+          <a:fontRef idx="minor">
+            <a:schemeClr val="lt1"/>
+          </a:fontRef>
+        </p:style>
+        <p:txBody>
+          <a:bodyPr rtlCol="0" anchor="ctr"/>
+          <a:lstStyle/>
+          <a:p>
+            <a:pPr algn="ctr"/>
+            <a:endParaRPr lang="en-US">
+              <a:solidFill>
+                <a:schemeClr val="tx1"/>
+              </a:solidFill>
+            </a:endParaRPr>
           </a:p>
         </p:txBody>
       </p:sp>
@@ -5651,7 +6008,43 @@
       </p:grpSpPr>
       <p:sp>
         <p:nvSpPr>
-          <p:cNvPr id="4" name="Rounded Rectangle 3"/>
+          <p:cNvPr id="75" name="TextBox 74"/>
+          <p:cNvSpPr txBox="1"/>
+          <p:nvPr/>
+        </p:nvSpPr>
+        <p:spPr>
+          <a:xfrm>
+            <a:off x="538826" y="2021840"/>
+            <a:ext cx="1956598" cy="646331"/>
+          </a:xfrm>
+          <a:prstGeom prst="rect">
+            <a:avLst/>
+          </a:prstGeom>
+          <a:noFill/>
+        </p:spPr>
+        <p:txBody>
+          <a:bodyPr wrap="none" rtlCol="0">
+            <a:spAutoFit/>
+          </a:bodyPr>
+          <a:lstStyle/>
+          <a:p>
+            <a:r>
+              <a:rPr lang="en-US" dirty="0" smtClean="0"/>
+              <a:t>DIMENSIONS AND</a:t>
+            </a:r>
+          </a:p>
+          <a:p>
+            <a:r>
+              <a:rPr lang="en-US" dirty="0" smtClean="0"/>
+              <a:t>KEY COMPONENTS</a:t>
+            </a:r>
+            <a:endParaRPr lang="en-US" dirty="0"/>
+          </a:p>
+        </p:txBody>
+      </p:sp>
+      <p:sp>
+        <p:nvSpPr>
+          <p:cNvPr id="41" name="Rounded Rectangle 40"/>
           <p:cNvSpPr/>
           <p:nvPr/>
         </p:nvSpPr>
@@ -5695,7 +6088,7 @@
       </p:sp>
       <p:sp>
         <p:nvSpPr>
-          <p:cNvPr id="5" name="Rounded Rectangle 4"/>
+          <p:cNvPr id="42" name="Rounded Rectangle 41"/>
           <p:cNvSpPr/>
           <p:nvPr/>
         </p:nvSpPr>
@@ -5739,7 +6132,7 @@
       </p:sp>
       <p:sp>
         <p:nvSpPr>
-          <p:cNvPr id="6" name="Rounded Rectangle 5"/>
+          <p:cNvPr id="43" name="Rounded Rectangle 42"/>
           <p:cNvSpPr/>
           <p:nvPr/>
         </p:nvSpPr>
@@ -5783,7 +6176,7 @@
       </p:sp>
       <p:sp>
         <p:nvSpPr>
-          <p:cNvPr id="7" name="Rounded Rectangle 6"/>
+          <p:cNvPr id="44" name="Rounded Rectangle 43"/>
           <p:cNvSpPr/>
           <p:nvPr/>
         </p:nvSpPr>
@@ -5827,7 +6220,7 @@
       </p:sp>
       <p:sp>
         <p:nvSpPr>
-          <p:cNvPr id="124" name="Rounded Rectangle 123"/>
+          <p:cNvPr id="45" name="Rounded Rectangle 44"/>
           <p:cNvSpPr/>
           <p:nvPr/>
         </p:nvSpPr>
@@ -5875,7 +6268,7 @@
       </p:sp>
       <p:sp>
         <p:nvSpPr>
-          <p:cNvPr id="125" name="Rounded Rectangle 124"/>
+          <p:cNvPr id="46" name="Rounded Rectangle 45"/>
           <p:cNvSpPr/>
           <p:nvPr/>
         </p:nvSpPr>
@@ -5923,7 +6316,7 @@
       </p:sp>
       <p:sp>
         <p:nvSpPr>
-          <p:cNvPr id="126" name="Rounded Rectangle 125"/>
+          <p:cNvPr id="47" name="Rounded Rectangle 46"/>
           <p:cNvSpPr/>
           <p:nvPr/>
         </p:nvSpPr>
@@ -5971,7 +6364,7 @@
       </p:sp>
       <p:sp>
         <p:nvSpPr>
-          <p:cNvPr id="127" name="Rounded Rectangle 126"/>
+          <p:cNvPr id="48" name="Rounded Rectangle 47"/>
           <p:cNvSpPr/>
           <p:nvPr/>
         </p:nvSpPr>
@@ -6019,14 +6412,14 @@
       </p:sp>
       <p:sp>
         <p:nvSpPr>
-          <p:cNvPr id="128" name="Rounded Rectangle 127"/>
+          <p:cNvPr id="49" name="Rounded Rectangle 48"/>
           <p:cNvSpPr/>
           <p:nvPr/>
         </p:nvSpPr>
         <p:spPr>
           <a:xfrm>
-            <a:off x="5415281" y="1786915"/>
-            <a:ext cx="1066800" cy="237490"/>
+            <a:off x="5415281" y="1706877"/>
+            <a:ext cx="1066800" cy="367664"/>
           </a:xfrm>
           <a:prstGeom prst="roundRect">
             <a:avLst>
@@ -6059,7 +6452,7 @@
             <a:pPr algn="ctr"/>
             <a:r>
               <a:rPr lang="en-US" sz="1000" dirty="0" smtClean="0"/>
-              <a:t>User Experience</a:t>
+              <a:t>Learnability</a:t>
             </a:r>
             <a:endParaRPr lang="en-US" sz="1000" dirty="0"/>
           </a:p>
@@ -6067,14 +6460,14 @@
       </p:sp>
       <p:sp>
         <p:nvSpPr>
-          <p:cNvPr id="129" name="Rounded Rectangle 128"/>
+          <p:cNvPr id="50" name="Rounded Rectangle 49"/>
           <p:cNvSpPr/>
           <p:nvPr/>
         </p:nvSpPr>
         <p:spPr>
           <a:xfrm>
             <a:off x="5415281" y="2142515"/>
-            <a:ext cx="1087119" cy="227330"/>
+            <a:ext cx="1494679" cy="305726"/>
           </a:xfrm>
           <a:prstGeom prst="roundRect">
             <a:avLst>
@@ -6107,11 +6500,7 @@
             <a:pPr algn="ctr"/>
             <a:r>
               <a:rPr lang="en-US" sz="1000" dirty="0" smtClean="0"/>
-              <a:t>Website </a:t>
-            </a:r>
-            <a:r>
-              <a:rPr lang="en-US" sz="1000" dirty="0"/>
-              <a:t>design</a:t>
+              <a:t>User interface aesthetics</a:t>
             </a:r>
             <a:endParaRPr lang="en-US" sz="1000" dirty="0"/>
           </a:p>
@@ -6119,7 +6508,7 @@
       </p:sp>
       <p:sp>
         <p:nvSpPr>
-          <p:cNvPr id="130" name="Rounded Rectangle 129"/>
+          <p:cNvPr id="51" name="Rounded Rectangle 50"/>
           <p:cNvSpPr/>
           <p:nvPr/>
         </p:nvSpPr>
@@ -6167,7 +6556,7 @@
       </p:sp>
       <p:sp>
         <p:nvSpPr>
-          <p:cNvPr id="131" name="Rounded Rectangle 130"/>
+          <p:cNvPr id="52" name="Rounded Rectangle 51"/>
           <p:cNvSpPr/>
           <p:nvPr/>
         </p:nvSpPr>
@@ -6207,7 +6596,7 @@
             <a:pPr algn="ctr"/>
             <a:r>
               <a:rPr lang="en-US" sz="1000" dirty="0" smtClean="0"/>
-              <a:t>Response Time</a:t>
+              <a:t>Time behavior</a:t>
             </a:r>
             <a:endParaRPr lang="en-US" sz="1000" dirty="0"/>
           </a:p>
@@ -6215,13 +6604,13 @@
       </p:sp>
       <p:grpSp>
         <p:nvGrpSpPr>
-          <p:cNvPr id="135" name="Group 134"/>
+          <p:cNvPr id="53" name="Group 52"/>
           <p:cNvGrpSpPr/>
           <p:nvPr/>
         </p:nvGrpSpPr>
         <p:grpSpPr>
           <a:xfrm>
-            <a:off x="5318761" y="4085792"/>
+            <a:off x="5318761" y="4193872"/>
             <a:ext cx="1879598" cy="491491"/>
             <a:chOff x="7721601" y="3576319"/>
             <a:chExt cx="1859278" cy="491491"/>
@@ -6229,7 +6618,7 @@
         </p:grpSpPr>
         <p:sp>
           <p:nvSpPr>
-            <p:cNvPr id="132" name="Rounded Rectangle 131"/>
+            <p:cNvPr id="54" name="Rounded Rectangle 53"/>
             <p:cNvSpPr/>
             <p:nvPr/>
           </p:nvSpPr>
@@ -6277,7 +6666,7 @@
         </p:sp>
         <p:sp>
           <p:nvSpPr>
-            <p:cNvPr id="133" name="Rounded Rectangle 132"/>
+            <p:cNvPr id="55" name="Rounded Rectangle 54"/>
             <p:cNvSpPr/>
             <p:nvPr/>
           </p:nvSpPr>
@@ -6325,7 +6714,7 @@
         </p:sp>
         <p:sp>
           <p:nvSpPr>
-            <p:cNvPr id="134" name="Rounded Rectangle 133"/>
+            <p:cNvPr id="56" name="Rounded Rectangle 55"/>
             <p:cNvSpPr/>
             <p:nvPr/>
           </p:nvSpPr>
@@ -6374,7 +6763,7 @@
       </p:grpSp>
       <p:sp>
         <p:nvSpPr>
-          <p:cNvPr id="136" name="Rounded Rectangle 135"/>
+          <p:cNvPr id="57" name="Rounded Rectangle 56"/>
           <p:cNvSpPr/>
           <p:nvPr/>
         </p:nvSpPr>
@@ -6422,7 +6811,7 @@
       </p:sp>
       <p:sp>
         <p:nvSpPr>
-          <p:cNvPr id="137" name="Rounded Rectangle 136"/>
+          <p:cNvPr id="58" name="Rounded Rectangle 57"/>
           <p:cNvSpPr/>
           <p:nvPr/>
         </p:nvSpPr>
@@ -6470,14 +6859,14 @@
       </p:sp>
       <p:sp>
         <p:nvSpPr>
-          <p:cNvPr id="138" name="Rounded Rectangle 137"/>
+          <p:cNvPr id="59" name="Rounded Rectangle 58"/>
           <p:cNvSpPr/>
           <p:nvPr/>
         </p:nvSpPr>
         <p:spPr>
           <a:xfrm>
-            <a:off x="5313681" y="6084747"/>
-            <a:ext cx="1300479" cy="300991"/>
+            <a:off x="5372166" y="6084747"/>
+            <a:ext cx="1011197" cy="240573"/>
           </a:xfrm>
           <a:prstGeom prst="roundRect">
             <a:avLst>
@@ -6510,7 +6899,7 @@
             <a:pPr algn="ctr"/>
             <a:r>
               <a:rPr lang="en-US" sz="1000" dirty="0" smtClean="0"/>
-              <a:t>Information Integrity</a:t>
+              <a:t>Confidentiality</a:t>
             </a:r>
             <a:endParaRPr lang="en-US" sz="1000" dirty="0"/>
           </a:p>
@@ -6518,13 +6907,13 @@
       </p:sp>
       <p:sp>
         <p:nvSpPr>
-          <p:cNvPr id="139" name="Rounded Rectangle 138"/>
+          <p:cNvPr id="60" name="Rounded Rectangle 59"/>
           <p:cNvSpPr/>
           <p:nvPr/>
         </p:nvSpPr>
         <p:spPr>
           <a:xfrm>
-            <a:off x="5311141" y="4858588"/>
+            <a:off x="5369626" y="4858588"/>
             <a:ext cx="2098997" cy="227330"/>
           </a:xfrm>
           <a:prstGeom prst="roundRect">
@@ -6566,14 +6955,14 @@
       </p:sp>
       <p:sp>
         <p:nvSpPr>
-          <p:cNvPr id="140" name="Rounded Rectangle 139"/>
+          <p:cNvPr id="61" name="Rounded Rectangle 60"/>
           <p:cNvSpPr/>
           <p:nvPr/>
         </p:nvSpPr>
         <p:spPr>
           <a:xfrm>
-            <a:off x="5323841" y="5781570"/>
-            <a:ext cx="1158240" cy="227330"/>
+            <a:off x="5382326" y="5781570"/>
+            <a:ext cx="1001037" cy="227330"/>
           </a:xfrm>
           <a:prstGeom prst="roundRect">
             <a:avLst>
@@ -6606,7 +6995,7 @@
             <a:pPr algn="ctr"/>
             <a:r>
               <a:rPr lang="en-US" sz="1000" dirty="0" smtClean="0"/>
-              <a:t>Confidentiality</a:t>
+              <a:t>Integrity</a:t>
             </a:r>
             <a:endParaRPr lang="en-US" sz="1000" dirty="0"/>
           </a:p>
@@ -6614,13 +7003,13 @@
       </p:sp>
       <p:sp>
         <p:nvSpPr>
-          <p:cNvPr id="141" name="Rounded Rectangle 140"/>
+          <p:cNvPr id="62" name="Rounded Rectangle 61"/>
           <p:cNvSpPr/>
           <p:nvPr/>
         </p:nvSpPr>
         <p:spPr>
           <a:xfrm>
-            <a:off x="5319039" y="5195136"/>
+            <a:off x="5377524" y="5195136"/>
             <a:ext cx="1005839" cy="227330"/>
           </a:xfrm>
           <a:prstGeom prst="roundRect">
@@ -6662,10 +7051,10 @@
       </p:sp>
       <p:cxnSp>
         <p:nvCxnSpPr>
-          <p:cNvPr id="150" name="Straight Connector 149"/>
+          <p:cNvPr id="63" name="Straight Connector 62"/>
           <p:cNvCxnSpPr>
-            <a:stCxn id="125" idx="1"/>
-            <a:endCxn id="4" idx="3"/>
+            <a:stCxn id="46" idx="1"/>
+            <a:endCxn id="41" idx="3"/>
           </p:cNvCxnSpPr>
           <p:nvPr/>
         </p:nvCxnSpPr>
@@ -6695,10 +7084,10 @@
       </p:cxnSp>
       <p:cxnSp>
         <p:nvCxnSpPr>
-          <p:cNvPr id="153" name="Straight Connector 152"/>
+          <p:cNvPr id="64" name="Straight Connector 63"/>
           <p:cNvCxnSpPr>
-            <a:stCxn id="126" idx="1"/>
-            <a:endCxn id="4" idx="3"/>
+            <a:stCxn id="47" idx="1"/>
+            <a:endCxn id="41" idx="3"/>
           </p:cNvCxnSpPr>
           <p:nvPr/>
         </p:nvCxnSpPr>
@@ -6728,10 +7117,10 @@
       </p:cxnSp>
       <p:cxnSp>
         <p:nvCxnSpPr>
-          <p:cNvPr id="156" name="Straight Connector 155"/>
+          <p:cNvPr id="65" name="Straight Connector 64"/>
           <p:cNvCxnSpPr>
-            <a:stCxn id="124" idx="1"/>
-            <a:endCxn id="4" idx="3"/>
+            <a:stCxn id="45" idx="1"/>
+            <a:endCxn id="41" idx="3"/>
           </p:cNvCxnSpPr>
           <p:nvPr/>
         </p:nvCxnSpPr>
@@ -6761,10 +7150,10 @@
       </p:cxnSp>
       <p:cxnSp>
         <p:nvCxnSpPr>
-          <p:cNvPr id="159" name="Straight Connector 158"/>
+          <p:cNvPr id="66" name="Straight Connector 65"/>
           <p:cNvCxnSpPr>
-            <a:stCxn id="127" idx="1"/>
-            <a:endCxn id="5" idx="3"/>
+            <a:stCxn id="48" idx="1"/>
+            <a:endCxn id="42" idx="3"/>
           </p:cNvCxnSpPr>
           <p:nvPr/>
         </p:nvCxnSpPr>
@@ -6794,17 +7183,17 @@
       </p:cxnSp>
       <p:cxnSp>
         <p:nvCxnSpPr>
-          <p:cNvPr id="162" name="Straight Connector 161"/>
+          <p:cNvPr id="67" name="Straight Connector 66"/>
           <p:cNvCxnSpPr>
-            <a:stCxn id="128" idx="1"/>
-            <a:endCxn id="5" idx="3"/>
+            <a:stCxn id="49" idx="1"/>
+            <a:endCxn id="42" idx="3"/>
           </p:cNvCxnSpPr>
           <p:nvPr/>
         </p:nvCxnSpPr>
         <p:spPr>
           <a:xfrm flipH="1">
-            <a:off x="4825999" y="1905660"/>
-            <a:ext cx="589282" cy="0"/>
+            <a:off x="4825999" y="1890709"/>
+            <a:ext cx="589282" cy="14951"/>
           </a:xfrm>
           <a:prstGeom prst="line">
             <a:avLst/>
@@ -6827,10 +7216,10 @@
       </p:cxnSp>
       <p:cxnSp>
         <p:nvCxnSpPr>
-          <p:cNvPr id="165" name="Straight Connector 164"/>
+          <p:cNvPr id="68" name="Straight Connector 67"/>
           <p:cNvCxnSpPr>
-            <a:stCxn id="130" idx="1"/>
-            <a:endCxn id="6" idx="3"/>
+            <a:stCxn id="51" idx="1"/>
+            <a:endCxn id="43" idx="3"/>
           </p:cNvCxnSpPr>
           <p:nvPr/>
         </p:nvCxnSpPr>
@@ -6860,10 +7249,10 @@
       </p:cxnSp>
       <p:cxnSp>
         <p:nvCxnSpPr>
-          <p:cNvPr id="217" name="Straight Connector 216"/>
+          <p:cNvPr id="73" name="Straight Connector 72"/>
           <p:cNvCxnSpPr>
-            <a:stCxn id="136" idx="1"/>
-            <a:endCxn id="6" idx="3"/>
+            <a:stCxn id="57" idx="1"/>
+            <a:endCxn id="43" idx="3"/>
           </p:cNvCxnSpPr>
           <p:nvPr/>
         </p:nvCxnSpPr>
@@ -6893,10 +7282,10 @@
       </p:cxnSp>
       <p:cxnSp>
         <p:nvCxnSpPr>
-          <p:cNvPr id="222" name="Straight Connector 221"/>
+          <p:cNvPr id="74" name="Straight Connector 73"/>
           <p:cNvCxnSpPr>
-            <a:stCxn id="131" idx="1"/>
-            <a:endCxn id="6" idx="3"/>
+            <a:stCxn id="52" idx="1"/>
+            <a:endCxn id="43" idx="3"/>
           </p:cNvCxnSpPr>
           <p:nvPr/>
         </p:nvCxnSpPr>
@@ -6926,10 +7315,10 @@
       </p:cxnSp>
       <p:cxnSp>
         <p:nvCxnSpPr>
-          <p:cNvPr id="225" name="Straight Connector 224"/>
+          <p:cNvPr id="76" name="Straight Connector 75"/>
           <p:cNvCxnSpPr>
-            <a:stCxn id="137" idx="1"/>
-            <a:endCxn id="6" idx="3"/>
+            <a:stCxn id="58" idx="1"/>
+            <a:endCxn id="43" idx="3"/>
           </p:cNvCxnSpPr>
           <p:nvPr/>
         </p:nvCxnSpPr>
@@ -6959,17 +7348,17 @@
       </p:cxnSp>
       <p:cxnSp>
         <p:nvCxnSpPr>
-          <p:cNvPr id="228" name="Straight Connector 227"/>
+          <p:cNvPr id="77" name="Straight Connector 76"/>
           <p:cNvCxnSpPr>
-            <a:stCxn id="132" idx="1"/>
-            <a:endCxn id="6" idx="3"/>
+            <a:stCxn id="54" idx="1"/>
+            <a:endCxn id="43" idx="3"/>
           </p:cNvCxnSpPr>
           <p:nvPr/>
         </p:nvCxnSpPr>
         <p:spPr>
           <a:xfrm flipH="1" flipV="1">
             <a:off x="4825999" y="3413812"/>
-            <a:ext cx="492762" cy="802473"/>
+            <a:ext cx="492762" cy="910553"/>
           </a:xfrm>
           <a:prstGeom prst="line">
             <a:avLst/>
@@ -6992,17 +7381,17 @@
       </p:cxnSp>
       <p:cxnSp>
         <p:nvCxnSpPr>
-          <p:cNvPr id="333" name="Straight Connector 332"/>
+          <p:cNvPr id="81" name="Straight Connector 80"/>
           <p:cNvCxnSpPr>
-            <a:stCxn id="129" idx="1"/>
-            <a:endCxn id="5" idx="3"/>
+            <a:stCxn id="50" idx="1"/>
+            <a:endCxn id="42" idx="3"/>
           </p:cNvCxnSpPr>
           <p:nvPr/>
         </p:nvCxnSpPr>
         <p:spPr>
           <a:xfrm flipH="1" flipV="1">
             <a:off x="4825999" y="1905660"/>
-            <a:ext cx="589282" cy="350520"/>
+            <a:ext cx="589282" cy="389718"/>
           </a:xfrm>
           <a:prstGeom prst="line">
             <a:avLst/>
@@ -7025,17 +7414,17 @@
       </p:cxnSp>
       <p:cxnSp>
         <p:nvCxnSpPr>
-          <p:cNvPr id="443" name="Straight Connector 442"/>
+          <p:cNvPr id="86" name="Straight Connector 85"/>
           <p:cNvCxnSpPr>
-            <a:stCxn id="139" idx="1"/>
-            <a:endCxn id="7" idx="3"/>
+            <a:stCxn id="60" idx="1"/>
+            <a:endCxn id="44" idx="3"/>
           </p:cNvCxnSpPr>
           <p:nvPr/>
         </p:nvCxnSpPr>
         <p:spPr>
           <a:xfrm flipH="1">
             <a:off x="4825999" y="4972253"/>
-            <a:ext cx="485142" cy="631094"/>
+            <a:ext cx="543627" cy="631094"/>
           </a:xfrm>
           <a:prstGeom prst="line">
             <a:avLst/>
@@ -7058,17 +7447,17 @@
       </p:cxnSp>
       <p:cxnSp>
         <p:nvCxnSpPr>
-          <p:cNvPr id="446" name="Straight Connector 445"/>
+          <p:cNvPr id="87" name="Straight Connector 86"/>
           <p:cNvCxnSpPr>
-            <a:stCxn id="140" idx="1"/>
-            <a:endCxn id="7" idx="3"/>
+            <a:stCxn id="61" idx="1"/>
+            <a:endCxn id="44" idx="3"/>
           </p:cNvCxnSpPr>
           <p:nvPr/>
         </p:nvCxnSpPr>
         <p:spPr>
           <a:xfrm flipH="1" flipV="1">
             <a:off x="4825999" y="5603347"/>
-            <a:ext cx="497842" cy="291888"/>
+            <a:ext cx="556327" cy="291888"/>
           </a:xfrm>
           <a:prstGeom prst="line">
             <a:avLst/>
@@ -7091,17 +7480,17 @@
       </p:cxnSp>
       <p:cxnSp>
         <p:nvCxnSpPr>
-          <p:cNvPr id="449" name="Straight Connector 448"/>
+          <p:cNvPr id="88" name="Straight Connector 87"/>
           <p:cNvCxnSpPr>
-            <a:stCxn id="138" idx="1"/>
-            <a:endCxn id="7" idx="3"/>
+            <a:stCxn id="59" idx="1"/>
+            <a:endCxn id="44" idx="3"/>
           </p:cNvCxnSpPr>
           <p:nvPr/>
         </p:nvCxnSpPr>
         <p:spPr>
           <a:xfrm flipH="1" flipV="1">
             <a:off x="4825999" y="5603347"/>
-            <a:ext cx="487682" cy="631896"/>
+            <a:ext cx="546167" cy="601687"/>
           </a:xfrm>
           <a:prstGeom prst="line">
             <a:avLst/>
@@ -7124,17 +7513,17 @@
       </p:cxnSp>
       <p:cxnSp>
         <p:nvCxnSpPr>
-          <p:cNvPr id="452" name="Straight Connector 451"/>
+          <p:cNvPr id="89" name="Straight Connector 88"/>
           <p:cNvCxnSpPr>
-            <a:stCxn id="80" idx="1"/>
-            <a:endCxn id="7" idx="3"/>
+            <a:stCxn id="92" idx="1"/>
+            <a:endCxn id="44" idx="3"/>
           </p:cNvCxnSpPr>
           <p:nvPr/>
         </p:nvCxnSpPr>
         <p:spPr>
           <a:xfrm flipH="1">
             <a:off x="4825999" y="5603347"/>
-            <a:ext cx="502923" cy="0"/>
+            <a:ext cx="561408" cy="0"/>
           </a:xfrm>
           <a:prstGeom prst="line">
             <a:avLst/>
@@ -7157,13 +7546,13 @@
       </p:cxnSp>
       <p:sp>
         <p:nvSpPr>
-          <p:cNvPr id="80" name="Rounded Rectangle 79"/>
+          <p:cNvPr id="92" name="Rounded Rectangle 91"/>
           <p:cNvSpPr/>
           <p:nvPr/>
         </p:nvSpPr>
         <p:spPr>
           <a:xfrm>
-            <a:off x="5328922" y="5493707"/>
+            <a:off x="5387407" y="5493707"/>
             <a:ext cx="993917" cy="219279"/>
           </a:xfrm>
           <a:prstGeom prst="roundRect">
@@ -7200,42 +7589,6 @@
               <a:t>Privacy</a:t>
             </a:r>
             <a:endParaRPr lang="en-US" sz="1000" dirty="0"/>
-          </a:p>
-        </p:txBody>
-      </p:sp>
-      <p:sp>
-        <p:nvSpPr>
-          <p:cNvPr id="75" name="TextBox 74"/>
-          <p:cNvSpPr txBox="1"/>
-          <p:nvPr/>
-        </p:nvSpPr>
-        <p:spPr>
-          <a:xfrm>
-            <a:off x="538826" y="2021840"/>
-            <a:ext cx="1956598" cy="646331"/>
-          </a:xfrm>
-          <a:prstGeom prst="rect">
-            <a:avLst/>
-          </a:prstGeom>
-          <a:noFill/>
-        </p:spPr>
-        <p:txBody>
-          <a:bodyPr wrap="none" rtlCol="0">
-            <a:spAutoFit/>
-          </a:bodyPr>
-          <a:lstStyle/>
-          <a:p>
-            <a:r>
-              <a:rPr lang="en-US" dirty="0" smtClean="0"/>
-              <a:t>DIMENSIONS AND</a:t>
-            </a:r>
-          </a:p>
-          <a:p>
-            <a:r>
-              <a:rPr lang="en-US" dirty="0" smtClean="0"/>
-              <a:t>KEY COMPONENTS</a:t>
-            </a:r>
-            <a:endParaRPr lang="en-US" dirty="0"/>
           </a:p>
         </p:txBody>
       </p:sp>
@@ -7278,7 +7631,42 @@
       </p:grpSpPr>
       <p:sp>
         <p:nvSpPr>
-          <p:cNvPr id="4" name="Rounded Rectangle 3"/>
+          <p:cNvPr id="112" name="TextBox 111"/>
+          <p:cNvSpPr txBox="1"/>
+          <p:nvPr/>
+        </p:nvSpPr>
+        <p:spPr>
+          <a:xfrm>
+            <a:off x="461850" y="2833292"/>
+            <a:ext cx="2903359" cy="646331"/>
+          </a:xfrm>
+          <a:prstGeom prst="rect">
+            <a:avLst/>
+          </a:prstGeom>
+          <a:noFill/>
+        </p:spPr>
+        <p:txBody>
+          <a:bodyPr wrap="none" rtlCol="0">
+            <a:spAutoFit/>
+          </a:bodyPr>
+          <a:lstStyle/>
+          <a:p>
+            <a:r>
+              <a:rPr lang="en-US" dirty="0" smtClean="0"/>
+              <a:t>DIMENSIONS, COMPONENTS</a:t>
+            </a:r>
+          </a:p>
+          <a:p>
+            <a:r>
+              <a:rPr lang="en-US" dirty="0" smtClean="0"/>
+              <a:t>AND RELATIONSHIPS</a:t>
+            </a:r>
+          </a:p>
+        </p:txBody>
+      </p:sp>
+      <p:sp>
+        <p:nvSpPr>
+          <p:cNvPr id="54" name="Rounded Rectangle 53"/>
           <p:cNvSpPr/>
           <p:nvPr/>
         </p:nvSpPr>
@@ -7322,7 +7710,7 @@
       </p:sp>
       <p:sp>
         <p:nvSpPr>
-          <p:cNvPr id="5" name="Rounded Rectangle 4"/>
+          <p:cNvPr id="55" name="Rounded Rectangle 54"/>
           <p:cNvSpPr/>
           <p:nvPr/>
         </p:nvSpPr>
@@ -7366,7 +7754,7 @@
       </p:sp>
       <p:sp>
         <p:nvSpPr>
-          <p:cNvPr id="6" name="Rounded Rectangle 5"/>
+          <p:cNvPr id="56" name="Rounded Rectangle 55"/>
           <p:cNvSpPr/>
           <p:nvPr/>
         </p:nvSpPr>
@@ -7410,7 +7798,7 @@
       </p:sp>
       <p:sp>
         <p:nvSpPr>
-          <p:cNvPr id="7" name="Rounded Rectangle 6"/>
+          <p:cNvPr id="57" name="Rounded Rectangle 56"/>
           <p:cNvSpPr/>
           <p:nvPr/>
         </p:nvSpPr>
@@ -7454,7 +7842,7 @@
       </p:sp>
       <p:sp>
         <p:nvSpPr>
-          <p:cNvPr id="124" name="Rounded Rectangle 123"/>
+          <p:cNvPr id="58" name="Rounded Rectangle 57"/>
           <p:cNvSpPr/>
           <p:nvPr/>
         </p:nvSpPr>
@@ -7502,7 +7890,7 @@
       </p:sp>
       <p:sp>
         <p:nvSpPr>
-          <p:cNvPr id="125" name="Rounded Rectangle 124"/>
+          <p:cNvPr id="59" name="Rounded Rectangle 58"/>
           <p:cNvSpPr/>
           <p:nvPr/>
         </p:nvSpPr>
@@ -7550,7 +7938,7 @@
       </p:sp>
       <p:sp>
         <p:nvSpPr>
-          <p:cNvPr id="126" name="Rounded Rectangle 125"/>
+          <p:cNvPr id="60" name="Rounded Rectangle 59"/>
           <p:cNvSpPr/>
           <p:nvPr/>
         </p:nvSpPr>
@@ -7598,7 +7986,7 @@
       </p:sp>
       <p:sp>
         <p:nvSpPr>
-          <p:cNvPr id="127" name="Rounded Rectangle 126"/>
+          <p:cNvPr id="61" name="Rounded Rectangle 60"/>
           <p:cNvSpPr/>
           <p:nvPr/>
         </p:nvSpPr>
@@ -7646,14 +8034,14 @@
       </p:sp>
       <p:sp>
         <p:nvSpPr>
-          <p:cNvPr id="128" name="Rounded Rectangle 127"/>
+          <p:cNvPr id="62" name="Rounded Rectangle 61"/>
           <p:cNvSpPr/>
           <p:nvPr/>
         </p:nvSpPr>
         <p:spPr>
           <a:xfrm>
-            <a:off x="5415281" y="1786915"/>
-            <a:ext cx="1066800" cy="237490"/>
+            <a:off x="5415281" y="1706877"/>
+            <a:ext cx="1066800" cy="367664"/>
           </a:xfrm>
           <a:prstGeom prst="roundRect">
             <a:avLst>
@@ -7686,7 +8074,7 @@
             <a:pPr algn="ctr"/>
             <a:r>
               <a:rPr lang="en-US" sz="1000" dirty="0" smtClean="0"/>
-              <a:t>User Experience</a:t>
+              <a:t>Learnability</a:t>
             </a:r>
             <a:endParaRPr lang="en-US" sz="1000" dirty="0"/>
           </a:p>
@@ -7694,14 +8082,14 @@
       </p:sp>
       <p:sp>
         <p:nvSpPr>
-          <p:cNvPr id="129" name="Rounded Rectangle 128"/>
+          <p:cNvPr id="63" name="Rounded Rectangle 62"/>
           <p:cNvSpPr/>
           <p:nvPr/>
         </p:nvSpPr>
         <p:spPr>
           <a:xfrm>
             <a:off x="5415281" y="2142515"/>
-            <a:ext cx="1087119" cy="227330"/>
+            <a:ext cx="1494679" cy="305726"/>
           </a:xfrm>
           <a:prstGeom prst="roundRect">
             <a:avLst>
@@ -7734,11 +8122,7 @@
             <a:pPr algn="ctr"/>
             <a:r>
               <a:rPr lang="en-US" sz="1000" dirty="0" smtClean="0"/>
-              <a:t>Website </a:t>
-            </a:r>
-            <a:r>
-              <a:rPr lang="en-US" sz="1000" dirty="0"/>
-              <a:t>design</a:t>
+              <a:t>User interface aesthetics</a:t>
             </a:r>
             <a:endParaRPr lang="en-US" sz="1000" dirty="0"/>
           </a:p>
@@ -7746,7 +8130,7 @@
       </p:sp>
       <p:sp>
         <p:nvSpPr>
-          <p:cNvPr id="130" name="Rounded Rectangle 129"/>
+          <p:cNvPr id="64" name="Rounded Rectangle 63"/>
           <p:cNvSpPr/>
           <p:nvPr/>
         </p:nvSpPr>
@@ -7794,7 +8178,7 @@
       </p:sp>
       <p:sp>
         <p:nvSpPr>
-          <p:cNvPr id="131" name="Rounded Rectangle 130"/>
+          <p:cNvPr id="65" name="Rounded Rectangle 64"/>
           <p:cNvSpPr/>
           <p:nvPr/>
         </p:nvSpPr>
@@ -7834,7 +8218,7 @@
             <a:pPr algn="ctr"/>
             <a:r>
               <a:rPr lang="en-US" sz="1000" dirty="0" smtClean="0"/>
-              <a:t>Response Time</a:t>
+              <a:t>Time behavior</a:t>
             </a:r>
             <a:endParaRPr lang="en-US" sz="1000" dirty="0"/>
           </a:p>
@@ -7842,7 +8226,7 @@
       </p:sp>
       <p:grpSp>
         <p:nvGrpSpPr>
-          <p:cNvPr id="135" name="Group 134"/>
+          <p:cNvPr id="66" name="Group 65"/>
           <p:cNvGrpSpPr/>
           <p:nvPr/>
         </p:nvGrpSpPr>
@@ -7856,7 +8240,7 @@
         </p:grpSpPr>
         <p:sp>
           <p:nvSpPr>
-            <p:cNvPr id="132" name="Rounded Rectangle 131"/>
+            <p:cNvPr id="67" name="Rounded Rectangle 66"/>
             <p:cNvSpPr/>
             <p:nvPr/>
           </p:nvSpPr>
@@ -7904,7 +8288,7 @@
         </p:sp>
         <p:sp>
           <p:nvSpPr>
-            <p:cNvPr id="133" name="Rounded Rectangle 132"/>
+            <p:cNvPr id="68" name="Rounded Rectangle 67"/>
             <p:cNvSpPr/>
             <p:nvPr/>
           </p:nvSpPr>
@@ -7952,7 +8336,7 @@
         </p:sp>
         <p:sp>
           <p:nvSpPr>
-            <p:cNvPr id="134" name="Rounded Rectangle 133"/>
+            <p:cNvPr id="69" name="Rounded Rectangle 68"/>
             <p:cNvSpPr/>
             <p:nvPr/>
           </p:nvSpPr>
@@ -8001,7 +8385,7 @@
       </p:grpSp>
       <p:sp>
         <p:nvSpPr>
-          <p:cNvPr id="136" name="Rounded Rectangle 135"/>
+          <p:cNvPr id="70" name="Rounded Rectangle 69"/>
           <p:cNvSpPr/>
           <p:nvPr/>
         </p:nvSpPr>
@@ -8049,7 +8433,7 @@
       </p:sp>
       <p:sp>
         <p:nvSpPr>
-          <p:cNvPr id="137" name="Rounded Rectangle 136"/>
+          <p:cNvPr id="71" name="Rounded Rectangle 70"/>
           <p:cNvSpPr/>
           <p:nvPr/>
         </p:nvSpPr>
@@ -8097,14 +8481,14 @@
       </p:sp>
       <p:sp>
         <p:nvSpPr>
-          <p:cNvPr id="138" name="Rounded Rectangle 137"/>
+          <p:cNvPr id="72" name="Rounded Rectangle 71"/>
           <p:cNvSpPr/>
           <p:nvPr/>
         </p:nvSpPr>
         <p:spPr>
           <a:xfrm>
-            <a:off x="5313681" y="6084747"/>
-            <a:ext cx="1300479" cy="300991"/>
+            <a:off x="5372166" y="6084747"/>
+            <a:ext cx="1011197" cy="240573"/>
           </a:xfrm>
           <a:prstGeom prst="roundRect">
             <a:avLst>
@@ -8137,7 +8521,7 @@
             <a:pPr algn="ctr"/>
             <a:r>
               <a:rPr lang="en-US" sz="1000" dirty="0" smtClean="0"/>
-              <a:t>Information Integrity</a:t>
+              <a:t>Confidentiality</a:t>
             </a:r>
             <a:endParaRPr lang="en-US" sz="1000" dirty="0"/>
           </a:p>
@@ -8145,13 +8529,13 @@
       </p:sp>
       <p:sp>
         <p:nvSpPr>
-          <p:cNvPr id="139" name="Rounded Rectangle 138"/>
+          <p:cNvPr id="74" name="Rounded Rectangle 73"/>
           <p:cNvSpPr/>
           <p:nvPr/>
         </p:nvSpPr>
         <p:spPr>
           <a:xfrm>
-            <a:off x="5311141" y="4858588"/>
+            <a:off x="5369626" y="4858588"/>
             <a:ext cx="2098997" cy="227330"/>
           </a:xfrm>
           <a:prstGeom prst="roundRect">
@@ -8193,14 +8577,14 @@
       </p:sp>
       <p:sp>
         <p:nvSpPr>
-          <p:cNvPr id="140" name="Rounded Rectangle 139"/>
+          <p:cNvPr id="75" name="Rounded Rectangle 74"/>
           <p:cNvSpPr/>
           <p:nvPr/>
         </p:nvSpPr>
         <p:spPr>
           <a:xfrm>
-            <a:off x="5323841" y="5781570"/>
-            <a:ext cx="1158240" cy="227330"/>
+            <a:off x="5382326" y="5781570"/>
+            <a:ext cx="1001037" cy="227330"/>
           </a:xfrm>
           <a:prstGeom prst="roundRect">
             <a:avLst>
@@ -8233,7 +8617,7 @@
             <a:pPr algn="ctr"/>
             <a:r>
               <a:rPr lang="en-US" sz="1000" dirty="0" smtClean="0"/>
-              <a:t>Confidentiality</a:t>
+              <a:t>Integrity</a:t>
             </a:r>
             <a:endParaRPr lang="en-US" sz="1000" dirty="0"/>
           </a:p>
@@ -8241,13 +8625,13 @@
       </p:sp>
       <p:sp>
         <p:nvSpPr>
-          <p:cNvPr id="141" name="Rounded Rectangle 140"/>
+          <p:cNvPr id="76" name="Rounded Rectangle 75"/>
           <p:cNvSpPr/>
           <p:nvPr/>
         </p:nvSpPr>
         <p:spPr>
           <a:xfrm>
-            <a:off x="5319039" y="5195136"/>
+            <a:off x="5377524" y="5195136"/>
             <a:ext cx="1005839" cy="227330"/>
           </a:xfrm>
           <a:prstGeom prst="roundRect">
@@ -8289,10 +8673,10 @@
       </p:sp>
       <p:cxnSp>
         <p:nvCxnSpPr>
-          <p:cNvPr id="150" name="Straight Connector 149"/>
+          <p:cNvPr id="77" name="Straight Connector 76"/>
           <p:cNvCxnSpPr>
-            <a:stCxn id="125" idx="1"/>
-            <a:endCxn id="4" idx="3"/>
+            <a:stCxn id="59" idx="1"/>
+            <a:endCxn id="54" idx="3"/>
           </p:cNvCxnSpPr>
           <p:nvPr/>
         </p:nvCxnSpPr>
@@ -8322,10 +8706,10 @@
       </p:cxnSp>
       <p:cxnSp>
         <p:nvCxnSpPr>
-          <p:cNvPr id="153" name="Straight Connector 152"/>
+          <p:cNvPr id="78" name="Straight Connector 77"/>
           <p:cNvCxnSpPr>
-            <a:stCxn id="126" idx="1"/>
-            <a:endCxn id="4" idx="3"/>
+            <a:stCxn id="60" idx="1"/>
+            <a:endCxn id="54" idx="3"/>
           </p:cNvCxnSpPr>
           <p:nvPr/>
         </p:nvCxnSpPr>
@@ -8355,10 +8739,10 @@
       </p:cxnSp>
       <p:cxnSp>
         <p:nvCxnSpPr>
-          <p:cNvPr id="156" name="Straight Connector 155"/>
+          <p:cNvPr id="79" name="Straight Connector 78"/>
           <p:cNvCxnSpPr>
-            <a:stCxn id="124" idx="1"/>
-            <a:endCxn id="4" idx="3"/>
+            <a:stCxn id="58" idx="1"/>
+            <a:endCxn id="54" idx="3"/>
           </p:cNvCxnSpPr>
           <p:nvPr/>
         </p:nvCxnSpPr>
@@ -8388,10 +8772,10 @@
       </p:cxnSp>
       <p:cxnSp>
         <p:nvCxnSpPr>
-          <p:cNvPr id="159" name="Straight Connector 158"/>
+          <p:cNvPr id="82" name="Straight Connector 81"/>
           <p:cNvCxnSpPr>
-            <a:stCxn id="127" idx="1"/>
-            <a:endCxn id="5" idx="3"/>
+            <a:stCxn id="61" idx="1"/>
+            <a:endCxn id="55" idx="3"/>
           </p:cNvCxnSpPr>
           <p:nvPr/>
         </p:nvCxnSpPr>
@@ -8421,17 +8805,17 @@
       </p:cxnSp>
       <p:cxnSp>
         <p:nvCxnSpPr>
-          <p:cNvPr id="162" name="Straight Connector 161"/>
+          <p:cNvPr id="83" name="Straight Connector 82"/>
           <p:cNvCxnSpPr>
-            <a:stCxn id="128" idx="1"/>
-            <a:endCxn id="5" idx="3"/>
+            <a:stCxn id="62" idx="1"/>
+            <a:endCxn id="55" idx="3"/>
           </p:cNvCxnSpPr>
           <p:nvPr/>
         </p:nvCxnSpPr>
         <p:spPr>
           <a:xfrm flipH="1">
-            <a:off x="4825999" y="1905660"/>
-            <a:ext cx="589282" cy="0"/>
+            <a:off x="4825999" y="1890709"/>
+            <a:ext cx="589282" cy="14951"/>
           </a:xfrm>
           <a:prstGeom prst="line">
             <a:avLst/>
@@ -8454,10 +8838,10 @@
       </p:cxnSp>
       <p:cxnSp>
         <p:nvCxnSpPr>
-          <p:cNvPr id="165" name="Straight Connector 164"/>
+          <p:cNvPr id="84" name="Straight Connector 83"/>
           <p:cNvCxnSpPr>
-            <a:stCxn id="130" idx="1"/>
-            <a:endCxn id="6" idx="3"/>
+            <a:stCxn id="64" idx="1"/>
+            <a:endCxn id="56" idx="3"/>
           </p:cNvCxnSpPr>
           <p:nvPr/>
         </p:nvCxnSpPr>
@@ -8487,10 +8871,10 @@
       </p:cxnSp>
       <p:cxnSp>
         <p:nvCxnSpPr>
-          <p:cNvPr id="169" name="Straight Arrow Connector 168"/>
+          <p:cNvPr id="85" name="Straight Arrow Connector 84"/>
           <p:cNvCxnSpPr>
-            <a:stCxn id="127" idx="0"/>
-            <a:endCxn id="124" idx="2"/>
+            <a:stCxn id="61" idx="0"/>
+            <a:endCxn id="58" idx="2"/>
           </p:cNvCxnSpPr>
           <p:nvPr/>
         </p:nvCxnSpPr>
@@ -8525,19 +8909,21 @@
       </p:cxnSp>
       <p:cxnSp>
         <p:nvCxnSpPr>
-          <p:cNvPr id="171" name="Elbow Connector 170"/>
+          <p:cNvPr id="86" name="Elbow Connector 85"/>
           <p:cNvCxnSpPr>
-            <a:stCxn id="129" idx="3"/>
+            <a:stCxn id="63" idx="3"/>
           </p:cNvCxnSpPr>
           <p:nvPr/>
         </p:nvCxnSpPr>
         <p:spPr>
-          <a:xfrm flipV="1">
-            <a:off x="6502400" y="1666902"/>
-            <a:ext cx="487680" cy="589278"/>
-          </a:xfrm>
-          <a:prstGeom prst="bentConnector2">
-            <a:avLst/>
+          <a:xfrm flipH="1" flipV="1">
+            <a:off x="6482082" y="2032660"/>
+            <a:ext cx="427878" cy="262718"/>
+          </a:xfrm>
+          <a:prstGeom prst="bentConnector3">
+            <a:avLst>
+              <a:gd name="adj1" fmla="val -53426"/>
+            </a:avLst>
           </a:prstGeom>
           <a:ln w="3175" cmpd="sng">
             <a:prstDash val="lgDash"/>
@@ -8562,19 +8948,21 @@
       </p:cxnSp>
       <p:cxnSp>
         <p:nvCxnSpPr>
-          <p:cNvPr id="172" name="Elbow Connector 171"/>
+          <p:cNvPr id="87" name="Elbow Connector 86"/>
           <p:cNvCxnSpPr>
-            <a:stCxn id="128" idx="3"/>
+            <a:stCxn id="62" idx="3"/>
           </p:cNvCxnSpPr>
           <p:nvPr/>
         </p:nvCxnSpPr>
         <p:spPr>
           <a:xfrm flipV="1">
-            <a:off x="6482081" y="1646581"/>
-            <a:ext cx="243839" cy="259079"/>
-          </a:xfrm>
-          <a:prstGeom prst="bentConnector2">
-            <a:avLst/>
+            <a:off x="6482081" y="1656741"/>
+            <a:ext cx="243839" cy="233968"/>
+          </a:xfrm>
+          <a:prstGeom prst="bentConnector3">
+            <a:avLst>
+              <a:gd name="adj1" fmla="val 104827"/>
+            </a:avLst>
           </a:prstGeom>
           <a:ln w="3175" cmpd="sng">
             <a:prstDash val="lgDash"/>
@@ -8600,10 +8988,10 @@
       </p:cxnSp>
       <p:cxnSp>
         <p:nvCxnSpPr>
-          <p:cNvPr id="181" name="Elbow Connector 180"/>
+          <p:cNvPr id="88" name="Elbow Connector 87"/>
           <p:cNvCxnSpPr>
-            <a:stCxn id="130" idx="3"/>
-            <a:endCxn id="124" idx="3"/>
+            <a:stCxn id="64" idx="3"/>
+            <a:endCxn id="58" idx="3"/>
           </p:cNvCxnSpPr>
           <p:nvPr/>
         </p:nvCxnSpPr>
@@ -8640,10 +9028,10 @@
       </p:cxnSp>
       <p:cxnSp>
         <p:nvCxnSpPr>
-          <p:cNvPr id="217" name="Straight Connector 216"/>
+          <p:cNvPr id="89" name="Straight Connector 88"/>
           <p:cNvCxnSpPr>
-            <a:stCxn id="136" idx="1"/>
-            <a:endCxn id="6" idx="3"/>
+            <a:stCxn id="70" idx="1"/>
+            <a:endCxn id="56" idx="3"/>
           </p:cNvCxnSpPr>
           <p:nvPr/>
         </p:nvCxnSpPr>
@@ -8673,10 +9061,10 @@
       </p:cxnSp>
       <p:cxnSp>
         <p:nvCxnSpPr>
-          <p:cNvPr id="222" name="Straight Connector 221"/>
+          <p:cNvPr id="90" name="Straight Connector 89"/>
           <p:cNvCxnSpPr>
-            <a:stCxn id="131" idx="1"/>
-            <a:endCxn id="6" idx="3"/>
+            <a:stCxn id="65" idx="1"/>
+            <a:endCxn id="56" idx="3"/>
           </p:cNvCxnSpPr>
           <p:nvPr/>
         </p:nvCxnSpPr>
@@ -8706,10 +9094,10 @@
       </p:cxnSp>
       <p:cxnSp>
         <p:nvCxnSpPr>
-          <p:cNvPr id="225" name="Straight Connector 224"/>
+          <p:cNvPr id="91" name="Straight Connector 90"/>
           <p:cNvCxnSpPr>
-            <a:stCxn id="137" idx="1"/>
-            <a:endCxn id="6" idx="3"/>
+            <a:stCxn id="71" idx="1"/>
+            <a:endCxn id="56" idx="3"/>
           </p:cNvCxnSpPr>
           <p:nvPr/>
         </p:nvCxnSpPr>
@@ -8739,10 +9127,10 @@
       </p:cxnSp>
       <p:cxnSp>
         <p:nvCxnSpPr>
-          <p:cNvPr id="228" name="Straight Connector 227"/>
+          <p:cNvPr id="92" name="Straight Connector 91"/>
           <p:cNvCxnSpPr>
-            <a:stCxn id="132" idx="1"/>
-            <a:endCxn id="6" idx="3"/>
+            <a:stCxn id="67" idx="1"/>
+            <a:endCxn id="56" idx="3"/>
           </p:cNvCxnSpPr>
           <p:nvPr/>
         </p:nvCxnSpPr>
@@ -8772,7 +9160,7 @@
       </p:cxnSp>
       <p:cxnSp>
         <p:nvCxnSpPr>
-          <p:cNvPr id="313" name="Elbow Connector 312"/>
+          <p:cNvPr id="93" name="Elbow Connector 92"/>
           <p:cNvCxnSpPr/>
           <p:nvPr/>
         </p:nvCxnSpPr>
@@ -8807,9 +9195,9 @@
       </p:cxnSp>
       <p:cxnSp>
         <p:nvCxnSpPr>
-          <p:cNvPr id="315" name="Elbow Connector 314"/>
+          <p:cNvPr id="94" name="Elbow Connector 93"/>
           <p:cNvCxnSpPr>
-            <a:stCxn id="131" idx="3"/>
+            <a:stCxn id="65" idx="3"/>
           </p:cNvCxnSpPr>
           <p:nvPr/>
         </p:nvCxnSpPr>
@@ -8844,17 +9232,17 @@
       </p:cxnSp>
       <p:cxnSp>
         <p:nvCxnSpPr>
-          <p:cNvPr id="333" name="Straight Connector 332"/>
+          <p:cNvPr id="95" name="Straight Connector 94"/>
           <p:cNvCxnSpPr>
-            <a:stCxn id="129" idx="1"/>
-            <a:endCxn id="5" idx="3"/>
+            <a:stCxn id="63" idx="1"/>
+            <a:endCxn id="55" idx="3"/>
           </p:cNvCxnSpPr>
           <p:nvPr/>
         </p:nvCxnSpPr>
         <p:spPr>
           <a:xfrm flipH="1" flipV="1">
             <a:off x="4825999" y="1905660"/>
-            <a:ext cx="589282" cy="350520"/>
+            <a:ext cx="589282" cy="389718"/>
           </a:xfrm>
           <a:prstGeom prst="line">
             <a:avLst/>
@@ -8877,9 +9265,9 @@
       </p:cxnSp>
       <p:cxnSp>
         <p:nvCxnSpPr>
-          <p:cNvPr id="379" name="Straight Arrow Connector 378"/>
+          <p:cNvPr id="96" name="Straight Arrow Connector 95"/>
           <p:cNvCxnSpPr>
-            <a:stCxn id="132" idx="0"/>
+            <a:stCxn id="67" idx="0"/>
           </p:cNvCxnSpPr>
           <p:nvPr/>
         </p:nvCxnSpPr>
@@ -8914,15 +9302,15 @@
       </p:cxnSp>
       <p:cxnSp>
         <p:nvCxnSpPr>
-          <p:cNvPr id="426" name="Elbow Connector 425"/>
+          <p:cNvPr id="97" name="Elbow Connector 96"/>
           <p:cNvCxnSpPr>
-            <a:stCxn id="141" idx="3"/>
+            <a:stCxn id="76" idx="3"/>
           </p:cNvCxnSpPr>
           <p:nvPr/>
         </p:nvCxnSpPr>
         <p:spPr>
           <a:xfrm flipV="1">
-            <a:off x="6324878" y="5085918"/>
+            <a:off x="6383363" y="5085918"/>
             <a:ext cx="197842" cy="222883"/>
           </a:xfrm>
           <a:prstGeom prst="bentConnector2">
@@ -8951,16 +9339,16 @@
       </p:cxnSp>
       <p:cxnSp>
         <p:nvCxnSpPr>
-          <p:cNvPr id="427" name="Elbow Connector 426"/>
+          <p:cNvPr id="98" name="Elbow Connector 97"/>
           <p:cNvCxnSpPr>
-            <a:stCxn id="140" idx="3"/>
+            <a:stCxn id="75" idx="3"/>
           </p:cNvCxnSpPr>
           <p:nvPr/>
         </p:nvCxnSpPr>
         <p:spPr>
           <a:xfrm flipV="1">
-            <a:off x="6482081" y="5085919"/>
-            <a:ext cx="497839" cy="809316"/>
+            <a:off x="6383363" y="5085919"/>
+            <a:ext cx="655042" cy="809316"/>
           </a:xfrm>
           <a:prstGeom prst="bentConnector2">
             <a:avLst/>
@@ -8988,16 +9376,16 @@
       </p:cxnSp>
       <p:cxnSp>
         <p:nvCxnSpPr>
-          <p:cNvPr id="438" name="Elbow Connector 437"/>
+          <p:cNvPr id="99" name="Elbow Connector 98"/>
           <p:cNvCxnSpPr>
-            <a:stCxn id="138" idx="3"/>
+            <a:stCxn id="72" idx="3"/>
           </p:cNvCxnSpPr>
           <p:nvPr/>
         </p:nvCxnSpPr>
         <p:spPr>
           <a:xfrm flipV="1">
-            <a:off x="6614160" y="5085919"/>
-            <a:ext cx="584199" cy="1149324"/>
+            <a:off x="6383363" y="5085920"/>
+            <a:ext cx="873481" cy="1119114"/>
           </a:xfrm>
           <a:prstGeom prst="bentConnector2">
             <a:avLst/>
@@ -9025,17 +9413,17 @@
       </p:cxnSp>
       <p:cxnSp>
         <p:nvCxnSpPr>
-          <p:cNvPr id="443" name="Straight Connector 442"/>
+          <p:cNvPr id="100" name="Straight Connector 99"/>
           <p:cNvCxnSpPr>
-            <a:stCxn id="139" idx="1"/>
-            <a:endCxn id="7" idx="3"/>
+            <a:stCxn id="74" idx="1"/>
+            <a:endCxn id="57" idx="3"/>
           </p:cNvCxnSpPr>
           <p:nvPr/>
         </p:nvCxnSpPr>
         <p:spPr>
           <a:xfrm flipH="1">
             <a:off x="4825999" y="4972253"/>
-            <a:ext cx="485142" cy="631094"/>
+            <a:ext cx="543627" cy="631094"/>
           </a:xfrm>
           <a:prstGeom prst="line">
             <a:avLst/>
@@ -9058,17 +9446,17 @@
       </p:cxnSp>
       <p:cxnSp>
         <p:nvCxnSpPr>
-          <p:cNvPr id="446" name="Straight Connector 445"/>
+          <p:cNvPr id="101" name="Straight Connector 100"/>
           <p:cNvCxnSpPr>
-            <a:stCxn id="140" idx="1"/>
-            <a:endCxn id="7" idx="3"/>
+            <a:stCxn id="75" idx="1"/>
+            <a:endCxn id="57" idx="3"/>
           </p:cNvCxnSpPr>
           <p:nvPr/>
         </p:nvCxnSpPr>
         <p:spPr>
           <a:xfrm flipH="1" flipV="1">
             <a:off x="4825999" y="5603347"/>
-            <a:ext cx="497842" cy="291888"/>
+            <a:ext cx="556327" cy="291888"/>
           </a:xfrm>
           <a:prstGeom prst="line">
             <a:avLst/>
@@ -9091,17 +9479,17 @@
       </p:cxnSp>
       <p:cxnSp>
         <p:nvCxnSpPr>
-          <p:cNvPr id="449" name="Straight Connector 448"/>
+          <p:cNvPr id="102" name="Straight Connector 101"/>
           <p:cNvCxnSpPr>
-            <a:stCxn id="138" idx="1"/>
-            <a:endCxn id="7" idx="3"/>
+            <a:stCxn id="72" idx="1"/>
+            <a:endCxn id="57" idx="3"/>
           </p:cNvCxnSpPr>
           <p:nvPr/>
         </p:nvCxnSpPr>
         <p:spPr>
           <a:xfrm flipH="1" flipV="1">
             <a:off x="4825999" y="5603347"/>
-            <a:ext cx="487682" cy="631896"/>
+            <a:ext cx="546167" cy="601687"/>
           </a:xfrm>
           <a:prstGeom prst="line">
             <a:avLst/>
@@ -9124,17 +9512,17 @@
       </p:cxnSp>
       <p:cxnSp>
         <p:nvCxnSpPr>
-          <p:cNvPr id="452" name="Straight Connector 451"/>
+          <p:cNvPr id="103" name="Straight Connector 102"/>
           <p:cNvCxnSpPr>
-            <a:stCxn id="80" idx="1"/>
-            <a:endCxn id="7" idx="3"/>
+            <a:stCxn id="106" idx="1"/>
+            <a:endCxn id="57" idx="3"/>
           </p:cNvCxnSpPr>
           <p:nvPr/>
         </p:nvCxnSpPr>
         <p:spPr>
           <a:xfrm flipH="1">
             <a:off x="4825999" y="5603347"/>
-            <a:ext cx="502923" cy="0"/>
+            <a:ext cx="561408" cy="0"/>
           </a:xfrm>
           <a:prstGeom prst="line">
             <a:avLst/>
@@ -9157,16 +9545,16 @@
       </p:cxnSp>
       <p:cxnSp>
         <p:nvCxnSpPr>
-          <p:cNvPr id="73" name="Elbow Connector 72"/>
+          <p:cNvPr id="104" name="Elbow Connector 103"/>
           <p:cNvCxnSpPr>
-            <a:stCxn id="136" idx="3"/>
+            <a:stCxn id="70" idx="3"/>
           </p:cNvCxnSpPr>
           <p:nvPr/>
         </p:nvCxnSpPr>
         <p:spPr>
           <a:xfrm flipH="1" flipV="1">
-            <a:off x="7108939" y="992344"/>
-            <a:ext cx="86881" cy="1728000"/>
+            <a:off x="7108939" y="992345"/>
+            <a:ext cx="86881" cy="1713155"/>
           </a:xfrm>
           <a:prstGeom prst="bentConnector4">
             <a:avLst>
@@ -9197,9 +9585,9 @@
       </p:cxnSp>
       <p:cxnSp>
         <p:nvCxnSpPr>
-          <p:cNvPr id="108" name="Elbow Connector 107"/>
+          <p:cNvPr id="105" name="Elbow Connector 104"/>
           <p:cNvCxnSpPr>
-            <a:endCxn id="126" idx="3"/>
+            <a:endCxn id="60" idx="3"/>
           </p:cNvCxnSpPr>
           <p:nvPr/>
         </p:nvCxnSpPr>
@@ -9237,13 +9625,13 @@
       </p:cxnSp>
       <p:sp>
         <p:nvSpPr>
-          <p:cNvPr id="80" name="Rounded Rectangle 79"/>
+          <p:cNvPr id="106" name="Rounded Rectangle 105"/>
           <p:cNvSpPr/>
           <p:nvPr/>
         </p:nvSpPr>
         <p:spPr>
           <a:xfrm>
-            <a:off x="5328922" y="5493707"/>
+            <a:off x="5387407" y="5493707"/>
             <a:ext cx="993917" cy="219279"/>
           </a:xfrm>
           <a:prstGeom prst="roundRect">
@@ -9285,15 +9673,15 @@
       </p:sp>
       <p:cxnSp>
         <p:nvCxnSpPr>
-          <p:cNvPr id="81" name="Elbow Connector 80"/>
+          <p:cNvPr id="107" name="Elbow Connector 106"/>
           <p:cNvCxnSpPr>
-            <a:stCxn id="80" idx="3"/>
+            <a:stCxn id="106" idx="3"/>
           </p:cNvCxnSpPr>
           <p:nvPr/>
         </p:nvCxnSpPr>
         <p:spPr>
           <a:xfrm flipV="1">
-            <a:off x="6322839" y="5085919"/>
+            <a:off x="6381324" y="5085919"/>
             <a:ext cx="387840" cy="517428"/>
           </a:xfrm>
           <a:prstGeom prst="bentConnector2">
@@ -9320,41 +9708,6 @@
           </a:fontRef>
         </p:style>
       </p:cxnSp>
-      <p:sp>
-        <p:nvSpPr>
-          <p:cNvPr id="112" name="TextBox 111"/>
-          <p:cNvSpPr txBox="1"/>
-          <p:nvPr/>
-        </p:nvSpPr>
-        <p:spPr>
-          <a:xfrm>
-            <a:off x="461850" y="2833292"/>
-            <a:ext cx="2903359" cy="646331"/>
-          </a:xfrm>
-          <a:prstGeom prst="rect">
-            <a:avLst/>
-          </a:prstGeom>
-          <a:noFill/>
-        </p:spPr>
-        <p:txBody>
-          <a:bodyPr wrap="none" rtlCol="0">
-            <a:spAutoFit/>
-          </a:bodyPr>
-          <a:lstStyle/>
-          <a:p>
-            <a:r>
-              <a:rPr lang="en-US" dirty="0" smtClean="0"/>
-              <a:t>DIMENSIONS, COMPONENTS</a:t>
-            </a:r>
-          </a:p>
-          <a:p>
-            <a:r>
-              <a:rPr lang="en-US" dirty="0" smtClean="0"/>
-              <a:t>AND RELATIONSHIPS</a:t>
-            </a:r>
-          </a:p>
-        </p:txBody>
-      </p:sp>
     </p:spTree>
     <p:extLst>
       <p:ext uri="{BB962C8B-B14F-4D97-AF65-F5344CB8AC3E}">

</xml_diff>

<commit_message>
added changes and figures to main document.
</commit_message>
<xml_diff>
--- a/model.pptx
+++ b/model.pptx
@@ -3814,6 +3814,63 @@
           </a:p>
         </p:txBody>
       </p:sp>
+      <p:graphicFrame>
+        <p:nvGraphicFramePr>
+          <p:cNvPr id="14" name="Object 13"/>
+          <p:cNvGraphicFramePr>
+            <a:graphicFrameLocks noChangeAspect="1"/>
+          </p:cNvGraphicFramePr>
+          <p:nvPr>
+            <p:extLst>
+              <p:ext uri="{D42A27DB-BD31-4B8C-83A1-F6EECF244321}">
+                <p14:modId xmlns:p14="http://schemas.microsoft.com/office/powerpoint/2010/main" val="1966741737"/>
+              </p:ext>
+            </p:extLst>
+          </p:nvPr>
+        </p:nvGraphicFramePr>
+        <p:xfrm>
+          <a:off x="1592917" y="3255904"/>
+          <a:ext cx="5851383" cy="315226"/>
+        </p:xfrm>
+        <a:graphic>
+          <a:graphicData uri="http://schemas.openxmlformats.org/presentationml/2006/ole">
+            <mc:AlternateContent xmlns:mc="http://schemas.openxmlformats.org/markup-compatibility/2006">
+              <mc:Choice xmlns:v="urn:schemas-microsoft-com:vml" Requires="v">
+                <p:oleObj spid="_x0000_s1041" name="Equation" r:id="rId3" imgW="3771900" imgH="203200" progId="Equation.3">
+                  <p:embed/>
+                </p:oleObj>
+              </mc:Choice>
+              <mc:Fallback>
+                <p:oleObj name="Equation" r:id="rId3" imgW="3771900" imgH="203200" progId="Equation.3">
+                  <p:embed/>
+                  <p:pic>
+                    <p:nvPicPr>
+                      <p:cNvPr id="0" name=""/>
+                      <p:cNvPicPr/>
+                      <p:nvPr/>
+                    </p:nvPicPr>
+                    <p:blipFill>
+                      <a:blip r:embed="rId4"/>
+                      <a:stretch>
+                        <a:fillRect/>
+                      </a:stretch>
+                    </p:blipFill>
+                    <p:spPr>
+                      <a:xfrm>
+                        <a:off x="1592917" y="3255904"/>
+                        <a:ext cx="5851383" cy="315226"/>
+                      </a:xfrm>
+                      <a:prstGeom prst="rect">
+                        <a:avLst/>
+                      </a:prstGeom>
+                    </p:spPr>
+                  </p:pic>
+                </p:oleObj>
+              </mc:Fallback>
+            </mc:AlternateContent>
+          </a:graphicData>
+        </a:graphic>
+      </p:graphicFrame>
     </p:spTree>
     <p:extLst>
       <p:ext uri="{BB962C8B-B14F-4D97-AF65-F5344CB8AC3E}">
@@ -3859,7 +3916,7 @@
         </p:nvSpPr>
         <p:spPr>
           <a:xfrm>
-            <a:off x="853441" y="513080"/>
+            <a:off x="1671314" y="770058"/>
             <a:ext cx="1137920" cy="294640"/>
           </a:xfrm>
           <a:prstGeom prst="roundRect">
@@ -3904,7 +3961,7 @@
         </p:nvSpPr>
         <p:spPr>
           <a:xfrm>
-            <a:off x="853441" y="1341121"/>
+            <a:off x="1671314" y="1337674"/>
             <a:ext cx="1137920" cy="294640"/>
           </a:xfrm>
           <a:prstGeom prst="roundRect">
@@ -3949,7 +4006,7 @@
         </p:nvSpPr>
         <p:spPr>
           <a:xfrm>
-            <a:off x="701041" y="2238375"/>
+            <a:off x="1518914" y="1890061"/>
             <a:ext cx="1290320" cy="294640"/>
           </a:xfrm>
           <a:prstGeom prst="roundRect">
@@ -3994,7 +4051,7 @@
         </p:nvSpPr>
         <p:spPr>
           <a:xfrm>
-            <a:off x="629920" y="3460114"/>
+            <a:off x="1447793" y="2455332"/>
             <a:ext cx="1361441" cy="460375"/>
           </a:xfrm>
           <a:prstGeom prst="roundRect">
@@ -4069,14 +4126,27 @@
         </p:nvSpPr>
         <p:spPr>
           <a:xfrm>
-            <a:off x="5053352" y="3107294"/>
-            <a:ext cx="1491439" cy="369332"/>
+            <a:off x="3471162" y="1558771"/>
+            <a:ext cx="2398087" cy="369332"/>
           </a:xfrm>
           <a:prstGeom prst="rect">
             <a:avLst/>
           </a:prstGeom>
-          <a:noFill/>
-        </p:spPr>
+        </p:spPr>
+        <p:style>
+          <a:lnRef idx="2">
+            <a:schemeClr val="dk1"/>
+          </a:lnRef>
+          <a:fillRef idx="1">
+            <a:schemeClr val="lt1"/>
+          </a:fillRef>
+          <a:effectRef idx="0">
+            <a:schemeClr val="dk1"/>
+          </a:effectRef>
+          <a:fontRef idx="minor">
+            <a:schemeClr val="dk1"/>
+          </a:fontRef>
+        </p:style>
         <p:txBody>
           <a:bodyPr wrap="none" rtlCol="0">
             <a:spAutoFit/>
@@ -4085,7 +4155,235 @@
           <a:p>
             <a:r>
               <a:rPr lang="en-US" dirty="0" smtClean="0"/>
-              <a:t>Quality in Use</a:t>
+              <a:t>E-Service Quality </a:t>
+            </a:r>
+            <a:r>
+              <a:rPr lang="en-US" dirty="0" smtClean="0"/>
+              <a:t>in </a:t>
+            </a:r>
+            <a:r>
+              <a:rPr lang="en-US" dirty="0" smtClean="0"/>
+              <a:t>Use</a:t>
+            </a:r>
+          </a:p>
+        </p:txBody>
+      </p:sp>
+      <p:cxnSp>
+        <p:nvCxnSpPr>
+          <p:cNvPr id="11" name="Straight Connector 10"/>
+          <p:cNvCxnSpPr>
+            <a:stCxn id="8" idx="3"/>
+            <a:endCxn id="3" idx="1"/>
+          </p:cNvCxnSpPr>
+          <p:nvPr/>
+        </p:nvCxnSpPr>
+        <p:spPr>
+          <a:xfrm>
+            <a:off x="2809234" y="917378"/>
+            <a:ext cx="661928" cy="826059"/>
+          </a:xfrm>
+          <a:prstGeom prst="line">
+            <a:avLst/>
+          </a:prstGeom>
+        </p:spPr>
+        <p:style>
+          <a:lnRef idx="1">
+            <a:schemeClr val="dk1"/>
+          </a:lnRef>
+          <a:fillRef idx="0">
+            <a:schemeClr val="dk1"/>
+          </a:fillRef>
+          <a:effectRef idx="0">
+            <a:schemeClr val="dk1"/>
+          </a:effectRef>
+          <a:fontRef idx="minor">
+            <a:schemeClr val="tx1"/>
+          </a:fontRef>
+        </p:style>
+      </p:cxnSp>
+      <p:cxnSp>
+        <p:nvCxnSpPr>
+          <p:cNvPr id="12" name="Straight Connector 11"/>
+          <p:cNvCxnSpPr>
+            <a:endCxn id="3" idx="1"/>
+          </p:cNvCxnSpPr>
+          <p:nvPr/>
+        </p:nvCxnSpPr>
+        <p:spPr>
+          <a:xfrm>
+            <a:off x="2809234" y="1439135"/>
+            <a:ext cx="661928" cy="304302"/>
+          </a:xfrm>
+          <a:prstGeom prst="line">
+            <a:avLst/>
+          </a:prstGeom>
+        </p:spPr>
+        <p:style>
+          <a:lnRef idx="1">
+            <a:schemeClr val="dk1"/>
+          </a:lnRef>
+          <a:fillRef idx="0">
+            <a:schemeClr val="dk1"/>
+          </a:fillRef>
+          <a:effectRef idx="0">
+            <a:schemeClr val="dk1"/>
+          </a:effectRef>
+          <a:fontRef idx="minor">
+            <a:schemeClr val="tx1"/>
+          </a:fontRef>
+        </p:style>
+      </p:cxnSp>
+      <p:cxnSp>
+        <p:nvCxnSpPr>
+          <p:cNvPr id="14" name="Straight Connector 13"/>
+          <p:cNvCxnSpPr>
+            <a:stCxn id="10" idx="3"/>
+            <a:endCxn id="3" idx="1"/>
+          </p:cNvCxnSpPr>
+          <p:nvPr/>
+        </p:nvCxnSpPr>
+        <p:spPr>
+          <a:xfrm flipV="1">
+            <a:off x="2809234" y="1743437"/>
+            <a:ext cx="661928" cy="293944"/>
+          </a:xfrm>
+          <a:prstGeom prst="line">
+            <a:avLst/>
+          </a:prstGeom>
+        </p:spPr>
+        <p:style>
+          <a:lnRef idx="1">
+            <a:schemeClr val="dk1"/>
+          </a:lnRef>
+          <a:fillRef idx="0">
+            <a:schemeClr val="dk1"/>
+          </a:fillRef>
+          <a:effectRef idx="0">
+            <a:schemeClr val="dk1"/>
+          </a:effectRef>
+          <a:fontRef idx="minor">
+            <a:schemeClr val="tx1"/>
+          </a:fontRef>
+        </p:style>
+      </p:cxnSp>
+      <p:cxnSp>
+        <p:nvCxnSpPr>
+          <p:cNvPr id="18" name="Straight Connector 17"/>
+          <p:cNvCxnSpPr>
+            <a:stCxn id="484" idx="3"/>
+            <a:endCxn id="3" idx="1"/>
+          </p:cNvCxnSpPr>
+          <p:nvPr/>
+        </p:nvCxnSpPr>
+        <p:spPr>
+          <a:xfrm flipV="1">
+            <a:off x="2809234" y="1743437"/>
+            <a:ext cx="661928" cy="942083"/>
+          </a:xfrm>
+          <a:prstGeom prst="line">
+            <a:avLst/>
+          </a:prstGeom>
+        </p:spPr>
+        <p:style>
+          <a:lnRef idx="1">
+            <a:schemeClr val="dk1"/>
+          </a:lnRef>
+          <a:fillRef idx="0">
+            <a:schemeClr val="dk1"/>
+          </a:fillRef>
+          <a:effectRef idx="0">
+            <a:schemeClr val="dk1"/>
+          </a:effectRef>
+          <a:fontRef idx="minor">
+            <a:schemeClr val="tx1"/>
+          </a:fontRef>
+        </p:style>
+      </p:cxnSp>
+      <p:sp>
+        <p:nvSpPr>
+          <p:cNvPr id="23" name="TextBox 22"/>
+          <p:cNvSpPr txBox="1"/>
+          <p:nvPr/>
+        </p:nvSpPr>
+        <p:spPr>
+          <a:xfrm>
+            <a:off x="5377848" y="3999778"/>
+            <a:ext cx="3045500" cy="369332"/>
+          </a:xfrm>
+          <a:prstGeom prst="rect">
+            <a:avLst/>
+          </a:prstGeom>
+          <a:noFill/>
+        </p:spPr>
+        <p:txBody>
+          <a:bodyPr wrap="none" rtlCol="0">
+            <a:spAutoFit/>
+          </a:bodyPr>
+          <a:lstStyle/>
+          <a:p>
+            <a:r>
+              <a:rPr lang="en-US" dirty="0" smtClean="0"/>
+              <a:t>E-Service Quality in Use model</a:t>
+            </a:r>
+            <a:endParaRPr lang="en-US" dirty="0"/>
+          </a:p>
+        </p:txBody>
+      </p:sp>
+      <p:sp>
+        <p:nvSpPr>
+          <p:cNvPr id="24" name="TextBox 23"/>
+          <p:cNvSpPr txBox="1"/>
+          <p:nvPr/>
+        </p:nvSpPr>
+        <p:spPr>
+          <a:xfrm>
+            <a:off x="6504396" y="2222047"/>
+            <a:ext cx="1918952" cy="369332"/>
+          </a:xfrm>
+          <a:prstGeom prst="rect">
+            <a:avLst/>
+          </a:prstGeom>
+          <a:noFill/>
+        </p:spPr>
+        <p:txBody>
+          <a:bodyPr wrap="none" rtlCol="0">
+            <a:spAutoFit/>
+          </a:bodyPr>
+          <a:lstStyle/>
+          <a:p>
+            <a:r>
+              <a:rPr lang="en-US" b="1" dirty="0" smtClean="0"/>
+              <a:t>CHARACTERISTICS</a:t>
+            </a:r>
+            <a:endParaRPr lang="en-US" b="1" dirty="0"/>
+          </a:p>
+        </p:txBody>
+      </p:sp>
+      <p:sp>
+        <p:nvSpPr>
+          <p:cNvPr id="22" name="TextBox 21"/>
+          <p:cNvSpPr txBox="1"/>
+          <p:nvPr/>
+        </p:nvSpPr>
+        <p:spPr>
+          <a:xfrm>
+            <a:off x="202680" y="6020974"/>
+            <a:ext cx="8781370" cy="369332"/>
+          </a:xfrm>
+          <a:prstGeom prst="rect">
+            <a:avLst/>
+          </a:prstGeom>
+          <a:noFill/>
+        </p:spPr>
+        <p:txBody>
+          <a:bodyPr wrap="none" rtlCol="0">
+            <a:spAutoFit/>
+          </a:bodyPr>
+          <a:lstStyle/>
+          <a:p>
+            <a:r>
+              <a:rPr lang="en-US" dirty="0" smtClean="0"/>
+              <a:t>Hypothesis: This 4 e-services characteristics positively influence the user quality perception.</a:t>
             </a:r>
             <a:endParaRPr lang="en-US" dirty="0"/>
           </a:p>
@@ -4136,7 +4434,7 @@
         </p:nvSpPr>
         <p:spPr>
           <a:xfrm>
-            <a:off x="853441" y="4700264"/>
+            <a:off x="1672750" y="1789975"/>
             <a:ext cx="1137920" cy="294640"/>
           </a:xfrm>
           <a:prstGeom prst="roundRect">
@@ -4184,7 +4482,7 @@
         </p:nvSpPr>
         <p:spPr>
           <a:xfrm>
-            <a:off x="853441" y="5916926"/>
+            <a:off x="1654113" y="2371669"/>
             <a:ext cx="1137920" cy="294640"/>
           </a:xfrm>
           <a:prstGeom prst="roundRect">
@@ -4232,7 +4530,7 @@
         </p:nvSpPr>
         <p:spPr>
           <a:xfrm>
-            <a:off x="701041" y="3543934"/>
+            <a:off x="1601630" y="1070286"/>
             <a:ext cx="1209040" cy="419819"/>
           </a:xfrm>
           <a:prstGeom prst="roundRect">
@@ -4302,6 +4600,244 @@
             <a:r>
               <a:rPr lang="en-US" dirty="0" smtClean="0"/>
               <a:t>PROVIDER PERCEPTION</a:t>
+            </a:r>
+            <a:endParaRPr lang="en-US" dirty="0"/>
+          </a:p>
+        </p:txBody>
+      </p:sp>
+      <p:sp>
+        <p:nvSpPr>
+          <p:cNvPr id="6" name="TextBox 5"/>
+          <p:cNvSpPr txBox="1"/>
+          <p:nvPr/>
+        </p:nvSpPr>
+        <p:spPr>
+          <a:xfrm>
+            <a:off x="3476871" y="1614129"/>
+            <a:ext cx="1650700" cy="646331"/>
+          </a:xfrm>
+          <a:prstGeom prst="rect">
+            <a:avLst/>
+          </a:prstGeom>
+        </p:spPr>
+        <p:style>
+          <a:lnRef idx="2">
+            <a:schemeClr val="dk1"/>
+          </a:lnRef>
+          <a:fillRef idx="1">
+            <a:schemeClr val="lt1"/>
+          </a:fillRef>
+          <a:effectRef idx="0">
+            <a:schemeClr val="dk1"/>
+          </a:effectRef>
+          <a:fontRef idx="minor">
+            <a:schemeClr val="dk1"/>
+          </a:fontRef>
+        </p:style>
+        <p:txBody>
+          <a:bodyPr wrap="none" rtlCol="0">
+            <a:spAutoFit/>
+          </a:bodyPr>
+          <a:lstStyle/>
+          <a:p>
+            <a:r>
+              <a:rPr lang="en-US" dirty="0" smtClean="0"/>
+              <a:t>E-Service</a:t>
+            </a:r>
+          </a:p>
+          <a:p>
+            <a:r>
+              <a:rPr lang="en-US" dirty="0" smtClean="0"/>
+              <a:t>Product Quality</a:t>
+            </a:r>
+            <a:endParaRPr lang="en-US" dirty="0"/>
+          </a:p>
+        </p:txBody>
+      </p:sp>
+      <p:cxnSp>
+        <p:nvCxnSpPr>
+          <p:cNvPr id="7" name="Straight Connector 6"/>
+          <p:cNvCxnSpPr>
+            <a:stCxn id="533" idx="3"/>
+            <a:endCxn id="6" idx="1"/>
+          </p:cNvCxnSpPr>
+          <p:nvPr/>
+        </p:nvCxnSpPr>
+        <p:spPr>
+          <a:xfrm>
+            <a:off x="2810670" y="1280196"/>
+            <a:ext cx="666201" cy="657099"/>
+          </a:xfrm>
+          <a:prstGeom prst="line">
+            <a:avLst/>
+          </a:prstGeom>
+        </p:spPr>
+        <p:style>
+          <a:lnRef idx="1">
+            <a:schemeClr val="dk1"/>
+          </a:lnRef>
+          <a:fillRef idx="0">
+            <a:schemeClr val="dk1"/>
+          </a:fillRef>
+          <a:effectRef idx="0">
+            <a:schemeClr val="dk1"/>
+          </a:effectRef>
+          <a:fontRef idx="minor">
+            <a:schemeClr val="tx1"/>
+          </a:fontRef>
+        </p:style>
+      </p:cxnSp>
+      <p:cxnSp>
+        <p:nvCxnSpPr>
+          <p:cNvPr id="10" name="Straight Connector 9"/>
+          <p:cNvCxnSpPr>
+            <a:stCxn id="11" idx="3"/>
+            <a:endCxn id="6" idx="1"/>
+          </p:cNvCxnSpPr>
+          <p:nvPr/>
+        </p:nvCxnSpPr>
+        <p:spPr>
+          <a:xfrm>
+            <a:off x="2810670" y="1937295"/>
+            <a:ext cx="666201" cy="0"/>
+          </a:xfrm>
+          <a:prstGeom prst="line">
+            <a:avLst/>
+          </a:prstGeom>
+        </p:spPr>
+        <p:style>
+          <a:lnRef idx="1">
+            <a:schemeClr val="dk1"/>
+          </a:lnRef>
+          <a:fillRef idx="0">
+            <a:schemeClr val="dk1"/>
+          </a:fillRef>
+          <a:effectRef idx="0">
+            <a:schemeClr val="dk1"/>
+          </a:effectRef>
+          <a:fontRef idx="minor">
+            <a:schemeClr val="tx1"/>
+          </a:fontRef>
+        </p:style>
+      </p:cxnSp>
+      <p:cxnSp>
+        <p:nvCxnSpPr>
+          <p:cNvPr id="14" name="Straight Connector 13"/>
+          <p:cNvCxnSpPr>
+            <a:stCxn id="12" idx="3"/>
+            <a:endCxn id="6" idx="1"/>
+          </p:cNvCxnSpPr>
+          <p:nvPr/>
+        </p:nvCxnSpPr>
+        <p:spPr>
+          <a:xfrm flipV="1">
+            <a:off x="2792033" y="1937295"/>
+            <a:ext cx="684838" cy="581694"/>
+          </a:xfrm>
+          <a:prstGeom prst="line">
+            <a:avLst/>
+          </a:prstGeom>
+        </p:spPr>
+        <p:style>
+          <a:lnRef idx="1">
+            <a:schemeClr val="dk1"/>
+          </a:lnRef>
+          <a:fillRef idx="0">
+            <a:schemeClr val="dk1"/>
+          </a:fillRef>
+          <a:effectRef idx="0">
+            <a:schemeClr val="dk1"/>
+          </a:effectRef>
+          <a:fontRef idx="minor">
+            <a:schemeClr val="tx1"/>
+          </a:fontRef>
+        </p:style>
+      </p:cxnSp>
+      <p:sp>
+        <p:nvSpPr>
+          <p:cNvPr id="19" name="TextBox 18"/>
+          <p:cNvSpPr txBox="1"/>
+          <p:nvPr/>
+        </p:nvSpPr>
+        <p:spPr>
+          <a:xfrm>
+            <a:off x="5589377" y="3743464"/>
+            <a:ext cx="3217723" cy="369332"/>
+          </a:xfrm>
+          <a:prstGeom prst="rect">
+            <a:avLst/>
+          </a:prstGeom>
+          <a:noFill/>
+        </p:spPr>
+        <p:txBody>
+          <a:bodyPr wrap="none" rtlCol="0">
+            <a:spAutoFit/>
+          </a:bodyPr>
+          <a:lstStyle/>
+          <a:p>
+            <a:r>
+              <a:rPr lang="en-US" dirty="0" smtClean="0"/>
+              <a:t>E-Service Product Quality Model</a:t>
+            </a:r>
+            <a:endParaRPr lang="en-US" dirty="0"/>
+          </a:p>
+        </p:txBody>
+      </p:sp>
+      <p:sp>
+        <p:nvSpPr>
+          <p:cNvPr id="20" name="TextBox 19"/>
+          <p:cNvSpPr txBox="1"/>
+          <p:nvPr/>
+        </p:nvSpPr>
+        <p:spPr>
+          <a:xfrm>
+            <a:off x="6291982" y="2666309"/>
+            <a:ext cx="1356524" cy="369332"/>
+          </a:xfrm>
+          <a:prstGeom prst="rect">
+            <a:avLst/>
+          </a:prstGeom>
+          <a:noFill/>
+        </p:spPr>
+        <p:txBody>
+          <a:bodyPr wrap="none" rtlCol="0">
+            <a:spAutoFit/>
+          </a:bodyPr>
+          <a:lstStyle/>
+          <a:p>
+            <a:r>
+              <a:rPr lang="en-US" b="1" dirty="0" smtClean="0"/>
+              <a:t>PROPERTIES</a:t>
+            </a:r>
+            <a:endParaRPr lang="en-US" b="1" dirty="0"/>
+          </a:p>
+        </p:txBody>
+      </p:sp>
+      <p:sp>
+        <p:nvSpPr>
+          <p:cNvPr id="24" name="TextBox 23"/>
+          <p:cNvSpPr txBox="1"/>
+          <p:nvPr/>
+        </p:nvSpPr>
+        <p:spPr>
+          <a:xfrm>
+            <a:off x="202680" y="6020974"/>
+            <a:ext cx="8352505" cy="369332"/>
+          </a:xfrm>
+          <a:prstGeom prst="rect">
+            <a:avLst/>
+          </a:prstGeom>
+          <a:noFill/>
+        </p:spPr>
+        <p:txBody>
+          <a:bodyPr wrap="none" rtlCol="0">
+            <a:spAutoFit/>
+          </a:bodyPr>
+          <a:lstStyle/>
+          <a:p>
+            <a:r>
+              <a:rPr lang="en-US" dirty="0" smtClean="0"/>
+              <a:t>Hypothesis: This 3 e-services properties positively influence the user quality perception.</a:t>
             </a:r>
             <a:endParaRPr lang="en-US" dirty="0"/>
           </a:p>
@@ -4352,7 +4888,7 @@
         </p:nvSpPr>
         <p:spPr>
           <a:xfrm>
-            <a:off x="3657599" y="501015"/>
+            <a:off x="3657599" y="1406184"/>
             <a:ext cx="1239519" cy="279400"/>
           </a:xfrm>
           <a:prstGeom prst="roundRect">
@@ -4396,7 +4932,7 @@
         </p:nvSpPr>
         <p:spPr>
           <a:xfrm>
-            <a:off x="3850640" y="2021840"/>
+            <a:off x="3850640" y="1927270"/>
             <a:ext cx="975359" cy="254000"/>
           </a:xfrm>
           <a:prstGeom prst="roundRect">
@@ -4440,7 +4976,7 @@
         </p:nvSpPr>
         <p:spPr>
           <a:xfrm>
-            <a:off x="3850640" y="3754755"/>
+            <a:off x="3850640" y="2444287"/>
             <a:ext cx="975359" cy="254000"/>
           </a:xfrm>
           <a:prstGeom prst="roundRect">
@@ -4484,7 +5020,7 @@
         </p:nvSpPr>
         <p:spPr>
           <a:xfrm>
-            <a:off x="3850640" y="5910572"/>
+            <a:off x="3850640" y="2978908"/>
             <a:ext cx="975359" cy="254000"/>
           </a:xfrm>
           <a:prstGeom prst="roundRect">
@@ -4595,7 +5131,7 @@
         </p:nvSpPr>
         <p:spPr>
           <a:xfrm>
-            <a:off x="3657599" y="501015"/>
+            <a:off x="6654798" y="2158365"/>
             <a:ext cx="1239519" cy="279400"/>
           </a:xfrm>
           <a:prstGeom prst="roundRect">
@@ -4639,7 +5175,7 @@
         </p:nvSpPr>
         <p:spPr>
           <a:xfrm>
-            <a:off x="3850640" y="2021840"/>
+            <a:off x="6847839" y="3039111"/>
             <a:ext cx="975359" cy="254000"/>
           </a:xfrm>
           <a:prstGeom prst="roundRect">
@@ -4683,7 +5219,7 @@
         </p:nvSpPr>
         <p:spPr>
           <a:xfrm>
-            <a:off x="3850640" y="3754755"/>
+            <a:off x="6847839" y="3895725"/>
             <a:ext cx="975359" cy="254000"/>
           </a:xfrm>
           <a:prstGeom prst="roundRect">
@@ -4727,7 +5263,7 @@
         </p:nvSpPr>
         <p:spPr>
           <a:xfrm>
-            <a:off x="3850640" y="5910572"/>
+            <a:off x="6847839" y="4744774"/>
             <a:ext cx="975359" cy="254000"/>
           </a:xfrm>
           <a:prstGeom prst="roundRect">
@@ -4771,7 +5307,7 @@
         </p:nvSpPr>
         <p:spPr>
           <a:xfrm>
-            <a:off x="853441" y="513080"/>
+            <a:off x="3850640" y="2170430"/>
             <a:ext cx="1137920" cy="294640"/>
           </a:xfrm>
           <a:prstGeom prst="roundRect">
@@ -4816,7 +5352,7 @@
         </p:nvSpPr>
         <p:spPr>
           <a:xfrm>
-            <a:off x="853441" y="1341121"/>
+            <a:off x="3850640" y="2998471"/>
             <a:ext cx="1137920" cy="294640"/>
           </a:xfrm>
           <a:prstGeom prst="roundRect">
@@ -4861,7 +5397,7 @@
         </p:nvSpPr>
         <p:spPr>
           <a:xfrm>
-            <a:off x="701041" y="2238375"/>
+            <a:off x="3698240" y="3792122"/>
             <a:ext cx="1290320" cy="294640"/>
           </a:xfrm>
           <a:prstGeom prst="roundRect">
@@ -4909,7 +5445,7 @@
         </p:nvCxnSpPr>
         <p:spPr>
           <a:xfrm flipV="1">
-            <a:off x="1991361" y="640715"/>
+            <a:off x="4988560" y="2298065"/>
             <a:ext cx="1666238" cy="19685"/>
           </a:xfrm>
           <a:prstGeom prst="line">
@@ -4942,8 +5478,8 @@
         </p:nvCxnSpPr>
         <p:spPr>
           <a:xfrm>
-            <a:off x="1991361" y="660400"/>
-            <a:ext cx="1859279" cy="1488440"/>
+            <a:off x="4988560" y="2317750"/>
+            <a:ext cx="1859279" cy="848361"/>
           </a:xfrm>
           <a:prstGeom prst="line">
             <a:avLst/>
@@ -4975,7 +5511,7 @@
         </p:nvCxnSpPr>
         <p:spPr>
           <a:xfrm flipV="1">
-            <a:off x="1991361" y="640715"/>
+            <a:off x="4988560" y="2298065"/>
             <a:ext cx="1666238" cy="847726"/>
           </a:xfrm>
           <a:prstGeom prst="line">
@@ -5008,8 +5544,8 @@
         </p:nvCxnSpPr>
         <p:spPr>
           <a:xfrm>
-            <a:off x="1991361" y="1488441"/>
-            <a:ext cx="1859279" cy="2393314"/>
+            <a:off x="4988560" y="3145791"/>
+            <a:ext cx="1859279" cy="876934"/>
           </a:xfrm>
           <a:prstGeom prst="line">
             <a:avLst/>
@@ -5041,8 +5577,8 @@
         </p:nvCxnSpPr>
         <p:spPr>
           <a:xfrm>
-            <a:off x="1991361" y="660400"/>
-            <a:ext cx="1859279" cy="3221355"/>
+            <a:off x="4988560" y="2317750"/>
+            <a:ext cx="1859279" cy="1704975"/>
           </a:xfrm>
           <a:prstGeom prst="line">
             <a:avLst/>
@@ -5074,8 +5610,8 @@
         </p:nvCxnSpPr>
         <p:spPr>
           <a:xfrm>
-            <a:off x="1991361" y="2385695"/>
-            <a:ext cx="1859279" cy="3651877"/>
+            <a:off x="4988560" y="3939442"/>
+            <a:ext cx="1859279" cy="932332"/>
           </a:xfrm>
           <a:prstGeom prst="line">
             <a:avLst/>
@@ -5104,7 +5640,7 @@
         </p:nvSpPr>
         <p:spPr>
           <a:xfrm>
-            <a:off x="629920" y="3460114"/>
+            <a:off x="3627119" y="4641586"/>
             <a:ext cx="1361441" cy="460375"/>
           </a:xfrm>
           <a:prstGeom prst="roundRect">
@@ -5145,14 +5681,15 @@
         <p:nvCxnSpPr>
           <p:cNvPr id="485" name="Straight Connector 484"/>
           <p:cNvCxnSpPr>
+            <a:stCxn id="484" idx="3"/>
             <a:endCxn id="4" idx="1"/>
           </p:cNvCxnSpPr>
           <p:nvPr/>
         </p:nvCxnSpPr>
         <p:spPr>
           <a:xfrm flipV="1">
-            <a:off x="1991361" y="640715"/>
-            <a:ext cx="1666238" cy="3020698"/>
+            <a:off x="4988560" y="2298065"/>
+            <a:ext cx="1666238" cy="2573709"/>
           </a:xfrm>
           <a:prstGeom prst="line">
             <a:avLst/>
@@ -5177,14 +5714,15 @@
         <p:nvCxnSpPr>
           <p:cNvPr id="488" name="Straight Connector 487"/>
           <p:cNvCxnSpPr>
+            <a:stCxn id="484" idx="3"/>
             <a:endCxn id="5" idx="1"/>
           </p:cNvCxnSpPr>
           <p:nvPr/>
         </p:nvCxnSpPr>
         <p:spPr>
           <a:xfrm flipV="1">
-            <a:off x="1991361" y="2148840"/>
-            <a:ext cx="1859279" cy="1512572"/>
+            <a:off x="4988560" y="3166111"/>
+            <a:ext cx="1859279" cy="1705663"/>
           </a:xfrm>
           <a:prstGeom prst="line">
             <a:avLst/>
@@ -5215,9 +5753,9 @@
           <p:nvPr/>
         </p:nvCxnSpPr>
         <p:spPr>
-          <a:xfrm>
-            <a:off x="1991361" y="3690302"/>
-            <a:ext cx="1859279" cy="191453"/>
+          <a:xfrm flipV="1">
+            <a:off x="4988560" y="4022725"/>
+            <a:ext cx="1859279" cy="849049"/>
           </a:xfrm>
           <a:prstGeom prst="line">
             <a:avLst/>
@@ -5249,8 +5787,8 @@
         </p:nvCxnSpPr>
         <p:spPr>
           <a:xfrm>
-            <a:off x="1991361" y="3690302"/>
-            <a:ext cx="1859279" cy="2347270"/>
+            <a:off x="4988560" y="4871774"/>
+            <a:ext cx="1859279" cy="0"/>
           </a:xfrm>
           <a:prstGeom prst="line">
             <a:avLst/>
@@ -5307,6 +5845,194 @@
           </a:p>
         </p:txBody>
       </p:sp>
+      <p:sp>
+        <p:nvSpPr>
+          <p:cNvPr id="38" name="TextBox 37"/>
+          <p:cNvSpPr txBox="1"/>
+          <p:nvPr/>
+        </p:nvSpPr>
+        <p:spPr>
+          <a:xfrm>
+            <a:off x="1052578" y="3145791"/>
+            <a:ext cx="1491439" cy="646331"/>
+          </a:xfrm>
+          <a:prstGeom prst="rect">
+            <a:avLst/>
+          </a:prstGeom>
+        </p:spPr>
+        <p:style>
+          <a:lnRef idx="2">
+            <a:schemeClr val="dk1"/>
+          </a:lnRef>
+          <a:fillRef idx="1">
+            <a:schemeClr val="lt1"/>
+          </a:fillRef>
+          <a:effectRef idx="0">
+            <a:schemeClr val="dk1"/>
+          </a:effectRef>
+          <a:fontRef idx="minor">
+            <a:schemeClr val="dk1"/>
+          </a:fontRef>
+        </p:style>
+        <p:txBody>
+          <a:bodyPr wrap="none" rtlCol="0">
+            <a:spAutoFit/>
+          </a:bodyPr>
+          <a:lstStyle/>
+          <a:p>
+            <a:r>
+              <a:rPr lang="en-US" dirty="0" smtClean="0"/>
+              <a:t>E-Service </a:t>
+            </a:r>
+          </a:p>
+          <a:p>
+            <a:r>
+              <a:rPr lang="en-US" dirty="0" smtClean="0"/>
+              <a:t>Quality </a:t>
+            </a:r>
+            <a:r>
+              <a:rPr lang="en-US" dirty="0" smtClean="0"/>
+              <a:t>in </a:t>
+            </a:r>
+            <a:r>
+              <a:rPr lang="en-US" dirty="0" smtClean="0"/>
+              <a:t>Use</a:t>
+            </a:r>
+          </a:p>
+        </p:txBody>
+      </p:sp>
+      <p:cxnSp>
+        <p:nvCxnSpPr>
+          <p:cNvPr id="39" name="Straight Connector 38"/>
+          <p:cNvCxnSpPr>
+            <a:stCxn id="38" idx="3"/>
+            <a:endCxn id="8" idx="1"/>
+          </p:cNvCxnSpPr>
+          <p:nvPr/>
+        </p:nvCxnSpPr>
+        <p:spPr>
+          <a:xfrm flipV="1">
+            <a:off x="2544017" y="2317750"/>
+            <a:ext cx="1306623" cy="1151207"/>
+          </a:xfrm>
+          <a:prstGeom prst="line">
+            <a:avLst/>
+          </a:prstGeom>
+        </p:spPr>
+        <p:style>
+          <a:lnRef idx="1">
+            <a:schemeClr val="dk1"/>
+          </a:lnRef>
+          <a:fillRef idx="0">
+            <a:schemeClr val="dk1"/>
+          </a:fillRef>
+          <a:effectRef idx="0">
+            <a:schemeClr val="dk1"/>
+          </a:effectRef>
+          <a:fontRef idx="minor">
+            <a:schemeClr val="tx1"/>
+          </a:fontRef>
+        </p:style>
+      </p:cxnSp>
+      <p:cxnSp>
+        <p:nvCxnSpPr>
+          <p:cNvPr id="49" name="Straight Connector 48"/>
+          <p:cNvCxnSpPr>
+            <a:stCxn id="38" idx="3"/>
+            <a:endCxn id="9" idx="1"/>
+          </p:cNvCxnSpPr>
+          <p:nvPr/>
+        </p:nvCxnSpPr>
+        <p:spPr>
+          <a:xfrm flipV="1">
+            <a:off x="2544017" y="3145791"/>
+            <a:ext cx="1306623" cy="323166"/>
+          </a:xfrm>
+          <a:prstGeom prst="line">
+            <a:avLst/>
+          </a:prstGeom>
+        </p:spPr>
+        <p:style>
+          <a:lnRef idx="1">
+            <a:schemeClr val="dk1"/>
+          </a:lnRef>
+          <a:fillRef idx="0">
+            <a:schemeClr val="dk1"/>
+          </a:fillRef>
+          <a:effectRef idx="0">
+            <a:schemeClr val="dk1"/>
+          </a:effectRef>
+          <a:fontRef idx="minor">
+            <a:schemeClr val="tx1"/>
+          </a:fontRef>
+        </p:style>
+      </p:cxnSp>
+      <p:cxnSp>
+        <p:nvCxnSpPr>
+          <p:cNvPr id="52" name="Straight Connector 51"/>
+          <p:cNvCxnSpPr>
+            <a:stCxn id="38" idx="3"/>
+            <a:endCxn id="10" idx="1"/>
+          </p:cNvCxnSpPr>
+          <p:nvPr/>
+        </p:nvCxnSpPr>
+        <p:spPr>
+          <a:xfrm>
+            <a:off x="2544017" y="3468957"/>
+            <a:ext cx="1154223" cy="470485"/>
+          </a:xfrm>
+          <a:prstGeom prst="line">
+            <a:avLst/>
+          </a:prstGeom>
+        </p:spPr>
+        <p:style>
+          <a:lnRef idx="1">
+            <a:schemeClr val="dk1"/>
+          </a:lnRef>
+          <a:fillRef idx="0">
+            <a:schemeClr val="dk1"/>
+          </a:fillRef>
+          <a:effectRef idx="0">
+            <a:schemeClr val="dk1"/>
+          </a:effectRef>
+          <a:fontRef idx="minor">
+            <a:schemeClr val="tx1"/>
+          </a:fontRef>
+        </p:style>
+      </p:cxnSp>
+      <p:cxnSp>
+        <p:nvCxnSpPr>
+          <p:cNvPr id="55" name="Straight Connector 54"/>
+          <p:cNvCxnSpPr>
+            <a:stCxn id="38" idx="3"/>
+            <a:endCxn id="484" idx="1"/>
+          </p:cNvCxnSpPr>
+          <p:nvPr/>
+        </p:nvCxnSpPr>
+        <p:spPr>
+          <a:xfrm>
+            <a:off x="2544017" y="3468957"/>
+            <a:ext cx="1083102" cy="1402817"/>
+          </a:xfrm>
+          <a:prstGeom prst="line">
+            <a:avLst/>
+          </a:prstGeom>
+        </p:spPr>
+        <p:style>
+          <a:lnRef idx="1">
+            <a:schemeClr val="dk1"/>
+          </a:lnRef>
+          <a:fillRef idx="0">
+            <a:schemeClr val="dk1"/>
+          </a:fillRef>
+          <a:effectRef idx="0">
+            <a:schemeClr val="dk1"/>
+          </a:effectRef>
+          <a:fontRef idx="minor">
+            <a:schemeClr val="tx1"/>
+          </a:fontRef>
+        </p:style>
+      </p:cxnSp>
     </p:spTree>
     <p:extLst>
       <p:ext uri="{BB962C8B-B14F-4D97-AF65-F5344CB8AC3E}">
@@ -5352,7 +6078,7 @@
         </p:nvSpPr>
         <p:spPr>
           <a:xfrm>
-            <a:off x="3657599" y="501015"/>
+            <a:off x="5958208" y="2386021"/>
             <a:ext cx="1239519" cy="279400"/>
           </a:xfrm>
           <a:prstGeom prst="roundRect">
@@ -5396,7 +6122,7 @@
         </p:nvSpPr>
         <p:spPr>
           <a:xfrm>
-            <a:off x="3850640" y="2021840"/>
+            <a:off x="6151249" y="3433996"/>
             <a:ext cx="975359" cy="254000"/>
           </a:xfrm>
           <a:prstGeom prst="roundRect">
@@ -5440,7 +6166,7 @@
         </p:nvSpPr>
         <p:spPr>
           <a:xfrm>
-            <a:off x="3850640" y="3754755"/>
+            <a:off x="6151249" y="2957818"/>
             <a:ext cx="975359" cy="254000"/>
           </a:xfrm>
           <a:prstGeom prst="roundRect">
@@ -5484,7 +6210,7 @@
         </p:nvSpPr>
         <p:spPr>
           <a:xfrm>
-            <a:off x="3850640" y="5910572"/>
+            <a:off x="6222368" y="3972455"/>
             <a:ext cx="975359" cy="254000"/>
           </a:xfrm>
           <a:prstGeom prst="roundRect">
@@ -5528,7 +6254,7 @@
         </p:nvSpPr>
         <p:spPr>
           <a:xfrm>
-            <a:off x="853441" y="4700264"/>
+            <a:off x="3296289" y="3196001"/>
             <a:ext cx="1137920" cy="294640"/>
           </a:xfrm>
           <a:prstGeom prst="roundRect">
@@ -5576,7 +6302,7 @@
         </p:nvSpPr>
         <p:spPr>
           <a:xfrm>
-            <a:off x="853441" y="5916926"/>
+            <a:off x="3296289" y="3920642"/>
             <a:ext cx="1137920" cy="294640"/>
           </a:xfrm>
           <a:prstGeom prst="roundRect">
@@ -5627,8 +6353,8 @@
         </p:nvCxnSpPr>
         <p:spPr>
           <a:xfrm flipV="1">
-            <a:off x="1991361" y="3881755"/>
-            <a:ext cx="1859279" cy="965829"/>
+            <a:off x="4434209" y="3084818"/>
+            <a:ext cx="1717040" cy="258503"/>
           </a:xfrm>
           <a:prstGeom prst="line">
             <a:avLst/>
@@ -5659,9 +6385,9 @@
           <p:nvPr/>
         </p:nvCxnSpPr>
         <p:spPr>
-          <a:xfrm flipV="1">
-            <a:off x="1991361" y="2148840"/>
-            <a:ext cx="1859279" cy="2698744"/>
+          <a:xfrm>
+            <a:off x="4434209" y="3343321"/>
+            <a:ext cx="1717040" cy="217675"/>
           </a:xfrm>
           <a:prstGeom prst="line">
             <a:avLst/>
@@ -5693,8 +6419,8 @@
         </p:nvCxnSpPr>
         <p:spPr>
           <a:xfrm flipV="1">
-            <a:off x="1991361" y="640715"/>
-            <a:ext cx="1666238" cy="4206869"/>
+            <a:off x="4434209" y="2525721"/>
+            <a:ext cx="1523999" cy="817600"/>
           </a:xfrm>
           <a:prstGeom prst="line">
             <a:avLst/>
@@ -5725,9 +6451,9 @@
           <p:nvPr/>
         </p:nvCxnSpPr>
         <p:spPr>
-          <a:xfrm flipV="1">
-            <a:off x="1991361" y="6037572"/>
-            <a:ext cx="1859279" cy="26674"/>
+          <a:xfrm>
+            <a:off x="4434209" y="4067962"/>
+            <a:ext cx="1788159" cy="31493"/>
           </a:xfrm>
           <a:prstGeom prst="line">
             <a:avLst/>
@@ -5758,9 +6484,9 @@
           <p:nvPr/>
         </p:nvCxnSpPr>
         <p:spPr>
-          <a:xfrm flipV="1">
-            <a:off x="1910081" y="640715"/>
-            <a:ext cx="1747518" cy="2991068"/>
+          <a:xfrm>
+            <a:off x="4434209" y="2525721"/>
+            <a:ext cx="1523999" cy="0"/>
           </a:xfrm>
           <a:prstGeom prst="line">
             <a:avLst/>
@@ -5791,9 +6517,9 @@
           <p:nvPr/>
         </p:nvCxnSpPr>
         <p:spPr>
-          <a:xfrm flipV="1">
-            <a:off x="1910081" y="2148840"/>
-            <a:ext cx="1940559" cy="1482943"/>
+          <a:xfrm>
+            <a:off x="4434209" y="2525721"/>
+            <a:ext cx="1717040" cy="1035275"/>
           </a:xfrm>
           <a:prstGeom prst="line">
             <a:avLst/>
@@ -5825,8 +6551,8 @@
         </p:nvCxnSpPr>
         <p:spPr>
           <a:xfrm>
-            <a:off x="1910081" y="3631783"/>
-            <a:ext cx="1940559" cy="249972"/>
+            <a:off x="4434209" y="2525721"/>
+            <a:ext cx="1717040" cy="559097"/>
           </a:xfrm>
           <a:prstGeom prst="line">
             <a:avLst/>
@@ -5858,8 +6584,8 @@
         </p:nvCxnSpPr>
         <p:spPr>
           <a:xfrm>
-            <a:off x="1910081" y="3631783"/>
-            <a:ext cx="1940559" cy="2405789"/>
+            <a:off x="4434209" y="2525721"/>
+            <a:ext cx="1788159" cy="1573734"/>
           </a:xfrm>
           <a:prstGeom prst="line">
             <a:avLst/>
@@ -5888,7 +6614,7 @@
         </p:nvSpPr>
         <p:spPr>
           <a:xfrm>
-            <a:off x="701041" y="3424991"/>
+            <a:off x="3225169" y="2318929"/>
             <a:ext cx="1209040" cy="413584"/>
           </a:xfrm>
           <a:prstGeom prst="roundRect">
@@ -5941,7 +6667,7 @@
         </p:nvSpPr>
         <p:spPr>
           <a:xfrm>
-            <a:off x="5901424" y="1423873"/>
+            <a:off x="6090587" y="640295"/>
             <a:ext cx="2388282" cy="646331"/>
           </a:xfrm>
           <a:prstGeom prst="rect">
@@ -5969,6 +6695,154 @@
           </a:p>
         </p:txBody>
       </p:sp>
+      <p:sp>
+        <p:nvSpPr>
+          <p:cNvPr id="55" name="TextBox 54"/>
+          <p:cNvSpPr txBox="1"/>
+          <p:nvPr/>
+        </p:nvSpPr>
+        <p:spPr>
+          <a:xfrm>
+            <a:off x="1031265" y="3023495"/>
+            <a:ext cx="1650700" cy="646331"/>
+          </a:xfrm>
+          <a:prstGeom prst="rect">
+            <a:avLst/>
+          </a:prstGeom>
+        </p:spPr>
+        <p:style>
+          <a:lnRef idx="2">
+            <a:schemeClr val="dk1"/>
+          </a:lnRef>
+          <a:fillRef idx="1">
+            <a:schemeClr val="lt1"/>
+          </a:fillRef>
+          <a:effectRef idx="0">
+            <a:schemeClr val="dk1"/>
+          </a:effectRef>
+          <a:fontRef idx="minor">
+            <a:schemeClr val="dk1"/>
+          </a:fontRef>
+        </p:style>
+        <p:txBody>
+          <a:bodyPr wrap="none" rtlCol="0">
+            <a:spAutoFit/>
+          </a:bodyPr>
+          <a:lstStyle/>
+          <a:p>
+            <a:r>
+              <a:rPr lang="en-US" dirty="0" smtClean="0"/>
+              <a:t>E-Service</a:t>
+            </a:r>
+          </a:p>
+          <a:p>
+            <a:r>
+              <a:rPr lang="en-US" dirty="0" smtClean="0"/>
+              <a:t>Product Quality</a:t>
+            </a:r>
+            <a:endParaRPr lang="en-US" dirty="0"/>
+          </a:p>
+        </p:txBody>
+      </p:sp>
+      <p:cxnSp>
+        <p:nvCxnSpPr>
+          <p:cNvPr id="57" name="Straight Connector 56"/>
+          <p:cNvCxnSpPr>
+            <a:stCxn id="55" idx="3"/>
+            <a:endCxn id="533" idx="1"/>
+          </p:cNvCxnSpPr>
+          <p:nvPr/>
+        </p:nvCxnSpPr>
+        <p:spPr>
+          <a:xfrm flipV="1">
+            <a:off x="2681965" y="2525721"/>
+            <a:ext cx="543204" cy="820940"/>
+          </a:xfrm>
+          <a:prstGeom prst="line">
+            <a:avLst/>
+          </a:prstGeom>
+        </p:spPr>
+        <p:style>
+          <a:lnRef idx="1">
+            <a:schemeClr val="dk1"/>
+          </a:lnRef>
+          <a:fillRef idx="0">
+            <a:schemeClr val="dk1"/>
+          </a:fillRef>
+          <a:effectRef idx="0">
+            <a:schemeClr val="dk1"/>
+          </a:effectRef>
+          <a:fontRef idx="minor">
+            <a:schemeClr val="tx1"/>
+          </a:fontRef>
+        </p:style>
+      </p:cxnSp>
+      <p:cxnSp>
+        <p:nvCxnSpPr>
+          <p:cNvPr id="60" name="Straight Connector 59"/>
+          <p:cNvCxnSpPr>
+            <a:stCxn id="55" idx="3"/>
+            <a:endCxn id="11" idx="1"/>
+          </p:cNvCxnSpPr>
+          <p:nvPr/>
+        </p:nvCxnSpPr>
+        <p:spPr>
+          <a:xfrm flipV="1">
+            <a:off x="2681965" y="3343321"/>
+            <a:ext cx="614324" cy="3340"/>
+          </a:xfrm>
+          <a:prstGeom prst="line">
+            <a:avLst/>
+          </a:prstGeom>
+        </p:spPr>
+        <p:style>
+          <a:lnRef idx="1">
+            <a:schemeClr val="dk1"/>
+          </a:lnRef>
+          <a:fillRef idx="0">
+            <a:schemeClr val="dk1"/>
+          </a:fillRef>
+          <a:effectRef idx="0">
+            <a:schemeClr val="dk1"/>
+          </a:effectRef>
+          <a:fontRef idx="minor">
+            <a:schemeClr val="tx1"/>
+          </a:fontRef>
+        </p:style>
+      </p:cxnSp>
+      <p:cxnSp>
+        <p:nvCxnSpPr>
+          <p:cNvPr id="63" name="Straight Connector 62"/>
+          <p:cNvCxnSpPr>
+            <a:stCxn id="55" idx="3"/>
+            <a:endCxn id="12" idx="1"/>
+          </p:cNvCxnSpPr>
+          <p:nvPr/>
+        </p:nvCxnSpPr>
+        <p:spPr>
+          <a:xfrm>
+            <a:off x="2681965" y="3346661"/>
+            <a:ext cx="614324" cy="721301"/>
+          </a:xfrm>
+          <a:prstGeom prst="line">
+            <a:avLst/>
+          </a:prstGeom>
+        </p:spPr>
+        <p:style>
+          <a:lnRef idx="1">
+            <a:schemeClr val="dk1"/>
+          </a:lnRef>
+          <a:fillRef idx="0">
+            <a:schemeClr val="dk1"/>
+          </a:fillRef>
+          <a:effectRef idx="0">
+            <a:schemeClr val="dk1"/>
+          </a:effectRef>
+          <a:fontRef idx="minor">
+            <a:schemeClr val="tx1"/>
+          </a:fontRef>
+        </p:style>
+      </p:cxnSp>
     </p:spTree>
     <p:extLst>
       <p:ext uri="{BB962C8B-B14F-4D97-AF65-F5344CB8AC3E}">
@@ -6042,590 +6916,206 @@
           </a:p>
         </p:txBody>
       </p:sp>
-      <p:sp>
-        <p:nvSpPr>
-          <p:cNvPr id="41" name="Rounded Rectangle 40"/>
-          <p:cNvSpPr/>
-          <p:nvPr/>
-        </p:nvSpPr>
-        <p:spPr>
-          <a:xfrm>
-            <a:off x="3657599" y="501015"/>
-            <a:ext cx="1239519" cy="279400"/>
-          </a:xfrm>
-          <a:prstGeom prst="roundRect">
-            <a:avLst>
-              <a:gd name="adj" fmla="val 50000"/>
-            </a:avLst>
-          </a:prstGeom>
-        </p:spPr>
-        <p:style>
-          <a:lnRef idx="2">
-            <a:schemeClr val="accent1"/>
-          </a:lnRef>
-          <a:fillRef idx="1">
-            <a:schemeClr val="lt1"/>
-          </a:fillRef>
-          <a:effectRef idx="0">
-            <a:schemeClr val="accent1"/>
-          </a:effectRef>
-          <a:fontRef idx="minor">
-            <a:schemeClr val="dk1"/>
-          </a:fontRef>
-        </p:style>
-        <p:txBody>
-          <a:bodyPr rtlCol="0" anchor="ctr"/>
-          <a:lstStyle/>
-          <a:p>
-            <a:pPr algn="ctr"/>
-            <a:r>
-              <a:rPr lang="en-US" sz="1200" dirty="0" smtClean="0"/>
-              <a:t>ACCESSIBILITY</a:t>
-            </a:r>
-            <a:endParaRPr lang="en-US" sz="1200" dirty="0"/>
-          </a:p>
-        </p:txBody>
-      </p:sp>
-      <p:sp>
-        <p:nvSpPr>
-          <p:cNvPr id="42" name="Rounded Rectangle 41"/>
-          <p:cNvSpPr/>
-          <p:nvPr/>
-        </p:nvSpPr>
-        <p:spPr>
-          <a:xfrm>
-            <a:off x="3850640" y="1778660"/>
-            <a:ext cx="975359" cy="254000"/>
-          </a:xfrm>
-          <a:prstGeom prst="roundRect">
-            <a:avLst>
-              <a:gd name="adj" fmla="val 50000"/>
-            </a:avLst>
-          </a:prstGeom>
-        </p:spPr>
-        <p:style>
-          <a:lnRef idx="2">
-            <a:schemeClr val="accent1"/>
-          </a:lnRef>
-          <a:fillRef idx="1">
-            <a:schemeClr val="lt1"/>
-          </a:fillRef>
-          <a:effectRef idx="0">
-            <a:schemeClr val="accent1"/>
-          </a:effectRef>
-          <a:fontRef idx="minor">
-            <a:schemeClr val="dk1"/>
-          </a:fontRef>
-        </p:style>
-        <p:txBody>
-          <a:bodyPr rtlCol="0" anchor="ctr"/>
-          <a:lstStyle/>
-          <a:p>
-            <a:pPr algn="ctr"/>
-            <a:r>
-              <a:rPr lang="en-US" sz="1200" dirty="0" smtClean="0"/>
-              <a:t>USABILITY</a:t>
-            </a:r>
-            <a:endParaRPr lang="en-US" sz="1200" dirty="0"/>
-          </a:p>
-        </p:txBody>
-      </p:sp>
-      <p:sp>
-        <p:nvSpPr>
-          <p:cNvPr id="43" name="Rounded Rectangle 42"/>
-          <p:cNvSpPr/>
-          <p:nvPr/>
-        </p:nvSpPr>
-        <p:spPr>
-          <a:xfrm>
-            <a:off x="3850640" y="3286812"/>
-            <a:ext cx="975359" cy="254000"/>
-          </a:xfrm>
-          <a:prstGeom prst="roundRect">
-            <a:avLst>
-              <a:gd name="adj" fmla="val 50000"/>
-            </a:avLst>
-          </a:prstGeom>
-        </p:spPr>
-        <p:style>
-          <a:lnRef idx="2">
-            <a:schemeClr val="accent1"/>
-          </a:lnRef>
-          <a:fillRef idx="1">
-            <a:schemeClr val="lt1"/>
-          </a:fillRef>
-          <a:effectRef idx="0">
-            <a:schemeClr val="accent1"/>
-          </a:effectRef>
-          <a:fontRef idx="minor">
-            <a:schemeClr val="dk1"/>
-          </a:fontRef>
-        </p:style>
-        <p:txBody>
-          <a:bodyPr rtlCol="0" anchor="ctr"/>
-          <a:lstStyle/>
-          <a:p>
-            <a:pPr algn="ctr"/>
-            <a:r>
-              <a:rPr lang="en-US" sz="1200" dirty="0" smtClean="0"/>
-              <a:t>EFFICIENCY</a:t>
-            </a:r>
-            <a:endParaRPr lang="en-US" sz="1200" dirty="0"/>
-          </a:p>
-        </p:txBody>
-      </p:sp>
-      <p:sp>
-        <p:nvSpPr>
-          <p:cNvPr id="44" name="Rounded Rectangle 43"/>
-          <p:cNvSpPr/>
-          <p:nvPr/>
-        </p:nvSpPr>
-        <p:spPr>
-          <a:xfrm>
-            <a:off x="3850640" y="5476347"/>
-            <a:ext cx="975359" cy="254000"/>
-          </a:xfrm>
-          <a:prstGeom prst="roundRect">
-            <a:avLst>
-              <a:gd name="adj" fmla="val 50000"/>
-            </a:avLst>
-          </a:prstGeom>
-        </p:spPr>
-        <p:style>
-          <a:lnRef idx="2">
-            <a:schemeClr val="accent1"/>
-          </a:lnRef>
-          <a:fillRef idx="1">
-            <a:schemeClr val="lt1"/>
-          </a:fillRef>
-          <a:effectRef idx="0">
-            <a:schemeClr val="accent1"/>
-          </a:effectRef>
-          <a:fontRef idx="minor">
-            <a:schemeClr val="dk1"/>
-          </a:fontRef>
-        </p:style>
-        <p:txBody>
-          <a:bodyPr rtlCol="0" anchor="ctr"/>
-          <a:lstStyle/>
-          <a:p>
-            <a:pPr algn="ctr"/>
-            <a:r>
-              <a:rPr lang="en-US" sz="1200" dirty="0" smtClean="0"/>
-              <a:t>SECURITY</a:t>
-            </a:r>
-            <a:endParaRPr lang="en-US" sz="1200" dirty="0"/>
-          </a:p>
-        </p:txBody>
-      </p:sp>
-      <p:sp>
-        <p:nvSpPr>
-          <p:cNvPr id="45" name="Rounded Rectangle 44"/>
-          <p:cNvSpPr/>
-          <p:nvPr/>
-        </p:nvSpPr>
-        <p:spPr>
-          <a:xfrm>
-            <a:off x="5486401" y="866468"/>
-            <a:ext cx="1619998" cy="287997"/>
-          </a:xfrm>
-          <a:prstGeom prst="roundRect">
-            <a:avLst>
-              <a:gd name="adj" fmla="val 0"/>
-            </a:avLst>
-          </a:prstGeom>
-          <a:solidFill>
-            <a:schemeClr val="lt1"/>
-          </a:solidFill>
-          <a:ln w="12700"/>
-        </p:spPr>
-        <p:style>
-          <a:lnRef idx="2">
-            <a:schemeClr val="dk1"/>
-          </a:lnRef>
-          <a:fillRef idx="1">
-            <a:schemeClr val="lt1"/>
-          </a:fillRef>
-          <a:effectRef idx="0">
-            <a:schemeClr val="dk1"/>
-          </a:effectRef>
-          <a:fontRef idx="minor">
-            <a:schemeClr val="dk1"/>
-          </a:fontRef>
-        </p:style>
-        <p:txBody>
-          <a:bodyPr rtlCol="0" anchor="ctr"/>
-          <a:lstStyle/>
-          <a:p>
-            <a:pPr algn="ctr"/>
-            <a:r>
-              <a:rPr lang="en-US" sz="1000" dirty="0" smtClean="0"/>
-              <a:t>Operability</a:t>
-            </a:r>
-            <a:endParaRPr lang="en-US" sz="1000" dirty="0"/>
-          </a:p>
-        </p:txBody>
-      </p:sp>
-      <p:sp>
-        <p:nvSpPr>
-          <p:cNvPr id="46" name="Rounded Rectangle 45"/>
-          <p:cNvSpPr/>
-          <p:nvPr/>
-        </p:nvSpPr>
-        <p:spPr>
-          <a:xfrm>
-            <a:off x="5486401" y="189865"/>
-            <a:ext cx="772159" cy="227330"/>
-          </a:xfrm>
-          <a:prstGeom prst="roundRect">
-            <a:avLst>
-              <a:gd name="adj" fmla="val 0"/>
-            </a:avLst>
-          </a:prstGeom>
-          <a:solidFill>
-            <a:schemeClr val="lt1"/>
-          </a:solidFill>
-          <a:ln w="12700"/>
-        </p:spPr>
-        <p:style>
-          <a:lnRef idx="2">
-            <a:schemeClr val="dk1"/>
-          </a:lnRef>
-          <a:fillRef idx="1">
-            <a:schemeClr val="lt1"/>
-          </a:fillRef>
-          <a:effectRef idx="0">
-            <a:schemeClr val="dk1"/>
-          </a:effectRef>
-          <a:fontRef idx="minor">
-            <a:schemeClr val="dk1"/>
-          </a:fontRef>
-        </p:style>
-        <p:txBody>
-          <a:bodyPr rtlCol="0" anchor="ctr"/>
-          <a:lstStyle/>
-          <a:p>
-            <a:pPr algn="ctr"/>
-            <a:r>
-              <a:rPr lang="en-US" sz="1000" dirty="0" smtClean="0"/>
-              <a:t>Availability</a:t>
-            </a:r>
-            <a:endParaRPr lang="en-US" sz="1000" dirty="0"/>
-          </a:p>
-        </p:txBody>
-      </p:sp>
-      <p:sp>
-        <p:nvSpPr>
-          <p:cNvPr id="47" name="Rounded Rectangle 46"/>
-          <p:cNvSpPr/>
-          <p:nvPr/>
-        </p:nvSpPr>
-        <p:spPr>
-          <a:xfrm>
-            <a:off x="5476241" y="531495"/>
-            <a:ext cx="772159" cy="227330"/>
-          </a:xfrm>
-          <a:prstGeom prst="roundRect">
-            <a:avLst>
-              <a:gd name="adj" fmla="val 0"/>
-            </a:avLst>
-          </a:prstGeom>
-          <a:solidFill>
-            <a:schemeClr val="lt1"/>
-          </a:solidFill>
-          <a:ln w="12700"/>
-        </p:spPr>
-        <p:style>
-          <a:lnRef idx="2">
-            <a:schemeClr val="dk1"/>
-          </a:lnRef>
-          <a:fillRef idx="1">
-            <a:schemeClr val="lt1"/>
-          </a:fillRef>
-          <a:effectRef idx="0">
-            <a:schemeClr val="dk1"/>
-          </a:effectRef>
-          <a:fontRef idx="minor">
-            <a:schemeClr val="dk1"/>
-          </a:fontRef>
-        </p:style>
-        <p:txBody>
-          <a:bodyPr rtlCol="0" anchor="ctr"/>
-          <a:lstStyle/>
-          <a:p>
-            <a:pPr algn="ctr"/>
-            <a:r>
-              <a:rPr lang="en-US" sz="1000" dirty="0" smtClean="0"/>
-              <a:t>Maturity</a:t>
-            </a:r>
-            <a:endParaRPr lang="en-US" sz="1000" dirty="0"/>
-          </a:p>
-        </p:txBody>
-      </p:sp>
-      <p:sp>
-        <p:nvSpPr>
-          <p:cNvPr id="48" name="Rounded Rectangle 47"/>
-          <p:cNvSpPr/>
-          <p:nvPr/>
-        </p:nvSpPr>
-        <p:spPr>
-          <a:xfrm>
-            <a:off x="5415281" y="1392581"/>
-            <a:ext cx="1780539" cy="264160"/>
-          </a:xfrm>
-          <a:prstGeom prst="roundRect">
-            <a:avLst>
-              <a:gd name="adj" fmla="val 0"/>
-            </a:avLst>
-          </a:prstGeom>
-          <a:solidFill>
-            <a:schemeClr val="lt1"/>
-          </a:solidFill>
-          <a:ln w="12700"/>
-        </p:spPr>
-        <p:style>
-          <a:lnRef idx="2">
-            <a:schemeClr val="dk1"/>
-          </a:lnRef>
-          <a:fillRef idx="1">
-            <a:schemeClr val="lt1"/>
-          </a:fillRef>
-          <a:effectRef idx="0">
-            <a:schemeClr val="dk1"/>
-          </a:effectRef>
-          <a:fontRef idx="minor">
-            <a:schemeClr val="dk1"/>
-          </a:fontRef>
-        </p:style>
-        <p:txBody>
-          <a:bodyPr rtlCol="0" anchor="ctr"/>
-          <a:lstStyle/>
-          <a:p>
-            <a:pPr algn="ctr"/>
-            <a:r>
-              <a:rPr lang="en-US" sz="1000" dirty="0" smtClean="0"/>
-              <a:t>Ease of Use</a:t>
-            </a:r>
-            <a:endParaRPr lang="en-US" sz="1000" dirty="0"/>
-          </a:p>
-        </p:txBody>
-      </p:sp>
-      <p:sp>
-        <p:nvSpPr>
-          <p:cNvPr id="49" name="Rounded Rectangle 48"/>
-          <p:cNvSpPr/>
-          <p:nvPr/>
-        </p:nvSpPr>
-        <p:spPr>
-          <a:xfrm>
-            <a:off x="5415281" y="1706877"/>
-            <a:ext cx="1066800" cy="367664"/>
-          </a:xfrm>
-          <a:prstGeom prst="roundRect">
-            <a:avLst>
-              <a:gd name="adj" fmla="val 0"/>
-            </a:avLst>
-          </a:prstGeom>
-          <a:solidFill>
-            <a:schemeClr val="lt1"/>
-          </a:solidFill>
-          <a:ln w="12700"/>
-        </p:spPr>
-        <p:style>
-          <a:lnRef idx="2">
-            <a:schemeClr val="dk1"/>
-          </a:lnRef>
-          <a:fillRef idx="1">
-            <a:schemeClr val="lt1"/>
-          </a:fillRef>
-          <a:effectRef idx="0">
-            <a:schemeClr val="dk1"/>
-          </a:effectRef>
-          <a:fontRef idx="minor">
-            <a:schemeClr val="dk1"/>
-          </a:fontRef>
-        </p:style>
-        <p:txBody>
-          <a:bodyPr rtlCol="0" anchor="ctr"/>
-          <a:lstStyle/>
-          <a:p>
-            <a:pPr algn="ctr"/>
-            <a:r>
-              <a:rPr lang="en-US" sz="1000" dirty="0" smtClean="0"/>
-              <a:t>Learnability</a:t>
-            </a:r>
-            <a:endParaRPr lang="en-US" sz="1000" dirty="0"/>
-          </a:p>
-        </p:txBody>
-      </p:sp>
-      <p:sp>
-        <p:nvSpPr>
-          <p:cNvPr id="50" name="Rounded Rectangle 49"/>
-          <p:cNvSpPr/>
-          <p:nvPr/>
-        </p:nvSpPr>
-        <p:spPr>
-          <a:xfrm>
-            <a:off x="5415281" y="2142515"/>
-            <a:ext cx="1494679" cy="305726"/>
-          </a:xfrm>
-          <a:prstGeom prst="roundRect">
-            <a:avLst>
-              <a:gd name="adj" fmla="val 0"/>
-            </a:avLst>
-          </a:prstGeom>
-          <a:solidFill>
-            <a:schemeClr val="lt1"/>
-          </a:solidFill>
-          <a:ln w="12700"/>
-        </p:spPr>
-        <p:style>
-          <a:lnRef idx="2">
-            <a:schemeClr val="dk1"/>
-          </a:lnRef>
-          <a:fillRef idx="1">
-            <a:schemeClr val="lt1"/>
-          </a:fillRef>
-          <a:effectRef idx="0">
-            <a:schemeClr val="dk1"/>
-          </a:effectRef>
-          <a:fontRef idx="minor">
-            <a:schemeClr val="dk1"/>
-          </a:fontRef>
-        </p:style>
-        <p:txBody>
-          <a:bodyPr rtlCol="0" anchor="ctr"/>
-          <a:lstStyle/>
-          <a:p>
-            <a:pPr algn="ctr"/>
-            <a:r>
-              <a:rPr lang="en-US" sz="1000" dirty="0" smtClean="0"/>
-              <a:t>User interface aesthetics</a:t>
-            </a:r>
-            <a:endParaRPr lang="en-US" sz="1000" dirty="0"/>
-          </a:p>
-        </p:txBody>
-      </p:sp>
-      <p:sp>
-        <p:nvSpPr>
-          <p:cNvPr id="51" name="Rounded Rectangle 50"/>
-          <p:cNvSpPr/>
-          <p:nvPr/>
-        </p:nvSpPr>
-        <p:spPr>
-          <a:xfrm>
-            <a:off x="5344161" y="2925210"/>
-            <a:ext cx="2065978" cy="276861"/>
-          </a:xfrm>
-          <a:prstGeom prst="roundRect">
-            <a:avLst>
-              <a:gd name="adj" fmla="val 0"/>
-            </a:avLst>
-          </a:prstGeom>
-          <a:solidFill>
-            <a:schemeClr val="lt1"/>
-          </a:solidFill>
-          <a:ln w="12700"/>
-        </p:spPr>
-        <p:style>
-          <a:lnRef idx="2">
-            <a:schemeClr val="dk1"/>
-          </a:lnRef>
-          <a:fillRef idx="1">
-            <a:schemeClr val="lt1"/>
-          </a:fillRef>
-          <a:effectRef idx="0">
-            <a:schemeClr val="dk1"/>
-          </a:effectRef>
-          <a:fontRef idx="minor">
-            <a:schemeClr val="dk1"/>
-          </a:fontRef>
-        </p:style>
-        <p:txBody>
-          <a:bodyPr rtlCol="0" anchor="ctr"/>
-          <a:lstStyle/>
-          <a:p>
-            <a:pPr algn="ctr"/>
-            <a:r>
-              <a:rPr lang="en-US" sz="1000" dirty="0" smtClean="0"/>
-              <a:t>Responsiveness</a:t>
-            </a:r>
-            <a:endParaRPr lang="en-US" sz="1000" dirty="0"/>
-          </a:p>
-        </p:txBody>
-      </p:sp>
-      <p:sp>
-        <p:nvSpPr>
-          <p:cNvPr id="52" name="Rounded Rectangle 51"/>
-          <p:cNvSpPr/>
-          <p:nvPr/>
-        </p:nvSpPr>
-        <p:spPr>
-          <a:xfrm>
-            <a:off x="5313681" y="3685938"/>
-            <a:ext cx="1396998" cy="264160"/>
-          </a:xfrm>
-          <a:prstGeom prst="roundRect">
-            <a:avLst>
-              <a:gd name="adj" fmla="val 0"/>
-            </a:avLst>
-          </a:prstGeom>
-          <a:solidFill>
-            <a:schemeClr val="lt1"/>
-          </a:solidFill>
-          <a:ln w="12700"/>
-        </p:spPr>
-        <p:style>
-          <a:lnRef idx="2">
-            <a:schemeClr val="dk1"/>
-          </a:lnRef>
-          <a:fillRef idx="1">
-            <a:schemeClr val="lt1"/>
-          </a:fillRef>
-          <a:effectRef idx="0">
-            <a:schemeClr val="dk1"/>
-          </a:effectRef>
-          <a:fontRef idx="minor">
-            <a:schemeClr val="dk1"/>
-          </a:fontRef>
-        </p:style>
-        <p:txBody>
-          <a:bodyPr rtlCol="0" anchor="ctr"/>
-          <a:lstStyle/>
-          <a:p>
-            <a:pPr algn="ctr"/>
-            <a:r>
-              <a:rPr lang="en-US" sz="1000" dirty="0" smtClean="0"/>
-              <a:t>Time behavior</a:t>
-            </a:r>
-            <a:endParaRPr lang="en-US" sz="1000" dirty="0"/>
-          </a:p>
-        </p:txBody>
-      </p:sp>
       <p:grpSp>
         <p:nvGrpSpPr>
-          <p:cNvPr id="53" name="Group 52"/>
+          <p:cNvPr id="2" name="Group 1"/>
           <p:cNvGrpSpPr/>
           <p:nvPr/>
         </p:nvGrpSpPr>
         <p:grpSpPr>
           <a:xfrm>
-            <a:off x="5318761" y="4193872"/>
-            <a:ext cx="1879598" cy="491491"/>
-            <a:chOff x="7721601" y="3576319"/>
-            <a:chExt cx="1859278" cy="491491"/>
+            <a:off x="3657599" y="189865"/>
+            <a:ext cx="3811024" cy="6135455"/>
+            <a:chOff x="3657599" y="189865"/>
+            <a:chExt cx="3811024" cy="6135455"/>
           </a:xfrm>
         </p:grpSpPr>
         <p:sp>
           <p:nvSpPr>
-            <p:cNvPr id="54" name="Rounded Rectangle 53"/>
+            <p:cNvPr id="41" name="Rounded Rectangle 40"/>
             <p:cNvSpPr/>
             <p:nvPr/>
           </p:nvSpPr>
           <p:spPr>
             <a:xfrm>
-              <a:off x="7721601" y="3576319"/>
-              <a:ext cx="1859278" cy="260985"/>
+              <a:off x="3657599" y="501015"/>
+              <a:ext cx="1239519" cy="279400"/>
+            </a:xfrm>
+            <a:prstGeom prst="roundRect">
+              <a:avLst>
+                <a:gd name="adj" fmla="val 50000"/>
+              </a:avLst>
+            </a:prstGeom>
+          </p:spPr>
+          <p:style>
+            <a:lnRef idx="2">
+              <a:schemeClr val="accent1"/>
+            </a:lnRef>
+            <a:fillRef idx="1">
+              <a:schemeClr val="lt1"/>
+            </a:fillRef>
+            <a:effectRef idx="0">
+              <a:schemeClr val="accent1"/>
+            </a:effectRef>
+            <a:fontRef idx="minor">
+              <a:schemeClr val="dk1"/>
+            </a:fontRef>
+          </p:style>
+          <p:txBody>
+            <a:bodyPr rtlCol="0" anchor="ctr"/>
+            <a:lstStyle/>
+            <a:p>
+              <a:pPr algn="ctr"/>
+              <a:r>
+                <a:rPr lang="en-US" sz="1200" dirty="0" smtClean="0"/>
+                <a:t>ACCESSIBILITY</a:t>
+              </a:r>
+              <a:endParaRPr lang="en-US" sz="1200" dirty="0"/>
+            </a:p>
+          </p:txBody>
+        </p:sp>
+        <p:sp>
+          <p:nvSpPr>
+            <p:cNvPr id="42" name="Rounded Rectangle 41"/>
+            <p:cNvSpPr/>
+            <p:nvPr/>
+          </p:nvSpPr>
+          <p:spPr>
+            <a:xfrm>
+              <a:off x="3850640" y="1778660"/>
+              <a:ext cx="975359" cy="254000"/>
+            </a:xfrm>
+            <a:prstGeom prst="roundRect">
+              <a:avLst>
+                <a:gd name="adj" fmla="val 50000"/>
+              </a:avLst>
+            </a:prstGeom>
+          </p:spPr>
+          <p:style>
+            <a:lnRef idx="2">
+              <a:schemeClr val="accent1"/>
+            </a:lnRef>
+            <a:fillRef idx="1">
+              <a:schemeClr val="lt1"/>
+            </a:fillRef>
+            <a:effectRef idx="0">
+              <a:schemeClr val="accent1"/>
+            </a:effectRef>
+            <a:fontRef idx="minor">
+              <a:schemeClr val="dk1"/>
+            </a:fontRef>
+          </p:style>
+          <p:txBody>
+            <a:bodyPr rtlCol="0" anchor="ctr"/>
+            <a:lstStyle/>
+            <a:p>
+              <a:pPr algn="ctr"/>
+              <a:r>
+                <a:rPr lang="en-US" sz="1200" dirty="0" smtClean="0"/>
+                <a:t>USABILITY</a:t>
+              </a:r>
+              <a:endParaRPr lang="en-US" sz="1200" dirty="0"/>
+            </a:p>
+          </p:txBody>
+        </p:sp>
+        <p:sp>
+          <p:nvSpPr>
+            <p:cNvPr id="43" name="Rounded Rectangle 42"/>
+            <p:cNvSpPr/>
+            <p:nvPr/>
+          </p:nvSpPr>
+          <p:spPr>
+            <a:xfrm>
+              <a:off x="3850640" y="3286812"/>
+              <a:ext cx="975359" cy="254000"/>
+            </a:xfrm>
+            <a:prstGeom prst="roundRect">
+              <a:avLst>
+                <a:gd name="adj" fmla="val 50000"/>
+              </a:avLst>
+            </a:prstGeom>
+          </p:spPr>
+          <p:style>
+            <a:lnRef idx="2">
+              <a:schemeClr val="accent1"/>
+            </a:lnRef>
+            <a:fillRef idx="1">
+              <a:schemeClr val="lt1"/>
+            </a:fillRef>
+            <a:effectRef idx="0">
+              <a:schemeClr val="accent1"/>
+            </a:effectRef>
+            <a:fontRef idx="minor">
+              <a:schemeClr val="dk1"/>
+            </a:fontRef>
+          </p:style>
+          <p:txBody>
+            <a:bodyPr rtlCol="0" anchor="ctr"/>
+            <a:lstStyle/>
+            <a:p>
+              <a:pPr algn="ctr"/>
+              <a:r>
+                <a:rPr lang="en-US" sz="1200" dirty="0" smtClean="0"/>
+                <a:t>EFFICIENCY</a:t>
+              </a:r>
+              <a:endParaRPr lang="en-US" sz="1200" dirty="0"/>
+            </a:p>
+          </p:txBody>
+        </p:sp>
+        <p:sp>
+          <p:nvSpPr>
+            <p:cNvPr id="44" name="Rounded Rectangle 43"/>
+            <p:cNvSpPr/>
+            <p:nvPr/>
+          </p:nvSpPr>
+          <p:spPr>
+            <a:xfrm>
+              <a:off x="3850640" y="5476347"/>
+              <a:ext cx="975359" cy="254000"/>
+            </a:xfrm>
+            <a:prstGeom prst="roundRect">
+              <a:avLst>
+                <a:gd name="adj" fmla="val 50000"/>
+              </a:avLst>
+            </a:prstGeom>
+          </p:spPr>
+          <p:style>
+            <a:lnRef idx="2">
+              <a:schemeClr val="accent1"/>
+            </a:lnRef>
+            <a:fillRef idx="1">
+              <a:schemeClr val="lt1"/>
+            </a:fillRef>
+            <a:effectRef idx="0">
+              <a:schemeClr val="accent1"/>
+            </a:effectRef>
+            <a:fontRef idx="minor">
+              <a:schemeClr val="dk1"/>
+            </a:fontRef>
+          </p:style>
+          <p:txBody>
+            <a:bodyPr rtlCol="0" anchor="ctr"/>
+            <a:lstStyle/>
+            <a:p>
+              <a:pPr algn="ctr"/>
+              <a:r>
+                <a:rPr lang="en-US" sz="1200" dirty="0" smtClean="0"/>
+                <a:t>SECURITY</a:t>
+              </a:r>
+              <a:endParaRPr lang="en-US" sz="1200" dirty="0"/>
+            </a:p>
+          </p:txBody>
+        </p:sp>
+        <p:sp>
+          <p:nvSpPr>
+            <p:cNvPr id="45" name="Rounded Rectangle 44"/>
+            <p:cNvSpPr/>
+            <p:nvPr/>
+          </p:nvSpPr>
+          <p:spPr>
+            <a:xfrm>
+              <a:off x="5486401" y="866468"/>
+              <a:ext cx="1619998" cy="287997"/>
             </a:xfrm>
             <a:prstGeom prst="roundRect">
               <a:avLst>
@@ -6658,7 +7148,7 @@
               <a:pPr algn="ctr"/>
               <a:r>
                 <a:rPr lang="en-US" sz="1000" dirty="0" smtClean="0"/>
-                <a:t>Transaction Capability</a:t>
+                <a:t>Operability</a:t>
               </a:r>
               <a:endParaRPr lang="en-US" sz="1000" dirty="0"/>
             </a:p>
@@ -6666,14 +7156,14 @@
         </p:sp>
         <p:sp>
           <p:nvSpPr>
-            <p:cNvPr id="55" name="Rounded Rectangle 54"/>
+            <p:cNvPr id="46" name="Rounded Rectangle 45"/>
             <p:cNvSpPr/>
             <p:nvPr/>
           </p:nvSpPr>
           <p:spPr>
             <a:xfrm>
-              <a:off x="7721601" y="3840480"/>
-              <a:ext cx="955039" cy="224154"/>
+              <a:off x="5486401" y="189865"/>
+              <a:ext cx="772159" cy="227330"/>
             </a:xfrm>
             <a:prstGeom prst="roundRect">
               <a:avLst>
@@ -6706,7 +7196,7 @@
               <a:pPr algn="ctr"/>
               <a:r>
                 <a:rPr lang="en-US" sz="1000" dirty="0" smtClean="0"/>
-                <a:t>Completeness</a:t>
+                <a:t>Availability</a:t>
               </a:r>
               <a:endParaRPr lang="en-US" sz="1000" dirty="0"/>
             </a:p>
@@ -6714,14 +7204,14 @@
         </p:sp>
         <p:sp>
           <p:nvSpPr>
-            <p:cNvPr id="56" name="Rounded Rectangle 55"/>
+            <p:cNvPr id="47" name="Rounded Rectangle 46"/>
             <p:cNvSpPr/>
             <p:nvPr/>
           </p:nvSpPr>
           <p:spPr>
             <a:xfrm>
-              <a:off x="8676640" y="3840480"/>
-              <a:ext cx="904239" cy="227330"/>
+              <a:off x="5476241" y="531495"/>
+              <a:ext cx="772159" cy="227330"/>
             </a:xfrm>
             <a:prstGeom prst="roundRect">
               <a:avLst>
@@ -6754,844 +7244,1243 @@
               <a:pPr algn="ctr"/>
               <a:r>
                 <a:rPr lang="en-US" sz="1000" dirty="0" smtClean="0"/>
-                <a:t>Correctness</a:t>
+                <a:t>Maturity</a:t>
+              </a:r>
+              <a:endParaRPr lang="en-US" sz="1000" dirty="0"/>
+            </a:p>
+          </p:txBody>
+        </p:sp>
+        <p:sp>
+          <p:nvSpPr>
+            <p:cNvPr id="48" name="Rounded Rectangle 47"/>
+            <p:cNvSpPr/>
+            <p:nvPr/>
+          </p:nvSpPr>
+          <p:spPr>
+            <a:xfrm>
+              <a:off x="5415281" y="1392581"/>
+              <a:ext cx="1780539" cy="264160"/>
+            </a:xfrm>
+            <a:prstGeom prst="roundRect">
+              <a:avLst>
+                <a:gd name="adj" fmla="val 0"/>
+              </a:avLst>
+            </a:prstGeom>
+            <a:solidFill>
+              <a:schemeClr val="lt1"/>
+            </a:solidFill>
+            <a:ln w="12700"/>
+          </p:spPr>
+          <p:style>
+            <a:lnRef idx="2">
+              <a:schemeClr val="dk1"/>
+            </a:lnRef>
+            <a:fillRef idx="1">
+              <a:schemeClr val="lt1"/>
+            </a:fillRef>
+            <a:effectRef idx="0">
+              <a:schemeClr val="dk1"/>
+            </a:effectRef>
+            <a:fontRef idx="minor">
+              <a:schemeClr val="dk1"/>
+            </a:fontRef>
+          </p:style>
+          <p:txBody>
+            <a:bodyPr rtlCol="0" anchor="ctr"/>
+            <a:lstStyle/>
+            <a:p>
+              <a:pPr algn="ctr"/>
+              <a:r>
+                <a:rPr lang="en-US" sz="1000" dirty="0" smtClean="0"/>
+                <a:t>Ease of Use</a:t>
+              </a:r>
+              <a:endParaRPr lang="en-US" sz="1000" dirty="0"/>
+            </a:p>
+          </p:txBody>
+        </p:sp>
+        <p:sp>
+          <p:nvSpPr>
+            <p:cNvPr id="49" name="Rounded Rectangle 48"/>
+            <p:cNvSpPr/>
+            <p:nvPr/>
+          </p:nvSpPr>
+          <p:spPr>
+            <a:xfrm>
+              <a:off x="5415281" y="1706877"/>
+              <a:ext cx="1066800" cy="367664"/>
+            </a:xfrm>
+            <a:prstGeom prst="roundRect">
+              <a:avLst>
+                <a:gd name="adj" fmla="val 0"/>
+              </a:avLst>
+            </a:prstGeom>
+            <a:solidFill>
+              <a:schemeClr val="lt1"/>
+            </a:solidFill>
+            <a:ln w="12700"/>
+          </p:spPr>
+          <p:style>
+            <a:lnRef idx="2">
+              <a:schemeClr val="dk1"/>
+            </a:lnRef>
+            <a:fillRef idx="1">
+              <a:schemeClr val="lt1"/>
+            </a:fillRef>
+            <a:effectRef idx="0">
+              <a:schemeClr val="dk1"/>
+            </a:effectRef>
+            <a:fontRef idx="minor">
+              <a:schemeClr val="dk1"/>
+            </a:fontRef>
+          </p:style>
+          <p:txBody>
+            <a:bodyPr rtlCol="0" anchor="ctr"/>
+            <a:lstStyle/>
+            <a:p>
+              <a:pPr algn="ctr"/>
+              <a:r>
+                <a:rPr lang="en-US" sz="1000" dirty="0" smtClean="0"/>
+                <a:t>Learnability</a:t>
+              </a:r>
+              <a:endParaRPr lang="en-US" sz="1000" dirty="0"/>
+            </a:p>
+          </p:txBody>
+        </p:sp>
+        <p:sp>
+          <p:nvSpPr>
+            <p:cNvPr id="50" name="Rounded Rectangle 49"/>
+            <p:cNvSpPr/>
+            <p:nvPr/>
+          </p:nvSpPr>
+          <p:spPr>
+            <a:xfrm>
+              <a:off x="5415281" y="2142515"/>
+              <a:ext cx="1494679" cy="305726"/>
+            </a:xfrm>
+            <a:prstGeom prst="roundRect">
+              <a:avLst>
+                <a:gd name="adj" fmla="val 0"/>
+              </a:avLst>
+            </a:prstGeom>
+            <a:solidFill>
+              <a:schemeClr val="lt1"/>
+            </a:solidFill>
+            <a:ln w="12700"/>
+          </p:spPr>
+          <p:style>
+            <a:lnRef idx="2">
+              <a:schemeClr val="dk1"/>
+            </a:lnRef>
+            <a:fillRef idx="1">
+              <a:schemeClr val="lt1"/>
+            </a:fillRef>
+            <a:effectRef idx="0">
+              <a:schemeClr val="dk1"/>
+            </a:effectRef>
+            <a:fontRef idx="minor">
+              <a:schemeClr val="dk1"/>
+            </a:fontRef>
+          </p:style>
+          <p:txBody>
+            <a:bodyPr rtlCol="0" anchor="ctr"/>
+            <a:lstStyle/>
+            <a:p>
+              <a:pPr algn="ctr"/>
+              <a:r>
+                <a:rPr lang="en-US" sz="1000" dirty="0" smtClean="0"/>
+                <a:t>User interface aesthetics</a:t>
+              </a:r>
+              <a:endParaRPr lang="en-US" sz="1000" dirty="0"/>
+            </a:p>
+          </p:txBody>
+        </p:sp>
+        <p:sp>
+          <p:nvSpPr>
+            <p:cNvPr id="51" name="Rounded Rectangle 50"/>
+            <p:cNvSpPr/>
+            <p:nvPr/>
+          </p:nvSpPr>
+          <p:spPr>
+            <a:xfrm>
+              <a:off x="5344161" y="2925210"/>
+              <a:ext cx="2065978" cy="276861"/>
+            </a:xfrm>
+            <a:prstGeom prst="roundRect">
+              <a:avLst>
+                <a:gd name="adj" fmla="val 0"/>
+              </a:avLst>
+            </a:prstGeom>
+            <a:solidFill>
+              <a:schemeClr val="lt1"/>
+            </a:solidFill>
+            <a:ln w="12700"/>
+          </p:spPr>
+          <p:style>
+            <a:lnRef idx="2">
+              <a:schemeClr val="dk1"/>
+            </a:lnRef>
+            <a:fillRef idx="1">
+              <a:schemeClr val="lt1"/>
+            </a:fillRef>
+            <a:effectRef idx="0">
+              <a:schemeClr val="dk1"/>
+            </a:effectRef>
+            <a:fontRef idx="minor">
+              <a:schemeClr val="dk1"/>
+            </a:fontRef>
+          </p:style>
+          <p:txBody>
+            <a:bodyPr rtlCol="0" anchor="ctr"/>
+            <a:lstStyle/>
+            <a:p>
+              <a:pPr algn="ctr"/>
+              <a:r>
+                <a:rPr lang="en-US" sz="1000" dirty="0" smtClean="0"/>
+                <a:t>Responsiveness</a:t>
+              </a:r>
+              <a:endParaRPr lang="en-US" sz="1000" dirty="0"/>
+            </a:p>
+          </p:txBody>
+        </p:sp>
+        <p:sp>
+          <p:nvSpPr>
+            <p:cNvPr id="52" name="Rounded Rectangle 51"/>
+            <p:cNvSpPr/>
+            <p:nvPr/>
+          </p:nvSpPr>
+          <p:spPr>
+            <a:xfrm>
+              <a:off x="5313681" y="3685938"/>
+              <a:ext cx="1396998" cy="264160"/>
+            </a:xfrm>
+            <a:prstGeom prst="roundRect">
+              <a:avLst>
+                <a:gd name="adj" fmla="val 0"/>
+              </a:avLst>
+            </a:prstGeom>
+            <a:solidFill>
+              <a:schemeClr val="lt1"/>
+            </a:solidFill>
+            <a:ln w="12700"/>
+          </p:spPr>
+          <p:style>
+            <a:lnRef idx="2">
+              <a:schemeClr val="dk1"/>
+            </a:lnRef>
+            <a:fillRef idx="1">
+              <a:schemeClr val="lt1"/>
+            </a:fillRef>
+            <a:effectRef idx="0">
+              <a:schemeClr val="dk1"/>
+            </a:effectRef>
+            <a:fontRef idx="minor">
+              <a:schemeClr val="dk1"/>
+            </a:fontRef>
+          </p:style>
+          <p:txBody>
+            <a:bodyPr rtlCol="0" anchor="ctr"/>
+            <a:lstStyle/>
+            <a:p>
+              <a:pPr algn="ctr"/>
+              <a:r>
+                <a:rPr lang="en-US" sz="1000" dirty="0" smtClean="0"/>
+                <a:t>Time behavior</a:t>
+              </a:r>
+              <a:endParaRPr lang="en-US" sz="1000" dirty="0"/>
+            </a:p>
+          </p:txBody>
+        </p:sp>
+        <p:grpSp>
+          <p:nvGrpSpPr>
+            <p:cNvPr id="53" name="Group 52"/>
+            <p:cNvGrpSpPr/>
+            <p:nvPr/>
+          </p:nvGrpSpPr>
+          <p:grpSpPr>
+            <a:xfrm>
+              <a:off x="5318761" y="4193872"/>
+              <a:ext cx="1879598" cy="491491"/>
+              <a:chOff x="7721601" y="3576319"/>
+              <a:chExt cx="1859278" cy="491491"/>
+            </a:xfrm>
+          </p:grpSpPr>
+          <p:sp>
+            <p:nvSpPr>
+              <p:cNvPr id="54" name="Rounded Rectangle 53"/>
+              <p:cNvSpPr/>
+              <p:nvPr/>
+            </p:nvSpPr>
+            <p:spPr>
+              <a:xfrm>
+                <a:off x="7721601" y="3576319"/>
+                <a:ext cx="1859278" cy="260985"/>
+              </a:xfrm>
+              <a:prstGeom prst="roundRect">
+                <a:avLst>
+                  <a:gd name="adj" fmla="val 0"/>
+                </a:avLst>
+              </a:prstGeom>
+              <a:solidFill>
+                <a:schemeClr val="lt1"/>
+              </a:solidFill>
+              <a:ln w="12700"/>
+            </p:spPr>
+            <p:style>
+              <a:lnRef idx="2">
+                <a:schemeClr val="dk1"/>
+              </a:lnRef>
+              <a:fillRef idx="1">
+                <a:schemeClr val="lt1"/>
+              </a:fillRef>
+              <a:effectRef idx="0">
+                <a:schemeClr val="dk1"/>
+              </a:effectRef>
+              <a:fontRef idx="minor">
+                <a:schemeClr val="dk1"/>
+              </a:fontRef>
+            </p:style>
+            <p:txBody>
+              <a:bodyPr rtlCol="0" anchor="ctr"/>
+              <a:lstStyle/>
+              <a:p>
+                <a:pPr algn="ctr"/>
+                <a:r>
+                  <a:rPr lang="en-US" sz="1000" dirty="0" smtClean="0"/>
+                  <a:t>Transaction Capability</a:t>
+                </a:r>
+                <a:endParaRPr lang="en-US" sz="1000" dirty="0"/>
+              </a:p>
+            </p:txBody>
+          </p:sp>
+          <p:sp>
+            <p:nvSpPr>
+              <p:cNvPr id="55" name="Rounded Rectangle 54"/>
+              <p:cNvSpPr/>
+              <p:nvPr/>
+            </p:nvSpPr>
+            <p:spPr>
+              <a:xfrm>
+                <a:off x="7721601" y="3840480"/>
+                <a:ext cx="955039" cy="224154"/>
+              </a:xfrm>
+              <a:prstGeom prst="roundRect">
+                <a:avLst>
+                  <a:gd name="adj" fmla="val 0"/>
+                </a:avLst>
+              </a:prstGeom>
+              <a:solidFill>
+                <a:schemeClr val="lt1"/>
+              </a:solidFill>
+              <a:ln w="12700"/>
+            </p:spPr>
+            <p:style>
+              <a:lnRef idx="2">
+                <a:schemeClr val="dk1"/>
+              </a:lnRef>
+              <a:fillRef idx="1">
+                <a:schemeClr val="lt1"/>
+              </a:fillRef>
+              <a:effectRef idx="0">
+                <a:schemeClr val="dk1"/>
+              </a:effectRef>
+              <a:fontRef idx="minor">
+                <a:schemeClr val="dk1"/>
+              </a:fontRef>
+            </p:style>
+            <p:txBody>
+              <a:bodyPr rtlCol="0" anchor="ctr"/>
+              <a:lstStyle/>
+              <a:p>
+                <a:pPr algn="ctr"/>
+                <a:r>
+                  <a:rPr lang="en-US" sz="1000" dirty="0" smtClean="0"/>
+                  <a:t>Completeness</a:t>
+                </a:r>
+                <a:endParaRPr lang="en-US" sz="1000" dirty="0"/>
+              </a:p>
+            </p:txBody>
+          </p:sp>
+          <p:sp>
+            <p:nvSpPr>
+              <p:cNvPr id="56" name="Rounded Rectangle 55"/>
+              <p:cNvSpPr/>
+              <p:nvPr/>
+            </p:nvSpPr>
+            <p:spPr>
+              <a:xfrm>
+                <a:off x="8676640" y="3840480"/>
+                <a:ext cx="904239" cy="227330"/>
+              </a:xfrm>
+              <a:prstGeom prst="roundRect">
+                <a:avLst>
+                  <a:gd name="adj" fmla="val 0"/>
+                </a:avLst>
+              </a:prstGeom>
+              <a:solidFill>
+                <a:schemeClr val="lt1"/>
+              </a:solidFill>
+              <a:ln w="12700"/>
+            </p:spPr>
+            <p:style>
+              <a:lnRef idx="2">
+                <a:schemeClr val="dk1"/>
+              </a:lnRef>
+              <a:fillRef idx="1">
+                <a:schemeClr val="lt1"/>
+              </a:fillRef>
+              <a:effectRef idx="0">
+                <a:schemeClr val="dk1"/>
+              </a:effectRef>
+              <a:fontRef idx="minor">
+                <a:schemeClr val="dk1"/>
+              </a:fontRef>
+            </p:style>
+            <p:txBody>
+              <a:bodyPr rtlCol="0" anchor="ctr"/>
+              <a:lstStyle/>
+              <a:p>
+                <a:pPr algn="ctr"/>
+                <a:r>
+                  <a:rPr lang="en-US" sz="1000" dirty="0" smtClean="0"/>
+                  <a:t>Correctness</a:t>
+                </a:r>
+                <a:endParaRPr lang="en-US" sz="1000" dirty="0"/>
+              </a:p>
+            </p:txBody>
+          </p:sp>
+        </p:grpSp>
+        <p:sp>
+          <p:nvSpPr>
+            <p:cNvPr id="57" name="Rounded Rectangle 56"/>
+            <p:cNvSpPr/>
+            <p:nvPr/>
+          </p:nvSpPr>
+          <p:spPr>
+            <a:xfrm>
+              <a:off x="5344161" y="2578500"/>
+              <a:ext cx="1851659" cy="254000"/>
+            </a:xfrm>
+            <a:prstGeom prst="roundRect">
+              <a:avLst>
+                <a:gd name="adj" fmla="val 0"/>
+              </a:avLst>
+            </a:prstGeom>
+            <a:solidFill>
+              <a:schemeClr val="lt1"/>
+            </a:solidFill>
+            <a:ln w="12700"/>
+          </p:spPr>
+          <p:style>
+            <a:lnRef idx="2">
+              <a:schemeClr val="dk1"/>
+            </a:lnRef>
+            <a:fillRef idx="1">
+              <a:schemeClr val="lt1"/>
+            </a:fillRef>
+            <a:effectRef idx="0">
+              <a:schemeClr val="dk1"/>
+            </a:effectRef>
+            <a:fontRef idx="minor">
+              <a:schemeClr val="dk1"/>
+            </a:fontRef>
+          </p:style>
+          <p:txBody>
+            <a:bodyPr rtlCol="0" anchor="ctr"/>
+            <a:lstStyle/>
+            <a:p>
+              <a:pPr algn="ctr"/>
+              <a:r>
+                <a:rPr lang="en-US" sz="1000" dirty="0" smtClean="0"/>
+                <a:t>Fault Tolerance</a:t>
+              </a:r>
+              <a:endParaRPr lang="en-US" sz="1000" dirty="0"/>
+            </a:p>
+          </p:txBody>
+        </p:sp>
+        <p:sp>
+          <p:nvSpPr>
+            <p:cNvPr id="58" name="Rounded Rectangle 57"/>
+            <p:cNvSpPr/>
+            <p:nvPr/>
+          </p:nvSpPr>
+          <p:spPr>
+            <a:xfrm>
+              <a:off x="5328922" y="3322085"/>
+              <a:ext cx="1178560" cy="227330"/>
+            </a:xfrm>
+            <a:prstGeom prst="roundRect">
+              <a:avLst>
+                <a:gd name="adj" fmla="val 0"/>
+              </a:avLst>
+            </a:prstGeom>
+            <a:solidFill>
+              <a:schemeClr val="lt1"/>
+            </a:solidFill>
+            <a:ln w="12700"/>
+          </p:spPr>
+          <p:style>
+            <a:lnRef idx="2">
+              <a:schemeClr val="dk1"/>
+            </a:lnRef>
+            <a:fillRef idx="1">
+              <a:schemeClr val="lt1"/>
+            </a:fillRef>
+            <a:effectRef idx="0">
+              <a:schemeClr val="dk1"/>
+            </a:effectRef>
+            <a:fontRef idx="minor">
+              <a:schemeClr val="dk1"/>
+            </a:fontRef>
+          </p:style>
+          <p:txBody>
+            <a:bodyPr rtlCol="0" anchor="ctr"/>
+            <a:lstStyle/>
+            <a:p>
+              <a:pPr algn="ctr"/>
+              <a:r>
+                <a:rPr lang="en-US" sz="1000" dirty="0" smtClean="0"/>
+                <a:t>Customer Service</a:t>
+              </a:r>
+              <a:endParaRPr lang="en-US" sz="1000" dirty="0"/>
+            </a:p>
+          </p:txBody>
+        </p:sp>
+        <p:sp>
+          <p:nvSpPr>
+            <p:cNvPr id="59" name="Rounded Rectangle 58"/>
+            <p:cNvSpPr/>
+            <p:nvPr/>
+          </p:nvSpPr>
+          <p:spPr>
+            <a:xfrm>
+              <a:off x="5372166" y="6084747"/>
+              <a:ext cx="1011197" cy="240573"/>
+            </a:xfrm>
+            <a:prstGeom prst="roundRect">
+              <a:avLst>
+                <a:gd name="adj" fmla="val 0"/>
+              </a:avLst>
+            </a:prstGeom>
+            <a:solidFill>
+              <a:schemeClr val="lt1"/>
+            </a:solidFill>
+            <a:ln w="12700"/>
+          </p:spPr>
+          <p:style>
+            <a:lnRef idx="2">
+              <a:schemeClr val="dk1"/>
+            </a:lnRef>
+            <a:fillRef idx="1">
+              <a:schemeClr val="lt1"/>
+            </a:fillRef>
+            <a:effectRef idx="0">
+              <a:schemeClr val="dk1"/>
+            </a:effectRef>
+            <a:fontRef idx="minor">
+              <a:schemeClr val="dk1"/>
+            </a:fontRef>
+          </p:style>
+          <p:txBody>
+            <a:bodyPr rtlCol="0" anchor="ctr"/>
+            <a:lstStyle/>
+            <a:p>
+              <a:pPr algn="ctr"/>
+              <a:r>
+                <a:rPr lang="en-US" sz="1000" dirty="0" smtClean="0"/>
+                <a:t>Confidentiality</a:t>
+              </a:r>
+              <a:endParaRPr lang="en-US" sz="1000" dirty="0"/>
+            </a:p>
+          </p:txBody>
+        </p:sp>
+        <p:sp>
+          <p:nvSpPr>
+            <p:cNvPr id="60" name="Rounded Rectangle 59"/>
+            <p:cNvSpPr/>
+            <p:nvPr/>
+          </p:nvSpPr>
+          <p:spPr>
+            <a:xfrm>
+              <a:off x="5369626" y="4858588"/>
+              <a:ext cx="2098997" cy="227330"/>
+            </a:xfrm>
+            <a:prstGeom prst="roundRect">
+              <a:avLst>
+                <a:gd name="adj" fmla="val 0"/>
+              </a:avLst>
+            </a:prstGeom>
+            <a:solidFill>
+              <a:schemeClr val="lt1"/>
+            </a:solidFill>
+            <a:ln w="12700"/>
+          </p:spPr>
+          <p:style>
+            <a:lnRef idx="2">
+              <a:schemeClr val="dk1"/>
+            </a:lnRef>
+            <a:fillRef idx="1">
+              <a:schemeClr val="lt1"/>
+            </a:fillRef>
+            <a:effectRef idx="0">
+              <a:schemeClr val="dk1"/>
+            </a:effectRef>
+            <a:fontRef idx="minor">
+              <a:schemeClr val="dk1"/>
+            </a:fontRef>
+          </p:style>
+          <p:txBody>
+            <a:bodyPr rtlCol="0" anchor="ctr"/>
+            <a:lstStyle/>
+            <a:p>
+              <a:pPr algn="ctr"/>
+              <a:r>
+                <a:rPr lang="en-US" sz="1000" dirty="0" smtClean="0"/>
+                <a:t>Safety</a:t>
+              </a:r>
+              <a:endParaRPr lang="en-US" sz="1000" dirty="0"/>
+            </a:p>
+          </p:txBody>
+        </p:sp>
+        <p:sp>
+          <p:nvSpPr>
+            <p:cNvPr id="61" name="Rounded Rectangle 60"/>
+            <p:cNvSpPr/>
+            <p:nvPr/>
+          </p:nvSpPr>
+          <p:spPr>
+            <a:xfrm>
+              <a:off x="5382326" y="5781570"/>
+              <a:ext cx="1001037" cy="227330"/>
+            </a:xfrm>
+            <a:prstGeom prst="roundRect">
+              <a:avLst>
+                <a:gd name="adj" fmla="val 0"/>
+              </a:avLst>
+            </a:prstGeom>
+            <a:solidFill>
+              <a:schemeClr val="lt1"/>
+            </a:solidFill>
+            <a:ln w="12700"/>
+          </p:spPr>
+          <p:style>
+            <a:lnRef idx="2">
+              <a:schemeClr val="dk1"/>
+            </a:lnRef>
+            <a:fillRef idx="1">
+              <a:schemeClr val="lt1"/>
+            </a:fillRef>
+            <a:effectRef idx="0">
+              <a:schemeClr val="dk1"/>
+            </a:effectRef>
+            <a:fontRef idx="minor">
+              <a:schemeClr val="dk1"/>
+            </a:fontRef>
+          </p:style>
+          <p:txBody>
+            <a:bodyPr rtlCol="0" anchor="ctr"/>
+            <a:lstStyle/>
+            <a:p>
+              <a:pPr algn="ctr"/>
+              <a:r>
+                <a:rPr lang="en-US" sz="1000" dirty="0" smtClean="0"/>
+                <a:t>Integrity</a:t>
+              </a:r>
+              <a:endParaRPr lang="en-US" sz="1000" dirty="0"/>
+            </a:p>
+          </p:txBody>
+        </p:sp>
+        <p:sp>
+          <p:nvSpPr>
+            <p:cNvPr id="62" name="Rounded Rectangle 61"/>
+            <p:cNvSpPr/>
+            <p:nvPr/>
+          </p:nvSpPr>
+          <p:spPr>
+            <a:xfrm>
+              <a:off x="5377524" y="5195136"/>
+              <a:ext cx="1005839" cy="227330"/>
+            </a:xfrm>
+            <a:prstGeom prst="roundRect">
+              <a:avLst>
+                <a:gd name="adj" fmla="val 0"/>
+              </a:avLst>
+            </a:prstGeom>
+            <a:solidFill>
+              <a:schemeClr val="lt1"/>
+            </a:solidFill>
+            <a:ln w="12700"/>
+          </p:spPr>
+          <p:style>
+            <a:lnRef idx="2">
+              <a:schemeClr val="dk1"/>
+            </a:lnRef>
+            <a:fillRef idx="1">
+              <a:schemeClr val="lt1"/>
+            </a:fillRef>
+            <a:effectRef idx="0">
+              <a:schemeClr val="dk1"/>
+            </a:effectRef>
+            <a:fontRef idx="minor">
+              <a:schemeClr val="dk1"/>
+            </a:fontRef>
+          </p:style>
+          <p:txBody>
+            <a:bodyPr rtlCol="0" anchor="ctr"/>
+            <a:lstStyle/>
+            <a:p>
+              <a:pPr algn="ctr"/>
+              <a:r>
+                <a:rPr lang="en-US" sz="1000" dirty="0" smtClean="0"/>
+                <a:t>Authenticity</a:t>
+              </a:r>
+              <a:endParaRPr lang="en-US" sz="1000" dirty="0"/>
+            </a:p>
+          </p:txBody>
+        </p:sp>
+        <p:cxnSp>
+          <p:nvCxnSpPr>
+            <p:cNvPr id="63" name="Straight Connector 62"/>
+            <p:cNvCxnSpPr>
+              <a:stCxn id="46" idx="1"/>
+              <a:endCxn id="41" idx="3"/>
+            </p:cNvCxnSpPr>
+            <p:nvPr/>
+          </p:nvCxnSpPr>
+          <p:spPr>
+            <a:xfrm flipH="1">
+              <a:off x="4897118" y="303530"/>
+              <a:ext cx="589283" cy="337185"/>
+            </a:xfrm>
+            <a:prstGeom prst="line">
+              <a:avLst/>
+            </a:prstGeom>
+          </p:spPr>
+          <p:style>
+            <a:lnRef idx="1">
+              <a:schemeClr val="dk1"/>
+            </a:lnRef>
+            <a:fillRef idx="0">
+              <a:schemeClr val="dk1"/>
+            </a:fillRef>
+            <a:effectRef idx="0">
+              <a:schemeClr val="dk1"/>
+            </a:effectRef>
+            <a:fontRef idx="minor">
+              <a:schemeClr val="tx1"/>
+            </a:fontRef>
+          </p:style>
+        </p:cxnSp>
+        <p:cxnSp>
+          <p:nvCxnSpPr>
+            <p:cNvPr id="64" name="Straight Connector 63"/>
+            <p:cNvCxnSpPr>
+              <a:stCxn id="47" idx="1"/>
+              <a:endCxn id="41" idx="3"/>
+            </p:cNvCxnSpPr>
+            <p:nvPr/>
+          </p:nvCxnSpPr>
+          <p:spPr>
+            <a:xfrm flipH="1" flipV="1">
+              <a:off x="4897118" y="640715"/>
+              <a:ext cx="579123" cy="4445"/>
+            </a:xfrm>
+            <a:prstGeom prst="line">
+              <a:avLst/>
+            </a:prstGeom>
+          </p:spPr>
+          <p:style>
+            <a:lnRef idx="1">
+              <a:schemeClr val="dk1"/>
+            </a:lnRef>
+            <a:fillRef idx="0">
+              <a:schemeClr val="dk1"/>
+            </a:fillRef>
+            <a:effectRef idx="0">
+              <a:schemeClr val="dk1"/>
+            </a:effectRef>
+            <a:fontRef idx="minor">
+              <a:schemeClr val="tx1"/>
+            </a:fontRef>
+          </p:style>
+        </p:cxnSp>
+        <p:cxnSp>
+          <p:nvCxnSpPr>
+            <p:cNvPr id="65" name="Straight Connector 64"/>
+            <p:cNvCxnSpPr>
+              <a:stCxn id="45" idx="1"/>
+              <a:endCxn id="41" idx="3"/>
+            </p:cNvCxnSpPr>
+            <p:nvPr/>
+          </p:nvCxnSpPr>
+          <p:spPr>
+            <a:xfrm flipH="1" flipV="1">
+              <a:off x="4897118" y="640715"/>
+              <a:ext cx="589283" cy="369752"/>
+            </a:xfrm>
+            <a:prstGeom prst="line">
+              <a:avLst/>
+            </a:prstGeom>
+          </p:spPr>
+          <p:style>
+            <a:lnRef idx="1">
+              <a:schemeClr val="dk1"/>
+            </a:lnRef>
+            <a:fillRef idx="0">
+              <a:schemeClr val="dk1"/>
+            </a:fillRef>
+            <a:effectRef idx="0">
+              <a:schemeClr val="dk1"/>
+            </a:effectRef>
+            <a:fontRef idx="minor">
+              <a:schemeClr val="tx1"/>
+            </a:fontRef>
+          </p:style>
+        </p:cxnSp>
+        <p:cxnSp>
+          <p:nvCxnSpPr>
+            <p:cNvPr id="66" name="Straight Connector 65"/>
+            <p:cNvCxnSpPr>
+              <a:stCxn id="48" idx="1"/>
+              <a:endCxn id="42" idx="3"/>
+            </p:cNvCxnSpPr>
+            <p:nvPr/>
+          </p:nvCxnSpPr>
+          <p:spPr>
+            <a:xfrm flipH="1">
+              <a:off x="4825999" y="1524661"/>
+              <a:ext cx="589282" cy="380999"/>
+            </a:xfrm>
+            <a:prstGeom prst="line">
+              <a:avLst/>
+            </a:prstGeom>
+          </p:spPr>
+          <p:style>
+            <a:lnRef idx="1">
+              <a:schemeClr val="dk1"/>
+            </a:lnRef>
+            <a:fillRef idx="0">
+              <a:schemeClr val="dk1"/>
+            </a:fillRef>
+            <a:effectRef idx="0">
+              <a:schemeClr val="dk1"/>
+            </a:effectRef>
+            <a:fontRef idx="minor">
+              <a:schemeClr val="tx1"/>
+            </a:fontRef>
+          </p:style>
+        </p:cxnSp>
+        <p:cxnSp>
+          <p:nvCxnSpPr>
+            <p:cNvPr id="67" name="Straight Connector 66"/>
+            <p:cNvCxnSpPr>
+              <a:stCxn id="49" idx="1"/>
+              <a:endCxn id="42" idx="3"/>
+            </p:cNvCxnSpPr>
+            <p:nvPr/>
+          </p:nvCxnSpPr>
+          <p:spPr>
+            <a:xfrm flipH="1">
+              <a:off x="4825999" y="1890709"/>
+              <a:ext cx="589282" cy="14951"/>
+            </a:xfrm>
+            <a:prstGeom prst="line">
+              <a:avLst/>
+            </a:prstGeom>
+          </p:spPr>
+          <p:style>
+            <a:lnRef idx="1">
+              <a:schemeClr val="dk1"/>
+            </a:lnRef>
+            <a:fillRef idx="0">
+              <a:schemeClr val="dk1"/>
+            </a:fillRef>
+            <a:effectRef idx="0">
+              <a:schemeClr val="dk1"/>
+            </a:effectRef>
+            <a:fontRef idx="minor">
+              <a:schemeClr val="tx1"/>
+            </a:fontRef>
+          </p:style>
+        </p:cxnSp>
+        <p:cxnSp>
+          <p:nvCxnSpPr>
+            <p:cNvPr id="68" name="Straight Connector 67"/>
+            <p:cNvCxnSpPr>
+              <a:stCxn id="51" idx="1"/>
+              <a:endCxn id="43" idx="3"/>
+            </p:cNvCxnSpPr>
+            <p:nvPr/>
+          </p:nvCxnSpPr>
+          <p:spPr>
+            <a:xfrm flipH="1">
+              <a:off x="4825999" y="3063641"/>
+              <a:ext cx="518162" cy="350171"/>
+            </a:xfrm>
+            <a:prstGeom prst="line">
+              <a:avLst/>
+            </a:prstGeom>
+          </p:spPr>
+          <p:style>
+            <a:lnRef idx="1">
+              <a:schemeClr val="dk1"/>
+            </a:lnRef>
+            <a:fillRef idx="0">
+              <a:schemeClr val="dk1"/>
+            </a:fillRef>
+            <a:effectRef idx="0">
+              <a:schemeClr val="dk1"/>
+            </a:effectRef>
+            <a:fontRef idx="minor">
+              <a:schemeClr val="tx1"/>
+            </a:fontRef>
+          </p:style>
+        </p:cxnSp>
+        <p:cxnSp>
+          <p:nvCxnSpPr>
+            <p:cNvPr id="73" name="Straight Connector 72"/>
+            <p:cNvCxnSpPr>
+              <a:stCxn id="57" idx="1"/>
+              <a:endCxn id="43" idx="3"/>
+            </p:cNvCxnSpPr>
+            <p:nvPr/>
+          </p:nvCxnSpPr>
+          <p:spPr>
+            <a:xfrm flipH="1">
+              <a:off x="4825999" y="2705500"/>
+              <a:ext cx="518162" cy="708312"/>
+            </a:xfrm>
+            <a:prstGeom prst="line">
+              <a:avLst/>
+            </a:prstGeom>
+          </p:spPr>
+          <p:style>
+            <a:lnRef idx="1">
+              <a:schemeClr val="dk1"/>
+            </a:lnRef>
+            <a:fillRef idx="0">
+              <a:schemeClr val="dk1"/>
+            </a:fillRef>
+            <a:effectRef idx="0">
+              <a:schemeClr val="dk1"/>
+            </a:effectRef>
+            <a:fontRef idx="minor">
+              <a:schemeClr val="tx1"/>
+            </a:fontRef>
+          </p:style>
+        </p:cxnSp>
+        <p:cxnSp>
+          <p:nvCxnSpPr>
+            <p:cNvPr id="74" name="Straight Connector 73"/>
+            <p:cNvCxnSpPr>
+              <a:stCxn id="52" idx="1"/>
+              <a:endCxn id="43" idx="3"/>
+            </p:cNvCxnSpPr>
+            <p:nvPr/>
+          </p:nvCxnSpPr>
+          <p:spPr>
+            <a:xfrm flipH="1" flipV="1">
+              <a:off x="4825999" y="3413812"/>
+              <a:ext cx="487682" cy="404206"/>
+            </a:xfrm>
+            <a:prstGeom prst="line">
+              <a:avLst/>
+            </a:prstGeom>
+          </p:spPr>
+          <p:style>
+            <a:lnRef idx="1">
+              <a:schemeClr val="dk1"/>
+            </a:lnRef>
+            <a:fillRef idx="0">
+              <a:schemeClr val="dk1"/>
+            </a:fillRef>
+            <a:effectRef idx="0">
+              <a:schemeClr val="dk1"/>
+            </a:effectRef>
+            <a:fontRef idx="minor">
+              <a:schemeClr val="tx1"/>
+            </a:fontRef>
+          </p:style>
+        </p:cxnSp>
+        <p:cxnSp>
+          <p:nvCxnSpPr>
+            <p:cNvPr id="76" name="Straight Connector 75"/>
+            <p:cNvCxnSpPr>
+              <a:stCxn id="58" idx="1"/>
+              <a:endCxn id="43" idx="3"/>
+            </p:cNvCxnSpPr>
+            <p:nvPr/>
+          </p:nvCxnSpPr>
+          <p:spPr>
+            <a:xfrm flipH="1" flipV="1">
+              <a:off x="4825999" y="3413812"/>
+              <a:ext cx="502923" cy="21938"/>
+            </a:xfrm>
+            <a:prstGeom prst="line">
+              <a:avLst/>
+            </a:prstGeom>
+          </p:spPr>
+          <p:style>
+            <a:lnRef idx="1">
+              <a:schemeClr val="dk1"/>
+            </a:lnRef>
+            <a:fillRef idx="0">
+              <a:schemeClr val="dk1"/>
+            </a:fillRef>
+            <a:effectRef idx="0">
+              <a:schemeClr val="dk1"/>
+            </a:effectRef>
+            <a:fontRef idx="minor">
+              <a:schemeClr val="tx1"/>
+            </a:fontRef>
+          </p:style>
+        </p:cxnSp>
+        <p:cxnSp>
+          <p:nvCxnSpPr>
+            <p:cNvPr id="77" name="Straight Connector 76"/>
+            <p:cNvCxnSpPr>
+              <a:stCxn id="54" idx="1"/>
+              <a:endCxn id="43" idx="3"/>
+            </p:cNvCxnSpPr>
+            <p:nvPr/>
+          </p:nvCxnSpPr>
+          <p:spPr>
+            <a:xfrm flipH="1" flipV="1">
+              <a:off x="4825999" y="3413812"/>
+              <a:ext cx="492762" cy="910553"/>
+            </a:xfrm>
+            <a:prstGeom prst="line">
+              <a:avLst/>
+            </a:prstGeom>
+          </p:spPr>
+          <p:style>
+            <a:lnRef idx="1">
+              <a:schemeClr val="dk1"/>
+            </a:lnRef>
+            <a:fillRef idx="0">
+              <a:schemeClr val="dk1"/>
+            </a:fillRef>
+            <a:effectRef idx="0">
+              <a:schemeClr val="dk1"/>
+            </a:effectRef>
+            <a:fontRef idx="minor">
+              <a:schemeClr val="tx1"/>
+            </a:fontRef>
+          </p:style>
+        </p:cxnSp>
+        <p:cxnSp>
+          <p:nvCxnSpPr>
+            <p:cNvPr id="81" name="Straight Connector 80"/>
+            <p:cNvCxnSpPr>
+              <a:stCxn id="50" idx="1"/>
+              <a:endCxn id="42" idx="3"/>
+            </p:cNvCxnSpPr>
+            <p:nvPr/>
+          </p:nvCxnSpPr>
+          <p:spPr>
+            <a:xfrm flipH="1" flipV="1">
+              <a:off x="4825999" y="1905660"/>
+              <a:ext cx="589282" cy="389718"/>
+            </a:xfrm>
+            <a:prstGeom prst="line">
+              <a:avLst/>
+            </a:prstGeom>
+          </p:spPr>
+          <p:style>
+            <a:lnRef idx="1">
+              <a:schemeClr val="dk1"/>
+            </a:lnRef>
+            <a:fillRef idx="0">
+              <a:schemeClr val="dk1"/>
+            </a:fillRef>
+            <a:effectRef idx="0">
+              <a:schemeClr val="dk1"/>
+            </a:effectRef>
+            <a:fontRef idx="minor">
+              <a:schemeClr val="tx1"/>
+            </a:fontRef>
+          </p:style>
+        </p:cxnSp>
+        <p:cxnSp>
+          <p:nvCxnSpPr>
+            <p:cNvPr id="86" name="Straight Connector 85"/>
+            <p:cNvCxnSpPr>
+              <a:stCxn id="60" idx="1"/>
+              <a:endCxn id="44" idx="3"/>
+            </p:cNvCxnSpPr>
+            <p:nvPr/>
+          </p:nvCxnSpPr>
+          <p:spPr>
+            <a:xfrm flipH="1">
+              <a:off x="4825999" y="4972253"/>
+              <a:ext cx="543627" cy="631094"/>
+            </a:xfrm>
+            <a:prstGeom prst="line">
+              <a:avLst/>
+            </a:prstGeom>
+          </p:spPr>
+          <p:style>
+            <a:lnRef idx="1">
+              <a:schemeClr val="dk1"/>
+            </a:lnRef>
+            <a:fillRef idx="0">
+              <a:schemeClr val="dk1"/>
+            </a:fillRef>
+            <a:effectRef idx="0">
+              <a:schemeClr val="dk1"/>
+            </a:effectRef>
+            <a:fontRef idx="minor">
+              <a:schemeClr val="tx1"/>
+            </a:fontRef>
+          </p:style>
+        </p:cxnSp>
+        <p:cxnSp>
+          <p:nvCxnSpPr>
+            <p:cNvPr id="87" name="Straight Connector 86"/>
+            <p:cNvCxnSpPr>
+              <a:stCxn id="61" idx="1"/>
+              <a:endCxn id="44" idx="3"/>
+            </p:cNvCxnSpPr>
+            <p:nvPr/>
+          </p:nvCxnSpPr>
+          <p:spPr>
+            <a:xfrm flipH="1" flipV="1">
+              <a:off x="4825999" y="5603347"/>
+              <a:ext cx="556327" cy="291888"/>
+            </a:xfrm>
+            <a:prstGeom prst="line">
+              <a:avLst/>
+            </a:prstGeom>
+          </p:spPr>
+          <p:style>
+            <a:lnRef idx="1">
+              <a:schemeClr val="dk1"/>
+            </a:lnRef>
+            <a:fillRef idx="0">
+              <a:schemeClr val="dk1"/>
+            </a:fillRef>
+            <a:effectRef idx="0">
+              <a:schemeClr val="dk1"/>
+            </a:effectRef>
+            <a:fontRef idx="minor">
+              <a:schemeClr val="tx1"/>
+            </a:fontRef>
+          </p:style>
+        </p:cxnSp>
+        <p:cxnSp>
+          <p:nvCxnSpPr>
+            <p:cNvPr id="88" name="Straight Connector 87"/>
+            <p:cNvCxnSpPr>
+              <a:stCxn id="59" idx="1"/>
+              <a:endCxn id="44" idx="3"/>
+            </p:cNvCxnSpPr>
+            <p:nvPr/>
+          </p:nvCxnSpPr>
+          <p:spPr>
+            <a:xfrm flipH="1" flipV="1">
+              <a:off x="4825999" y="5603347"/>
+              <a:ext cx="546167" cy="601687"/>
+            </a:xfrm>
+            <a:prstGeom prst="line">
+              <a:avLst/>
+            </a:prstGeom>
+          </p:spPr>
+          <p:style>
+            <a:lnRef idx="1">
+              <a:schemeClr val="dk1"/>
+            </a:lnRef>
+            <a:fillRef idx="0">
+              <a:schemeClr val="dk1"/>
+            </a:fillRef>
+            <a:effectRef idx="0">
+              <a:schemeClr val="dk1"/>
+            </a:effectRef>
+            <a:fontRef idx="minor">
+              <a:schemeClr val="tx1"/>
+            </a:fontRef>
+          </p:style>
+        </p:cxnSp>
+        <p:cxnSp>
+          <p:nvCxnSpPr>
+            <p:cNvPr id="89" name="Straight Connector 88"/>
+            <p:cNvCxnSpPr>
+              <a:stCxn id="92" idx="1"/>
+              <a:endCxn id="44" idx="3"/>
+            </p:cNvCxnSpPr>
+            <p:nvPr/>
+          </p:nvCxnSpPr>
+          <p:spPr>
+            <a:xfrm flipH="1">
+              <a:off x="4825999" y="5603347"/>
+              <a:ext cx="561408" cy="0"/>
+            </a:xfrm>
+            <a:prstGeom prst="line">
+              <a:avLst/>
+            </a:prstGeom>
+          </p:spPr>
+          <p:style>
+            <a:lnRef idx="1">
+              <a:schemeClr val="dk1"/>
+            </a:lnRef>
+            <a:fillRef idx="0">
+              <a:schemeClr val="dk1"/>
+            </a:fillRef>
+            <a:effectRef idx="0">
+              <a:schemeClr val="dk1"/>
+            </a:effectRef>
+            <a:fontRef idx="minor">
+              <a:schemeClr val="tx1"/>
+            </a:fontRef>
+          </p:style>
+        </p:cxnSp>
+        <p:sp>
+          <p:nvSpPr>
+            <p:cNvPr id="92" name="Rounded Rectangle 91"/>
+            <p:cNvSpPr/>
+            <p:nvPr/>
+          </p:nvSpPr>
+          <p:spPr>
+            <a:xfrm>
+              <a:off x="5387407" y="5493707"/>
+              <a:ext cx="993917" cy="219279"/>
+            </a:xfrm>
+            <a:prstGeom prst="roundRect">
+              <a:avLst>
+                <a:gd name="adj" fmla="val 0"/>
+              </a:avLst>
+            </a:prstGeom>
+            <a:solidFill>
+              <a:schemeClr val="lt1"/>
+            </a:solidFill>
+            <a:ln w="12700"/>
+          </p:spPr>
+          <p:style>
+            <a:lnRef idx="2">
+              <a:schemeClr val="dk1"/>
+            </a:lnRef>
+            <a:fillRef idx="1">
+              <a:schemeClr val="lt1"/>
+            </a:fillRef>
+            <a:effectRef idx="0">
+              <a:schemeClr val="dk1"/>
+            </a:effectRef>
+            <a:fontRef idx="minor">
+              <a:schemeClr val="dk1"/>
+            </a:fontRef>
+          </p:style>
+          <p:txBody>
+            <a:bodyPr rtlCol="0" anchor="ctr"/>
+            <a:lstStyle/>
+            <a:p>
+              <a:pPr algn="ctr"/>
+              <a:r>
+                <a:rPr lang="en-US" sz="1000" dirty="0" smtClean="0"/>
+                <a:t>Privacy</a:t>
               </a:r>
               <a:endParaRPr lang="en-US" sz="1000" dirty="0"/>
             </a:p>
           </p:txBody>
         </p:sp>
       </p:grpSp>
-      <p:sp>
-        <p:nvSpPr>
-          <p:cNvPr id="57" name="Rounded Rectangle 56"/>
-          <p:cNvSpPr/>
-          <p:nvPr/>
-        </p:nvSpPr>
-        <p:spPr>
-          <a:xfrm>
-            <a:off x="5344161" y="2578500"/>
-            <a:ext cx="1851659" cy="254000"/>
-          </a:xfrm>
-          <a:prstGeom prst="roundRect">
-            <a:avLst>
-              <a:gd name="adj" fmla="val 0"/>
-            </a:avLst>
-          </a:prstGeom>
-          <a:solidFill>
-            <a:schemeClr val="lt1"/>
-          </a:solidFill>
-          <a:ln w="12700"/>
-        </p:spPr>
-        <p:style>
-          <a:lnRef idx="2">
-            <a:schemeClr val="dk1"/>
-          </a:lnRef>
-          <a:fillRef idx="1">
-            <a:schemeClr val="lt1"/>
-          </a:fillRef>
-          <a:effectRef idx="0">
-            <a:schemeClr val="dk1"/>
-          </a:effectRef>
-          <a:fontRef idx="minor">
-            <a:schemeClr val="dk1"/>
-          </a:fontRef>
-        </p:style>
-        <p:txBody>
-          <a:bodyPr rtlCol="0" anchor="ctr"/>
-          <a:lstStyle/>
-          <a:p>
-            <a:pPr algn="ctr"/>
-            <a:r>
-              <a:rPr lang="en-US" sz="1000" dirty="0" smtClean="0"/>
-              <a:t>Fault Tolerance</a:t>
-            </a:r>
-            <a:endParaRPr lang="en-US" sz="1000" dirty="0"/>
-          </a:p>
-        </p:txBody>
-      </p:sp>
-      <p:sp>
-        <p:nvSpPr>
-          <p:cNvPr id="58" name="Rounded Rectangle 57"/>
-          <p:cNvSpPr/>
-          <p:nvPr/>
-        </p:nvSpPr>
-        <p:spPr>
-          <a:xfrm>
-            <a:off x="5328922" y="3322085"/>
-            <a:ext cx="1178560" cy="227330"/>
-          </a:xfrm>
-          <a:prstGeom prst="roundRect">
-            <a:avLst>
-              <a:gd name="adj" fmla="val 0"/>
-            </a:avLst>
-          </a:prstGeom>
-          <a:solidFill>
-            <a:schemeClr val="lt1"/>
-          </a:solidFill>
-          <a:ln w="12700"/>
-        </p:spPr>
-        <p:style>
-          <a:lnRef idx="2">
-            <a:schemeClr val="dk1"/>
-          </a:lnRef>
-          <a:fillRef idx="1">
-            <a:schemeClr val="lt1"/>
-          </a:fillRef>
-          <a:effectRef idx="0">
-            <a:schemeClr val="dk1"/>
-          </a:effectRef>
-          <a:fontRef idx="minor">
-            <a:schemeClr val="dk1"/>
-          </a:fontRef>
-        </p:style>
-        <p:txBody>
-          <a:bodyPr rtlCol="0" anchor="ctr"/>
-          <a:lstStyle/>
-          <a:p>
-            <a:pPr algn="ctr"/>
-            <a:r>
-              <a:rPr lang="en-US" sz="1000" dirty="0" smtClean="0"/>
-              <a:t>Customer Service</a:t>
-            </a:r>
-            <a:endParaRPr lang="en-US" sz="1000" dirty="0"/>
-          </a:p>
-        </p:txBody>
-      </p:sp>
-      <p:sp>
-        <p:nvSpPr>
-          <p:cNvPr id="59" name="Rounded Rectangle 58"/>
-          <p:cNvSpPr/>
-          <p:nvPr/>
-        </p:nvSpPr>
-        <p:spPr>
-          <a:xfrm>
-            <a:off x="5372166" y="6084747"/>
-            <a:ext cx="1011197" cy="240573"/>
-          </a:xfrm>
-          <a:prstGeom prst="roundRect">
-            <a:avLst>
-              <a:gd name="adj" fmla="val 0"/>
-            </a:avLst>
-          </a:prstGeom>
-          <a:solidFill>
-            <a:schemeClr val="lt1"/>
-          </a:solidFill>
-          <a:ln w="12700"/>
-        </p:spPr>
-        <p:style>
-          <a:lnRef idx="2">
-            <a:schemeClr val="dk1"/>
-          </a:lnRef>
-          <a:fillRef idx="1">
-            <a:schemeClr val="lt1"/>
-          </a:fillRef>
-          <a:effectRef idx="0">
-            <a:schemeClr val="dk1"/>
-          </a:effectRef>
-          <a:fontRef idx="minor">
-            <a:schemeClr val="dk1"/>
-          </a:fontRef>
-        </p:style>
-        <p:txBody>
-          <a:bodyPr rtlCol="0" anchor="ctr"/>
-          <a:lstStyle/>
-          <a:p>
-            <a:pPr algn="ctr"/>
-            <a:r>
-              <a:rPr lang="en-US" sz="1000" dirty="0" smtClean="0"/>
-              <a:t>Confidentiality</a:t>
-            </a:r>
-            <a:endParaRPr lang="en-US" sz="1000" dirty="0"/>
-          </a:p>
-        </p:txBody>
-      </p:sp>
-      <p:sp>
-        <p:nvSpPr>
-          <p:cNvPr id="60" name="Rounded Rectangle 59"/>
-          <p:cNvSpPr/>
-          <p:nvPr/>
-        </p:nvSpPr>
-        <p:spPr>
-          <a:xfrm>
-            <a:off x="5369626" y="4858588"/>
-            <a:ext cx="2098997" cy="227330"/>
-          </a:xfrm>
-          <a:prstGeom prst="roundRect">
-            <a:avLst>
-              <a:gd name="adj" fmla="val 0"/>
-            </a:avLst>
-          </a:prstGeom>
-          <a:solidFill>
-            <a:schemeClr val="lt1"/>
-          </a:solidFill>
-          <a:ln w="12700"/>
-        </p:spPr>
-        <p:style>
-          <a:lnRef idx="2">
-            <a:schemeClr val="dk1"/>
-          </a:lnRef>
-          <a:fillRef idx="1">
-            <a:schemeClr val="lt1"/>
-          </a:fillRef>
-          <a:effectRef idx="0">
-            <a:schemeClr val="dk1"/>
-          </a:effectRef>
-          <a:fontRef idx="minor">
-            <a:schemeClr val="dk1"/>
-          </a:fontRef>
-        </p:style>
-        <p:txBody>
-          <a:bodyPr rtlCol="0" anchor="ctr"/>
-          <a:lstStyle/>
-          <a:p>
-            <a:pPr algn="ctr"/>
-            <a:r>
-              <a:rPr lang="en-US" sz="1000" dirty="0" smtClean="0"/>
-              <a:t>Safety</a:t>
-            </a:r>
-            <a:endParaRPr lang="en-US" sz="1000" dirty="0"/>
-          </a:p>
-        </p:txBody>
-      </p:sp>
-      <p:sp>
-        <p:nvSpPr>
-          <p:cNvPr id="61" name="Rounded Rectangle 60"/>
-          <p:cNvSpPr/>
-          <p:nvPr/>
-        </p:nvSpPr>
-        <p:spPr>
-          <a:xfrm>
-            <a:off x="5382326" y="5781570"/>
-            <a:ext cx="1001037" cy="227330"/>
-          </a:xfrm>
-          <a:prstGeom prst="roundRect">
-            <a:avLst>
-              <a:gd name="adj" fmla="val 0"/>
-            </a:avLst>
-          </a:prstGeom>
-          <a:solidFill>
-            <a:schemeClr val="lt1"/>
-          </a:solidFill>
-          <a:ln w="12700"/>
-        </p:spPr>
-        <p:style>
-          <a:lnRef idx="2">
-            <a:schemeClr val="dk1"/>
-          </a:lnRef>
-          <a:fillRef idx="1">
-            <a:schemeClr val="lt1"/>
-          </a:fillRef>
-          <a:effectRef idx="0">
-            <a:schemeClr val="dk1"/>
-          </a:effectRef>
-          <a:fontRef idx="minor">
-            <a:schemeClr val="dk1"/>
-          </a:fontRef>
-        </p:style>
-        <p:txBody>
-          <a:bodyPr rtlCol="0" anchor="ctr"/>
-          <a:lstStyle/>
-          <a:p>
-            <a:pPr algn="ctr"/>
-            <a:r>
-              <a:rPr lang="en-US" sz="1000" dirty="0" smtClean="0"/>
-              <a:t>Integrity</a:t>
-            </a:r>
-            <a:endParaRPr lang="en-US" sz="1000" dirty="0"/>
-          </a:p>
-        </p:txBody>
-      </p:sp>
-      <p:sp>
-        <p:nvSpPr>
-          <p:cNvPr id="62" name="Rounded Rectangle 61"/>
-          <p:cNvSpPr/>
-          <p:nvPr/>
-        </p:nvSpPr>
-        <p:spPr>
-          <a:xfrm>
-            <a:off x="5377524" y="5195136"/>
-            <a:ext cx="1005839" cy="227330"/>
-          </a:xfrm>
-          <a:prstGeom prst="roundRect">
-            <a:avLst>
-              <a:gd name="adj" fmla="val 0"/>
-            </a:avLst>
-          </a:prstGeom>
-          <a:solidFill>
-            <a:schemeClr val="lt1"/>
-          </a:solidFill>
-          <a:ln w="12700"/>
-        </p:spPr>
-        <p:style>
-          <a:lnRef idx="2">
-            <a:schemeClr val="dk1"/>
-          </a:lnRef>
-          <a:fillRef idx="1">
-            <a:schemeClr val="lt1"/>
-          </a:fillRef>
-          <a:effectRef idx="0">
-            <a:schemeClr val="dk1"/>
-          </a:effectRef>
-          <a:fontRef idx="minor">
-            <a:schemeClr val="dk1"/>
-          </a:fontRef>
-        </p:style>
-        <p:txBody>
-          <a:bodyPr rtlCol="0" anchor="ctr"/>
-          <a:lstStyle/>
-          <a:p>
-            <a:pPr algn="ctr"/>
-            <a:r>
-              <a:rPr lang="en-US" sz="1000" dirty="0" smtClean="0"/>
-              <a:t>Authenticity</a:t>
-            </a:r>
-            <a:endParaRPr lang="en-US" sz="1000" dirty="0"/>
-          </a:p>
-        </p:txBody>
-      </p:sp>
-      <p:cxnSp>
-        <p:nvCxnSpPr>
-          <p:cNvPr id="63" name="Straight Connector 62"/>
-          <p:cNvCxnSpPr>
-            <a:stCxn id="46" idx="1"/>
-            <a:endCxn id="41" idx="3"/>
-          </p:cNvCxnSpPr>
-          <p:nvPr/>
-        </p:nvCxnSpPr>
-        <p:spPr>
-          <a:xfrm flipH="1">
-            <a:off x="4897118" y="303530"/>
-            <a:ext cx="589283" cy="337185"/>
-          </a:xfrm>
-          <a:prstGeom prst="line">
-            <a:avLst/>
-          </a:prstGeom>
-        </p:spPr>
-        <p:style>
-          <a:lnRef idx="1">
-            <a:schemeClr val="dk1"/>
-          </a:lnRef>
-          <a:fillRef idx="0">
-            <a:schemeClr val="dk1"/>
-          </a:fillRef>
-          <a:effectRef idx="0">
-            <a:schemeClr val="dk1"/>
-          </a:effectRef>
-          <a:fontRef idx="minor">
-            <a:schemeClr val="tx1"/>
-          </a:fontRef>
-        </p:style>
-      </p:cxnSp>
-      <p:cxnSp>
-        <p:nvCxnSpPr>
-          <p:cNvPr id="64" name="Straight Connector 63"/>
-          <p:cNvCxnSpPr>
-            <a:stCxn id="47" idx="1"/>
-            <a:endCxn id="41" idx="3"/>
-          </p:cNvCxnSpPr>
-          <p:nvPr/>
-        </p:nvCxnSpPr>
-        <p:spPr>
-          <a:xfrm flipH="1" flipV="1">
-            <a:off x="4897118" y="640715"/>
-            <a:ext cx="579123" cy="4445"/>
-          </a:xfrm>
-          <a:prstGeom prst="line">
-            <a:avLst/>
-          </a:prstGeom>
-        </p:spPr>
-        <p:style>
-          <a:lnRef idx="1">
-            <a:schemeClr val="dk1"/>
-          </a:lnRef>
-          <a:fillRef idx="0">
-            <a:schemeClr val="dk1"/>
-          </a:fillRef>
-          <a:effectRef idx="0">
-            <a:schemeClr val="dk1"/>
-          </a:effectRef>
-          <a:fontRef idx="minor">
-            <a:schemeClr val="tx1"/>
-          </a:fontRef>
-        </p:style>
-      </p:cxnSp>
-      <p:cxnSp>
-        <p:nvCxnSpPr>
-          <p:cNvPr id="65" name="Straight Connector 64"/>
-          <p:cNvCxnSpPr>
-            <a:stCxn id="45" idx="1"/>
-            <a:endCxn id="41" idx="3"/>
-          </p:cNvCxnSpPr>
-          <p:nvPr/>
-        </p:nvCxnSpPr>
-        <p:spPr>
-          <a:xfrm flipH="1" flipV="1">
-            <a:off x="4897118" y="640715"/>
-            <a:ext cx="589283" cy="369752"/>
-          </a:xfrm>
-          <a:prstGeom prst="line">
-            <a:avLst/>
-          </a:prstGeom>
-        </p:spPr>
-        <p:style>
-          <a:lnRef idx="1">
-            <a:schemeClr val="dk1"/>
-          </a:lnRef>
-          <a:fillRef idx="0">
-            <a:schemeClr val="dk1"/>
-          </a:fillRef>
-          <a:effectRef idx="0">
-            <a:schemeClr val="dk1"/>
-          </a:effectRef>
-          <a:fontRef idx="minor">
-            <a:schemeClr val="tx1"/>
-          </a:fontRef>
-        </p:style>
-      </p:cxnSp>
-      <p:cxnSp>
-        <p:nvCxnSpPr>
-          <p:cNvPr id="66" name="Straight Connector 65"/>
-          <p:cNvCxnSpPr>
-            <a:stCxn id="48" idx="1"/>
-            <a:endCxn id="42" idx="3"/>
-          </p:cNvCxnSpPr>
-          <p:nvPr/>
-        </p:nvCxnSpPr>
-        <p:spPr>
-          <a:xfrm flipH="1">
-            <a:off x="4825999" y="1524661"/>
-            <a:ext cx="589282" cy="380999"/>
-          </a:xfrm>
-          <a:prstGeom prst="line">
-            <a:avLst/>
-          </a:prstGeom>
-        </p:spPr>
-        <p:style>
-          <a:lnRef idx="1">
-            <a:schemeClr val="dk1"/>
-          </a:lnRef>
-          <a:fillRef idx="0">
-            <a:schemeClr val="dk1"/>
-          </a:fillRef>
-          <a:effectRef idx="0">
-            <a:schemeClr val="dk1"/>
-          </a:effectRef>
-          <a:fontRef idx="minor">
-            <a:schemeClr val="tx1"/>
-          </a:fontRef>
-        </p:style>
-      </p:cxnSp>
-      <p:cxnSp>
-        <p:nvCxnSpPr>
-          <p:cNvPr id="67" name="Straight Connector 66"/>
-          <p:cNvCxnSpPr>
-            <a:stCxn id="49" idx="1"/>
-            <a:endCxn id="42" idx="3"/>
-          </p:cNvCxnSpPr>
-          <p:nvPr/>
-        </p:nvCxnSpPr>
-        <p:spPr>
-          <a:xfrm flipH="1">
-            <a:off x="4825999" y="1890709"/>
-            <a:ext cx="589282" cy="14951"/>
-          </a:xfrm>
-          <a:prstGeom prst="line">
-            <a:avLst/>
-          </a:prstGeom>
-        </p:spPr>
-        <p:style>
-          <a:lnRef idx="1">
-            <a:schemeClr val="dk1"/>
-          </a:lnRef>
-          <a:fillRef idx="0">
-            <a:schemeClr val="dk1"/>
-          </a:fillRef>
-          <a:effectRef idx="0">
-            <a:schemeClr val="dk1"/>
-          </a:effectRef>
-          <a:fontRef idx="minor">
-            <a:schemeClr val="tx1"/>
-          </a:fontRef>
-        </p:style>
-      </p:cxnSp>
-      <p:cxnSp>
-        <p:nvCxnSpPr>
-          <p:cNvPr id="68" name="Straight Connector 67"/>
-          <p:cNvCxnSpPr>
-            <a:stCxn id="51" idx="1"/>
-            <a:endCxn id="43" idx="3"/>
-          </p:cNvCxnSpPr>
-          <p:nvPr/>
-        </p:nvCxnSpPr>
-        <p:spPr>
-          <a:xfrm flipH="1">
-            <a:off x="4825999" y="3063641"/>
-            <a:ext cx="518162" cy="350171"/>
-          </a:xfrm>
-          <a:prstGeom prst="line">
-            <a:avLst/>
-          </a:prstGeom>
-        </p:spPr>
-        <p:style>
-          <a:lnRef idx="1">
-            <a:schemeClr val="dk1"/>
-          </a:lnRef>
-          <a:fillRef idx="0">
-            <a:schemeClr val="dk1"/>
-          </a:fillRef>
-          <a:effectRef idx="0">
-            <a:schemeClr val="dk1"/>
-          </a:effectRef>
-          <a:fontRef idx="minor">
-            <a:schemeClr val="tx1"/>
-          </a:fontRef>
-        </p:style>
-      </p:cxnSp>
-      <p:cxnSp>
-        <p:nvCxnSpPr>
-          <p:cNvPr id="73" name="Straight Connector 72"/>
-          <p:cNvCxnSpPr>
-            <a:stCxn id="57" idx="1"/>
-            <a:endCxn id="43" idx="3"/>
-          </p:cNvCxnSpPr>
-          <p:nvPr/>
-        </p:nvCxnSpPr>
-        <p:spPr>
-          <a:xfrm flipH="1">
-            <a:off x="4825999" y="2705500"/>
-            <a:ext cx="518162" cy="708312"/>
-          </a:xfrm>
-          <a:prstGeom prst="line">
-            <a:avLst/>
-          </a:prstGeom>
-        </p:spPr>
-        <p:style>
-          <a:lnRef idx="1">
-            <a:schemeClr val="dk1"/>
-          </a:lnRef>
-          <a:fillRef idx="0">
-            <a:schemeClr val="dk1"/>
-          </a:fillRef>
-          <a:effectRef idx="0">
-            <a:schemeClr val="dk1"/>
-          </a:effectRef>
-          <a:fontRef idx="minor">
-            <a:schemeClr val="tx1"/>
-          </a:fontRef>
-        </p:style>
-      </p:cxnSp>
-      <p:cxnSp>
-        <p:nvCxnSpPr>
-          <p:cNvPr id="74" name="Straight Connector 73"/>
-          <p:cNvCxnSpPr>
-            <a:stCxn id="52" idx="1"/>
-            <a:endCxn id="43" idx="3"/>
-          </p:cNvCxnSpPr>
-          <p:nvPr/>
-        </p:nvCxnSpPr>
-        <p:spPr>
-          <a:xfrm flipH="1" flipV="1">
-            <a:off x="4825999" y="3413812"/>
-            <a:ext cx="487682" cy="404206"/>
-          </a:xfrm>
-          <a:prstGeom prst="line">
-            <a:avLst/>
-          </a:prstGeom>
-        </p:spPr>
-        <p:style>
-          <a:lnRef idx="1">
-            <a:schemeClr val="dk1"/>
-          </a:lnRef>
-          <a:fillRef idx="0">
-            <a:schemeClr val="dk1"/>
-          </a:fillRef>
-          <a:effectRef idx="0">
-            <a:schemeClr val="dk1"/>
-          </a:effectRef>
-          <a:fontRef idx="minor">
-            <a:schemeClr val="tx1"/>
-          </a:fontRef>
-        </p:style>
-      </p:cxnSp>
-      <p:cxnSp>
-        <p:nvCxnSpPr>
-          <p:cNvPr id="76" name="Straight Connector 75"/>
-          <p:cNvCxnSpPr>
-            <a:stCxn id="58" idx="1"/>
-            <a:endCxn id="43" idx="3"/>
-          </p:cNvCxnSpPr>
-          <p:nvPr/>
-        </p:nvCxnSpPr>
-        <p:spPr>
-          <a:xfrm flipH="1" flipV="1">
-            <a:off x="4825999" y="3413812"/>
-            <a:ext cx="502923" cy="21938"/>
-          </a:xfrm>
-          <a:prstGeom prst="line">
-            <a:avLst/>
-          </a:prstGeom>
-        </p:spPr>
-        <p:style>
-          <a:lnRef idx="1">
-            <a:schemeClr val="dk1"/>
-          </a:lnRef>
-          <a:fillRef idx="0">
-            <a:schemeClr val="dk1"/>
-          </a:fillRef>
-          <a:effectRef idx="0">
-            <a:schemeClr val="dk1"/>
-          </a:effectRef>
-          <a:fontRef idx="minor">
-            <a:schemeClr val="tx1"/>
-          </a:fontRef>
-        </p:style>
-      </p:cxnSp>
-      <p:cxnSp>
-        <p:nvCxnSpPr>
-          <p:cNvPr id="77" name="Straight Connector 76"/>
-          <p:cNvCxnSpPr>
-            <a:stCxn id="54" idx="1"/>
-            <a:endCxn id="43" idx="3"/>
-          </p:cNvCxnSpPr>
-          <p:nvPr/>
-        </p:nvCxnSpPr>
-        <p:spPr>
-          <a:xfrm flipH="1" flipV="1">
-            <a:off x="4825999" y="3413812"/>
-            <a:ext cx="492762" cy="910553"/>
-          </a:xfrm>
-          <a:prstGeom prst="line">
-            <a:avLst/>
-          </a:prstGeom>
-        </p:spPr>
-        <p:style>
-          <a:lnRef idx="1">
-            <a:schemeClr val="dk1"/>
-          </a:lnRef>
-          <a:fillRef idx="0">
-            <a:schemeClr val="dk1"/>
-          </a:fillRef>
-          <a:effectRef idx="0">
-            <a:schemeClr val="dk1"/>
-          </a:effectRef>
-          <a:fontRef idx="minor">
-            <a:schemeClr val="tx1"/>
-          </a:fontRef>
-        </p:style>
-      </p:cxnSp>
-      <p:cxnSp>
-        <p:nvCxnSpPr>
-          <p:cNvPr id="81" name="Straight Connector 80"/>
-          <p:cNvCxnSpPr>
-            <a:stCxn id="50" idx="1"/>
-            <a:endCxn id="42" idx="3"/>
-          </p:cNvCxnSpPr>
-          <p:nvPr/>
-        </p:nvCxnSpPr>
-        <p:spPr>
-          <a:xfrm flipH="1" flipV="1">
-            <a:off x="4825999" y="1905660"/>
-            <a:ext cx="589282" cy="389718"/>
-          </a:xfrm>
-          <a:prstGeom prst="line">
-            <a:avLst/>
-          </a:prstGeom>
-        </p:spPr>
-        <p:style>
-          <a:lnRef idx="1">
-            <a:schemeClr val="dk1"/>
-          </a:lnRef>
-          <a:fillRef idx="0">
-            <a:schemeClr val="dk1"/>
-          </a:fillRef>
-          <a:effectRef idx="0">
-            <a:schemeClr val="dk1"/>
-          </a:effectRef>
-          <a:fontRef idx="minor">
-            <a:schemeClr val="tx1"/>
-          </a:fontRef>
-        </p:style>
-      </p:cxnSp>
-      <p:cxnSp>
-        <p:nvCxnSpPr>
-          <p:cNvPr id="86" name="Straight Connector 85"/>
-          <p:cNvCxnSpPr>
-            <a:stCxn id="60" idx="1"/>
-            <a:endCxn id="44" idx="3"/>
-          </p:cNvCxnSpPr>
-          <p:nvPr/>
-        </p:nvCxnSpPr>
-        <p:spPr>
-          <a:xfrm flipH="1">
-            <a:off x="4825999" y="4972253"/>
-            <a:ext cx="543627" cy="631094"/>
-          </a:xfrm>
-          <a:prstGeom prst="line">
-            <a:avLst/>
-          </a:prstGeom>
-        </p:spPr>
-        <p:style>
-          <a:lnRef idx="1">
-            <a:schemeClr val="dk1"/>
-          </a:lnRef>
-          <a:fillRef idx="0">
-            <a:schemeClr val="dk1"/>
-          </a:fillRef>
-          <a:effectRef idx="0">
-            <a:schemeClr val="dk1"/>
-          </a:effectRef>
-          <a:fontRef idx="minor">
-            <a:schemeClr val="tx1"/>
-          </a:fontRef>
-        </p:style>
-      </p:cxnSp>
-      <p:cxnSp>
-        <p:nvCxnSpPr>
-          <p:cNvPr id="87" name="Straight Connector 86"/>
-          <p:cNvCxnSpPr>
-            <a:stCxn id="61" idx="1"/>
-            <a:endCxn id="44" idx="3"/>
-          </p:cNvCxnSpPr>
-          <p:nvPr/>
-        </p:nvCxnSpPr>
-        <p:spPr>
-          <a:xfrm flipH="1" flipV="1">
-            <a:off x="4825999" y="5603347"/>
-            <a:ext cx="556327" cy="291888"/>
-          </a:xfrm>
-          <a:prstGeom prst="line">
-            <a:avLst/>
-          </a:prstGeom>
-        </p:spPr>
-        <p:style>
-          <a:lnRef idx="1">
-            <a:schemeClr val="dk1"/>
-          </a:lnRef>
-          <a:fillRef idx="0">
-            <a:schemeClr val="dk1"/>
-          </a:fillRef>
-          <a:effectRef idx="0">
-            <a:schemeClr val="dk1"/>
-          </a:effectRef>
-          <a:fontRef idx="minor">
-            <a:schemeClr val="tx1"/>
-          </a:fontRef>
-        </p:style>
-      </p:cxnSp>
-      <p:cxnSp>
-        <p:nvCxnSpPr>
-          <p:cNvPr id="88" name="Straight Connector 87"/>
-          <p:cNvCxnSpPr>
-            <a:stCxn id="59" idx="1"/>
-            <a:endCxn id="44" idx="3"/>
-          </p:cNvCxnSpPr>
-          <p:nvPr/>
-        </p:nvCxnSpPr>
-        <p:spPr>
-          <a:xfrm flipH="1" flipV="1">
-            <a:off x="4825999" y="5603347"/>
-            <a:ext cx="546167" cy="601687"/>
-          </a:xfrm>
-          <a:prstGeom prst="line">
-            <a:avLst/>
-          </a:prstGeom>
-        </p:spPr>
-        <p:style>
-          <a:lnRef idx="1">
-            <a:schemeClr val="dk1"/>
-          </a:lnRef>
-          <a:fillRef idx="0">
-            <a:schemeClr val="dk1"/>
-          </a:fillRef>
-          <a:effectRef idx="0">
-            <a:schemeClr val="dk1"/>
-          </a:effectRef>
-          <a:fontRef idx="minor">
-            <a:schemeClr val="tx1"/>
-          </a:fontRef>
-        </p:style>
-      </p:cxnSp>
-      <p:cxnSp>
-        <p:nvCxnSpPr>
-          <p:cNvPr id="89" name="Straight Connector 88"/>
-          <p:cNvCxnSpPr>
-            <a:stCxn id="92" idx="1"/>
-            <a:endCxn id="44" idx="3"/>
-          </p:cNvCxnSpPr>
-          <p:nvPr/>
-        </p:nvCxnSpPr>
-        <p:spPr>
-          <a:xfrm flipH="1">
-            <a:off x="4825999" y="5603347"/>
-            <a:ext cx="561408" cy="0"/>
-          </a:xfrm>
-          <a:prstGeom prst="line">
-            <a:avLst/>
-          </a:prstGeom>
-        </p:spPr>
-        <p:style>
-          <a:lnRef idx="1">
-            <a:schemeClr val="dk1"/>
-          </a:lnRef>
-          <a:fillRef idx="0">
-            <a:schemeClr val="dk1"/>
-          </a:fillRef>
-          <a:effectRef idx="0">
-            <a:schemeClr val="dk1"/>
-          </a:effectRef>
-          <a:fontRef idx="minor">
-            <a:schemeClr val="tx1"/>
-          </a:fontRef>
-        </p:style>
-      </p:cxnSp>
-      <p:sp>
-        <p:nvSpPr>
-          <p:cNvPr id="92" name="Rounded Rectangle 91"/>
-          <p:cNvSpPr/>
-          <p:nvPr/>
-        </p:nvSpPr>
-        <p:spPr>
-          <a:xfrm>
-            <a:off x="5387407" y="5493707"/>
-            <a:ext cx="993917" cy="219279"/>
-          </a:xfrm>
-          <a:prstGeom prst="roundRect">
-            <a:avLst>
-              <a:gd name="adj" fmla="val 0"/>
-            </a:avLst>
-          </a:prstGeom>
-          <a:solidFill>
-            <a:schemeClr val="lt1"/>
-          </a:solidFill>
-          <a:ln w="12700"/>
-        </p:spPr>
-        <p:style>
-          <a:lnRef idx="2">
-            <a:schemeClr val="dk1"/>
-          </a:lnRef>
-          <a:fillRef idx="1">
-            <a:schemeClr val="lt1"/>
-          </a:fillRef>
-          <a:effectRef idx="0">
-            <a:schemeClr val="dk1"/>
-          </a:effectRef>
-          <a:fontRef idx="minor">
-            <a:schemeClr val="dk1"/>
-          </a:fontRef>
-        </p:style>
-        <p:txBody>
-          <a:bodyPr rtlCol="0" anchor="ctr"/>
-          <a:lstStyle/>
-          <a:p>
-            <a:pPr algn="ctr"/>
-            <a:r>
-              <a:rPr lang="en-US" sz="1000" dirty="0" smtClean="0"/>
-              <a:t>Privacy</a:t>
-            </a:r>
-            <a:endParaRPr lang="en-US" sz="1000" dirty="0"/>
-          </a:p>
-        </p:txBody>
-      </p:sp>
     </p:spTree>
     <p:extLst>
       <p:ext uri="{BB962C8B-B14F-4D97-AF65-F5344CB8AC3E}">

</xml_diff>

<commit_message>
Updated main document, updated model in pptx, and tables.
</commit_message>
<xml_diff>
--- a/model.pptx
+++ b/model.pptx
@@ -3845,7 +3845,7 @@
           <a:graphicData uri="http://schemas.openxmlformats.org/presentationml/2006/ole">
             <mc:AlternateContent xmlns:mc="http://schemas.openxmlformats.org/markup-compatibility/2006">
               <mc:Choice xmlns:v="urn:schemas-microsoft-com:vml" Requires="v">
-                <p:oleObj spid="_x0000_s1075" name="Equation" r:id="rId3" imgW="3771900" imgH="203200" progId="Equation.3">
+                <p:oleObj spid="_x0000_s1080" name="Equation" r:id="rId3" imgW="3771900" imgH="203200" progId="Equation.3">
                   <p:embed/>
                 </p:oleObj>
               </mc:Choice>
@@ -6189,7 +6189,7 @@
           <a:p>
             <a:r>
               <a:rPr lang="en-US" sz="1000" dirty="0" smtClean="0"/>
-              <a:t>H4.7.6</a:t>
+              <a:t>H4.8.6</a:t>
             </a:r>
             <a:endParaRPr lang="en-US" sz="1000" dirty="0" smtClean="0"/>
           </a:p>
@@ -6219,7 +6219,7 @@
           <a:p>
             <a:r>
               <a:rPr lang="en-US" sz="1000" dirty="0" smtClean="0"/>
-              <a:t>H4.7.3</a:t>
+              <a:t>H4.8.3</a:t>
             </a:r>
             <a:endParaRPr lang="en-US" sz="1000" dirty="0" smtClean="0"/>
           </a:p>
@@ -6249,7 +6249,7 @@
           <a:p>
             <a:r>
               <a:rPr lang="en-US" sz="1000" dirty="0" smtClean="0"/>
-              <a:t>H4.7.4</a:t>
+              <a:t>H4.8.4</a:t>
             </a:r>
             <a:endParaRPr lang="en-US" sz="1000" dirty="0" smtClean="0"/>
           </a:p>
@@ -6279,7 +6279,7 @@
           <a:p>
             <a:r>
               <a:rPr lang="en-US" sz="1000" dirty="0" smtClean="0"/>
-              <a:t>H4.7.2</a:t>
+              <a:t>H4.8.2</a:t>
             </a:r>
             <a:endParaRPr lang="en-US" sz="1000" dirty="0" smtClean="0"/>
           </a:p>
@@ -6309,7 +6309,7 @@
           <a:p>
             <a:r>
               <a:rPr lang="en-US" sz="1000" dirty="0" smtClean="0"/>
-              <a:t>H4.7.5</a:t>
+              <a:t>H4.8.5</a:t>
             </a:r>
             <a:endParaRPr lang="en-US" sz="1000" dirty="0" smtClean="0"/>
           </a:p>
@@ -6339,7 +6339,7 @@
           <a:p>
             <a:r>
               <a:rPr lang="en-US" sz="1000" dirty="0" smtClean="0"/>
-              <a:t>H4.7.7</a:t>
+              <a:t>H4.8.7</a:t>
             </a:r>
             <a:endParaRPr lang="en-US" sz="1000" dirty="0" smtClean="0"/>
           </a:p>
@@ -6369,7 +6369,7 @@
           <a:p>
             <a:r>
               <a:rPr lang="en-US" sz="1000" dirty="0" smtClean="0"/>
-              <a:t>H4.7.1</a:t>
+              <a:t>H4.8.1</a:t>
             </a:r>
             <a:endParaRPr lang="en-US" sz="1000" dirty="0" smtClean="0"/>
           </a:p>
@@ -8931,38 +8931,6 @@
       </p:cxnSp>
       <p:cxnSp>
         <p:nvCxnSpPr>
-          <p:cNvPr id="488" name="Straight Connector 487"/>
-          <p:cNvCxnSpPr>
-            <a:endCxn id="5" idx="1"/>
-          </p:cNvCxnSpPr>
-          <p:nvPr/>
-        </p:nvCxnSpPr>
-        <p:spPr>
-          <a:xfrm flipV="1">
-            <a:off x="1991361" y="1905660"/>
-            <a:ext cx="1859279" cy="1512572"/>
-          </a:xfrm>
-          <a:prstGeom prst="line">
-            <a:avLst/>
-          </a:prstGeom>
-        </p:spPr>
-        <p:style>
-          <a:lnRef idx="1">
-            <a:schemeClr val="dk1"/>
-          </a:lnRef>
-          <a:fillRef idx="0">
-            <a:schemeClr val="dk1"/>
-          </a:fillRef>
-          <a:effectRef idx="0">
-            <a:schemeClr val="dk1"/>
-          </a:effectRef>
-          <a:fontRef idx="minor">
-            <a:schemeClr val="tx1"/>
-          </a:fontRef>
-        </p:style>
-      </p:cxnSp>
-      <p:cxnSp>
-        <p:nvCxnSpPr>
           <p:cNvPr id="491" name="Straight Connector 490"/>
           <p:cNvCxnSpPr>
             <a:stCxn id="484" idx="3"/>
@@ -11830,39 +11798,6 @@
       </p:cxnSp>
       <p:cxnSp>
         <p:nvCxnSpPr>
-          <p:cNvPr id="488" name="Straight Connector 487"/>
-          <p:cNvCxnSpPr>
-            <a:stCxn id="484" idx="3"/>
-            <a:endCxn id="5" idx="1"/>
-          </p:cNvCxnSpPr>
-          <p:nvPr/>
-        </p:nvCxnSpPr>
-        <p:spPr>
-          <a:xfrm flipV="1">
-            <a:off x="4115428" y="1905660"/>
-            <a:ext cx="1183679" cy="1529998"/>
-          </a:xfrm>
-          <a:prstGeom prst="line">
-            <a:avLst/>
-          </a:prstGeom>
-        </p:spPr>
-        <p:style>
-          <a:lnRef idx="1">
-            <a:schemeClr val="dk1"/>
-          </a:lnRef>
-          <a:fillRef idx="0">
-            <a:schemeClr val="dk1"/>
-          </a:fillRef>
-          <a:effectRef idx="0">
-            <a:schemeClr val="dk1"/>
-          </a:effectRef>
-          <a:fontRef idx="minor">
-            <a:schemeClr val="tx1"/>
-          </a:fontRef>
-        </p:style>
-      </p:cxnSp>
-      <p:cxnSp>
-        <p:nvCxnSpPr>
           <p:cNvPr id="491" name="Straight Connector 490"/>
           <p:cNvCxnSpPr>
             <a:stCxn id="484" idx="3"/>
@@ -12621,7 +12556,7 @@
         </p:nvSpPr>
         <p:spPr>
           <a:xfrm>
-            <a:off x="2290506" y="5684764"/>
+            <a:off x="2266988" y="5755312"/>
             <a:ext cx="452017" cy="276999"/>
           </a:xfrm>
           <a:prstGeom prst="rect">
@@ -12757,7 +12692,7 @@
           <a:p>
             <a:r>
               <a:rPr lang="en-US" sz="1000" dirty="0" smtClean="0"/>
-              <a:t>H4.7.2</a:t>
+              <a:t>H4.8.2</a:t>
             </a:r>
             <a:endParaRPr lang="en-US" sz="1000" dirty="0" smtClean="0"/>
           </a:p>
@@ -12787,7 +12722,7 @@
           <a:p>
             <a:r>
               <a:rPr lang="en-US" sz="1000" dirty="0" smtClean="0"/>
-              <a:t>H4.7.5</a:t>
+              <a:t>H4.8.5</a:t>
             </a:r>
             <a:endParaRPr lang="en-US" sz="1000" dirty="0" smtClean="0"/>
           </a:p>
@@ -12817,7 +12752,7 @@
           <a:p>
             <a:r>
               <a:rPr lang="en-US" sz="1000" dirty="0" smtClean="0"/>
-              <a:t>H4.7.7</a:t>
+              <a:t>H4.8.7</a:t>
             </a:r>
             <a:endParaRPr lang="en-US" sz="1000" dirty="0" smtClean="0"/>
           </a:p>
@@ -12847,7 +12782,7 @@
           <a:p>
             <a:r>
               <a:rPr lang="en-US" sz="1000" dirty="0" smtClean="0"/>
-              <a:t>H4.7.1</a:t>
+              <a:t>H4.8.1</a:t>
             </a:r>
             <a:endParaRPr lang="en-US" sz="1000" dirty="0" smtClean="0"/>
           </a:p>
@@ -15532,39 +15467,6 @@
       </p:cxnSp>
       <p:cxnSp>
         <p:nvCxnSpPr>
-          <p:cNvPr id="488" name="Straight Connector 487"/>
-          <p:cNvCxnSpPr>
-            <a:stCxn id="484" idx="3"/>
-            <a:endCxn id="5" idx="1"/>
-          </p:cNvCxnSpPr>
-          <p:nvPr/>
-        </p:nvCxnSpPr>
-        <p:spPr>
-          <a:xfrm flipV="1">
-            <a:off x="4115428" y="1905660"/>
-            <a:ext cx="1183679" cy="1568482"/>
-          </a:xfrm>
-          <a:prstGeom prst="line">
-            <a:avLst/>
-          </a:prstGeom>
-        </p:spPr>
-        <p:style>
-          <a:lnRef idx="1">
-            <a:schemeClr val="dk1"/>
-          </a:lnRef>
-          <a:fillRef idx="0">
-            <a:schemeClr val="dk1"/>
-          </a:fillRef>
-          <a:effectRef idx="0">
-            <a:schemeClr val="dk1"/>
-          </a:effectRef>
-          <a:fontRef idx="minor">
-            <a:schemeClr val="tx1"/>
-          </a:fontRef>
-        </p:style>
-      </p:cxnSp>
-      <p:cxnSp>
-        <p:nvCxnSpPr>
           <p:cNvPr id="491" name="Straight Connector 490"/>
           <p:cNvCxnSpPr>
             <a:stCxn id="484" idx="3"/>
@@ -19453,39 +19355,6 @@
       </p:cxnSp>
       <p:cxnSp>
         <p:nvCxnSpPr>
-          <p:cNvPr id="488" name="Straight Connector 487"/>
-          <p:cNvCxnSpPr>
-            <a:stCxn id="484" idx="3"/>
-            <a:endCxn id="5" idx="1"/>
-          </p:cNvCxnSpPr>
-          <p:nvPr/>
-        </p:nvCxnSpPr>
-        <p:spPr>
-          <a:xfrm flipV="1">
-            <a:off x="4115428" y="1905660"/>
-            <a:ext cx="1183679" cy="1568482"/>
-          </a:xfrm>
-          <a:prstGeom prst="line">
-            <a:avLst/>
-          </a:prstGeom>
-        </p:spPr>
-        <p:style>
-          <a:lnRef idx="1">
-            <a:schemeClr val="dk1"/>
-          </a:lnRef>
-          <a:fillRef idx="0">
-            <a:schemeClr val="dk1"/>
-          </a:fillRef>
-          <a:effectRef idx="0">
-            <a:schemeClr val="dk1"/>
-          </a:effectRef>
-          <a:fontRef idx="minor">
-            <a:schemeClr val="tx1"/>
-          </a:fontRef>
-        </p:style>
-      </p:cxnSp>
-      <p:cxnSp>
-        <p:nvCxnSpPr>
           <p:cNvPr id="491" name="Straight Connector 490"/>
           <p:cNvCxnSpPr>
             <a:stCxn id="484" idx="3"/>
@@ -21603,39 +21472,6 @@
           <a:xfrm flipV="1">
             <a:off x="4115428" y="640715"/>
             <a:ext cx="990638" cy="2833427"/>
-          </a:xfrm>
-          <a:prstGeom prst="line">
-            <a:avLst/>
-          </a:prstGeom>
-        </p:spPr>
-        <p:style>
-          <a:lnRef idx="1">
-            <a:schemeClr val="dk1"/>
-          </a:lnRef>
-          <a:fillRef idx="0">
-            <a:schemeClr val="dk1"/>
-          </a:fillRef>
-          <a:effectRef idx="0">
-            <a:schemeClr val="dk1"/>
-          </a:effectRef>
-          <a:fontRef idx="minor">
-            <a:schemeClr val="tx1"/>
-          </a:fontRef>
-        </p:style>
-      </p:cxnSp>
-      <p:cxnSp>
-        <p:nvCxnSpPr>
-          <p:cNvPr id="488" name="Straight Connector 487"/>
-          <p:cNvCxnSpPr>
-            <a:stCxn id="484" idx="3"/>
-            <a:endCxn id="5" idx="1"/>
-          </p:cNvCxnSpPr>
-          <p:nvPr/>
-        </p:nvCxnSpPr>
-        <p:spPr>
-          <a:xfrm flipV="1">
-            <a:off x="4115428" y="1905660"/>
-            <a:ext cx="1183679" cy="1568482"/>
           </a:xfrm>
           <a:prstGeom prst="line">
             <a:avLst/>
@@ -28037,39 +27873,6 @@
       </p:cxnSp>
       <p:cxnSp>
         <p:nvCxnSpPr>
-          <p:cNvPr id="488" name="Straight Connector 487"/>
-          <p:cNvCxnSpPr>
-            <a:stCxn id="484" idx="3"/>
-            <a:endCxn id="5" idx="1"/>
-          </p:cNvCxnSpPr>
-          <p:nvPr/>
-        </p:nvCxnSpPr>
-        <p:spPr>
-          <a:xfrm flipV="1">
-            <a:off x="4988560" y="3166111"/>
-            <a:ext cx="1859279" cy="1705663"/>
-          </a:xfrm>
-          <a:prstGeom prst="line">
-            <a:avLst/>
-          </a:prstGeom>
-        </p:spPr>
-        <p:style>
-          <a:lnRef idx="1">
-            <a:schemeClr val="dk1"/>
-          </a:lnRef>
-          <a:fillRef idx="0">
-            <a:schemeClr val="dk1"/>
-          </a:fillRef>
-          <a:effectRef idx="0">
-            <a:schemeClr val="dk1"/>
-          </a:effectRef>
-          <a:fontRef idx="minor">
-            <a:schemeClr val="tx1"/>
-          </a:fontRef>
-        </p:style>
-      </p:cxnSp>
-      <p:cxnSp>
-        <p:nvCxnSpPr>
           <p:cNvPr id="491" name="Straight Connector 490"/>
           <p:cNvCxnSpPr>
             <a:stCxn id="484" idx="3"/>
@@ -28812,39 +28615,6 @@
           <a:xfrm>
             <a:off x="4434209" y="2525721"/>
             <a:ext cx="1523999" cy="0"/>
-          </a:xfrm>
-          <a:prstGeom prst="line">
-            <a:avLst/>
-          </a:prstGeom>
-        </p:spPr>
-        <p:style>
-          <a:lnRef idx="1">
-            <a:schemeClr val="dk1"/>
-          </a:lnRef>
-          <a:fillRef idx="0">
-            <a:schemeClr val="dk1"/>
-          </a:fillRef>
-          <a:effectRef idx="0">
-            <a:schemeClr val="dk1"/>
-          </a:effectRef>
-          <a:fontRef idx="minor">
-            <a:schemeClr val="tx1"/>
-          </a:fontRef>
-        </p:style>
-      </p:cxnSp>
-      <p:cxnSp>
-        <p:nvCxnSpPr>
-          <p:cNvPr id="488" name="Straight Connector 487"/>
-          <p:cNvCxnSpPr>
-            <a:stCxn id="533" idx="3"/>
-            <a:endCxn id="5" idx="1"/>
-          </p:cNvCxnSpPr>
-          <p:nvPr/>
-        </p:nvCxnSpPr>
-        <p:spPr>
-          <a:xfrm>
-            <a:off x="4434209" y="2525721"/>
-            <a:ext cx="1717040" cy="1035275"/>
           </a:xfrm>
           <a:prstGeom prst="line">
             <a:avLst/>

</xml_diff>

<commit_message>
Added important contributions to both files.
</commit_message>
<xml_diff>
--- a/model.pptx
+++ b/model.pptx
@@ -3845,7 +3845,7 @@
           <a:graphicData uri="http://schemas.openxmlformats.org/presentationml/2006/ole">
             <mc:AlternateContent xmlns:mc="http://schemas.openxmlformats.org/markup-compatibility/2006">
               <mc:Choice xmlns:v="urn:schemas-microsoft-com:vml" Requires="v">
-                <p:oleObj spid="_x0000_s1080" name="Equation" r:id="rId3" imgW="3771900" imgH="203200" progId="Equation.3">
+                <p:oleObj spid="_x0000_s1081" name="Equation" r:id="rId3" imgW="3771900" imgH="203200" progId="Equation.3">
                   <p:embed/>
                 </p:oleObj>
               </mc:Choice>
@@ -28982,8 +28982,8 @@
           <p:nvPr/>
         </p:nvSpPr>
         <p:spPr>
-          <a:xfrm>
-            <a:off x="538826" y="2021840"/>
+          <a:xfrm rot="16200000">
+            <a:off x="-1301464" y="655133"/>
             <a:ext cx="1956598" cy="646331"/>
           </a:xfrm>
           <a:prstGeom prst="rect">
@@ -29011,206 +29011,590 @@
           </a:p>
         </p:txBody>
       </p:sp>
+      <p:sp>
+        <p:nvSpPr>
+          <p:cNvPr id="41" name="Rounded Rectangle 40"/>
+          <p:cNvSpPr/>
+          <p:nvPr/>
+        </p:nvSpPr>
+        <p:spPr>
+          <a:xfrm>
+            <a:off x="769644" y="2072321"/>
+            <a:ext cx="1239519" cy="279400"/>
+          </a:xfrm>
+          <a:prstGeom prst="roundRect">
+            <a:avLst>
+              <a:gd name="adj" fmla="val 50000"/>
+            </a:avLst>
+          </a:prstGeom>
+        </p:spPr>
+        <p:style>
+          <a:lnRef idx="2">
+            <a:schemeClr val="accent1"/>
+          </a:lnRef>
+          <a:fillRef idx="1">
+            <a:schemeClr val="lt1"/>
+          </a:fillRef>
+          <a:effectRef idx="0">
+            <a:schemeClr val="accent1"/>
+          </a:effectRef>
+          <a:fontRef idx="minor">
+            <a:schemeClr val="dk1"/>
+          </a:fontRef>
+        </p:style>
+        <p:txBody>
+          <a:bodyPr rtlCol="0" anchor="ctr"/>
+          <a:lstStyle/>
+          <a:p>
+            <a:pPr algn="ctr"/>
+            <a:r>
+              <a:rPr lang="en-US" sz="1200" dirty="0" smtClean="0"/>
+              <a:t>ACCESSIBILITY</a:t>
+            </a:r>
+            <a:endParaRPr lang="en-US" sz="1200" dirty="0"/>
+          </a:p>
+        </p:txBody>
+      </p:sp>
+      <p:sp>
+        <p:nvSpPr>
+          <p:cNvPr id="42" name="Rounded Rectangle 41"/>
+          <p:cNvSpPr/>
+          <p:nvPr/>
+        </p:nvSpPr>
+        <p:spPr>
+          <a:xfrm>
+            <a:off x="910752" y="4223691"/>
+            <a:ext cx="975359" cy="254000"/>
+          </a:xfrm>
+          <a:prstGeom prst="roundRect">
+            <a:avLst>
+              <a:gd name="adj" fmla="val 50000"/>
+            </a:avLst>
+          </a:prstGeom>
+        </p:spPr>
+        <p:style>
+          <a:lnRef idx="2">
+            <a:schemeClr val="accent1"/>
+          </a:lnRef>
+          <a:fillRef idx="1">
+            <a:schemeClr val="lt1"/>
+          </a:fillRef>
+          <a:effectRef idx="0">
+            <a:schemeClr val="accent1"/>
+          </a:effectRef>
+          <a:fontRef idx="minor">
+            <a:schemeClr val="dk1"/>
+          </a:fontRef>
+        </p:style>
+        <p:txBody>
+          <a:bodyPr rtlCol="0" anchor="ctr"/>
+          <a:lstStyle/>
+          <a:p>
+            <a:pPr algn="ctr"/>
+            <a:r>
+              <a:rPr lang="en-US" sz="1200" dirty="0" smtClean="0"/>
+              <a:t>USABILITY</a:t>
+            </a:r>
+            <a:endParaRPr lang="en-US" sz="1200" dirty="0"/>
+          </a:p>
+        </p:txBody>
+      </p:sp>
+      <p:sp>
+        <p:nvSpPr>
+          <p:cNvPr id="43" name="Rounded Rectangle 42"/>
+          <p:cNvSpPr/>
+          <p:nvPr/>
+        </p:nvSpPr>
+        <p:spPr>
+          <a:xfrm>
+            <a:off x="4156372" y="2097721"/>
+            <a:ext cx="975359" cy="254000"/>
+          </a:xfrm>
+          <a:prstGeom prst="roundRect">
+            <a:avLst>
+              <a:gd name="adj" fmla="val 50000"/>
+            </a:avLst>
+          </a:prstGeom>
+        </p:spPr>
+        <p:style>
+          <a:lnRef idx="2">
+            <a:schemeClr val="accent1"/>
+          </a:lnRef>
+          <a:fillRef idx="1">
+            <a:schemeClr val="lt1"/>
+          </a:fillRef>
+          <a:effectRef idx="0">
+            <a:schemeClr val="accent1"/>
+          </a:effectRef>
+          <a:fontRef idx="minor">
+            <a:schemeClr val="dk1"/>
+          </a:fontRef>
+        </p:style>
+        <p:txBody>
+          <a:bodyPr rtlCol="0" anchor="ctr"/>
+          <a:lstStyle/>
+          <a:p>
+            <a:pPr algn="ctr"/>
+            <a:r>
+              <a:rPr lang="en-US" sz="1200" dirty="0" smtClean="0"/>
+              <a:t>EFFICIENCY</a:t>
+            </a:r>
+            <a:endParaRPr lang="en-US" sz="1200" dirty="0"/>
+          </a:p>
+        </p:txBody>
+      </p:sp>
+      <p:sp>
+        <p:nvSpPr>
+          <p:cNvPr id="44" name="Rounded Rectangle 43"/>
+          <p:cNvSpPr/>
+          <p:nvPr/>
+        </p:nvSpPr>
+        <p:spPr>
+          <a:xfrm>
+            <a:off x="4191649" y="4287256"/>
+            <a:ext cx="975359" cy="254000"/>
+          </a:xfrm>
+          <a:prstGeom prst="roundRect">
+            <a:avLst>
+              <a:gd name="adj" fmla="val 50000"/>
+            </a:avLst>
+          </a:prstGeom>
+        </p:spPr>
+        <p:style>
+          <a:lnRef idx="2">
+            <a:schemeClr val="accent1"/>
+          </a:lnRef>
+          <a:fillRef idx="1">
+            <a:schemeClr val="lt1"/>
+          </a:fillRef>
+          <a:effectRef idx="0">
+            <a:schemeClr val="accent1"/>
+          </a:effectRef>
+          <a:fontRef idx="minor">
+            <a:schemeClr val="dk1"/>
+          </a:fontRef>
+        </p:style>
+        <p:txBody>
+          <a:bodyPr rtlCol="0" anchor="ctr"/>
+          <a:lstStyle/>
+          <a:p>
+            <a:pPr algn="ctr"/>
+            <a:r>
+              <a:rPr lang="en-US" sz="1200" dirty="0" smtClean="0"/>
+              <a:t>SECURITY</a:t>
+            </a:r>
+            <a:endParaRPr lang="en-US" sz="1200" dirty="0"/>
+          </a:p>
+        </p:txBody>
+      </p:sp>
+      <p:sp>
+        <p:nvSpPr>
+          <p:cNvPr id="45" name="Rounded Rectangle 44"/>
+          <p:cNvSpPr/>
+          <p:nvPr/>
+        </p:nvSpPr>
+        <p:spPr>
+          <a:xfrm>
+            <a:off x="2292712" y="2437774"/>
+            <a:ext cx="1619998" cy="287997"/>
+          </a:xfrm>
+          <a:prstGeom prst="roundRect">
+            <a:avLst>
+              <a:gd name="adj" fmla="val 0"/>
+            </a:avLst>
+          </a:prstGeom>
+          <a:solidFill>
+            <a:schemeClr val="lt1"/>
+          </a:solidFill>
+          <a:ln w="12700"/>
+        </p:spPr>
+        <p:style>
+          <a:lnRef idx="2">
+            <a:schemeClr val="dk1"/>
+          </a:lnRef>
+          <a:fillRef idx="1">
+            <a:schemeClr val="lt1"/>
+          </a:fillRef>
+          <a:effectRef idx="0">
+            <a:schemeClr val="dk1"/>
+          </a:effectRef>
+          <a:fontRef idx="minor">
+            <a:schemeClr val="dk1"/>
+          </a:fontRef>
+        </p:style>
+        <p:txBody>
+          <a:bodyPr rtlCol="0" anchor="ctr"/>
+          <a:lstStyle/>
+          <a:p>
+            <a:pPr algn="ctr"/>
+            <a:r>
+              <a:rPr lang="en-US" sz="1000" dirty="0" smtClean="0"/>
+              <a:t>Operability</a:t>
+            </a:r>
+            <a:endParaRPr lang="en-US" sz="1000" dirty="0"/>
+          </a:p>
+        </p:txBody>
+      </p:sp>
+      <p:sp>
+        <p:nvSpPr>
+          <p:cNvPr id="46" name="Rounded Rectangle 45"/>
+          <p:cNvSpPr/>
+          <p:nvPr/>
+        </p:nvSpPr>
+        <p:spPr>
+          <a:xfrm>
+            <a:off x="2292712" y="1761171"/>
+            <a:ext cx="772159" cy="227330"/>
+          </a:xfrm>
+          <a:prstGeom prst="roundRect">
+            <a:avLst>
+              <a:gd name="adj" fmla="val 0"/>
+            </a:avLst>
+          </a:prstGeom>
+          <a:solidFill>
+            <a:schemeClr val="lt1"/>
+          </a:solidFill>
+          <a:ln w="12700"/>
+        </p:spPr>
+        <p:style>
+          <a:lnRef idx="2">
+            <a:schemeClr val="dk1"/>
+          </a:lnRef>
+          <a:fillRef idx="1">
+            <a:schemeClr val="lt1"/>
+          </a:fillRef>
+          <a:effectRef idx="0">
+            <a:schemeClr val="dk1"/>
+          </a:effectRef>
+          <a:fontRef idx="minor">
+            <a:schemeClr val="dk1"/>
+          </a:fontRef>
+        </p:style>
+        <p:txBody>
+          <a:bodyPr rtlCol="0" anchor="ctr"/>
+          <a:lstStyle/>
+          <a:p>
+            <a:pPr algn="ctr"/>
+            <a:r>
+              <a:rPr lang="en-US" sz="1000" dirty="0" smtClean="0"/>
+              <a:t>Availability</a:t>
+            </a:r>
+            <a:endParaRPr lang="en-US" sz="1000" dirty="0"/>
+          </a:p>
+        </p:txBody>
+      </p:sp>
+      <p:sp>
+        <p:nvSpPr>
+          <p:cNvPr id="47" name="Rounded Rectangle 46"/>
+          <p:cNvSpPr/>
+          <p:nvPr/>
+        </p:nvSpPr>
+        <p:spPr>
+          <a:xfrm>
+            <a:off x="2282552" y="2102801"/>
+            <a:ext cx="772159" cy="227330"/>
+          </a:xfrm>
+          <a:prstGeom prst="roundRect">
+            <a:avLst>
+              <a:gd name="adj" fmla="val 0"/>
+            </a:avLst>
+          </a:prstGeom>
+          <a:solidFill>
+            <a:schemeClr val="lt1"/>
+          </a:solidFill>
+          <a:ln w="12700"/>
+        </p:spPr>
+        <p:style>
+          <a:lnRef idx="2">
+            <a:schemeClr val="dk1"/>
+          </a:lnRef>
+          <a:fillRef idx="1">
+            <a:schemeClr val="lt1"/>
+          </a:fillRef>
+          <a:effectRef idx="0">
+            <a:schemeClr val="dk1"/>
+          </a:effectRef>
+          <a:fontRef idx="minor">
+            <a:schemeClr val="dk1"/>
+          </a:fontRef>
+        </p:style>
+        <p:txBody>
+          <a:bodyPr rtlCol="0" anchor="ctr"/>
+          <a:lstStyle/>
+          <a:p>
+            <a:pPr algn="ctr"/>
+            <a:r>
+              <a:rPr lang="en-US" sz="1000" dirty="0" smtClean="0"/>
+              <a:t>Maturity</a:t>
+            </a:r>
+            <a:endParaRPr lang="en-US" sz="1000" dirty="0"/>
+          </a:p>
+        </p:txBody>
+      </p:sp>
+      <p:sp>
+        <p:nvSpPr>
+          <p:cNvPr id="48" name="Rounded Rectangle 47"/>
+          <p:cNvSpPr/>
+          <p:nvPr/>
+        </p:nvSpPr>
+        <p:spPr>
+          <a:xfrm>
+            <a:off x="2181418" y="3837612"/>
+            <a:ext cx="1780539" cy="264160"/>
+          </a:xfrm>
+          <a:prstGeom prst="roundRect">
+            <a:avLst>
+              <a:gd name="adj" fmla="val 0"/>
+            </a:avLst>
+          </a:prstGeom>
+          <a:solidFill>
+            <a:schemeClr val="lt1"/>
+          </a:solidFill>
+          <a:ln w="12700"/>
+        </p:spPr>
+        <p:style>
+          <a:lnRef idx="2">
+            <a:schemeClr val="dk1"/>
+          </a:lnRef>
+          <a:fillRef idx="1">
+            <a:schemeClr val="lt1"/>
+          </a:fillRef>
+          <a:effectRef idx="0">
+            <a:schemeClr val="dk1"/>
+          </a:effectRef>
+          <a:fontRef idx="minor">
+            <a:schemeClr val="dk1"/>
+          </a:fontRef>
+        </p:style>
+        <p:txBody>
+          <a:bodyPr rtlCol="0" anchor="ctr"/>
+          <a:lstStyle/>
+          <a:p>
+            <a:pPr algn="ctr"/>
+            <a:r>
+              <a:rPr lang="en-US" sz="1000" dirty="0" smtClean="0"/>
+              <a:t>Ease of Use</a:t>
+            </a:r>
+            <a:endParaRPr lang="en-US" sz="1000" dirty="0"/>
+          </a:p>
+        </p:txBody>
+      </p:sp>
+      <p:sp>
+        <p:nvSpPr>
+          <p:cNvPr id="49" name="Rounded Rectangle 48"/>
+          <p:cNvSpPr/>
+          <p:nvPr/>
+        </p:nvSpPr>
+        <p:spPr>
+          <a:xfrm>
+            <a:off x="2181418" y="4151908"/>
+            <a:ext cx="1066800" cy="367664"/>
+          </a:xfrm>
+          <a:prstGeom prst="roundRect">
+            <a:avLst>
+              <a:gd name="adj" fmla="val 0"/>
+            </a:avLst>
+          </a:prstGeom>
+          <a:solidFill>
+            <a:schemeClr val="lt1"/>
+          </a:solidFill>
+          <a:ln w="12700"/>
+        </p:spPr>
+        <p:style>
+          <a:lnRef idx="2">
+            <a:schemeClr val="dk1"/>
+          </a:lnRef>
+          <a:fillRef idx="1">
+            <a:schemeClr val="lt1"/>
+          </a:fillRef>
+          <a:effectRef idx="0">
+            <a:schemeClr val="dk1"/>
+          </a:effectRef>
+          <a:fontRef idx="minor">
+            <a:schemeClr val="dk1"/>
+          </a:fontRef>
+        </p:style>
+        <p:txBody>
+          <a:bodyPr rtlCol="0" anchor="ctr"/>
+          <a:lstStyle/>
+          <a:p>
+            <a:pPr algn="ctr"/>
+            <a:r>
+              <a:rPr lang="en-US" sz="1000" dirty="0" smtClean="0"/>
+              <a:t>Learnability</a:t>
+            </a:r>
+            <a:endParaRPr lang="en-US" sz="1000" dirty="0"/>
+          </a:p>
+        </p:txBody>
+      </p:sp>
+      <p:sp>
+        <p:nvSpPr>
+          <p:cNvPr id="50" name="Rounded Rectangle 49"/>
+          <p:cNvSpPr/>
+          <p:nvPr/>
+        </p:nvSpPr>
+        <p:spPr>
+          <a:xfrm>
+            <a:off x="2181418" y="4587546"/>
+            <a:ext cx="1494679" cy="305726"/>
+          </a:xfrm>
+          <a:prstGeom prst="roundRect">
+            <a:avLst>
+              <a:gd name="adj" fmla="val 0"/>
+            </a:avLst>
+          </a:prstGeom>
+          <a:solidFill>
+            <a:schemeClr val="lt1"/>
+          </a:solidFill>
+          <a:ln w="12700"/>
+        </p:spPr>
+        <p:style>
+          <a:lnRef idx="2">
+            <a:schemeClr val="dk1"/>
+          </a:lnRef>
+          <a:fillRef idx="1">
+            <a:schemeClr val="lt1"/>
+          </a:fillRef>
+          <a:effectRef idx="0">
+            <a:schemeClr val="dk1"/>
+          </a:effectRef>
+          <a:fontRef idx="minor">
+            <a:schemeClr val="dk1"/>
+          </a:fontRef>
+        </p:style>
+        <p:txBody>
+          <a:bodyPr rtlCol="0" anchor="ctr"/>
+          <a:lstStyle/>
+          <a:p>
+            <a:pPr algn="ctr"/>
+            <a:r>
+              <a:rPr lang="en-US" sz="1000" dirty="0" smtClean="0"/>
+              <a:t>User interface aesthetics</a:t>
+            </a:r>
+            <a:endParaRPr lang="en-US" sz="1000" dirty="0"/>
+          </a:p>
+        </p:txBody>
+      </p:sp>
+      <p:sp>
+        <p:nvSpPr>
+          <p:cNvPr id="51" name="Rounded Rectangle 50"/>
+          <p:cNvSpPr/>
+          <p:nvPr/>
+        </p:nvSpPr>
+        <p:spPr>
+          <a:xfrm>
+            <a:off x="5508785" y="1736119"/>
+            <a:ext cx="2065978" cy="276861"/>
+          </a:xfrm>
+          <a:prstGeom prst="roundRect">
+            <a:avLst>
+              <a:gd name="adj" fmla="val 0"/>
+            </a:avLst>
+          </a:prstGeom>
+          <a:solidFill>
+            <a:schemeClr val="lt1"/>
+          </a:solidFill>
+          <a:ln w="12700"/>
+        </p:spPr>
+        <p:style>
+          <a:lnRef idx="2">
+            <a:schemeClr val="dk1"/>
+          </a:lnRef>
+          <a:fillRef idx="1">
+            <a:schemeClr val="lt1"/>
+          </a:fillRef>
+          <a:effectRef idx="0">
+            <a:schemeClr val="dk1"/>
+          </a:effectRef>
+          <a:fontRef idx="minor">
+            <a:schemeClr val="dk1"/>
+          </a:fontRef>
+        </p:style>
+        <p:txBody>
+          <a:bodyPr rtlCol="0" anchor="ctr"/>
+          <a:lstStyle/>
+          <a:p>
+            <a:pPr algn="ctr"/>
+            <a:r>
+              <a:rPr lang="en-US" sz="1000" dirty="0" smtClean="0"/>
+              <a:t>Responsiveness</a:t>
+            </a:r>
+            <a:endParaRPr lang="en-US" sz="1000" dirty="0"/>
+          </a:p>
+        </p:txBody>
+      </p:sp>
+      <p:sp>
+        <p:nvSpPr>
+          <p:cNvPr id="52" name="Rounded Rectangle 51"/>
+          <p:cNvSpPr/>
+          <p:nvPr/>
+        </p:nvSpPr>
+        <p:spPr>
+          <a:xfrm>
+            <a:off x="5478305" y="2496847"/>
+            <a:ext cx="1396998" cy="264160"/>
+          </a:xfrm>
+          <a:prstGeom prst="roundRect">
+            <a:avLst>
+              <a:gd name="adj" fmla="val 0"/>
+            </a:avLst>
+          </a:prstGeom>
+          <a:solidFill>
+            <a:schemeClr val="lt1"/>
+          </a:solidFill>
+          <a:ln w="12700"/>
+        </p:spPr>
+        <p:style>
+          <a:lnRef idx="2">
+            <a:schemeClr val="dk1"/>
+          </a:lnRef>
+          <a:fillRef idx="1">
+            <a:schemeClr val="lt1"/>
+          </a:fillRef>
+          <a:effectRef idx="0">
+            <a:schemeClr val="dk1"/>
+          </a:effectRef>
+          <a:fontRef idx="minor">
+            <a:schemeClr val="dk1"/>
+          </a:fontRef>
+        </p:style>
+        <p:txBody>
+          <a:bodyPr rtlCol="0" anchor="ctr"/>
+          <a:lstStyle/>
+          <a:p>
+            <a:pPr algn="ctr"/>
+            <a:r>
+              <a:rPr lang="en-US" sz="1000" dirty="0" smtClean="0"/>
+              <a:t>Time behavior</a:t>
+            </a:r>
+            <a:endParaRPr lang="en-US" sz="1000" dirty="0"/>
+          </a:p>
+        </p:txBody>
+      </p:sp>
       <p:grpSp>
         <p:nvGrpSpPr>
-          <p:cNvPr id="2" name="Group 1"/>
+          <p:cNvPr id="53" name="Group 52"/>
           <p:cNvGrpSpPr/>
           <p:nvPr/>
         </p:nvGrpSpPr>
         <p:grpSpPr>
           <a:xfrm>
-            <a:off x="3657599" y="189865"/>
-            <a:ext cx="3811024" cy="6135455"/>
-            <a:chOff x="3657599" y="189865"/>
-            <a:chExt cx="3811024" cy="6135455"/>
+            <a:off x="5483385" y="3004781"/>
+            <a:ext cx="1879598" cy="491491"/>
+            <a:chOff x="7721601" y="3576319"/>
+            <a:chExt cx="1859278" cy="491491"/>
           </a:xfrm>
         </p:grpSpPr>
         <p:sp>
           <p:nvSpPr>
-            <p:cNvPr id="41" name="Rounded Rectangle 40"/>
+            <p:cNvPr id="54" name="Rounded Rectangle 53"/>
             <p:cNvSpPr/>
             <p:nvPr/>
           </p:nvSpPr>
           <p:spPr>
             <a:xfrm>
-              <a:off x="3657599" y="501015"/>
-              <a:ext cx="1239519" cy="279400"/>
-            </a:xfrm>
-            <a:prstGeom prst="roundRect">
-              <a:avLst>
-                <a:gd name="adj" fmla="val 50000"/>
-              </a:avLst>
-            </a:prstGeom>
-          </p:spPr>
-          <p:style>
-            <a:lnRef idx="2">
-              <a:schemeClr val="accent1"/>
-            </a:lnRef>
-            <a:fillRef idx="1">
-              <a:schemeClr val="lt1"/>
-            </a:fillRef>
-            <a:effectRef idx="0">
-              <a:schemeClr val="accent1"/>
-            </a:effectRef>
-            <a:fontRef idx="minor">
-              <a:schemeClr val="dk1"/>
-            </a:fontRef>
-          </p:style>
-          <p:txBody>
-            <a:bodyPr rtlCol="0" anchor="ctr"/>
-            <a:lstStyle/>
-            <a:p>
-              <a:pPr algn="ctr"/>
-              <a:r>
-                <a:rPr lang="en-US" sz="1200" dirty="0" smtClean="0"/>
-                <a:t>ACCESSIBILITY</a:t>
-              </a:r>
-              <a:endParaRPr lang="en-US" sz="1200" dirty="0"/>
-            </a:p>
-          </p:txBody>
-        </p:sp>
-        <p:sp>
-          <p:nvSpPr>
-            <p:cNvPr id="42" name="Rounded Rectangle 41"/>
-            <p:cNvSpPr/>
-            <p:nvPr/>
-          </p:nvSpPr>
-          <p:spPr>
-            <a:xfrm>
-              <a:off x="3850640" y="1778660"/>
-              <a:ext cx="975359" cy="254000"/>
-            </a:xfrm>
-            <a:prstGeom prst="roundRect">
-              <a:avLst>
-                <a:gd name="adj" fmla="val 50000"/>
-              </a:avLst>
-            </a:prstGeom>
-          </p:spPr>
-          <p:style>
-            <a:lnRef idx="2">
-              <a:schemeClr val="accent1"/>
-            </a:lnRef>
-            <a:fillRef idx="1">
-              <a:schemeClr val="lt1"/>
-            </a:fillRef>
-            <a:effectRef idx="0">
-              <a:schemeClr val="accent1"/>
-            </a:effectRef>
-            <a:fontRef idx="minor">
-              <a:schemeClr val="dk1"/>
-            </a:fontRef>
-          </p:style>
-          <p:txBody>
-            <a:bodyPr rtlCol="0" anchor="ctr"/>
-            <a:lstStyle/>
-            <a:p>
-              <a:pPr algn="ctr"/>
-              <a:r>
-                <a:rPr lang="en-US" sz="1200" dirty="0" smtClean="0"/>
-                <a:t>USABILITY</a:t>
-              </a:r>
-              <a:endParaRPr lang="en-US" sz="1200" dirty="0"/>
-            </a:p>
-          </p:txBody>
-        </p:sp>
-        <p:sp>
-          <p:nvSpPr>
-            <p:cNvPr id="43" name="Rounded Rectangle 42"/>
-            <p:cNvSpPr/>
-            <p:nvPr/>
-          </p:nvSpPr>
-          <p:spPr>
-            <a:xfrm>
-              <a:off x="3850640" y="3286812"/>
-              <a:ext cx="975359" cy="254000"/>
-            </a:xfrm>
-            <a:prstGeom prst="roundRect">
-              <a:avLst>
-                <a:gd name="adj" fmla="val 50000"/>
-              </a:avLst>
-            </a:prstGeom>
-          </p:spPr>
-          <p:style>
-            <a:lnRef idx="2">
-              <a:schemeClr val="accent1"/>
-            </a:lnRef>
-            <a:fillRef idx="1">
-              <a:schemeClr val="lt1"/>
-            </a:fillRef>
-            <a:effectRef idx="0">
-              <a:schemeClr val="accent1"/>
-            </a:effectRef>
-            <a:fontRef idx="minor">
-              <a:schemeClr val="dk1"/>
-            </a:fontRef>
-          </p:style>
-          <p:txBody>
-            <a:bodyPr rtlCol="0" anchor="ctr"/>
-            <a:lstStyle/>
-            <a:p>
-              <a:pPr algn="ctr"/>
-              <a:r>
-                <a:rPr lang="en-US" sz="1200" dirty="0" smtClean="0"/>
-                <a:t>EFFICIENCY</a:t>
-              </a:r>
-              <a:endParaRPr lang="en-US" sz="1200" dirty="0"/>
-            </a:p>
-          </p:txBody>
-        </p:sp>
-        <p:sp>
-          <p:nvSpPr>
-            <p:cNvPr id="44" name="Rounded Rectangle 43"/>
-            <p:cNvSpPr/>
-            <p:nvPr/>
-          </p:nvSpPr>
-          <p:spPr>
-            <a:xfrm>
-              <a:off x="3850640" y="5476347"/>
-              <a:ext cx="975359" cy="254000"/>
-            </a:xfrm>
-            <a:prstGeom prst="roundRect">
-              <a:avLst>
-                <a:gd name="adj" fmla="val 50000"/>
-              </a:avLst>
-            </a:prstGeom>
-          </p:spPr>
-          <p:style>
-            <a:lnRef idx="2">
-              <a:schemeClr val="accent1"/>
-            </a:lnRef>
-            <a:fillRef idx="1">
-              <a:schemeClr val="lt1"/>
-            </a:fillRef>
-            <a:effectRef idx="0">
-              <a:schemeClr val="accent1"/>
-            </a:effectRef>
-            <a:fontRef idx="minor">
-              <a:schemeClr val="dk1"/>
-            </a:fontRef>
-          </p:style>
-          <p:txBody>
-            <a:bodyPr rtlCol="0" anchor="ctr"/>
-            <a:lstStyle/>
-            <a:p>
-              <a:pPr algn="ctr"/>
-              <a:r>
-                <a:rPr lang="en-US" sz="1200" dirty="0" smtClean="0"/>
-                <a:t>SECURITY</a:t>
-              </a:r>
-              <a:endParaRPr lang="en-US" sz="1200" dirty="0"/>
-            </a:p>
-          </p:txBody>
-        </p:sp>
-        <p:sp>
-          <p:nvSpPr>
-            <p:cNvPr id="45" name="Rounded Rectangle 44"/>
-            <p:cNvSpPr/>
-            <p:nvPr/>
-          </p:nvSpPr>
-          <p:spPr>
-            <a:xfrm>
-              <a:off x="5486401" y="866468"/>
-              <a:ext cx="1619998" cy="287997"/>
+              <a:off x="7721601" y="3576319"/>
+              <a:ext cx="1859278" cy="260985"/>
             </a:xfrm>
             <a:prstGeom prst="roundRect">
               <a:avLst>
@@ -29243,7 +29627,7 @@
               <a:pPr algn="ctr"/>
               <a:r>
                 <a:rPr lang="en-US" sz="1000" dirty="0" smtClean="0"/>
-                <a:t>Operability</a:t>
+                <a:t>Transaction Capability</a:t>
               </a:r>
               <a:endParaRPr lang="en-US" sz="1000" dirty="0"/>
             </a:p>
@@ -29251,14 +29635,14 @@
         </p:sp>
         <p:sp>
           <p:nvSpPr>
-            <p:cNvPr id="46" name="Rounded Rectangle 45"/>
+            <p:cNvPr id="55" name="Rounded Rectangle 54"/>
             <p:cNvSpPr/>
             <p:nvPr/>
           </p:nvSpPr>
           <p:spPr>
             <a:xfrm>
-              <a:off x="5486401" y="189865"/>
-              <a:ext cx="772159" cy="227330"/>
+              <a:off x="7721601" y="3840480"/>
+              <a:ext cx="955039" cy="224154"/>
             </a:xfrm>
             <a:prstGeom prst="roundRect">
               <a:avLst>
@@ -29291,7 +29675,7 @@
               <a:pPr algn="ctr"/>
               <a:r>
                 <a:rPr lang="en-US" sz="1000" dirty="0" smtClean="0"/>
-                <a:t>Availability</a:t>
+                <a:t>Completeness</a:t>
               </a:r>
               <a:endParaRPr lang="en-US" sz="1000" dirty="0"/>
             </a:p>
@@ -29299,14 +29683,14 @@
         </p:sp>
         <p:sp>
           <p:nvSpPr>
-            <p:cNvPr id="47" name="Rounded Rectangle 46"/>
+            <p:cNvPr id="56" name="Rounded Rectangle 55"/>
             <p:cNvSpPr/>
             <p:nvPr/>
           </p:nvSpPr>
           <p:spPr>
             <a:xfrm>
-              <a:off x="5476241" y="531495"/>
-              <a:ext cx="772159" cy="227330"/>
+              <a:off x="8676640" y="3840480"/>
+              <a:ext cx="904239" cy="227330"/>
             </a:xfrm>
             <a:prstGeom prst="roundRect">
               <a:avLst>
@@ -29339,1243 +29723,844 @@
               <a:pPr algn="ctr"/>
               <a:r>
                 <a:rPr lang="en-US" sz="1000" dirty="0" smtClean="0"/>
-                <a:t>Maturity</a:t>
-              </a:r>
-              <a:endParaRPr lang="en-US" sz="1000" dirty="0"/>
-            </a:p>
-          </p:txBody>
-        </p:sp>
-        <p:sp>
-          <p:nvSpPr>
-            <p:cNvPr id="48" name="Rounded Rectangle 47"/>
-            <p:cNvSpPr/>
-            <p:nvPr/>
-          </p:nvSpPr>
-          <p:spPr>
-            <a:xfrm>
-              <a:off x="5415281" y="1392581"/>
-              <a:ext cx="1780539" cy="264160"/>
-            </a:xfrm>
-            <a:prstGeom prst="roundRect">
-              <a:avLst>
-                <a:gd name="adj" fmla="val 0"/>
-              </a:avLst>
-            </a:prstGeom>
-            <a:solidFill>
-              <a:schemeClr val="lt1"/>
-            </a:solidFill>
-            <a:ln w="12700"/>
-          </p:spPr>
-          <p:style>
-            <a:lnRef idx="2">
-              <a:schemeClr val="dk1"/>
-            </a:lnRef>
-            <a:fillRef idx="1">
-              <a:schemeClr val="lt1"/>
-            </a:fillRef>
-            <a:effectRef idx="0">
-              <a:schemeClr val="dk1"/>
-            </a:effectRef>
-            <a:fontRef idx="minor">
-              <a:schemeClr val="dk1"/>
-            </a:fontRef>
-          </p:style>
-          <p:txBody>
-            <a:bodyPr rtlCol="0" anchor="ctr"/>
-            <a:lstStyle/>
-            <a:p>
-              <a:pPr algn="ctr"/>
-              <a:r>
-                <a:rPr lang="en-US" sz="1000" dirty="0" smtClean="0"/>
-                <a:t>Ease of Use</a:t>
-              </a:r>
-              <a:endParaRPr lang="en-US" sz="1000" dirty="0"/>
-            </a:p>
-          </p:txBody>
-        </p:sp>
-        <p:sp>
-          <p:nvSpPr>
-            <p:cNvPr id="49" name="Rounded Rectangle 48"/>
-            <p:cNvSpPr/>
-            <p:nvPr/>
-          </p:nvSpPr>
-          <p:spPr>
-            <a:xfrm>
-              <a:off x="5415281" y="1706877"/>
-              <a:ext cx="1066800" cy="367664"/>
-            </a:xfrm>
-            <a:prstGeom prst="roundRect">
-              <a:avLst>
-                <a:gd name="adj" fmla="val 0"/>
-              </a:avLst>
-            </a:prstGeom>
-            <a:solidFill>
-              <a:schemeClr val="lt1"/>
-            </a:solidFill>
-            <a:ln w="12700"/>
-          </p:spPr>
-          <p:style>
-            <a:lnRef idx="2">
-              <a:schemeClr val="dk1"/>
-            </a:lnRef>
-            <a:fillRef idx="1">
-              <a:schemeClr val="lt1"/>
-            </a:fillRef>
-            <a:effectRef idx="0">
-              <a:schemeClr val="dk1"/>
-            </a:effectRef>
-            <a:fontRef idx="minor">
-              <a:schemeClr val="dk1"/>
-            </a:fontRef>
-          </p:style>
-          <p:txBody>
-            <a:bodyPr rtlCol="0" anchor="ctr"/>
-            <a:lstStyle/>
-            <a:p>
-              <a:pPr algn="ctr"/>
-              <a:r>
-                <a:rPr lang="en-US" sz="1000" dirty="0" smtClean="0"/>
-                <a:t>Learnability</a:t>
-              </a:r>
-              <a:endParaRPr lang="en-US" sz="1000" dirty="0"/>
-            </a:p>
-          </p:txBody>
-        </p:sp>
-        <p:sp>
-          <p:nvSpPr>
-            <p:cNvPr id="50" name="Rounded Rectangle 49"/>
-            <p:cNvSpPr/>
-            <p:nvPr/>
-          </p:nvSpPr>
-          <p:spPr>
-            <a:xfrm>
-              <a:off x="5415281" y="2142515"/>
-              <a:ext cx="1494679" cy="305726"/>
-            </a:xfrm>
-            <a:prstGeom prst="roundRect">
-              <a:avLst>
-                <a:gd name="adj" fmla="val 0"/>
-              </a:avLst>
-            </a:prstGeom>
-            <a:solidFill>
-              <a:schemeClr val="lt1"/>
-            </a:solidFill>
-            <a:ln w="12700"/>
-          </p:spPr>
-          <p:style>
-            <a:lnRef idx="2">
-              <a:schemeClr val="dk1"/>
-            </a:lnRef>
-            <a:fillRef idx="1">
-              <a:schemeClr val="lt1"/>
-            </a:fillRef>
-            <a:effectRef idx="0">
-              <a:schemeClr val="dk1"/>
-            </a:effectRef>
-            <a:fontRef idx="minor">
-              <a:schemeClr val="dk1"/>
-            </a:fontRef>
-          </p:style>
-          <p:txBody>
-            <a:bodyPr rtlCol="0" anchor="ctr"/>
-            <a:lstStyle/>
-            <a:p>
-              <a:pPr algn="ctr"/>
-              <a:r>
-                <a:rPr lang="en-US" sz="1000" dirty="0" smtClean="0"/>
-                <a:t>User interface aesthetics</a:t>
-              </a:r>
-              <a:endParaRPr lang="en-US" sz="1000" dirty="0"/>
-            </a:p>
-          </p:txBody>
-        </p:sp>
-        <p:sp>
-          <p:nvSpPr>
-            <p:cNvPr id="51" name="Rounded Rectangle 50"/>
-            <p:cNvSpPr/>
-            <p:nvPr/>
-          </p:nvSpPr>
-          <p:spPr>
-            <a:xfrm>
-              <a:off x="5344161" y="2925210"/>
-              <a:ext cx="2065978" cy="276861"/>
-            </a:xfrm>
-            <a:prstGeom prst="roundRect">
-              <a:avLst>
-                <a:gd name="adj" fmla="val 0"/>
-              </a:avLst>
-            </a:prstGeom>
-            <a:solidFill>
-              <a:schemeClr val="lt1"/>
-            </a:solidFill>
-            <a:ln w="12700"/>
-          </p:spPr>
-          <p:style>
-            <a:lnRef idx="2">
-              <a:schemeClr val="dk1"/>
-            </a:lnRef>
-            <a:fillRef idx="1">
-              <a:schemeClr val="lt1"/>
-            </a:fillRef>
-            <a:effectRef idx="0">
-              <a:schemeClr val="dk1"/>
-            </a:effectRef>
-            <a:fontRef idx="minor">
-              <a:schemeClr val="dk1"/>
-            </a:fontRef>
-          </p:style>
-          <p:txBody>
-            <a:bodyPr rtlCol="0" anchor="ctr"/>
-            <a:lstStyle/>
-            <a:p>
-              <a:pPr algn="ctr"/>
-              <a:r>
-                <a:rPr lang="en-US" sz="1000" dirty="0" smtClean="0"/>
-                <a:t>Responsiveness</a:t>
-              </a:r>
-              <a:endParaRPr lang="en-US" sz="1000" dirty="0"/>
-            </a:p>
-          </p:txBody>
-        </p:sp>
-        <p:sp>
-          <p:nvSpPr>
-            <p:cNvPr id="52" name="Rounded Rectangle 51"/>
-            <p:cNvSpPr/>
-            <p:nvPr/>
-          </p:nvSpPr>
-          <p:spPr>
-            <a:xfrm>
-              <a:off x="5313681" y="3685938"/>
-              <a:ext cx="1396998" cy="264160"/>
-            </a:xfrm>
-            <a:prstGeom prst="roundRect">
-              <a:avLst>
-                <a:gd name="adj" fmla="val 0"/>
-              </a:avLst>
-            </a:prstGeom>
-            <a:solidFill>
-              <a:schemeClr val="lt1"/>
-            </a:solidFill>
-            <a:ln w="12700"/>
-          </p:spPr>
-          <p:style>
-            <a:lnRef idx="2">
-              <a:schemeClr val="dk1"/>
-            </a:lnRef>
-            <a:fillRef idx="1">
-              <a:schemeClr val="lt1"/>
-            </a:fillRef>
-            <a:effectRef idx="0">
-              <a:schemeClr val="dk1"/>
-            </a:effectRef>
-            <a:fontRef idx="minor">
-              <a:schemeClr val="dk1"/>
-            </a:fontRef>
-          </p:style>
-          <p:txBody>
-            <a:bodyPr rtlCol="0" anchor="ctr"/>
-            <a:lstStyle/>
-            <a:p>
-              <a:pPr algn="ctr"/>
-              <a:r>
-                <a:rPr lang="en-US" sz="1000" dirty="0" smtClean="0"/>
-                <a:t>Time behavior</a:t>
-              </a:r>
-              <a:endParaRPr lang="en-US" sz="1000" dirty="0"/>
-            </a:p>
-          </p:txBody>
-        </p:sp>
-        <p:grpSp>
-          <p:nvGrpSpPr>
-            <p:cNvPr id="53" name="Group 52"/>
-            <p:cNvGrpSpPr/>
-            <p:nvPr/>
-          </p:nvGrpSpPr>
-          <p:grpSpPr>
-            <a:xfrm>
-              <a:off x="5318761" y="4193872"/>
-              <a:ext cx="1879598" cy="491491"/>
-              <a:chOff x="7721601" y="3576319"/>
-              <a:chExt cx="1859278" cy="491491"/>
-            </a:xfrm>
-          </p:grpSpPr>
-          <p:sp>
-            <p:nvSpPr>
-              <p:cNvPr id="54" name="Rounded Rectangle 53"/>
-              <p:cNvSpPr/>
-              <p:nvPr/>
-            </p:nvSpPr>
-            <p:spPr>
-              <a:xfrm>
-                <a:off x="7721601" y="3576319"/>
-                <a:ext cx="1859278" cy="260985"/>
-              </a:xfrm>
-              <a:prstGeom prst="roundRect">
-                <a:avLst>
-                  <a:gd name="adj" fmla="val 0"/>
-                </a:avLst>
-              </a:prstGeom>
-              <a:solidFill>
-                <a:schemeClr val="lt1"/>
-              </a:solidFill>
-              <a:ln w="12700"/>
-            </p:spPr>
-            <p:style>
-              <a:lnRef idx="2">
-                <a:schemeClr val="dk1"/>
-              </a:lnRef>
-              <a:fillRef idx="1">
-                <a:schemeClr val="lt1"/>
-              </a:fillRef>
-              <a:effectRef idx="0">
-                <a:schemeClr val="dk1"/>
-              </a:effectRef>
-              <a:fontRef idx="minor">
-                <a:schemeClr val="dk1"/>
-              </a:fontRef>
-            </p:style>
-            <p:txBody>
-              <a:bodyPr rtlCol="0" anchor="ctr"/>
-              <a:lstStyle/>
-              <a:p>
-                <a:pPr algn="ctr"/>
-                <a:r>
-                  <a:rPr lang="en-US" sz="1000" dirty="0" smtClean="0"/>
-                  <a:t>Transaction Capability</a:t>
-                </a:r>
-                <a:endParaRPr lang="en-US" sz="1000" dirty="0"/>
-              </a:p>
-            </p:txBody>
-          </p:sp>
-          <p:sp>
-            <p:nvSpPr>
-              <p:cNvPr id="55" name="Rounded Rectangle 54"/>
-              <p:cNvSpPr/>
-              <p:nvPr/>
-            </p:nvSpPr>
-            <p:spPr>
-              <a:xfrm>
-                <a:off x="7721601" y="3840480"/>
-                <a:ext cx="955039" cy="224154"/>
-              </a:xfrm>
-              <a:prstGeom prst="roundRect">
-                <a:avLst>
-                  <a:gd name="adj" fmla="val 0"/>
-                </a:avLst>
-              </a:prstGeom>
-              <a:solidFill>
-                <a:schemeClr val="lt1"/>
-              </a:solidFill>
-              <a:ln w="12700"/>
-            </p:spPr>
-            <p:style>
-              <a:lnRef idx="2">
-                <a:schemeClr val="dk1"/>
-              </a:lnRef>
-              <a:fillRef idx="1">
-                <a:schemeClr val="lt1"/>
-              </a:fillRef>
-              <a:effectRef idx="0">
-                <a:schemeClr val="dk1"/>
-              </a:effectRef>
-              <a:fontRef idx="minor">
-                <a:schemeClr val="dk1"/>
-              </a:fontRef>
-            </p:style>
-            <p:txBody>
-              <a:bodyPr rtlCol="0" anchor="ctr"/>
-              <a:lstStyle/>
-              <a:p>
-                <a:pPr algn="ctr"/>
-                <a:r>
-                  <a:rPr lang="en-US" sz="1000" dirty="0" smtClean="0"/>
-                  <a:t>Completeness</a:t>
-                </a:r>
-                <a:endParaRPr lang="en-US" sz="1000" dirty="0"/>
-              </a:p>
-            </p:txBody>
-          </p:sp>
-          <p:sp>
-            <p:nvSpPr>
-              <p:cNvPr id="56" name="Rounded Rectangle 55"/>
-              <p:cNvSpPr/>
-              <p:nvPr/>
-            </p:nvSpPr>
-            <p:spPr>
-              <a:xfrm>
-                <a:off x="8676640" y="3840480"/>
-                <a:ext cx="904239" cy="227330"/>
-              </a:xfrm>
-              <a:prstGeom prst="roundRect">
-                <a:avLst>
-                  <a:gd name="adj" fmla="val 0"/>
-                </a:avLst>
-              </a:prstGeom>
-              <a:solidFill>
-                <a:schemeClr val="lt1"/>
-              </a:solidFill>
-              <a:ln w="12700"/>
-            </p:spPr>
-            <p:style>
-              <a:lnRef idx="2">
-                <a:schemeClr val="dk1"/>
-              </a:lnRef>
-              <a:fillRef idx="1">
-                <a:schemeClr val="lt1"/>
-              </a:fillRef>
-              <a:effectRef idx="0">
-                <a:schemeClr val="dk1"/>
-              </a:effectRef>
-              <a:fontRef idx="minor">
-                <a:schemeClr val="dk1"/>
-              </a:fontRef>
-            </p:style>
-            <p:txBody>
-              <a:bodyPr rtlCol="0" anchor="ctr"/>
-              <a:lstStyle/>
-              <a:p>
-                <a:pPr algn="ctr"/>
-                <a:r>
-                  <a:rPr lang="en-US" sz="1000" dirty="0" smtClean="0"/>
-                  <a:t>Correctness</a:t>
-                </a:r>
-                <a:endParaRPr lang="en-US" sz="1000" dirty="0"/>
-              </a:p>
-            </p:txBody>
-          </p:sp>
-        </p:grpSp>
-        <p:sp>
-          <p:nvSpPr>
-            <p:cNvPr id="57" name="Rounded Rectangle 56"/>
-            <p:cNvSpPr/>
-            <p:nvPr/>
-          </p:nvSpPr>
-          <p:spPr>
-            <a:xfrm>
-              <a:off x="5344161" y="2578500"/>
-              <a:ext cx="1851659" cy="254000"/>
-            </a:xfrm>
-            <a:prstGeom prst="roundRect">
-              <a:avLst>
-                <a:gd name="adj" fmla="val 0"/>
-              </a:avLst>
-            </a:prstGeom>
-            <a:solidFill>
-              <a:schemeClr val="lt1"/>
-            </a:solidFill>
-            <a:ln w="12700"/>
-          </p:spPr>
-          <p:style>
-            <a:lnRef idx="2">
-              <a:schemeClr val="dk1"/>
-            </a:lnRef>
-            <a:fillRef idx="1">
-              <a:schemeClr val="lt1"/>
-            </a:fillRef>
-            <a:effectRef idx="0">
-              <a:schemeClr val="dk1"/>
-            </a:effectRef>
-            <a:fontRef idx="minor">
-              <a:schemeClr val="dk1"/>
-            </a:fontRef>
-          </p:style>
-          <p:txBody>
-            <a:bodyPr rtlCol="0" anchor="ctr"/>
-            <a:lstStyle/>
-            <a:p>
-              <a:pPr algn="ctr"/>
-              <a:r>
-                <a:rPr lang="en-US" sz="1000" dirty="0" smtClean="0"/>
-                <a:t>Fault Tolerance</a:t>
-              </a:r>
-              <a:endParaRPr lang="en-US" sz="1000" dirty="0"/>
-            </a:p>
-          </p:txBody>
-        </p:sp>
-        <p:sp>
-          <p:nvSpPr>
-            <p:cNvPr id="58" name="Rounded Rectangle 57"/>
-            <p:cNvSpPr/>
-            <p:nvPr/>
-          </p:nvSpPr>
-          <p:spPr>
-            <a:xfrm>
-              <a:off x="5328922" y="3322085"/>
-              <a:ext cx="1178560" cy="227330"/>
-            </a:xfrm>
-            <a:prstGeom prst="roundRect">
-              <a:avLst>
-                <a:gd name="adj" fmla="val 0"/>
-              </a:avLst>
-            </a:prstGeom>
-            <a:solidFill>
-              <a:schemeClr val="lt1"/>
-            </a:solidFill>
-            <a:ln w="12700"/>
-          </p:spPr>
-          <p:style>
-            <a:lnRef idx="2">
-              <a:schemeClr val="dk1"/>
-            </a:lnRef>
-            <a:fillRef idx="1">
-              <a:schemeClr val="lt1"/>
-            </a:fillRef>
-            <a:effectRef idx="0">
-              <a:schemeClr val="dk1"/>
-            </a:effectRef>
-            <a:fontRef idx="minor">
-              <a:schemeClr val="dk1"/>
-            </a:fontRef>
-          </p:style>
-          <p:txBody>
-            <a:bodyPr rtlCol="0" anchor="ctr"/>
-            <a:lstStyle/>
-            <a:p>
-              <a:pPr algn="ctr"/>
-              <a:r>
-                <a:rPr lang="en-US" sz="1000" dirty="0" smtClean="0"/>
-                <a:t>Customer Service</a:t>
-              </a:r>
-              <a:endParaRPr lang="en-US" sz="1000" dirty="0"/>
-            </a:p>
-          </p:txBody>
-        </p:sp>
-        <p:sp>
-          <p:nvSpPr>
-            <p:cNvPr id="59" name="Rounded Rectangle 58"/>
-            <p:cNvSpPr/>
-            <p:nvPr/>
-          </p:nvSpPr>
-          <p:spPr>
-            <a:xfrm>
-              <a:off x="5372166" y="6084747"/>
-              <a:ext cx="1011197" cy="240573"/>
-            </a:xfrm>
-            <a:prstGeom prst="roundRect">
-              <a:avLst>
-                <a:gd name="adj" fmla="val 0"/>
-              </a:avLst>
-            </a:prstGeom>
-            <a:solidFill>
-              <a:schemeClr val="lt1"/>
-            </a:solidFill>
-            <a:ln w="12700"/>
-          </p:spPr>
-          <p:style>
-            <a:lnRef idx="2">
-              <a:schemeClr val="dk1"/>
-            </a:lnRef>
-            <a:fillRef idx="1">
-              <a:schemeClr val="lt1"/>
-            </a:fillRef>
-            <a:effectRef idx="0">
-              <a:schemeClr val="dk1"/>
-            </a:effectRef>
-            <a:fontRef idx="minor">
-              <a:schemeClr val="dk1"/>
-            </a:fontRef>
-          </p:style>
-          <p:txBody>
-            <a:bodyPr rtlCol="0" anchor="ctr"/>
-            <a:lstStyle/>
-            <a:p>
-              <a:pPr algn="ctr"/>
-              <a:r>
-                <a:rPr lang="en-US" sz="1000" dirty="0" smtClean="0"/>
-                <a:t>Confidentiality</a:t>
-              </a:r>
-              <a:endParaRPr lang="en-US" sz="1000" dirty="0"/>
-            </a:p>
-          </p:txBody>
-        </p:sp>
-        <p:sp>
-          <p:nvSpPr>
-            <p:cNvPr id="60" name="Rounded Rectangle 59"/>
-            <p:cNvSpPr/>
-            <p:nvPr/>
-          </p:nvSpPr>
-          <p:spPr>
-            <a:xfrm>
-              <a:off x="5369626" y="4858588"/>
-              <a:ext cx="2098997" cy="227330"/>
-            </a:xfrm>
-            <a:prstGeom prst="roundRect">
-              <a:avLst>
-                <a:gd name="adj" fmla="val 0"/>
-              </a:avLst>
-            </a:prstGeom>
-            <a:solidFill>
-              <a:schemeClr val="lt1"/>
-            </a:solidFill>
-            <a:ln w="12700"/>
-          </p:spPr>
-          <p:style>
-            <a:lnRef idx="2">
-              <a:schemeClr val="dk1"/>
-            </a:lnRef>
-            <a:fillRef idx="1">
-              <a:schemeClr val="lt1"/>
-            </a:fillRef>
-            <a:effectRef idx="0">
-              <a:schemeClr val="dk1"/>
-            </a:effectRef>
-            <a:fontRef idx="minor">
-              <a:schemeClr val="dk1"/>
-            </a:fontRef>
-          </p:style>
-          <p:txBody>
-            <a:bodyPr rtlCol="0" anchor="ctr"/>
-            <a:lstStyle/>
-            <a:p>
-              <a:pPr algn="ctr"/>
-              <a:r>
-                <a:rPr lang="en-US" sz="1000" dirty="0" smtClean="0"/>
-                <a:t>Safety</a:t>
-              </a:r>
-              <a:endParaRPr lang="en-US" sz="1000" dirty="0"/>
-            </a:p>
-          </p:txBody>
-        </p:sp>
-        <p:sp>
-          <p:nvSpPr>
-            <p:cNvPr id="61" name="Rounded Rectangle 60"/>
-            <p:cNvSpPr/>
-            <p:nvPr/>
-          </p:nvSpPr>
-          <p:spPr>
-            <a:xfrm>
-              <a:off x="5382326" y="5781570"/>
-              <a:ext cx="1001037" cy="227330"/>
-            </a:xfrm>
-            <a:prstGeom prst="roundRect">
-              <a:avLst>
-                <a:gd name="adj" fmla="val 0"/>
-              </a:avLst>
-            </a:prstGeom>
-            <a:solidFill>
-              <a:schemeClr val="lt1"/>
-            </a:solidFill>
-            <a:ln w="12700"/>
-          </p:spPr>
-          <p:style>
-            <a:lnRef idx="2">
-              <a:schemeClr val="dk1"/>
-            </a:lnRef>
-            <a:fillRef idx="1">
-              <a:schemeClr val="lt1"/>
-            </a:fillRef>
-            <a:effectRef idx="0">
-              <a:schemeClr val="dk1"/>
-            </a:effectRef>
-            <a:fontRef idx="minor">
-              <a:schemeClr val="dk1"/>
-            </a:fontRef>
-          </p:style>
-          <p:txBody>
-            <a:bodyPr rtlCol="0" anchor="ctr"/>
-            <a:lstStyle/>
-            <a:p>
-              <a:pPr algn="ctr"/>
-              <a:r>
-                <a:rPr lang="en-US" sz="1000" dirty="0" smtClean="0"/>
-                <a:t>Integrity</a:t>
-              </a:r>
-              <a:endParaRPr lang="en-US" sz="1000" dirty="0"/>
-            </a:p>
-          </p:txBody>
-        </p:sp>
-        <p:sp>
-          <p:nvSpPr>
-            <p:cNvPr id="62" name="Rounded Rectangle 61"/>
-            <p:cNvSpPr/>
-            <p:nvPr/>
-          </p:nvSpPr>
-          <p:spPr>
-            <a:xfrm>
-              <a:off x="5377524" y="5195136"/>
-              <a:ext cx="1005839" cy="227330"/>
-            </a:xfrm>
-            <a:prstGeom prst="roundRect">
-              <a:avLst>
-                <a:gd name="adj" fmla="val 0"/>
-              </a:avLst>
-            </a:prstGeom>
-            <a:solidFill>
-              <a:schemeClr val="lt1"/>
-            </a:solidFill>
-            <a:ln w="12700"/>
-          </p:spPr>
-          <p:style>
-            <a:lnRef idx="2">
-              <a:schemeClr val="dk1"/>
-            </a:lnRef>
-            <a:fillRef idx="1">
-              <a:schemeClr val="lt1"/>
-            </a:fillRef>
-            <a:effectRef idx="0">
-              <a:schemeClr val="dk1"/>
-            </a:effectRef>
-            <a:fontRef idx="minor">
-              <a:schemeClr val="dk1"/>
-            </a:fontRef>
-          </p:style>
-          <p:txBody>
-            <a:bodyPr rtlCol="0" anchor="ctr"/>
-            <a:lstStyle/>
-            <a:p>
-              <a:pPr algn="ctr"/>
-              <a:r>
-                <a:rPr lang="en-US" sz="1000" dirty="0" smtClean="0"/>
-                <a:t>Authenticity</a:t>
-              </a:r>
-              <a:endParaRPr lang="en-US" sz="1000" dirty="0"/>
-            </a:p>
-          </p:txBody>
-        </p:sp>
-        <p:cxnSp>
-          <p:nvCxnSpPr>
-            <p:cNvPr id="63" name="Straight Connector 62"/>
-            <p:cNvCxnSpPr>
-              <a:stCxn id="46" idx="1"/>
-              <a:endCxn id="41" idx="3"/>
-            </p:cNvCxnSpPr>
-            <p:nvPr/>
-          </p:nvCxnSpPr>
-          <p:spPr>
-            <a:xfrm flipH="1">
-              <a:off x="4897118" y="303530"/>
-              <a:ext cx="589283" cy="337185"/>
-            </a:xfrm>
-            <a:prstGeom prst="line">
-              <a:avLst/>
-            </a:prstGeom>
-          </p:spPr>
-          <p:style>
-            <a:lnRef idx="1">
-              <a:schemeClr val="dk1"/>
-            </a:lnRef>
-            <a:fillRef idx="0">
-              <a:schemeClr val="dk1"/>
-            </a:fillRef>
-            <a:effectRef idx="0">
-              <a:schemeClr val="dk1"/>
-            </a:effectRef>
-            <a:fontRef idx="minor">
-              <a:schemeClr val="tx1"/>
-            </a:fontRef>
-          </p:style>
-        </p:cxnSp>
-        <p:cxnSp>
-          <p:nvCxnSpPr>
-            <p:cNvPr id="64" name="Straight Connector 63"/>
-            <p:cNvCxnSpPr>
-              <a:stCxn id="47" idx="1"/>
-              <a:endCxn id="41" idx="3"/>
-            </p:cNvCxnSpPr>
-            <p:nvPr/>
-          </p:nvCxnSpPr>
-          <p:spPr>
-            <a:xfrm flipH="1" flipV="1">
-              <a:off x="4897118" y="640715"/>
-              <a:ext cx="579123" cy="4445"/>
-            </a:xfrm>
-            <a:prstGeom prst="line">
-              <a:avLst/>
-            </a:prstGeom>
-          </p:spPr>
-          <p:style>
-            <a:lnRef idx="1">
-              <a:schemeClr val="dk1"/>
-            </a:lnRef>
-            <a:fillRef idx="0">
-              <a:schemeClr val="dk1"/>
-            </a:fillRef>
-            <a:effectRef idx="0">
-              <a:schemeClr val="dk1"/>
-            </a:effectRef>
-            <a:fontRef idx="minor">
-              <a:schemeClr val="tx1"/>
-            </a:fontRef>
-          </p:style>
-        </p:cxnSp>
-        <p:cxnSp>
-          <p:nvCxnSpPr>
-            <p:cNvPr id="65" name="Straight Connector 64"/>
-            <p:cNvCxnSpPr>
-              <a:stCxn id="45" idx="1"/>
-              <a:endCxn id="41" idx="3"/>
-            </p:cNvCxnSpPr>
-            <p:nvPr/>
-          </p:nvCxnSpPr>
-          <p:spPr>
-            <a:xfrm flipH="1" flipV="1">
-              <a:off x="4897118" y="640715"/>
-              <a:ext cx="589283" cy="369752"/>
-            </a:xfrm>
-            <a:prstGeom prst="line">
-              <a:avLst/>
-            </a:prstGeom>
-          </p:spPr>
-          <p:style>
-            <a:lnRef idx="1">
-              <a:schemeClr val="dk1"/>
-            </a:lnRef>
-            <a:fillRef idx="0">
-              <a:schemeClr val="dk1"/>
-            </a:fillRef>
-            <a:effectRef idx="0">
-              <a:schemeClr val="dk1"/>
-            </a:effectRef>
-            <a:fontRef idx="minor">
-              <a:schemeClr val="tx1"/>
-            </a:fontRef>
-          </p:style>
-        </p:cxnSp>
-        <p:cxnSp>
-          <p:nvCxnSpPr>
-            <p:cNvPr id="66" name="Straight Connector 65"/>
-            <p:cNvCxnSpPr>
-              <a:stCxn id="48" idx="1"/>
-              <a:endCxn id="42" idx="3"/>
-            </p:cNvCxnSpPr>
-            <p:nvPr/>
-          </p:nvCxnSpPr>
-          <p:spPr>
-            <a:xfrm flipH="1">
-              <a:off x="4825999" y="1524661"/>
-              <a:ext cx="589282" cy="380999"/>
-            </a:xfrm>
-            <a:prstGeom prst="line">
-              <a:avLst/>
-            </a:prstGeom>
-          </p:spPr>
-          <p:style>
-            <a:lnRef idx="1">
-              <a:schemeClr val="dk1"/>
-            </a:lnRef>
-            <a:fillRef idx="0">
-              <a:schemeClr val="dk1"/>
-            </a:fillRef>
-            <a:effectRef idx="0">
-              <a:schemeClr val="dk1"/>
-            </a:effectRef>
-            <a:fontRef idx="minor">
-              <a:schemeClr val="tx1"/>
-            </a:fontRef>
-          </p:style>
-        </p:cxnSp>
-        <p:cxnSp>
-          <p:nvCxnSpPr>
-            <p:cNvPr id="67" name="Straight Connector 66"/>
-            <p:cNvCxnSpPr>
-              <a:stCxn id="49" idx="1"/>
-              <a:endCxn id="42" idx="3"/>
-            </p:cNvCxnSpPr>
-            <p:nvPr/>
-          </p:nvCxnSpPr>
-          <p:spPr>
-            <a:xfrm flipH="1">
-              <a:off x="4825999" y="1890709"/>
-              <a:ext cx="589282" cy="14951"/>
-            </a:xfrm>
-            <a:prstGeom prst="line">
-              <a:avLst/>
-            </a:prstGeom>
-          </p:spPr>
-          <p:style>
-            <a:lnRef idx="1">
-              <a:schemeClr val="dk1"/>
-            </a:lnRef>
-            <a:fillRef idx="0">
-              <a:schemeClr val="dk1"/>
-            </a:fillRef>
-            <a:effectRef idx="0">
-              <a:schemeClr val="dk1"/>
-            </a:effectRef>
-            <a:fontRef idx="minor">
-              <a:schemeClr val="tx1"/>
-            </a:fontRef>
-          </p:style>
-        </p:cxnSp>
-        <p:cxnSp>
-          <p:nvCxnSpPr>
-            <p:cNvPr id="68" name="Straight Connector 67"/>
-            <p:cNvCxnSpPr>
-              <a:stCxn id="51" idx="1"/>
-              <a:endCxn id="43" idx="3"/>
-            </p:cNvCxnSpPr>
-            <p:nvPr/>
-          </p:nvCxnSpPr>
-          <p:spPr>
-            <a:xfrm flipH="1">
-              <a:off x="4825999" y="3063641"/>
-              <a:ext cx="518162" cy="350171"/>
-            </a:xfrm>
-            <a:prstGeom prst="line">
-              <a:avLst/>
-            </a:prstGeom>
-          </p:spPr>
-          <p:style>
-            <a:lnRef idx="1">
-              <a:schemeClr val="dk1"/>
-            </a:lnRef>
-            <a:fillRef idx="0">
-              <a:schemeClr val="dk1"/>
-            </a:fillRef>
-            <a:effectRef idx="0">
-              <a:schemeClr val="dk1"/>
-            </a:effectRef>
-            <a:fontRef idx="minor">
-              <a:schemeClr val="tx1"/>
-            </a:fontRef>
-          </p:style>
-        </p:cxnSp>
-        <p:cxnSp>
-          <p:nvCxnSpPr>
-            <p:cNvPr id="73" name="Straight Connector 72"/>
-            <p:cNvCxnSpPr>
-              <a:stCxn id="57" idx="1"/>
-              <a:endCxn id="43" idx="3"/>
-            </p:cNvCxnSpPr>
-            <p:nvPr/>
-          </p:nvCxnSpPr>
-          <p:spPr>
-            <a:xfrm flipH="1">
-              <a:off x="4825999" y="2705500"/>
-              <a:ext cx="518162" cy="708312"/>
-            </a:xfrm>
-            <a:prstGeom prst="line">
-              <a:avLst/>
-            </a:prstGeom>
-          </p:spPr>
-          <p:style>
-            <a:lnRef idx="1">
-              <a:schemeClr val="dk1"/>
-            </a:lnRef>
-            <a:fillRef idx="0">
-              <a:schemeClr val="dk1"/>
-            </a:fillRef>
-            <a:effectRef idx="0">
-              <a:schemeClr val="dk1"/>
-            </a:effectRef>
-            <a:fontRef idx="minor">
-              <a:schemeClr val="tx1"/>
-            </a:fontRef>
-          </p:style>
-        </p:cxnSp>
-        <p:cxnSp>
-          <p:nvCxnSpPr>
-            <p:cNvPr id="74" name="Straight Connector 73"/>
-            <p:cNvCxnSpPr>
-              <a:stCxn id="52" idx="1"/>
-              <a:endCxn id="43" idx="3"/>
-            </p:cNvCxnSpPr>
-            <p:nvPr/>
-          </p:nvCxnSpPr>
-          <p:spPr>
-            <a:xfrm flipH="1" flipV="1">
-              <a:off x="4825999" y="3413812"/>
-              <a:ext cx="487682" cy="404206"/>
-            </a:xfrm>
-            <a:prstGeom prst="line">
-              <a:avLst/>
-            </a:prstGeom>
-          </p:spPr>
-          <p:style>
-            <a:lnRef idx="1">
-              <a:schemeClr val="dk1"/>
-            </a:lnRef>
-            <a:fillRef idx="0">
-              <a:schemeClr val="dk1"/>
-            </a:fillRef>
-            <a:effectRef idx="0">
-              <a:schemeClr val="dk1"/>
-            </a:effectRef>
-            <a:fontRef idx="minor">
-              <a:schemeClr val="tx1"/>
-            </a:fontRef>
-          </p:style>
-        </p:cxnSp>
-        <p:cxnSp>
-          <p:nvCxnSpPr>
-            <p:cNvPr id="76" name="Straight Connector 75"/>
-            <p:cNvCxnSpPr>
-              <a:stCxn id="58" idx="1"/>
-              <a:endCxn id="43" idx="3"/>
-            </p:cNvCxnSpPr>
-            <p:nvPr/>
-          </p:nvCxnSpPr>
-          <p:spPr>
-            <a:xfrm flipH="1" flipV="1">
-              <a:off x="4825999" y="3413812"/>
-              <a:ext cx="502923" cy="21938"/>
-            </a:xfrm>
-            <a:prstGeom prst="line">
-              <a:avLst/>
-            </a:prstGeom>
-          </p:spPr>
-          <p:style>
-            <a:lnRef idx="1">
-              <a:schemeClr val="dk1"/>
-            </a:lnRef>
-            <a:fillRef idx="0">
-              <a:schemeClr val="dk1"/>
-            </a:fillRef>
-            <a:effectRef idx="0">
-              <a:schemeClr val="dk1"/>
-            </a:effectRef>
-            <a:fontRef idx="minor">
-              <a:schemeClr val="tx1"/>
-            </a:fontRef>
-          </p:style>
-        </p:cxnSp>
-        <p:cxnSp>
-          <p:nvCxnSpPr>
-            <p:cNvPr id="77" name="Straight Connector 76"/>
-            <p:cNvCxnSpPr>
-              <a:stCxn id="54" idx="1"/>
-              <a:endCxn id="43" idx="3"/>
-            </p:cNvCxnSpPr>
-            <p:nvPr/>
-          </p:nvCxnSpPr>
-          <p:spPr>
-            <a:xfrm flipH="1" flipV="1">
-              <a:off x="4825999" y="3413812"/>
-              <a:ext cx="492762" cy="910553"/>
-            </a:xfrm>
-            <a:prstGeom prst="line">
-              <a:avLst/>
-            </a:prstGeom>
-          </p:spPr>
-          <p:style>
-            <a:lnRef idx="1">
-              <a:schemeClr val="dk1"/>
-            </a:lnRef>
-            <a:fillRef idx="0">
-              <a:schemeClr val="dk1"/>
-            </a:fillRef>
-            <a:effectRef idx="0">
-              <a:schemeClr val="dk1"/>
-            </a:effectRef>
-            <a:fontRef idx="minor">
-              <a:schemeClr val="tx1"/>
-            </a:fontRef>
-          </p:style>
-        </p:cxnSp>
-        <p:cxnSp>
-          <p:nvCxnSpPr>
-            <p:cNvPr id="81" name="Straight Connector 80"/>
-            <p:cNvCxnSpPr>
-              <a:stCxn id="50" idx="1"/>
-              <a:endCxn id="42" idx="3"/>
-            </p:cNvCxnSpPr>
-            <p:nvPr/>
-          </p:nvCxnSpPr>
-          <p:spPr>
-            <a:xfrm flipH="1" flipV="1">
-              <a:off x="4825999" y="1905660"/>
-              <a:ext cx="589282" cy="389718"/>
-            </a:xfrm>
-            <a:prstGeom prst="line">
-              <a:avLst/>
-            </a:prstGeom>
-          </p:spPr>
-          <p:style>
-            <a:lnRef idx="1">
-              <a:schemeClr val="dk1"/>
-            </a:lnRef>
-            <a:fillRef idx="0">
-              <a:schemeClr val="dk1"/>
-            </a:fillRef>
-            <a:effectRef idx="0">
-              <a:schemeClr val="dk1"/>
-            </a:effectRef>
-            <a:fontRef idx="minor">
-              <a:schemeClr val="tx1"/>
-            </a:fontRef>
-          </p:style>
-        </p:cxnSp>
-        <p:cxnSp>
-          <p:nvCxnSpPr>
-            <p:cNvPr id="86" name="Straight Connector 85"/>
-            <p:cNvCxnSpPr>
-              <a:stCxn id="60" idx="1"/>
-              <a:endCxn id="44" idx="3"/>
-            </p:cNvCxnSpPr>
-            <p:nvPr/>
-          </p:nvCxnSpPr>
-          <p:spPr>
-            <a:xfrm flipH="1">
-              <a:off x="4825999" y="4972253"/>
-              <a:ext cx="543627" cy="631094"/>
-            </a:xfrm>
-            <a:prstGeom prst="line">
-              <a:avLst/>
-            </a:prstGeom>
-          </p:spPr>
-          <p:style>
-            <a:lnRef idx="1">
-              <a:schemeClr val="dk1"/>
-            </a:lnRef>
-            <a:fillRef idx="0">
-              <a:schemeClr val="dk1"/>
-            </a:fillRef>
-            <a:effectRef idx="0">
-              <a:schemeClr val="dk1"/>
-            </a:effectRef>
-            <a:fontRef idx="minor">
-              <a:schemeClr val="tx1"/>
-            </a:fontRef>
-          </p:style>
-        </p:cxnSp>
-        <p:cxnSp>
-          <p:nvCxnSpPr>
-            <p:cNvPr id="87" name="Straight Connector 86"/>
-            <p:cNvCxnSpPr>
-              <a:stCxn id="61" idx="1"/>
-              <a:endCxn id="44" idx="3"/>
-            </p:cNvCxnSpPr>
-            <p:nvPr/>
-          </p:nvCxnSpPr>
-          <p:spPr>
-            <a:xfrm flipH="1" flipV="1">
-              <a:off x="4825999" y="5603347"/>
-              <a:ext cx="556327" cy="291888"/>
-            </a:xfrm>
-            <a:prstGeom prst="line">
-              <a:avLst/>
-            </a:prstGeom>
-          </p:spPr>
-          <p:style>
-            <a:lnRef idx="1">
-              <a:schemeClr val="dk1"/>
-            </a:lnRef>
-            <a:fillRef idx="0">
-              <a:schemeClr val="dk1"/>
-            </a:fillRef>
-            <a:effectRef idx="0">
-              <a:schemeClr val="dk1"/>
-            </a:effectRef>
-            <a:fontRef idx="minor">
-              <a:schemeClr val="tx1"/>
-            </a:fontRef>
-          </p:style>
-        </p:cxnSp>
-        <p:cxnSp>
-          <p:nvCxnSpPr>
-            <p:cNvPr id="88" name="Straight Connector 87"/>
-            <p:cNvCxnSpPr>
-              <a:stCxn id="59" idx="1"/>
-              <a:endCxn id="44" idx="3"/>
-            </p:cNvCxnSpPr>
-            <p:nvPr/>
-          </p:nvCxnSpPr>
-          <p:spPr>
-            <a:xfrm flipH="1" flipV="1">
-              <a:off x="4825999" y="5603347"/>
-              <a:ext cx="546167" cy="601687"/>
-            </a:xfrm>
-            <a:prstGeom prst="line">
-              <a:avLst/>
-            </a:prstGeom>
-          </p:spPr>
-          <p:style>
-            <a:lnRef idx="1">
-              <a:schemeClr val="dk1"/>
-            </a:lnRef>
-            <a:fillRef idx="0">
-              <a:schemeClr val="dk1"/>
-            </a:fillRef>
-            <a:effectRef idx="0">
-              <a:schemeClr val="dk1"/>
-            </a:effectRef>
-            <a:fontRef idx="minor">
-              <a:schemeClr val="tx1"/>
-            </a:fontRef>
-          </p:style>
-        </p:cxnSp>
-        <p:cxnSp>
-          <p:nvCxnSpPr>
-            <p:cNvPr id="89" name="Straight Connector 88"/>
-            <p:cNvCxnSpPr>
-              <a:stCxn id="92" idx="1"/>
-              <a:endCxn id="44" idx="3"/>
-            </p:cNvCxnSpPr>
-            <p:nvPr/>
-          </p:nvCxnSpPr>
-          <p:spPr>
-            <a:xfrm flipH="1">
-              <a:off x="4825999" y="5603347"/>
-              <a:ext cx="561408" cy="0"/>
-            </a:xfrm>
-            <a:prstGeom prst="line">
-              <a:avLst/>
-            </a:prstGeom>
-          </p:spPr>
-          <p:style>
-            <a:lnRef idx="1">
-              <a:schemeClr val="dk1"/>
-            </a:lnRef>
-            <a:fillRef idx="0">
-              <a:schemeClr val="dk1"/>
-            </a:fillRef>
-            <a:effectRef idx="0">
-              <a:schemeClr val="dk1"/>
-            </a:effectRef>
-            <a:fontRef idx="minor">
-              <a:schemeClr val="tx1"/>
-            </a:fontRef>
-          </p:style>
-        </p:cxnSp>
-        <p:sp>
-          <p:nvSpPr>
-            <p:cNvPr id="92" name="Rounded Rectangle 91"/>
-            <p:cNvSpPr/>
-            <p:nvPr/>
-          </p:nvSpPr>
-          <p:spPr>
-            <a:xfrm>
-              <a:off x="5387407" y="5493707"/>
-              <a:ext cx="993917" cy="219279"/>
-            </a:xfrm>
-            <a:prstGeom prst="roundRect">
-              <a:avLst>
-                <a:gd name="adj" fmla="val 0"/>
-              </a:avLst>
-            </a:prstGeom>
-            <a:solidFill>
-              <a:schemeClr val="lt1"/>
-            </a:solidFill>
-            <a:ln w="12700"/>
-          </p:spPr>
-          <p:style>
-            <a:lnRef idx="2">
-              <a:schemeClr val="dk1"/>
-            </a:lnRef>
-            <a:fillRef idx="1">
-              <a:schemeClr val="lt1"/>
-            </a:fillRef>
-            <a:effectRef idx="0">
-              <a:schemeClr val="dk1"/>
-            </a:effectRef>
-            <a:fontRef idx="minor">
-              <a:schemeClr val="dk1"/>
-            </a:fontRef>
-          </p:style>
-          <p:txBody>
-            <a:bodyPr rtlCol="0" anchor="ctr"/>
-            <a:lstStyle/>
-            <a:p>
-              <a:pPr algn="ctr"/>
-              <a:r>
-                <a:rPr lang="en-US" sz="1000" dirty="0" smtClean="0"/>
-                <a:t>Privacy</a:t>
+                <a:t>Correctness</a:t>
               </a:r>
               <a:endParaRPr lang="en-US" sz="1000" dirty="0"/>
             </a:p>
           </p:txBody>
         </p:sp>
       </p:grpSp>
+      <p:sp>
+        <p:nvSpPr>
+          <p:cNvPr id="57" name="Rounded Rectangle 56"/>
+          <p:cNvSpPr/>
+          <p:nvPr/>
+        </p:nvSpPr>
+        <p:spPr>
+          <a:xfrm>
+            <a:off x="5508785" y="1389409"/>
+            <a:ext cx="1851659" cy="254000"/>
+          </a:xfrm>
+          <a:prstGeom prst="roundRect">
+            <a:avLst>
+              <a:gd name="adj" fmla="val 0"/>
+            </a:avLst>
+          </a:prstGeom>
+          <a:solidFill>
+            <a:schemeClr val="lt1"/>
+          </a:solidFill>
+          <a:ln w="12700"/>
+        </p:spPr>
+        <p:style>
+          <a:lnRef idx="2">
+            <a:schemeClr val="dk1"/>
+          </a:lnRef>
+          <a:fillRef idx="1">
+            <a:schemeClr val="lt1"/>
+          </a:fillRef>
+          <a:effectRef idx="0">
+            <a:schemeClr val="dk1"/>
+          </a:effectRef>
+          <a:fontRef idx="minor">
+            <a:schemeClr val="dk1"/>
+          </a:fontRef>
+        </p:style>
+        <p:txBody>
+          <a:bodyPr rtlCol="0" anchor="ctr"/>
+          <a:lstStyle/>
+          <a:p>
+            <a:pPr algn="ctr"/>
+            <a:r>
+              <a:rPr lang="en-US" sz="1000" dirty="0" smtClean="0"/>
+              <a:t>Fault Tolerance</a:t>
+            </a:r>
+            <a:endParaRPr lang="en-US" sz="1000" dirty="0"/>
+          </a:p>
+        </p:txBody>
+      </p:sp>
+      <p:sp>
+        <p:nvSpPr>
+          <p:cNvPr id="58" name="Rounded Rectangle 57"/>
+          <p:cNvSpPr/>
+          <p:nvPr/>
+        </p:nvSpPr>
+        <p:spPr>
+          <a:xfrm>
+            <a:off x="5493546" y="2132994"/>
+            <a:ext cx="1178560" cy="227330"/>
+          </a:xfrm>
+          <a:prstGeom prst="roundRect">
+            <a:avLst>
+              <a:gd name="adj" fmla="val 0"/>
+            </a:avLst>
+          </a:prstGeom>
+          <a:solidFill>
+            <a:schemeClr val="lt1"/>
+          </a:solidFill>
+          <a:ln w="12700"/>
+        </p:spPr>
+        <p:style>
+          <a:lnRef idx="2">
+            <a:schemeClr val="dk1"/>
+          </a:lnRef>
+          <a:fillRef idx="1">
+            <a:schemeClr val="lt1"/>
+          </a:fillRef>
+          <a:effectRef idx="0">
+            <a:schemeClr val="dk1"/>
+          </a:effectRef>
+          <a:fontRef idx="minor">
+            <a:schemeClr val="dk1"/>
+          </a:fontRef>
+        </p:style>
+        <p:txBody>
+          <a:bodyPr rtlCol="0" anchor="ctr"/>
+          <a:lstStyle/>
+          <a:p>
+            <a:pPr algn="ctr"/>
+            <a:r>
+              <a:rPr lang="en-US" sz="1000" dirty="0" smtClean="0"/>
+              <a:t>Customer Service</a:t>
+            </a:r>
+            <a:endParaRPr lang="en-US" sz="1000" dirty="0"/>
+          </a:p>
+        </p:txBody>
+      </p:sp>
+      <p:sp>
+        <p:nvSpPr>
+          <p:cNvPr id="59" name="Rounded Rectangle 58"/>
+          <p:cNvSpPr/>
+          <p:nvPr/>
+        </p:nvSpPr>
+        <p:spPr>
+          <a:xfrm>
+            <a:off x="5536790" y="4895656"/>
+            <a:ext cx="1011197" cy="240573"/>
+          </a:xfrm>
+          <a:prstGeom prst="roundRect">
+            <a:avLst>
+              <a:gd name="adj" fmla="val 0"/>
+            </a:avLst>
+          </a:prstGeom>
+          <a:solidFill>
+            <a:schemeClr val="lt1"/>
+          </a:solidFill>
+          <a:ln w="12700"/>
+        </p:spPr>
+        <p:style>
+          <a:lnRef idx="2">
+            <a:schemeClr val="dk1"/>
+          </a:lnRef>
+          <a:fillRef idx="1">
+            <a:schemeClr val="lt1"/>
+          </a:fillRef>
+          <a:effectRef idx="0">
+            <a:schemeClr val="dk1"/>
+          </a:effectRef>
+          <a:fontRef idx="minor">
+            <a:schemeClr val="dk1"/>
+          </a:fontRef>
+        </p:style>
+        <p:txBody>
+          <a:bodyPr rtlCol="0" anchor="ctr"/>
+          <a:lstStyle/>
+          <a:p>
+            <a:pPr algn="ctr"/>
+            <a:r>
+              <a:rPr lang="en-US" sz="1000" dirty="0" smtClean="0"/>
+              <a:t>Confidentiality</a:t>
+            </a:r>
+            <a:endParaRPr lang="en-US" sz="1000" dirty="0"/>
+          </a:p>
+        </p:txBody>
+      </p:sp>
+      <p:sp>
+        <p:nvSpPr>
+          <p:cNvPr id="60" name="Rounded Rectangle 59"/>
+          <p:cNvSpPr/>
+          <p:nvPr/>
+        </p:nvSpPr>
+        <p:spPr>
+          <a:xfrm>
+            <a:off x="5534250" y="3669497"/>
+            <a:ext cx="2098997" cy="227330"/>
+          </a:xfrm>
+          <a:prstGeom prst="roundRect">
+            <a:avLst>
+              <a:gd name="adj" fmla="val 0"/>
+            </a:avLst>
+          </a:prstGeom>
+          <a:solidFill>
+            <a:schemeClr val="lt1"/>
+          </a:solidFill>
+          <a:ln w="12700"/>
+        </p:spPr>
+        <p:style>
+          <a:lnRef idx="2">
+            <a:schemeClr val="dk1"/>
+          </a:lnRef>
+          <a:fillRef idx="1">
+            <a:schemeClr val="lt1"/>
+          </a:fillRef>
+          <a:effectRef idx="0">
+            <a:schemeClr val="dk1"/>
+          </a:effectRef>
+          <a:fontRef idx="minor">
+            <a:schemeClr val="dk1"/>
+          </a:fontRef>
+        </p:style>
+        <p:txBody>
+          <a:bodyPr rtlCol="0" anchor="ctr"/>
+          <a:lstStyle/>
+          <a:p>
+            <a:pPr algn="ctr"/>
+            <a:r>
+              <a:rPr lang="en-US" sz="1000" dirty="0" smtClean="0"/>
+              <a:t>Safety</a:t>
+            </a:r>
+            <a:endParaRPr lang="en-US" sz="1000" dirty="0"/>
+          </a:p>
+        </p:txBody>
+      </p:sp>
+      <p:sp>
+        <p:nvSpPr>
+          <p:cNvPr id="61" name="Rounded Rectangle 60"/>
+          <p:cNvSpPr/>
+          <p:nvPr/>
+        </p:nvSpPr>
+        <p:spPr>
+          <a:xfrm>
+            <a:off x="5546950" y="4592479"/>
+            <a:ext cx="1001037" cy="227330"/>
+          </a:xfrm>
+          <a:prstGeom prst="roundRect">
+            <a:avLst>
+              <a:gd name="adj" fmla="val 0"/>
+            </a:avLst>
+          </a:prstGeom>
+          <a:solidFill>
+            <a:schemeClr val="lt1"/>
+          </a:solidFill>
+          <a:ln w="12700"/>
+        </p:spPr>
+        <p:style>
+          <a:lnRef idx="2">
+            <a:schemeClr val="dk1"/>
+          </a:lnRef>
+          <a:fillRef idx="1">
+            <a:schemeClr val="lt1"/>
+          </a:fillRef>
+          <a:effectRef idx="0">
+            <a:schemeClr val="dk1"/>
+          </a:effectRef>
+          <a:fontRef idx="minor">
+            <a:schemeClr val="dk1"/>
+          </a:fontRef>
+        </p:style>
+        <p:txBody>
+          <a:bodyPr rtlCol="0" anchor="ctr"/>
+          <a:lstStyle/>
+          <a:p>
+            <a:pPr algn="ctr"/>
+            <a:r>
+              <a:rPr lang="en-US" sz="1000" dirty="0" smtClean="0"/>
+              <a:t>Integrity</a:t>
+            </a:r>
+            <a:endParaRPr lang="en-US" sz="1000" dirty="0"/>
+          </a:p>
+        </p:txBody>
+      </p:sp>
+      <p:sp>
+        <p:nvSpPr>
+          <p:cNvPr id="62" name="Rounded Rectangle 61"/>
+          <p:cNvSpPr/>
+          <p:nvPr/>
+        </p:nvSpPr>
+        <p:spPr>
+          <a:xfrm>
+            <a:off x="5542148" y="4006045"/>
+            <a:ext cx="1005839" cy="227330"/>
+          </a:xfrm>
+          <a:prstGeom prst="roundRect">
+            <a:avLst>
+              <a:gd name="adj" fmla="val 0"/>
+            </a:avLst>
+          </a:prstGeom>
+          <a:solidFill>
+            <a:schemeClr val="lt1"/>
+          </a:solidFill>
+          <a:ln w="12700"/>
+        </p:spPr>
+        <p:style>
+          <a:lnRef idx="2">
+            <a:schemeClr val="dk1"/>
+          </a:lnRef>
+          <a:fillRef idx="1">
+            <a:schemeClr val="lt1"/>
+          </a:fillRef>
+          <a:effectRef idx="0">
+            <a:schemeClr val="dk1"/>
+          </a:effectRef>
+          <a:fontRef idx="minor">
+            <a:schemeClr val="dk1"/>
+          </a:fontRef>
+        </p:style>
+        <p:txBody>
+          <a:bodyPr rtlCol="0" anchor="ctr"/>
+          <a:lstStyle/>
+          <a:p>
+            <a:pPr algn="ctr"/>
+            <a:r>
+              <a:rPr lang="en-US" sz="1000" dirty="0" smtClean="0"/>
+              <a:t>Authenticity</a:t>
+            </a:r>
+            <a:endParaRPr lang="en-US" sz="1000" dirty="0"/>
+          </a:p>
+        </p:txBody>
+      </p:sp>
+      <p:cxnSp>
+        <p:nvCxnSpPr>
+          <p:cNvPr id="63" name="Straight Connector 62"/>
+          <p:cNvCxnSpPr>
+            <a:stCxn id="46" idx="1"/>
+            <a:endCxn id="41" idx="3"/>
+          </p:cNvCxnSpPr>
+          <p:nvPr/>
+        </p:nvCxnSpPr>
+        <p:spPr>
+          <a:xfrm flipH="1">
+            <a:off x="2009163" y="1874836"/>
+            <a:ext cx="283549" cy="337185"/>
+          </a:xfrm>
+          <a:prstGeom prst="line">
+            <a:avLst/>
+          </a:prstGeom>
+        </p:spPr>
+        <p:style>
+          <a:lnRef idx="1">
+            <a:schemeClr val="dk1"/>
+          </a:lnRef>
+          <a:fillRef idx="0">
+            <a:schemeClr val="dk1"/>
+          </a:fillRef>
+          <a:effectRef idx="0">
+            <a:schemeClr val="dk1"/>
+          </a:effectRef>
+          <a:fontRef idx="minor">
+            <a:schemeClr val="tx1"/>
+          </a:fontRef>
+        </p:style>
+      </p:cxnSp>
+      <p:cxnSp>
+        <p:nvCxnSpPr>
+          <p:cNvPr id="64" name="Straight Connector 63"/>
+          <p:cNvCxnSpPr>
+            <a:stCxn id="47" idx="1"/>
+            <a:endCxn id="41" idx="3"/>
+          </p:cNvCxnSpPr>
+          <p:nvPr/>
+        </p:nvCxnSpPr>
+        <p:spPr>
+          <a:xfrm flipH="1" flipV="1">
+            <a:off x="2009163" y="2212021"/>
+            <a:ext cx="273389" cy="4445"/>
+          </a:xfrm>
+          <a:prstGeom prst="line">
+            <a:avLst/>
+          </a:prstGeom>
+        </p:spPr>
+        <p:style>
+          <a:lnRef idx="1">
+            <a:schemeClr val="dk1"/>
+          </a:lnRef>
+          <a:fillRef idx="0">
+            <a:schemeClr val="dk1"/>
+          </a:fillRef>
+          <a:effectRef idx="0">
+            <a:schemeClr val="dk1"/>
+          </a:effectRef>
+          <a:fontRef idx="minor">
+            <a:schemeClr val="tx1"/>
+          </a:fontRef>
+        </p:style>
+      </p:cxnSp>
+      <p:cxnSp>
+        <p:nvCxnSpPr>
+          <p:cNvPr id="65" name="Straight Connector 64"/>
+          <p:cNvCxnSpPr>
+            <a:stCxn id="45" idx="1"/>
+            <a:endCxn id="41" idx="3"/>
+          </p:cNvCxnSpPr>
+          <p:nvPr/>
+        </p:nvCxnSpPr>
+        <p:spPr>
+          <a:xfrm flipH="1" flipV="1">
+            <a:off x="2009163" y="2212021"/>
+            <a:ext cx="283549" cy="369752"/>
+          </a:xfrm>
+          <a:prstGeom prst="line">
+            <a:avLst/>
+          </a:prstGeom>
+        </p:spPr>
+        <p:style>
+          <a:lnRef idx="1">
+            <a:schemeClr val="dk1"/>
+          </a:lnRef>
+          <a:fillRef idx="0">
+            <a:schemeClr val="dk1"/>
+          </a:fillRef>
+          <a:effectRef idx="0">
+            <a:schemeClr val="dk1"/>
+          </a:effectRef>
+          <a:fontRef idx="minor">
+            <a:schemeClr val="tx1"/>
+          </a:fontRef>
+        </p:style>
+      </p:cxnSp>
+      <p:cxnSp>
+        <p:nvCxnSpPr>
+          <p:cNvPr id="66" name="Straight Connector 65"/>
+          <p:cNvCxnSpPr>
+            <a:stCxn id="48" idx="1"/>
+            <a:endCxn id="42" idx="3"/>
+          </p:cNvCxnSpPr>
+          <p:nvPr/>
+        </p:nvCxnSpPr>
+        <p:spPr>
+          <a:xfrm flipH="1">
+            <a:off x="1886111" y="3969692"/>
+            <a:ext cx="295307" cy="380999"/>
+          </a:xfrm>
+          <a:prstGeom prst="line">
+            <a:avLst/>
+          </a:prstGeom>
+        </p:spPr>
+        <p:style>
+          <a:lnRef idx="1">
+            <a:schemeClr val="dk1"/>
+          </a:lnRef>
+          <a:fillRef idx="0">
+            <a:schemeClr val="dk1"/>
+          </a:fillRef>
+          <a:effectRef idx="0">
+            <a:schemeClr val="dk1"/>
+          </a:effectRef>
+          <a:fontRef idx="minor">
+            <a:schemeClr val="tx1"/>
+          </a:fontRef>
+        </p:style>
+      </p:cxnSp>
+      <p:cxnSp>
+        <p:nvCxnSpPr>
+          <p:cNvPr id="67" name="Straight Connector 66"/>
+          <p:cNvCxnSpPr>
+            <a:stCxn id="49" idx="1"/>
+            <a:endCxn id="42" idx="3"/>
+          </p:cNvCxnSpPr>
+          <p:nvPr/>
+        </p:nvCxnSpPr>
+        <p:spPr>
+          <a:xfrm flipH="1">
+            <a:off x="1886111" y="4335740"/>
+            <a:ext cx="295307" cy="14951"/>
+          </a:xfrm>
+          <a:prstGeom prst="line">
+            <a:avLst/>
+          </a:prstGeom>
+        </p:spPr>
+        <p:style>
+          <a:lnRef idx="1">
+            <a:schemeClr val="dk1"/>
+          </a:lnRef>
+          <a:fillRef idx="0">
+            <a:schemeClr val="dk1"/>
+          </a:fillRef>
+          <a:effectRef idx="0">
+            <a:schemeClr val="dk1"/>
+          </a:effectRef>
+          <a:fontRef idx="minor">
+            <a:schemeClr val="tx1"/>
+          </a:fontRef>
+        </p:style>
+      </p:cxnSp>
+      <p:cxnSp>
+        <p:nvCxnSpPr>
+          <p:cNvPr id="68" name="Straight Connector 67"/>
+          <p:cNvCxnSpPr>
+            <a:stCxn id="51" idx="1"/>
+            <a:endCxn id="43" idx="3"/>
+          </p:cNvCxnSpPr>
+          <p:nvPr/>
+        </p:nvCxnSpPr>
+        <p:spPr>
+          <a:xfrm flipH="1">
+            <a:off x="5131731" y="1874550"/>
+            <a:ext cx="377054" cy="350171"/>
+          </a:xfrm>
+          <a:prstGeom prst="line">
+            <a:avLst/>
+          </a:prstGeom>
+        </p:spPr>
+        <p:style>
+          <a:lnRef idx="1">
+            <a:schemeClr val="dk1"/>
+          </a:lnRef>
+          <a:fillRef idx="0">
+            <a:schemeClr val="dk1"/>
+          </a:fillRef>
+          <a:effectRef idx="0">
+            <a:schemeClr val="dk1"/>
+          </a:effectRef>
+          <a:fontRef idx="minor">
+            <a:schemeClr val="tx1"/>
+          </a:fontRef>
+        </p:style>
+      </p:cxnSp>
+      <p:cxnSp>
+        <p:nvCxnSpPr>
+          <p:cNvPr id="73" name="Straight Connector 72"/>
+          <p:cNvCxnSpPr>
+            <a:stCxn id="57" idx="1"/>
+            <a:endCxn id="43" idx="3"/>
+          </p:cNvCxnSpPr>
+          <p:nvPr/>
+        </p:nvCxnSpPr>
+        <p:spPr>
+          <a:xfrm flipH="1">
+            <a:off x="5131731" y="1516409"/>
+            <a:ext cx="377054" cy="708312"/>
+          </a:xfrm>
+          <a:prstGeom prst="line">
+            <a:avLst/>
+          </a:prstGeom>
+        </p:spPr>
+        <p:style>
+          <a:lnRef idx="1">
+            <a:schemeClr val="dk1"/>
+          </a:lnRef>
+          <a:fillRef idx="0">
+            <a:schemeClr val="dk1"/>
+          </a:fillRef>
+          <a:effectRef idx="0">
+            <a:schemeClr val="dk1"/>
+          </a:effectRef>
+          <a:fontRef idx="minor">
+            <a:schemeClr val="tx1"/>
+          </a:fontRef>
+        </p:style>
+      </p:cxnSp>
+      <p:cxnSp>
+        <p:nvCxnSpPr>
+          <p:cNvPr id="74" name="Straight Connector 73"/>
+          <p:cNvCxnSpPr>
+            <a:stCxn id="52" idx="1"/>
+            <a:endCxn id="43" idx="3"/>
+          </p:cNvCxnSpPr>
+          <p:nvPr/>
+        </p:nvCxnSpPr>
+        <p:spPr>
+          <a:xfrm flipH="1" flipV="1">
+            <a:off x="5131731" y="2224721"/>
+            <a:ext cx="346574" cy="404206"/>
+          </a:xfrm>
+          <a:prstGeom prst="line">
+            <a:avLst/>
+          </a:prstGeom>
+        </p:spPr>
+        <p:style>
+          <a:lnRef idx="1">
+            <a:schemeClr val="dk1"/>
+          </a:lnRef>
+          <a:fillRef idx="0">
+            <a:schemeClr val="dk1"/>
+          </a:fillRef>
+          <a:effectRef idx="0">
+            <a:schemeClr val="dk1"/>
+          </a:effectRef>
+          <a:fontRef idx="minor">
+            <a:schemeClr val="tx1"/>
+          </a:fontRef>
+        </p:style>
+      </p:cxnSp>
+      <p:cxnSp>
+        <p:nvCxnSpPr>
+          <p:cNvPr id="76" name="Straight Connector 75"/>
+          <p:cNvCxnSpPr>
+            <a:stCxn id="58" idx="1"/>
+            <a:endCxn id="43" idx="3"/>
+          </p:cNvCxnSpPr>
+          <p:nvPr/>
+        </p:nvCxnSpPr>
+        <p:spPr>
+          <a:xfrm flipH="1" flipV="1">
+            <a:off x="5131731" y="2224721"/>
+            <a:ext cx="361815" cy="21938"/>
+          </a:xfrm>
+          <a:prstGeom prst="line">
+            <a:avLst/>
+          </a:prstGeom>
+        </p:spPr>
+        <p:style>
+          <a:lnRef idx="1">
+            <a:schemeClr val="dk1"/>
+          </a:lnRef>
+          <a:fillRef idx="0">
+            <a:schemeClr val="dk1"/>
+          </a:fillRef>
+          <a:effectRef idx="0">
+            <a:schemeClr val="dk1"/>
+          </a:effectRef>
+          <a:fontRef idx="minor">
+            <a:schemeClr val="tx1"/>
+          </a:fontRef>
+        </p:style>
+      </p:cxnSp>
+      <p:cxnSp>
+        <p:nvCxnSpPr>
+          <p:cNvPr id="77" name="Straight Connector 76"/>
+          <p:cNvCxnSpPr>
+            <a:stCxn id="54" idx="1"/>
+            <a:endCxn id="43" idx="3"/>
+          </p:cNvCxnSpPr>
+          <p:nvPr/>
+        </p:nvCxnSpPr>
+        <p:spPr>
+          <a:xfrm flipH="1" flipV="1">
+            <a:off x="5131731" y="2224721"/>
+            <a:ext cx="351654" cy="910553"/>
+          </a:xfrm>
+          <a:prstGeom prst="line">
+            <a:avLst/>
+          </a:prstGeom>
+        </p:spPr>
+        <p:style>
+          <a:lnRef idx="1">
+            <a:schemeClr val="dk1"/>
+          </a:lnRef>
+          <a:fillRef idx="0">
+            <a:schemeClr val="dk1"/>
+          </a:fillRef>
+          <a:effectRef idx="0">
+            <a:schemeClr val="dk1"/>
+          </a:effectRef>
+          <a:fontRef idx="minor">
+            <a:schemeClr val="tx1"/>
+          </a:fontRef>
+        </p:style>
+      </p:cxnSp>
+      <p:cxnSp>
+        <p:nvCxnSpPr>
+          <p:cNvPr id="81" name="Straight Connector 80"/>
+          <p:cNvCxnSpPr>
+            <a:stCxn id="50" idx="1"/>
+            <a:endCxn id="42" idx="3"/>
+          </p:cNvCxnSpPr>
+          <p:nvPr/>
+        </p:nvCxnSpPr>
+        <p:spPr>
+          <a:xfrm flipH="1" flipV="1">
+            <a:off x="1886111" y="4350691"/>
+            <a:ext cx="295307" cy="389718"/>
+          </a:xfrm>
+          <a:prstGeom prst="line">
+            <a:avLst/>
+          </a:prstGeom>
+        </p:spPr>
+        <p:style>
+          <a:lnRef idx="1">
+            <a:schemeClr val="dk1"/>
+          </a:lnRef>
+          <a:fillRef idx="0">
+            <a:schemeClr val="dk1"/>
+          </a:fillRef>
+          <a:effectRef idx="0">
+            <a:schemeClr val="dk1"/>
+          </a:effectRef>
+          <a:fontRef idx="minor">
+            <a:schemeClr val="tx1"/>
+          </a:fontRef>
+        </p:style>
+      </p:cxnSp>
+      <p:cxnSp>
+        <p:nvCxnSpPr>
+          <p:cNvPr id="86" name="Straight Connector 85"/>
+          <p:cNvCxnSpPr>
+            <a:stCxn id="60" idx="1"/>
+            <a:endCxn id="44" idx="3"/>
+          </p:cNvCxnSpPr>
+          <p:nvPr/>
+        </p:nvCxnSpPr>
+        <p:spPr>
+          <a:xfrm flipH="1">
+            <a:off x="5167008" y="3783162"/>
+            <a:ext cx="367242" cy="631094"/>
+          </a:xfrm>
+          <a:prstGeom prst="line">
+            <a:avLst/>
+          </a:prstGeom>
+        </p:spPr>
+        <p:style>
+          <a:lnRef idx="1">
+            <a:schemeClr val="dk1"/>
+          </a:lnRef>
+          <a:fillRef idx="0">
+            <a:schemeClr val="dk1"/>
+          </a:fillRef>
+          <a:effectRef idx="0">
+            <a:schemeClr val="dk1"/>
+          </a:effectRef>
+          <a:fontRef idx="minor">
+            <a:schemeClr val="tx1"/>
+          </a:fontRef>
+        </p:style>
+      </p:cxnSp>
+      <p:cxnSp>
+        <p:nvCxnSpPr>
+          <p:cNvPr id="87" name="Straight Connector 86"/>
+          <p:cNvCxnSpPr>
+            <a:stCxn id="61" idx="1"/>
+            <a:endCxn id="44" idx="3"/>
+          </p:cNvCxnSpPr>
+          <p:nvPr/>
+        </p:nvCxnSpPr>
+        <p:spPr>
+          <a:xfrm flipH="1" flipV="1">
+            <a:off x="5167008" y="4414256"/>
+            <a:ext cx="379942" cy="291888"/>
+          </a:xfrm>
+          <a:prstGeom prst="line">
+            <a:avLst/>
+          </a:prstGeom>
+        </p:spPr>
+        <p:style>
+          <a:lnRef idx="1">
+            <a:schemeClr val="dk1"/>
+          </a:lnRef>
+          <a:fillRef idx="0">
+            <a:schemeClr val="dk1"/>
+          </a:fillRef>
+          <a:effectRef idx="0">
+            <a:schemeClr val="dk1"/>
+          </a:effectRef>
+          <a:fontRef idx="minor">
+            <a:schemeClr val="tx1"/>
+          </a:fontRef>
+        </p:style>
+      </p:cxnSp>
+      <p:cxnSp>
+        <p:nvCxnSpPr>
+          <p:cNvPr id="88" name="Straight Connector 87"/>
+          <p:cNvCxnSpPr>
+            <a:stCxn id="59" idx="1"/>
+            <a:endCxn id="44" idx="3"/>
+          </p:cNvCxnSpPr>
+          <p:nvPr/>
+        </p:nvCxnSpPr>
+        <p:spPr>
+          <a:xfrm flipH="1" flipV="1">
+            <a:off x="5167008" y="4414256"/>
+            <a:ext cx="369782" cy="601687"/>
+          </a:xfrm>
+          <a:prstGeom prst="line">
+            <a:avLst/>
+          </a:prstGeom>
+        </p:spPr>
+        <p:style>
+          <a:lnRef idx="1">
+            <a:schemeClr val="dk1"/>
+          </a:lnRef>
+          <a:fillRef idx="0">
+            <a:schemeClr val="dk1"/>
+          </a:fillRef>
+          <a:effectRef idx="0">
+            <a:schemeClr val="dk1"/>
+          </a:effectRef>
+          <a:fontRef idx="minor">
+            <a:schemeClr val="tx1"/>
+          </a:fontRef>
+        </p:style>
+      </p:cxnSp>
+      <p:cxnSp>
+        <p:nvCxnSpPr>
+          <p:cNvPr id="89" name="Straight Connector 88"/>
+          <p:cNvCxnSpPr>
+            <a:stCxn id="92" idx="1"/>
+            <a:endCxn id="44" idx="3"/>
+          </p:cNvCxnSpPr>
+          <p:nvPr/>
+        </p:nvCxnSpPr>
+        <p:spPr>
+          <a:xfrm flipH="1">
+            <a:off x="5167008" y="4414256"/>
+            <a:ext cx="385023" cy="0"/>
+          </a:xfrm>
+          <a:prstGeom prst="line">
+            <a:avLst/>
+          </a:prstGeom>
+        </p:spPr>
+        <p:style>
+          <a:lnRef idx="1">
+            <a:schemeClr val="dk1"/>
+          </a:lnRef>
+          <a:fillRef idx="0">
+            <a:schemeClr val="dk1"/>
+          </a:fillRef>
+          <a:effectRef idx="0">
+            <a:schemeClr val="dk1"/>
+          </a:effectRef>
+          <a:fontRef idx="minor">
+            <a:schemeClr val="tx1"/>
+          </a:fontRef>
+        </p:style>
+      </p:cxnSp>
+      <p:sp>
+        <p:nvSpPr>
+          <p:cNvPr id="92" name="Rounded Rectangle 91"/>
+          <p:cNvSpPr/>
+          <p:nvPr/>
+        </p:nvSpPr>
+        <p:spPr>
+          <a:xfrm>
+            <a:off x="5552031" y="4304616"/>
+            <a:ext cx="993917" cy="219279"/>
+          </a:xfrm>
+          <a:prstGeom prst="roundRect">
+            <a:avLst>
+              <a:gd name="adj" fmla="val 0"/>
+            </a:avLst>
+          </a:prstGeom>
+          <a:solidFill>
+            <a:schemeClr val="lt1"/>
+          </a:solidFill>
+          <a:ln w="12700"/>
+        </p:spPr>
+        <p:style>
+          <a:lnRef idx="2">
+            <a:schemeClr val="dk1"/>
+          </a:lnRef>
+          <a:fillRef idx="1">
+            <a:schemeClr val="lt1"/>
+          </a:fillRef>
+          <a:effectRef idx="0">
+            <a:schemeClr val="dk1"/>
+          </a:effectRef>
+          <a:fontRef idx="minor">
+            <a:schemeClr val="dk1"/>
+          </a:fontRef>
+        </p:style>
+        <p:txBody>
+          <a:bodyPr rtlCol="0" anchor="ctr"/>
+          <a:lstStyle/>
+          <a:p>
+            <a:pPr algn="ctr"/>
+            <a:r>
+              <a:rPr lang="en-US" sz="1000" dirty="0" smtClean="0"/>
+              <a:t>Privacy</a:t>
+            </a:r>
+            <a:endParaRPr lang="en-US" sz="1000" dirty="0"/>
+          </a:p>
+        </p:txBody>
+      </p:sp>
     </p:spTree>
     <p:extLst>
       <p:ext uri="{BB962C8B-B14F-4D97-AF65-F5344CB8AC3E}">

</xml_diff>

<commit_message>
Added important changes and format
</commit_message>
<xml_diff>
--- a/model.pptx
+++ b/model.pptx
@@ -18,11 +18,12 @@
     <p:sldId id="270" r:id="rId12"/>
     <p:sldId id="271" r:id="rId13"/>
     <p:sldId id="275" r:id="rId14"/>
-    <p:sldId id="276" r:id="rId15"/>
-    <p:sldId id="272" r:id="rId16"/>
-    <p:sldId id="273" r:id="rId17"/>
-    <p:sldId id="277" r:id="rId18"/>
-    <p:sldId id="279" r:id="rId19"/>
+    <p:sldId id="280" r:id="rId15"/>
+    <p:sldId id="276" r:id="rId16"/>
+    <p:sldId id="272" r:id="rId17"/>
+    <p:sldId id="273" r:id="rId18"/>
+    <p:sldId id="277" r:id="rId19"/>
+    <p:sldId id="279" r:id="rId20"/>
   </p:sldIdLst>
   <p:sldSz cx="9144000" cy="6858000" type="screen4x3"/>
   <p:notesSz cx="6858000" cy="9144000"/>
@@ -3845,7 +3846,7 @@
           <a:graphicData uri="http://schemas.openxmlformats.org/presentationml/2006/ole">
             <mc:AlternateContent xmlns:mc="http://schemas.openxmlformats.org/markup-compatibility/2006">
               <mc:Choice xmlns:v="urn:schemas-microsoft-com:vml" Requires="v">
-                <p:oleObj spid="_x0000_s1083" name="Equation" r:id="rId3" imgW="3771900" imgH="203200" progId="Equation.3">
+                <p:oleObj spid="_x0000_s1102" name="Equation" r:id="rId3" imgW="3771900" imgH="203200" progId="Equation.3">
                   <p:embed/>
                 </p:oleObj>
               </mc:Choice>
@@ -9463,8 +9464,8 @@
         </p:nvSpPr>
         <p:spPr>
           <a:xfrm>
-            <a:off x="2977508" y="513080"/>
-            <a:ext cx="1137920" cy="294640"/>
+            <a:off x="2848158" y="513080"/>
+            <a:ext cx="1243113" cy="294640"/>
           </a:xfrm>
           <a:prstGeom prst="roundRect">
             <a:avLst/>
@@ -9508,8 +9509,8 @@
         </p:nvSpPr>
         <p:spPr>
           <a:xfrm>
-            <a:off x="2977508" y="1341121"/>
-            <a:ext cx="1137920" cy="294640"/>
+            <a:off x="2824640" y="1341121"/>
+            <a:ext cx="1290788" cy="294640"/>
           </a:xfrm>
           <a:prstGeom prst="roundRect">
             <a:avLst/>
@@ -9598,8 +9599,8 @@
         </p:nvSpPr>
         <p:spPr>
           <a:xfrm>
-            <a:off x="2953352" y="4685363"/>
-            <a:ext cx="1137920" cy="294640"/>
+            <a:off x="2848158" y="4685363"/>
+            <a:ext cx="1243114" cy="294640"/>
           </a:xfrm>
           <a:prstGeom prst="roundRect">
             <a:avLst/>
@@ -9646,8 +9647,8 @@
         </p:nvSpPr>
         <p:spPr>
           <a:xfrm>
-            <a:off x="2977508" y="5435707"/>
-            <a:ext cx="1137920" cy="294640"/>
+            <a:off x="2934810" y="5435707"/>
+            <a:ext cx="1180618" cy="294640"/>
           </a:xfrm>
           <a:prstGeom prst="roundRect">
             <a:avLst/>
@@ -9697,8 +9698,8 @@
         </p:nvCxnSpPr>
         <p:spPr>
           <a:xfrm flipV="1">
-            <a:off x="4115428" y="640715"/>
-            <a:ext cx="990638" cy="19685"/>
+            <a:off x="4091271" y="640715"/>
+            <a:ext cx="1014795" cy="19685"/>
           </a:xfrm>
           <a:prstGeom prst="line">
             <a:avLst/>
@@ -9730,8 +9731,8 @@
         </p:nvCxnSpPr>
         <p:spPr>
           <a:xfrm>
-            <a:off x="4115428" y="660400"/>
-            <a:ext cx="1183679" cy="1245260"/>
+            <a:off x="4091271" y="660400"/>
+            <a:ext cx="1207836" cy="1245260"/>
           </a:xfrm>
           <a:prstGeom prst="line">
             <a:avLst/>
@@ -9829,8 +9830,8 @@
         </p:nvCxnSpPr>
         <p:spPr>
           <a:xfrm>
-            <a:off x="4115428" y="660400"/>
-            <a:ext cx="1183679" cy="2766240"/>
+            <a:off x="4091271" y="660400"/>
+            <a:ext cx="1207836" cy="2766240"/>
           </a:xfrm>
           <a:prstGeom prst="line">
             <a:avLst/>
@@ -12117,8 +12118,8 @@
         </p:nvSpPr>
         <p:spPr>
           <a:xfrm>
-            <a:off x="770184" y="1562466"/>
-            <a:ext cx="1491439" cy="646331"/>
+            <a:off x="1383820" y="1227882"/>
+            <a:ext cx="1039129" cy="923330"/>
           </a:xfrm>
           <a:prstGeom prst="rect">
             <a:avLst/>
@@ -12144,23 +12145,24 @@
           </a:bodyPr>
           <a:lstStyle/>
           <a:p>
+            <a:pPr algn="ctr"/>
             <a:r>
               <a:rPr lang="en-US" dirty="0" smtClean="0"/>
               <a:t>E-Service </a:t>
             </a:r>
           </a:p>
           <a:p>
+            <a:pPr algn="ctr"/>
             <a:r>
               <a:rPr lang="en-US" dirty="0" smtClean="0"/>
               <a:t>Quality </a:t>
             </a:r>
+          </a:p>
+          <a:p>
+            <a:pPr algn="ctr"/>
             <a:r>
               <a:rPr lang="en-US" dirty="0" smtClean="0"/>
-              <a:t>in </a:t>
-            </a:r>
-            <a:r>
-              <a:rPr lang="en-US" dirty="0" smtClean="0"/>
-              <a:t>Use</a:t>
+              <a:t>in Use</a:t>
             </a:r>
           </a:p>
         </p:txBody>
@@ -12176,8 +12178,8 @@
         </p:nvCxnSpPr>
         <p:spPr>
           <a:xfrm flipV="1">
-            <a:off x="2261623" y="660400"/>
-            <a:ext cx="715885" cy="1225232"/>
+            <a:off x="2422949" y="660400"/>
+            <a:ext cx="425209" cy="1029147"/>
           </a:xfrm>
           <a:prstGeom prst="line">
             <a:avLst/>
@@ -12209,8 +12211,8 @@
         </p:nvCxnSpPr>
         <p:spPr>
           <a:xfrm flipV="1">
-            <a:off x="2261623" y="1488441"/>
-            <a:ext cx="715885" cy="397191"/>
+            <a:off x="2422949" y="1488441"/>
+            <a:ext cx="401691" cy="201106"/>
           </a:xfrm>
           <a:prstGeom prst="line">
             <a:avLst/>
@@ -12242,8 +12244,8 @@
         </p:nvCxnSpPr>
         <p:spPr>
           <a:xfrm>
-            <a:off x="2261623" y="1885632"/>
-            <a:ext cx="563485" cy="500063"/>
+            <a:off x="2422949" y="1689547"/>
+            <a:ext cx="402159" cy="696148"/>
           </a:xfrm>
           <a:prstGeom prst="line">
             <a:avLst/>
@@ -12275,8 +12277,8 @@
         </p:nvCxnSpPr>
         <p:spPr>
           <a:xfrm>
-            <a:off x="2261623" y="1885632"/>
-            <a:ext cx="492364" cy="1550026"/>
+            <a:off x="2422949" y="1689547"/>
+            <a:ext cx="331038" cy="1746111"/>
           </a:xfrm>
           <a:prstGeom prst="line">
             <a:avLst/>
@@ -12305,8 +12307,8 @@
         </p:nvSpPr>
         <p:spPr>
           <a:xfrm>
-            <a:off x="675600" y="4507137"/>
-            <a:ext cx="1650700" cy="646331"/>
+            <a:off x="1392892" y="4364594"/>
+            <a:ext cx="1039129" cy="923330"/>
           </a:xfrm>
           <a:prstGeom prst="rect">
             <a:avLst/>
@@ -12332,15 +12334,24 @@
           </a:bodyPr>
           <a:lstStyle/>
           <a:p>
+            <a:pPr algn="ctr"/>
             <a:r>
               <a:rPr lang="en-US" dirty="0" smtClean="0"/>
               <a:t>E-Service</a:t>
             </a:r>
           </a:p>
           <a:p>
+            <a:pPr algn="ctr"/>
             <a:r>
               <a:rPr lang="en-US" dirty="0" smtClean="0"/>
-              <a:t>Product Quality</a:t>
+              <a:t>Product </a:t>
+            </a:r>
+          </a:p>
+          <a:p>
+            <a:pPr algn="ctr"/>
+            <a:r>
+              <a:rPr lang="en-US" dirty="0" smtClean="0"/>
+              <a:t>Quality</a:t>
             </a:r>
             <a:endParaRPr lang="en-US" dirty="0"/>
           </a:p>
@@ -12357,8 +12368,8 @@
         </p:nvCxnSpPr>
         <p:spPr>
           <a:xfrm flipV="1">
-            <a:off x="2326300" y="3436611"/>
-            <a:ext cx="498808" cy="1393692"/>
+            <a:off x="2432021" y="3436611"/>
+            <a:ext cx="393087" cy="1389648"/>
           </a:xfrm>
           <a:prstGeom prst="line">
             <a:avLst/>
@@ -12390,8 +12401,8 @@
         </p:nvCxnSpPr>
         <p:spPr>
           <a:xfrm>
-            <a:off x="2326300" y="4830303"/>
-            <a:ext cx="627052" cy="2380"/>
+            <a:off x="2432021" y="4826259"/>
+            <a:ext cx="416137" cy="6424"/>
           </a:xfrm>
           <a:prstGeom prst="line">
             <a:avLst/>
@@ -12423,8 +12434,8 @@
         </p:nvCxnSpPr>
         <p:spPr>
           <a:xfrm>
-            <a:off x="2326300" y="4830303"/>
-            <a:ext cx="651208" cy="752724"/>
+            <a:off x="2432021" y="4826259"/>
+            <a:ext cx="502789" cy="756768"/>
           </a:xfrm>
           <a:prstGeom prst="line">
             <a:avLst/>
@@ -12605,7 +12616,7 @@
           <a:p>
             <a:r>
               <a:rPr lang="en-US" sz="1000" dirty="0" smtClean="0"/>
-              <a:t>H4.7.6</a:t>
+              <a:t>H4.8.6</a:t>
             </a:r>
             <a:endParaRPr lang="en-US" sz="1000" dirty="0" smtClean="0"/>
           </a:p>
@@ -12635,7 +12646,7 @@
           <a:p>
             <a:r>
               <a:rPr lang="en-US" sz="1000" dirty="0" smtClean="0"/>
-              <a:t>H4.7.3</a:t>
+              <a:t>H4.8.3</a:t>
             </a:r>
             <a:endParaRPr lang="en-US" sz="1000" dirty="0" smtClean="0"/>
           </a:p>
@@ -12649,7 +12660,7 @@
         </p:nvSpPr>
         <p:spPr>
           <a:xfrm>
-            <a:off x="7835059" y="1154465"/>
+            <a:off x="7987926" y="1154465"/>
             <a:ext cx="524302" cy="246221"/>
           </a:xfrm>
           <a:prstGeom prst="rect">
@@ -12665,7 +12676,7 @@
           <a:p>
             <a:r>
               <a:rPr lang="en-US" sz="1000" dirty="0" smtClean="0"/>
-              <a:t>H4.7.4</a:t>
+              <a:t>H4.8.4</a:t>
             </a:r>
             <a:endParaRPr lang="en-US" sz="1000" dirty="0" smtClean="0"/>
           </a:p>
@@ -16780,6 +16791,1372 @@
         </p:nvSpPr>
         <p:spPr>
           <a:xfrm>
+            <a:off x="3499618" y="1336040"/>
+            <a:ext cx="1239519" cy="279400"/>
+          </a:xfrm>
+          <a:prstGeom prst="roundRect">
+            <a:avLst>
+              <a:gd name="adj" fmla="val 50000"/>
+            </a:avLst>
+          </a:prstGeom>
+        </p:spPr>
+        <p:style>
+          <a:lnRef idx="2">
+            <a:schemeClr val="accent1"/>
+          </a:lnRef>
+          <a:fillRef idx="1">
+            <a:schemeClr val="lt1"/>
+          </a:fillRef>
+          <a:effectRef idx="0">
+            <a:schemeClr val="accent1"/>
+          </a:effectRef>
+          <a:fontRef idx="minor">
+            <a:schemeClr val="dk1"/>
+          </a:fontRef>
+        </p:style>
+        <p:txBody>
+          <a:bodyPr rtlCol="0" anchor="ctr"/>
+          <a:lstStyle/>
+          <a:p>
+            <a:pPr algn="ctr"/>
+            <a:r>
+              <a:rPr lang="en-US" sz="1200" dirty="0" smtClean="0"/>
+              <a:t>ACCESSIBILITY</a:t>
+            </a:r>
+            <a:endParaRPr lang="en-US" sz="1200" dirty="0"/>
+          </a:p>
+        </p:txBody>
+      </p:sp>
+      <p:sp>
+        <p:nvSpPr>
+          <p:cNvPr id="7" name="Rounded Rectangle 6"/>
+          <p:cNvSpPr/>
+          <p:nvPr/>
+        </p:nvSpPr>
+        <p:spPr>
+          <a:xfrm>
+            <a:off x="3777421" y="3246174"/>
+            <a:ext cx="975359" cy="254000"/>
+          </a:xfrm>
+          <a:prstGeom prst="roundRect">
+            <a:avLst>
+              <a:gd name="adj" fmla="val 50000"/>
+            </a:avLst>
+          </a:prstGeom>
+        </p:spPr>
+        <p:style>
+          <a:lnRef idx="2">
+            <a:schemeClr val="accent1"/>
+          </a:lnRef>
+          <a:fillRef idx="1">
+            <a:schemeClr val="lt1"/>
+          </a:fillRef>
+          <a:effectRef idx="0">
+            <a:schemeClr val="accent1"/>
+          </a:effectRef>
+          <a:fontRef idx="minor">
+            <a:schemeClr val="dk1"/>
+          </a:fontRef>
+        </p:style>
+        <p:txBody>
+          <a:bodyPr rtlCol="0" anchor="ctr"/>
+          <a:lstStyle/>
+          <a:p>
+            <a:pPr algn="ctr"/>
+            <a:r>
+              <a:rPr lang="en-US" sz="1200" dirty="0" smtClean="0"/>
+              <a:t>SECURITY</a:t>
+            </a:r>
+            <a:endParaRPr lang="en-US" sz="1200" dirty="0"/>
+          </a:p>
+        </p:txBody>
+      </p:sp>
+      <p:sp>
+        <p:nvSpPr>
+          <p:cNvPr id="10" name="Rounded Rectangle 9"/>
+          <p:cNvSpPr/>
+          <p:nvPr/>
+        </p:nvSpPr>
+        <p:spPr>
+          <a:xfrm>
+            <a:off x="3119565" y="2391897"/>
+            <a:ext cx="1290320" cy="294640"/>
+          </a:xfrm>
+          <a:prstGeom prst="roundRect">
+            <a:avLst/>
+          </a:prstGeom>
+          <a:ln w="38100" cmpd="dbl">
+            <a:prstDash val="solid"/>
+          </a:ln>
+        </p:spPr>
+        <p:style>
+          <a:lnRef idx="2">
+            <a:schemeClr val="dk1"/>
+          </a:lnRef>
+          <a:fillRef idx="1">
+            <a:schemeClr val="lt1"/>
+          </a:fillRef>
+          <a:effectRef idx="0">
+            <a:schemeClr val="dk1"/>
+          </a:effectRef>
+          <a:fontRef idx="minor">
+            <a:schemeClr val="dk1"/>
+          </a:fontRef>
+        </p:style>
+        <p:txBody>
+          <a:bodyPr rtlCol="0" anchor="ctr"/>
+          <a:lstStyle/>
+          <a:p>
+            <a:pPr algn="ctr"/>
+            <a:r>
+              <a:rPr lang="en-US" sz="1200" dirty="0" smtClean="0"/>
+              <a:t>Trustworthiness</a:t>
+            </a:r>
+            <a:endParaRPr lang="en-US" sz="1200" dirty="0"/>
+          </a:p>
+        </p:txBody>
+      </p:sp>
+      <p:sp>
+        <p:nvSpPr>
+          <p:cNvPr id="12" name="Rounded Rectangle 11"/>
+          <p:cNvSpPr/>
+          <p:nvPr/>
+        </p:nvSpPr>
+        <p:spPr>
+          <a:xfrm>
+            <a:off x="3191536" y="4051409"/>
+            <a:ext cx="1137920" cy="294640"/>
+          </a:xfrm>
+          <a:prstGeom prst="roundRect">
+            <a:avLst/>
+          </a:prstGeom>
+          <a:ln w="28575" cmpd="sng">
+            <a:solidFill>
+              <a:srgbClr val="000000"/>
+            </a:solidFill>
+            <a:prstDash val="solid"/>
+          </a:ln>
+        </p:spPr>
+        <p:style>
+          <a:lnRef idx="2">
+            <a:schemeClr val="accent1"/>
+          </a:lnRef>
+          <a:fillRef idx="1">
+            <a:schemeClr val="lt1"/>
+          </a:fillRef>
+          <a:effectRef idx="0">
+            <a:schemeClr val="accent1"/>
+          </a:effectRef>
+          <a:fontRef idx="minor">
+            <a:schemeClr val="dk1"/>
+          </a:fontRef>
+        </p:style>
+        <p:txBody>
+          <a:bodyPr rtlCol="0" anchor="ctr"/>
+          <a:lstStyle/>
+          <a:p>
+            <a:pPr algn="ctr"/>
+            <a:r>
+              <a:rPr lang="en-US" sz="1200" dirty="0" smtClean="0"/>
+              <a:t>Reliability</a:t>
+            </a:r>
+            <a:endParaRPr lang="en-US" sz="1200" dirty="0"/>
+          </a:p>
+        </p:txBody>
+      </p:sp>
+      <p:cxnSp>
+        <p:nvCxnSpPr>
+          <p:cNvPr id="59" name="Straight Connector 58"/>
+          <p:cNvCxnSpPr>
+            <a:endCxn id="10" idx="1"/>
+          </p:cNvCxnSpPr>
+          <p:nvPr/>
+        </p:nvCxnSpPr>
+        <p:spPr>
+          <a:xfrm>
+            <a:off x="2892572" y="2536572"/>
+            <a:ext cx="226993" cy="2645"/>
+          </a:xfrm>
+          <a:prstGeom prst="line">
+            <a:avLst/>
+          </a:prstGeom>
+        </p:spPr>
+        <p:style>
+          <a:lnRef idx="1">
+            <a:schemeClr val="dk1"/>
+          </a:lnRef>
+          <a:fillRef idx="0">
+            <a:schemeClr val="dk1"/>
+          </a:fillRef>
+          <a:effectRef idx="0">
+            <a:schemeClr val="dk1"/>
+          </a:effectRef>
+          <a:fontRef idx="minor">
+            <a:schemeClr val="tx1"/>
+          </a:fontRef>
+        </p:style>
+      </p:cxnSp>
+      <p:cxnSp>
+        <p:nvCxnSpPr>
+          <p:cNvPr id="62" name="Straight Connector 61"/>
+          <p:cNvCxnSpPr>
+            <a:stCxn id="12" idx="0"/>
+            <a:endCxn id="7" idx="2"/>
+          </p:cNvCxnSpPr>
+          <p:nvPr/>
+        </p:nvCxnSpPr>
+        <p:spPr>
+          <a:xfrm flipV="1">
+            <a:off x="3760496" y="3500174"/>
+            <a:ext cx="504605" cy="551235"/>
+          </a:xfrm>
+          <a:prstGeom prst="line">
+            <a:avLst/>
+          </a:prstGeom>
+        </p:spPr>
+        <p:style>
+          <a:lnRef idx="1">
+            <a:schemeClr val="dk1"/>
+          </a:lnRef>
+          <a:fillRef idx="0">
+            <a:schemeClr val="dk1"/>
+          </a:fillRef>
+          <a:effectRef idx="0">
+            <a:schemeClr val="dk1"/>
+          </a:effectRef>
+          <a:fontRef idx="minor">
+            <a:schemeClr val="tx1"/>
+          </a:fontRef>
+        </p:style>
+      </p:cxnSp>
+      <p:sp>
+        <p:nvSpPr>
+          <p:cNvPr id="125" name="Rounded Rectangle 124"/>
+          <p:cNvSpPr/>
+          <p:nvPr/>
+        </p:nvSpPr>
+        <p:spPr>
+          <a:xfrm>
+            <a:off x="5034773" y="1364594"/>
+            <a:ext cx="1103363" cy="203814"/>
+          </a:xfrm>
+          <a:prstGeom prst="roundRect">
+            <a:avLst>
+              <a:gd name="adj" fmla="val 0"/>
+            </a:avLst>
+          </a:prstGeom>
+          <a:solidFill>
+            <a:schemeClr val="lt1"/>
+          </a:solidFill>
+          <a:ln w="12700"/>
+        </p:spPr>
+        <p:style>
+          <a:lnRef idx="2">
+            <a:schemeClr val="dk1"/>
+          </a:lnRef>
+          <a:fillRef idx="1">
+            <a:schemeClr val="lt1"/>
+          </a:fillRef>
+          <a:effectRef idx="0">
+            <a:schemeClr val="dk1"/>
+          </a:effectRef>
+          <a:fontRef idx="minor">
+            <a:schemeClr val="dk1"/>
+          </a:fontRef>
+        </p:style>
+        <p:txBody>
+          <a:bodyPr rtlCol="0" anchor="ctr"/>
+          <a:lstStyle/>
+          <a:p>
+            <a:pPr algn="ctr"/>
+            <a:r>
+              <a:rPr lang="en-US" sz="1000" dirty="0" smtClean="0"/>
+              <a:t>Availability</a:t>
+            </a:r>
+            <a:endParaRPr lang="en-US" sz="1000" dirty="0"/>
+          </a:p>
+        </p:txBody>
+      </p:sp>
+      <p:sp>
+        <p:nvSpPr>
+          <p:cNvPr id="138" name="Rounded Rectangle 137"/>
+          <p:cNvSpPr/>
+          <p:nvPr/>
+        </p:nvSpPr>
+        <p:spPr>
+          <a:xfrm>
+            <a:off x="5034774" y="3687436"/>
+            <a:ext cx="1044567" cy="280772"/>
+          </a:xfrm>
+          <a:prstGeom prst="roundRect">
+            <a:avLst>
+              <a:gd name="adj" fmla="val 0"/>
+            </a:avLst>
+          </a:prstGeom>
+          <a:solidFill>
+            <a:schemeClr val="lt1"/>
+          </a:solidFill>
+          <a:ln w="12700"/>
+        </p:spPr>
+        <p:style>
+          <a:lnRef idx="2">
+            <a:schemeClr val="dk1"/>
+          </a:lnRef>
+          <a:fillRef idx="1">
+            <a:schemeClr val="lt1"/>
+          </a:fillRef>
+          <a:effectRef idx="0">
+            <a:schemeClr val="dk1"/>
+          </a:effectRef>
+          <a:fontRef idx="minor">
+            <a:schemeClr val="dk1"/>
+          </a:fontRef>
+        </p:style>
+        <p:txBody>
+          <a:bodyPr rtlCol="0" anchor="ctr"/>
+          <a:lstStyle/>
+          <a:p>
+            <a:pPr algn="ctr"/>
+            <a:r>
+              <a:rPr lang="en-US" sz="1000" dirty="0" smtClean="0"/>
+              <a:t>Confidentiality</a:t>
+            </a:r>
+            <a:endParaRPr lang="en-US" sz="1000" dirty="0"/>
+          </a:p>
+        </p:txBody>
+      </p:sp>
+      <p:sp>
+        <p:nvSpPr>
+          <p:cNvPr id="139" name="Rounded Rectangle 138"/>
+          <p:cNvSpPr/>
+          <p:nvPr/>
+        </p:nvSpPr>
+        <p:spPr>
+          <a:xfrm>
+            <a:off x="5035566" y="2815185"/>
+            <a:ext cx="1062700" cy="260985"/>
+          </a:xfrm>
+          <a:prstGeom prst="roundRect">
+            <a:avLst>
+              <a:gd name="adj" fmla="val 0"/>
+            </a:avLst>
+          </a:prstGeom>
+          <a:solidFill>
+            <a:schemeClr val="lt1"/>
+          </a:solidFill>
+          <a:ln w="12700"/>
+        </p:spPr>
+        <p:style>
+          <a:lnRef idx="2">
+            <a:schemeClr val="dk1"/>
+          </a:lnRef>
+          <a:fillRef idx="1">
+            <a:schemeClr val="lt1"/>
+          </a:fillRef>
+          <a:effectRef idx="0">
+            <a:schemeClr val="dk1"/>
+          </a:effectRef>
+          <a:fontRef idx="minor">
+            <a:schemeClr val="dk1"/>
+          </a:fontRef>
+        </p:style>
+        <p:txBody>
+          <a:bodyPr rtlCol="0" anchor="ctr"/>
+          <a:lstStyle/>
+          <a:p>
+            <a:pPr algn="ctr"/>
+            <a:r>
+              <a:rPr lang="en-US" sz="1000" dirty="0" smtClean="0"/>
+              <a:t>Safety</a:t>
+            </a:r>
+            <a:endParaRPr lang="en-US" sz="1000" dirty="0"/>
+          </a:p>
+        </p:txBody>
+      </p:sp>
+      <p:sp>
+        <p:nvSpPr>
+          <p:cNvPr id="140" name="Rounded Rectangle 139"/>
+          <p:cNvSpPr/>
+          <p:nvPr/>
+        </p:nvSpPr>
+        <p:spPr>
+          <a:xfrm>
+            <a:off x="5034774" y="3261847"/>
+            <a:ext cx="1034407" cy="227330"/>
+          </a:xfrm>
+          <a:prstGeom prst="roundRect">
+            <a:avLst>
+              <a:gd name="adj" fmla="val 0"/>
+            </a:avLst>
+          </a:prstGeom>
+          <a:solidFill>
+            <a:schemeClr val="lt1"/>
+          </a:solidFill>
+          <a:ln w="12700"/>
+        </p:spPr>
+        <p:style>
+          <a:lnRef idx="2">
+            <a:schemeClr val="dk1"/>
+          </a:lnRef>
+          <a:fillRef idx="1">
+            <a:schemeClr val="lt1"/>
+          </a:fillRef>
+          <a:effectRef idx="0">
+            <a:schemeClr val="dk1"/>
+          </a:effectRef>
+          <a:fontRef idx="minor">
+            <a:schemeClr val="dk1"/>
+          </a:fontRef>
+        </p:style>
+        <p:txBody>
+          <a:bodyPr rtlCol="0" anchor="ctr"/>
+          <a:lstStyle/>
+          <a:p>
+            <a:pPr algn="ctr"/>
+            <a:r>
+              <a:rPr lang="en-US" sz="1000" dirty="0" smtClean="0"/>
+              <a:t>Integrity</a:t>
+            </a:r>
+            <a:endParaRPr lang="en-US" sz="1000" dirty="0"/>
+          </a:p>
+        </p:txBody>
+      </p:sp>
+      <p:cxnSp>
+        <p:nvCxnSpPr>
+          <p:cNvPr id="150" name="Straight Connector 149"/>
+          <p:cNvCxnSpPr>
+            <a:stCxn id="125" idx="1"/>
+            <a:endCxn id="4" idx="3"/>
+          </p:cNvCxnSpPr>
+          <p:nvPr/>
+        </p:nvCxnSpPr>
+        <p:spPr>
+          <a:xfrm flipH="1">
+            <a:off x="4739137" y="1466501"/>
+            <a:ext cx="295636" cy="9239"/>
+          </a:xfrm>
+          <a:prstGeom prst="line">
+            <a:avLst/>
+          </a:prstGeom>
+        </p:spPr>
+        <p:style>
+          <a:lnRef idx="1">
+            <a:schemeClr val="dk1"/>
+          </a:lnRef>
+          <a:fillRef idx="0">
+            <a:schemeClr val="dk1"/>
+          </a:fillRef>
+          <a:effectRef idx="0">
+            <a:schemeClr val="dk1"/>
+          </a:effectRef>
+          <a:fontRef idx="minor">
+            <a:schemeClr val="tx1"/>
+          </a:fontRef>
+        </p:style>
+      </p:cxnSp>
+      <p:cxnSp>
+        <p:nvCxnSpPr>
+          <p:cNvPr id="443" name="Straight Connector 442"/>
+          <p:cNvCxnSpPr>
+            <a:stCxn id="139" idx="1"/>
+            <a:endCxn id="7" idx="3"/>
+          </p:cNvCxnSpPr>
+          <p:nvPr/>
+        </p:nvCxnSpPr>
+        <p:spPr>
+          <a:xfrm flipH="1">
+            <a:off x="4752780" y="2945678"/>
+            <a:ext cx="282786" cy="427496"/>
+          </a:xfrm>
+          <a:prstGeom prst="line">
+            <a:avLst/>
+          </a:prstGeom>
+        </p:spPr>
+        <p:style>
+          <a:lnRef idx="1">
+            <a:schemeClr val="dk1"/>
+          </a:lnRef>
+          <a:fillRef idx="0">
+            <a:schemeClr val="dk1"/>
+          </a:fillRef>
+          <a:effectRef idx="0">
+            <a:schemeClr val="dk1"/>
+          </a:effectRef>
+          <a:fontRef idx="minor">
+            <a:schemeClr val="tx1"/>
+          </a:fontRef>
+        </p:style>
+      </p:cxnSp>
+      <p:cxnSp>
+        <p:nvCxnSpPr>
+          <p:cNvPr id="446" name="Straight Connector 445"/>
+          <p:cNvCxnSpPr>
+            <a:stCxn id="140" idx="1"/>
+            <a:endCxn id="7" idx="3"/>
+          </p:cNvCxnSpPr>
+          <p:nvPr/>
+        </p:nvCxnSpPr>
+        <p:spPr>
+          <a:xfrm flipH="1" flipV="1">
+            <a:off x="4752780" y="3373174"/>
+            <a:ext cx="281994" cy="2338"/>
+          </a:xfrm>
+          <a:prstGeom prst="line">
+            <a:avLst/>
+          </a:prstGeom>
+        </p:spPr>
+        <p:style>
+          <a:lnRef idx="1">
+            <a:schemeClr val="dk1"/>
+          </a:lnRef>
+          <a:fillRef idx="0">
+            <a:schemeClr val="dk1"/>
+          </a:fillRef>
+          <a:effectRef idx="0">
+            <a:schemeClr val="dk1"/>
+          </a:effectRef>
+          <a:fontRef idx="minor">
+            <a:schemeClr val="tx1"/>
+          </a:fontRef>
+        </p:style>
+      </p:cxnSp>
+      <p:cxnSp>
+        <p:nvCxnSpPr>
+          <p:cNvPr id="449" name="Straight Connector 448"/>
+          <p:cNvCxnSpPr>
+            <a:stCxn id="138" idx="1"/>
+            <a:endCxn id="7" idx="3"/>
+          </p:cNvCxnSpPr>
+          <p:nvPr/>
+        </p:nvCxnSpPr>
+        <p:spPr>
+          <a:xfrm flipH="1" flipV="1">
+            <a:off x="4752780" y="3373174"/>
+            <a:ext cx="281994" cy="454648"/>
+          </a:xfrm>
+          <a:prstGeom prst="line">
+            <a:avLst/>
+          </a:prstGeom>
+        </p:spPr>
+        <p:style>
+          <a:lnRef idx="1">
+            <a:schemeClr val="dk1"/>
+          </a:lnRef>
+          <a:fillRef idx="0">
+            <a:schemeClr val="dk1"/>
+          </a:fillRef>
+          <a:effectRef idx="0">
+            <a:schemeClr val="dk1"/>
+          </a:effectRef>
+          <a:fontRef idx="minor">
+            <a:schemeClr val="tx1"/>
+          </a:fontRef>
+        </p:style>
+      </p:cxnSp>
+      <p:sp>
+        <p:nvSpPr>
+          <p:cNvPr id="2" name="TextBox 1"/>
+          <p:cNvSpPr txBox="1"/>
+          <p:nvPr/>
+        </p:nvSpPr>
+        <p:spPr>
+          <a:xfrm>
+            <a:off x="94584" y="6488668"/>
+            <a:ext cx="4980851" cy="369332"/>
+          </a:xfrm>
+          <a:prstGeom prst="rect">
+            <a:avLst/>
+          </a:prstGeom>
+          <a:noFill/>
+        </p:spPr>
+        <p:txBody>
+          <a:bodyPr wrap="none" rtlCol="0">
+            <a:spAutoFit/>
+          </a:bodyPr>
+          <a:lstStyle/>
+          <a:p>
+            <a:r>
+              <a:rPr lang="en-US" dirty="0" smtClean="0"/>
+              <a:t>FOR DEPENDABILITY PURPOSES COMPLETE </a:t>
+            </a:r>
+            <a:r>
+              <a:rPr lang="en-US" dirty="0" smtClean="0"/>
+              <a:t>MODEL</a:t>
+            </a:r>
+            <a:endParaRPr lang="en-US" dirty="0"/>
+          </a:p>
+        </p:txBody>
+      </p:sp>
+      <p:sp>
+        <p:nvSpPr>
+          <p:cNvPr id="75" name="TextBox 74"/>
+          <p:cNvSpPr txBox="1"/>
+          <p:nvPr/>
+        </p:nvSpPr>
+        <p:spPr>
+          <a:xfrm>
+            <a:off x="1401133" y="2236922"/>
+            <a:ext cx="1491439" cy="646331"/>
+          </a:xfrm>
+          <a:prstGeom prst="rect">
+            <a:avLst/>
+          </a:prstGeom>
+        </p:spPr>
+        <p:style>
+          <a:lnRef idx="2">
+            <a:schemeClr val="dk1"/>
+          </a:lnRef>
+          <a:fillRef idx="1">
+            <a:schemeClr val="lt1"/>
+          </a:fillRef>
+          <a:effectRef idx="0">
+            <a:schemeClr val="dk1"/>
+          </a:effectRef>
+          <a:fontRef idx="minor">
+            <a:schemeClr val="dk1"/>
+          </a:fontRef>
+        </p:style>
+        <p:txBody>
+          <a:bodyPr wrap="none" rtlCol="0">
+            <a:spAutoFit/>
+          </a:bodyPr>
+          <a:lstStyle/>
+          <a:p>
+            <a:r>
+              <a:rPr lang="en-US" dirty="0" smtClean="0"/>
+              <a:t>E-Service </a:t>
+            </a:r>
+          </a:p>
+          <a:p>
+            <a:r>
+              <a:rPr lang="en-US" dirty="0" smtClean="0"/>
+              <a:t>Quality </a:t>
+            </a:r>
+            <a:r>
+              <a:rPr lang="en-US" dirty="0" smtClean="0"/>
+              <a:t>in </a:t>
+            </a:r>
+            <a:r>
+              <a:rPr lang="en-US" dirty="0" smtClean="0"/>
+              <a:t>Use</a:t>
+            </a:r>
+          </a:p>
+        </p:txBody>
+      </p:sp>
+      <p:sp>
+        <p:nvSpPr>
+          <p:cNvPr id="84" name="TextBox 83"/>
+          <p:cNvSpPr txBox="1"/>
+          <p:nvPr/>
+        </p:nvSpPr>
+        <p:spPr>
+          <a:xfrm>
+            <a:off x="1279967" y="3875563"/>
+            <a:ext cx="1650700" cy="646331"/>
+          </a:xfrm>
+          <a:prstGeom prst="rect">
+            <a:avLst/>
+          </a:prstGeom>
+        </p:spPr>
+        <p:style>
+          <a:lnRef idx="2">
+            <a:schemeClr val="dk1"/>
+          </a:lnRef>
+          <a:fillRef idx="1">
+            <a:schemeClr val="lt1"/>
+          </a:fillRef>
+          <a:effectRef idx="0">
+            <a:schemeClr val="dk1"/>
+          </a:effectRef>
+          <a:fontRef idx="minor">
+            <a:schemeClr val="dk1"/>
+          </a:fontRef>
+        </p:style>
+        <p:txBody>
+          <a:bodyPr wrap="none" rtlCol="0">
+            <a:spAutoFit/>
+          </a:bodyPr>
+          <a:lstStyle/>
+          <a:p>
+            <a:r>
+              <a:rPr lang="en-US" dirty="0" smtClean="0"/>
+              <a:t>E-Service</a:t>
+            </a:r>
+          </a:p>
+          <a:p>
+            <a:r>
+              <a:rPr lang="en-US" dirty="0" smtClean="0"/>
+              <a:t>Product Quality</a:t>
+            </a:r>
+            <a:endParaRPr lang="en-US" dirty="0"/>
+          </a:p>
+        </p:txBody>
+      </p:sp>
+      <p:cxnSp>
+        <p:nvCxnSpPr>
+          <p:cNvPr id="87" name="Straight Connector 86"/>
+          <p:cNvCxnSpPr>
+            <a:stCxn id="84" idx="3"/>
+            <a:endCxn id="12" idx="1"/>
+          </p:cNvCxnSpPr>
+          <p:nvPr/>
+        </p:nvCxnSpPr>
+        <p:spPr>
+          <a:xfrm>
+            <a:off x="2930667" y="4198729"/>
+            <a:ext cx="260869" cy="0"/>
+          </a:xfrm>
+          <a:prstGeom prst="line">
+            <a:avLst/>
+          </a:prstGeom>
+        </p:spPr>
+        <p:style>
+          <a:lnRef idx="1">
+            <a:schemeClr val="dk1"/>
+          </a:lnRef>
+          <a:fillRef idx="0">
+            <a:schemeClr val="dk1"/>
+          </a:fillRef>
+          <a:effectRef idx="0">
+            <a:schemeClr val="dk1"/>
+          </a:effectRef>
+          <a:fontRef idx="minor">
+            <a:schemeClr val="tx1"/>
+          </a:fontRef>
+        </p:style>
+      </p:cxnSp>
+      <p:sp>
+        <p:nvSpPr>
+          <p:cNvPr id="95" name="TextBox 94"/>
+          <p:cNvSpPr txBox="1"/>
+          <p:nvPr/>
+        </p:nvSpPr>
+        <p:spPr>
+          <a:xfrm>
+            <a:off x="6627119" y="3200719"/>
+            <a:ext cx="1659829" cy="369332"/>
+          </a:xfrm>
+          <a:prstGeom prst="rect">
+            <a:avLst/>
+          </a:prstGeom>
+          <a:ln>
+            <a:solidFill>
+              <a:srgbClr val="000000"/>
+            </a:solidFill>
+          </a:ln>
+        </p:spPr>
+        <p:style>
+          <a:lnRef idx="2">
+            <a:schemeClr val="accent2"/>
+          </a:lnRef>
+          <a:fillRef idx="1">
+            <a:schemeClr val="lt1"/>
+          </a:fillRef>
+          <a:effectRef idx="0">
+            <a:schemeClr val="accent2"/>
+          </a:effectRef>
+          <a:fontRef idx="minor">
+            <a:schemeClr val="dk1"/>
+          </a:fontRef>
+        </p:style>
+        <p:txBody>
+          <a:bodyPr wrap="none" rtlCol="0">
+            <a:spAutoFit/>
+          </a:bodyPr>
+          <a:lstStyle/>
+          <a:p>
+            <a:r>
+              <a:rPr lang="en-US" dirty="0" smtClean="0"/>
+              <a:t>DEPENDABILITY</a:t>
+            </a:r>
+            <a:endParaRPr lang="en-US" dirty="0" smtClean="0"/>
+          </a:p>
+        </p:txBody>
+      </p:sp>
+      <p:cxnSp>
+        <p:nvCxnSpPr>
+          <p:cNvPr id="211" name="Straight Connector 210"/>
+          <p:cNvCxnSpPr>
+            <a:stCxn id="7" idx="0"/>
+            <a:endCxn id="10" idx="2"/>
+          </p:cNvCxnSpPr>
+          <p:nvPr/>
+        </p:nvCxnSpPr>
+        <p:spPr>
+          <a:xfrm flipH="1" flipV="1">
+            <a:off x="3764725" y="2686537"/>
+            <a:ext cx="500376" cy="559637"/>
+          </a:xfrm>
+          <a:prstGeom prst="line">
+            <a:avLst/>
+          </a:prstGeom>
+        </p:spPr>
+        <p:style>
+          <a:lnRef idx="1">
+            <a:schemeClr val="dk1"/>
+          </a:lnRef>
+          <a:fillRef idx="0">
+            <a:schemeClr val="dk1"/>
+          </a:fillRef>
+          <a:effectRef idx="0">
+            <a:schemeClr val="dk1"/>
+          </a:effectRef>
+          <a:fontRef idx="minor">
+            <a:schemeClr val="tx1"/>
+          </a:fontRef>
+        </p:style>
+      </p:cxnSp>
+      <p:cxnSp>
+        <p:nvCxnSpPr>
+          <p:cNvPr id="316" name="Elbow Connector 315"/>
+          <p:cNvCxnSpPr>
+            <a:endCxn id="125" idx="3"/>
+          </p:cNvCxnSpPr>
+          <p:nvPr/>
+        </p:nvCxnSpPr>
+        <p:spPr>
+          <a:xfrm rot="10800000">
+            <a:off x="6138137" y="1466502"/>
+            <a:ext cx="1810873" cy="1734225"/>
+          </a:xfrm>
+          <a:prstGeom prst="bentConnector3">
+            <a:avLst>
+              <a:gd name="adj1" fmla="val 1299"/>
+            </a:avLst>
+          </a:prstGeom>
+          <a:ln w="19050" cmpd="sng">
+            <a:solidFill>
+              <a:schemeClr val="tx1"/>
+            </a:solidFill>
+            <a:tailEnd type="arrow"/>
+          </a:ln>
+          <a:effectLst/>
+        </p:spPr>
+        <p:style>
+          <a:lnRef idx="2">
+            <a:schemeClr val="accent1"/>
+          </a:lnRef>
+          <a:fillRef idx="0">
+            <a:schemeClr val="accent1"/>
+          </a:fillRef>
+          <a:effectRef idx="1">
+            <a:schemeClr val="accent1"/>
+          </a:effectRef>
+          <a:fontRef idx="minor">
+            <a:schemeClr val="tx1"/>
+          </a:fontRef>
+        </p:style>
+      </p:cxnSp>
+      <p:cxnSp>
+        <p:nvCxnSpPr>
+          <p:cNvPr id="319" name="Elbow Connector 318"/>
+          <p:cNvCxnSpPr>
+            <a:stCxn id="95" idx="2"/>
+            <a:endCxn id="12" idx="3"/>
+          </p:cNvCxnSpPr>
+          <p:nvPr/>
+        </p:nvCxnSpPr>
+        <p:spPr>
+          <a:xfrm rot="5400000">
+            <a:off x="5578906" y="2320601"/>
+            <a:ext cx="628678" cy="3127578"/>
+          </a:xfrm>
+          <a:prstGeom prst="bentConnector2">
+            <a:avLst/>
+          </a:prstGeom>
+          <a:ln w="19050" cmpd="sng">
+            <a:solidFill>
+              <a:schemeClr val="tx1"/>
+            </a:solidFill>
+            <a:tailEnd type="arrow"/>
+          </a:ln>
+          <a:effectLst/>
+        </p:spPr>
+        <p:style>
+          <a:lnRef idx="2">
+            <a:schemeClr val="accent1"/>
+          </a:lnRef>
+          <a:fillRef idx="0">
+            <a:schemeClr val="accent1"/>
+          </a:fillRef>
+          <a:effectRef idx="1">
+            <a:schemeClr val="accent1"/>
+          </a:effectRef>
+          <a:fontRef idx="minor">
+            <a:schemeClr val="tx1"/>
+          </a:fontRef>
+        </p:style>
+      </p:cxnSp>
+      <p:cxnSp>
+        <p:nvCxnSpPr>
+          <p:cNvPr id="323" name="Elbow Connector 322"/>
+          <p:cNvCxnSpPr>
+            <a:endCxn id="10" idx="3"/>
+          </p:cNvCxnSpPr>
+          <p:nvPr/>
+        </p:nvCxnSpPr>
+        <p:spPr>
+          <a:xfrm rot="10800000">
+            <a:off x="4409885" y="2539218"/>
+            <a:ext cx="2810068" cy="661501"/>
+          </a:xfrm>
+          <a:prstGeom prst="bentConnector3">
+            <a:avLst>
+              <a:gd name="adj1" fmla="val 204"/>
+            </a:avLst>
+          </a:prstGeom>
+          <a:ln w="19050" cmpd="sng">
+            <a:solidFill>
+              <a:schemeClr val="tx1"/>
+            </a:solidFill>
+            <a:tailEnd type="arrow"/>
+          </a:ln>
+          <a:effectLst/>
+        </p:spPr>
+        <p:style>
+          <a:lnRef idx="2">
+            <a:schemeClr val="accent1"/>
+          </a:lnRef>
+          <a:fillRef idx="0">
+            <a:schemeClr val="accent1"/>
+          </a:fillRef>
+          <a:effectRef idx="1">
+            <a:schemeClr val="accent1"/>
+          </a:effectRef>
+          <a:fontRef idx="minor">
+            <a:schemeClr val="tx1"/>
+          </a:fontRef>
+        </p:style>
+      </p:cxnSp>
+      <p:cxnSp>
+        <p:nvCxnSpPr>
+          <p:cNvPr id="328" name="Elbow Connector 327"/>
+          <p:cNvCxnSpPr>
+            <a:endCxn id="139" idx="3"/>
+          </p:cNvCxnSpPr>
+          <p:nvPr/>
+        </p:nvCxnSpPr>
+        <p:spPr>
+          <a:xfrm rot="10800000">
+            <a:off x="6098266" y="2945678"/>
+            <a:ext cx="839474" cy="255040"/>
+          </a:xfrm>
+          <a:prstGeom prst="bentConnector3">
+            <a:avLst>
+              <a:gd name="adj1" fmla="val -1828"/>
+            </a:avLst>
+          </a:prstGeom>
+          <a:ln w="19050" cmpd="sng">
+            <a:solidFill>
+              <a:schemeClr val="tx1"/>
+            </a:solidFill>
+            <a:tailEnd type="arrow"/>
+          </a:ln>
+          <a:effectLst/>
+        </p:spPr>
+        <p:style>
+          <a:lnRef idx="2">
+            <a:schemeClr val="accent1"/>
+          </a:lnRef>
+          <a:fillRef idx="0">
+            <a:schemeClr val="accent1"/>
+          </a:fillRef>
+          <a:effectRef idx="1">
+            <a:schemeClr val="accent1"/>
+          </a:effectRef>
+          <a:fontRef idx="minor">
+            <a:schemeClr val="tx1"/>
+          </a:fontRef>
+        </p:style>
+      </p:cxnSp>
+      <p:cxnSp>
+        <p:nvCxnSpPr>
+          <p:cNvPr id="334" name="Elbow Connector 333"/>
+          <p:cNvCxnSpPr>
+            <a:endCxn id="138" idx="3"/>
+          </p:cNvCxnSpPr>
+          <p:nvPr/>
+        </p:nvCxnSpPr>
+        <p:spPr>
+          <a:xfrm rot="10800000" flipV="1">
+            <a:off x="6079342" y="3570050"/>
+            <a:ext cx="858399" cy="257771"/>
+          </a:xfrm>
+          <a:prstGeom prst="bentConnector3">
+            <a:avLst>
+              <a:gd name="adj1" fmla="val -2055"/>
+            </a:avLst>
+          </a:prstGeom>
+          <a:ln w="19050" cmpd="sng">
+            <a:solidFill>
+              <a:schemeClr val="tx1"/>
+            </a:solidFill>
+            <a:tailEnd type="arrow"/>
+          </a:ln>
+          <a:effectLst/>
+        </p:spPr>
+        <p:style>
+          <a:lnRef idx="2">
+            <a:schemeClr val="accent1"/>
+          </a:lnRef>
+          <a:fillRef idx="0">
+            <a:schemeClr val="accent1"/>
+          </a:fillRef>
+          <a:effectRef idx="1">
+            <a:schemeClr val="accent1"/>
+          </a:effectRef>
+          <a:fontRef idx="minor">
+            <a:schemeClr val="tx1"/>
+          </a:fontRef>
+        </p:style>
+      </p:cxnSp>
+      <p:cxnSp>
+        <p:nvCxnSpPr>
+          <p:cNvPr id="339" name="Straight Arrow Connector 338"/>
+          <p:cNvCxnSpPr>
+            <a:stCxn id="95" idx="1"/>
+            <a:endCxn id="140" idx="3"/>
+          </p:cNvCxnSpPr>
+          <p:nvPr/>
+        </p:nvCxnSpPr>
+        <p:spPr>
+          <a:xfrm flipH="1" flipV="1">
+            <a:off x="6069181" y="3375512"/>
+            <a:ext cx="557938" cy="9873"/>
+          </a:xfrm>
+          <a:prstGeom prst="straightConnector1">
+            <a:avLst/>
+          </a:prstGeom>
+          <a:ln w="19050" cmpd="sng">
+            <a:solidFill>
+              <a:schemeClr val="tx1"/>
+            </a:solidFill>
+            <a:tailEnd type="arrow"/>
+          </a:ln>
+          <a:effectLst/>
+        </p:spPr>
+        <p:style>
+          <a:lnRef idx="2">
+            <a:schemeClr val="accent1"/>
+          </a:lnRef>
+          <a:fillRef idx="0">
+            <a:schemeClr val="accent1"/>
+          </a:fillRef>
+          <a:effectRef idx="1">
+            <a:schemeClr val="accent1"/>
+          </a:effectRef>
+          <a:fontRef idx="minor">
+            <a:schemeClr val="tx1"/>
+          </a:fontRef>
+        </p:style>
+      </p:cxnSp>
+      <p:sp>
+        <p:nvSpPr>
+          <p:cNvPr id="365" name="Rounded Rectangle 364"/>
+          <p:cNvSpPr/>
+          <p:nvPr/>
+        </p:nvSpPr>
+        <p:spPr>
+          <a:xfrm>
+            <a:off x="3760496" y="1838808"/>
+            <a:ext cx="975359" cy="254000"/>
+          </a:xfrm>
+          <a:prstGeom prst="roundRect">
+            <a:avLst>
+              <a:gd name="adj" fmla="val 50000"/>
+            </a:avLst>
+          </a:prstGeom>
+        </p:spPr>
+        <p:style>
+          <a:lnRef idx="2">
+            <a:schemeClr val="accent1"/>
+          </a:lnRef>
+          <a:fillRef idx="1">
+            <a:schemeClr val="lt1"/>
+          </a:fillRef>
+          <a:effectRef idx="0">
+            <a:schemeClr val="accent1"/>
+          </a:effectRef>
+          <a:fontRef idx="minor">
+            <a:schemeClr val="dk1"/>
+          </a:fontRef>
+        </p:style>
+        <p:txBody>
+          <a:bodyPr rtlCol="0" anchor="ctr"/>
+          <a:lstStyle/>
+          <a:p>
+            <a:pPr algn="ctr"/>
+            <a:r>
+              <a:rPr lang="en-US" sz="1200" dirty="0" smtClean="0"/>
+              <a:t>EFFICIENCY</a:t>
+            </a:r>
+            <a:endParaRPr lang="en-US" sz="1200" dirty="0"/>
+          </a:p>
+        </p:txBody>
+      </p:sp>
+      <p:sp>
+        <p:nvSpPr>
+          <p:cNvPr id="366" name="Rounded Rectangle 365"/>
+          <p:cNvSpPr/>
+          <p:nvPr/>
+        </p:nvSpPr>
+        <p:spPr>
+          <a:xfrm>
+            <a:off x="5035567" y="1838808"/>
+            <a:ext cx="1102570" cy="254000"/>
+          </a:xfrm>
+          <a:prstGeom prst="roundRect">
+            <a:avLst>
+              <a:gd name="adj" fmla="val 0"/>
+            </a:avLst>
+          </a:prstGeom>
+          <a:solidFill>
+            <a:schemeClr val="lt1"/>
+          </a:solidFill>
+          <a:ln w="12700"/>
+        </p:spPr>
+        <p:style>
+          <a:lnRef idx="2">
+            <a:schemeClr val="dk1"/>
+          </a:lnRef>
+          <a:fillRef idx="1">
+            <a:schemeClr val="lt1"/>
+          </a:fillRef>
+          <a:effectRef idx="0">
+            <a:schemeClr val="dk1"/>
+          </a:effectRef>
+          <a:fontRef idx="minor">
+            <a:schemeClr val="dk1"/>
+          </a:fontRef>
+        </p:style>
+        <p:txBody>
+          <a:bodyPr rtlCol="0" anchor="ctr"/>
+          <a:lstStyle/>
+          <a:p>
+            <a:pPr algn="ctr"/>
+            <a:r>
+              <a:rPr lang="en-US" sz="1000" dirty="0" smtClean="0"/>
+              <a:t>Fault Tolerance</a:t>
+            </a:r>
+            <a:endParaRPr lang="en-US" sz="1000" dirty="0"/>
+          </a:p>
+        </p:txBody>
+      </p:sp>
+      <p:cxnSp>
+        <p:nvCxnSpPr>
+          <p:cNvPr id="367" name="Straight Connector 366"/>
+          <p:cNvCxnSpPr>
+            <a:stCxn id="366" idx="1"/>
+            <a:endCxn id="365" idx="3"/>
+          </p:cNvCxnSpPr>
+          <p:nvPr/>
+        </p:nvCxnSpPr>
+        <p:spPr>
+          <a:xfrm flipH="1">
+            <a:off x="4735855" y="1965808"/>
+            <a:ext cx="299712" cy="0"/>
+          </a:xfrm>
+          <a:prstGeom prst="line">
+            <a:avLst/>
+          </a:prstGeom>
+        </p:spPr>
+        <p:style>
+          <a:lnRef idx="1">
+            <a:schemeClr val="dk1"/>
+          </a:lnRef>
+          <a:fillRef idx="0">
+            <a:schemeClr val="dk1"/>
+          </a:fillRef>
+          <a:effectRef idx="0">
+            <a:schemeClr val="dk1"/>
+          </a:effectRef>
+          <a:fontRef idx="minor">
+            <a:schemeClr val="tx1"/>
+          </a:fontRef>
+        </p:style>
+      </p:cxnSp>
+      <p:cxnSp>
+        <p:nvCxnSpPr>
+          <p:cNvPr id="375" name="Elbow Connector 374"/>
+          <p:cNvCxnSpPr>
+            <a:stCxn id="95" idx="0"/>
+            <a:endCxn id="366" idx="3"/>
+          </p:cNvCxnSpPr>
+          <p:nvPr/>
+        </p:nvCxnSpPr>
+        <p:spPr>
+          <a:xfrm rot="16200000" flipV="1">
+            <a:off x="6180131" y="1923815"/>
+            <a:ext cx="1234911" cy="1318897"/>
+          </a:xfrm>
+          <a:prstGeom prst="bentConnector2">
+            <a:avLst/>
+          </a:prstGeom>
+          <a:ln w="19050" cmpd="sng">
+            <a:solidFill>
+              <a:schemeClr val="tx1"/>
+            </a:solidFill>
+            <a:tailEnd type="arrow"/>
+          </a:ln>
+          <a:effectLst/>
+        </p:spPr>
+        <p:style>
+          <a:lnRef idx="2">
+            <a:schemeClr val="accent1"/>
+          </a:lnRef>
+          <a:fillRef idx="0">
+            <a:schemeClr val="accent1"/>
+          </a:fillRef>
+          <a:effectRef idx="1">
+            <a:schemeClr val="accent1"/>
+          </a:effectRef>
+          <a:fontRef idx="minor">
+            <a:schemeClr val="tx1"/>
+          </a:fontRef>
+        </p:style>
+      </p:cxnSp>
+      <p:sp>
+        <p:nvSpPr>
+          <p:cNvPr id="384" name="TextBox 383"/>
+          <p:cNvSpPr txBox="1"/>
+          <p:nvPr/>
+        </p:nvSpPr>
+        <p:spPr>
+          <a:xfrm>
+            <a:off x="2132660" y="1568408"/>
+            <a:ext cx="1087260" cy="276999"/>
+          </a:xfrm>
+          <a:prstGeom prst="rect">
+            <a:avLst/>
+          </a:prstGeom>
+          <a:noFill/>
+        </p:spPr>
+        <p:txBody>
+          <a:bodyPr wrap="square" rtlCol="0">
+            <a:spAutoFit/>
+          </a:bodyPr>
+          <a:lstStyle/>
+          <a:p>
+            <a:r>
+              <a:rPr lang="en-US" sz="1200" dirty="0" smtClean="0"/>
+              <a:t>Depends on</a:t>
+            </a:r>
+            <a:endParaRPr lang="en-US" sz="1200" dirty="0"/>
+          </a:p>
+        </p:txBody>
+      </p:sp>
+      <p:sp>
+        <p:nvSpPr>
+          <p:cNvPr id="385" name="TextBox 384"/>
+          <p:cNvSpPr txBox="1"/>
+          <p:nvPr/>
+        </p:nvSpPr>
+        <p:spPr>
+          <a:xfrm>
+            <a:off x="1636313" y="1314827"/>
+            <a:ext cx="452017" cy="276999"/>
+          </a:xfrm>
+          <a:prstGeom prst="rect">
+            <a:avLst/>
+          </a:prstGeom>
+          <a:noFill/>
+        </p:spPr>
+        <p:txBody>
+          <a:bodyPr wrap="none" rtlCol="0">
+            <a:spAutoFit/>
+          </a:bodyPr>
+          <a:lstStyle/>
+          <a:p>
+            <a:r>
+              <a:rPr lang="en-US" sz="1200" dirty="0" smtClean="0"/>
+              <a:t>Key:</a:t>
+            </a:r>
+            <a:endParaRPr lang="en-US" sz="1200" dirty="0" smtClean="0"/>
+          </a:p>
+        </p:txBody>
+      </p:sp>
+      <p:cxnSp>
+        <p:nvCxnSpPr>
+          <p:cNvPr id="421" name="Straight Arrow Connector 420"/>
+          <p:cNvCxnSpPr/>
+          <p:nvPr/>
+        </p:nvCxnSpPr>
+        <p:spPr>
+          <a:xfrm flipH="1">
+            <a:off x="1749643" y="1732595"/>
+            <a:ext cx="303139" cy="0"/>
+          </a:xfrm>
+          <a:prstGeom prst="straightConnector1">
+            <a:avLst/>
+          </a:prstGeom>
+          <a:ln w="19050" cmpd="sng">
+            <a:solidFill>
+              <a:schemeClr val="tx1"/>
+            </a:solidFill>
+            <a:tailEnd type="arrow"/>
+          </a:ln>
+          <a:effectLst/>
+        </p:spPr>
+        <p:style>
+          <a:lnRef idx="2">
+            <a:schemeClr val="accent1"/>
+          </a:lnRef>
+          <a:fillRef idx="0">
+            <a:schemeClr val="accent1"/>
+          </a:fillRef>
+          <a:effectRef idx="1">
+            <a:schemeClr val="accent1"/>
+          </a:effectRef>
+          <a:fontRef idx="minor">
+            <a:schemeClr val="tx1"/>
+          </a:fontRef>
+        </p:style>
+      </p:cxnSp>
+    </p:spTree>
+    <p:extLst>
+      <p:ext uri="{BB962C8B-B14F-4D97-AF65-F5344CB8AC3E}">
+        <p14:creationId xmlns:p14="http://schemas.microsoft.com/office/powerpoint/2010/main" val="938228249"/>
+      </p:ext>
+    </p:extLst>
+  </p:cSld>
+  <p:clrMapOvr>
+    <a:masterClrMapping/>
+  </p:clrMapOvr>
+  <p:timing>
+    <p:tnLst>
+      <p:par>
+        <p:cTn xmlns:p14="http://schemas.microsoft.com/office/powerpoint/2010/main" id="1" dur="indefinite" restart="never" nodeType="tmRoot"/>
+      </p:par>
+    </p:tnLst>
+  </p:timing>
+</p:sld>
+</file>
+
+<file path=ppt/slides/slide15.xml><?xml version="1.0" encoding="utf-8"?>
+<p:sld xmlns:a="http://schemas.openxmlformats.org/drawingml/2006/main" xmlns:r="http://schemas.openxmlformats.org/officeDocument/2006/relationships" xmlns:p="http://schemas.openxmlformats.org/presentationml/2006/main">
+  <p:cSld>
+    <p:spTree>
+      <p:nvGrpSpPr>
+        <p:cNvPr id="1" name=""/>
+        <p:cNvGrpSpPr/>
+        <p:nvPr/>
+      </p:nvGrpSpPr>
+      <p:grpSpPr>
+        <a:xfrm>
+          <a:off x="0" y="0"/>
+          <a:ext cx="0" cy="0"/>
+          <a:chOff x="0" y="0"/>
+          <a:chExt cx="0" cy="0"/>
+        </a:xfrm>
+      </p:grpSpPr>
+      <p:sp>
+        <p:nvSpPr>
+          <p:cNvPr id="4" name="Rounded Rectangle 3"/>
+          <p:cNvSpPr/>
+          <p:nvPr/>
+        </p:nvSpPr>
+        <p:spPr>
+          <a:xfrm>
             <a:off x="5106066" y="501015"/>
             <a:ext cx="1239519" cy="279400"/>
           </a:xfrm>
@@ -20663,7 +22040,7 @@
 </p:sld>
 </file>
 
-<file path=ppt/slides/slide15.xml><?xml version="1.0" encoding="utf-8"?>
+<file path=ppt/slides/slide16.xml><?xml version="1.0" encoding="utf-8"?>
 <p:sld xmlns:a="http://schemas.openxmlformats.org/drawingml/2006/main" xmlns:r="http://schemas.openxmlformats.org/officeDocument/2006/relationships" xmlns:p="http://schemas.openxmlformats.org/presentationml/2006/main">
   <p:cSld>
     <p:spTree>
@@ -22116,7 +23493,7 @@
 </p:sld>
 </file>
 
-<file path=ppt/slides/slide16.xml><?xml version="1.0" encoding="utf-8"?>
+<file path=ppt/slides/slide17.xml><?xml version="1.0" encoding="utf-8"?>
 <p:sld xmlns:a="http://schemas.openxmlformats.org/drawingml/2006/main" xmlns:r="http://schemas.openxmlformats.org/officeDocument/2006/relationships" xmlns:p="http://schemas.openxmlformats.org/presentationml/2006/main">
   <p:cSld>
     <p:spTree>
@@ -24377,7 +25754,7 @@
 </p:sld>
 </file>
 
-<file path=ppt/slides/slide17.xml><?xml version="1.0" encoding="utf-8"?>
+<file path=ppt/slides/slide18.xml><?xml version="1.0" encoding="utf-8"?>
 <p:sld xmlns:a="http://schemas.openxmlformats.org/drawingml/2006/main" xmlns:r="http://schemas.openxmlformats.org/officeDocument/2006/relationships" xmlns:p="http://schemas.openxmlformats.org/presentationml/2006/main">
   <p:cSld>
     <p:spTree>
@@ -25411,7 +26788,7 @@
 </p:sld>
 </file>
 
-<file path=ppt/slides/slide18.xml><?xml version="1.0" encoding="utf-8"?>
+<file path=ppt/slides/slide19.xml><?xml version="1.0" encoding="utf-8"?>
 <p:sld xmlns:a="http://schemas.openxmlformats.org/drawingml/2006/main" xmlns:r="http://schemas.openxmlformats.org/officeDocument/2006/relationships" xmlns:p="http://schemas.openxmlformats.org/presentationml/2006/main">
   <p:cSld>
     <p:spTree>

</xml_diff>

<commit_message>
Removed customer support dimensional component.
</commit_message>
<xml_diff>
--- a/model.pptx
+++ b/model.pptx
@@ -3850,7 +3850,7 @@
           <a:graphicData uri="http://schemas.openxmlformats.org/presentationml/2006/ole">
             <mc:AlternateContent xmlns:mc="http://schemas.openxmlformats.org/markup-compatibility/2006">
               <mc:Choice xmlns:v="urn:schemas-microsoft-com:vml" Requires="v">
-                <p:oleObj spid="_x0000_s1134" name="Equation" r:id="rId3" imgW="3771900" imgH="203200" progId="Equation.3">
+                <p:oleObj spid="_x0000_s1141" name="Equation" r:id="rId3" imgW="3771900" imgH="203200" progId="Equation.3">
                   <p:embed/>
                 </p:oleObj>
               </mc:Choice>
@@ -4097,7 +4097,7 @@
         </p:nvSpPr>
         <p:spPr>
           <a:xfrm>
-            <a:off x="4941701" y="5476347"/>
+            <a:off x="4941701" y="5095356"/>
             <a:ext cx="1239517" cy="254000"/>
           </a:xfrm>
           <a:prstGeom prst="roundRect">
@@ -4477,7 +4477,7 @@
         </p:nvSpPr>
         <p:spPr>
           <a:xfrm>
-            <a:off x="6597782" y="3685938"/>
+            <a:off x="6597782" y="3363561"/>
             <a:ext cx="1396998" cy="264160"/>
           </a:xfrm>
           <a:prstGeom prst="roundRect">
@@ -4525,7 +4525,7 @@
         </p:nvGrpSpPr>
         <p:grpSpPr>
           <a:xfrm>
-            <a:off x="6602862" y="4193872"/>
+            <a:off x="6602862" y="3871495"/>
             <a:ext cx="1879598" cy="491491"/>
             <a:chOff x="7721601" y="3576319"/>
             <a:chExt cx="1859278" cy="491491"/>
@@ -4726,14 +4726,14 @@
       </p:sp>
       <p:sp>
         <p:nvSpPr>
-          <p:cNvPr id="71" name="Rounded Rectangle 70"/>
+          <p:cNvPr id="72" name="Rounded Rectangle 71"/>
           <p:cNvSpPr/>
           <p:nvPr/>
         </p:nvSpPr>
         <p:spPr>
           <a:xfrm>
-            <a:off x="6613023" y="3322085"/>
-            <a:ext cx="1178560" cy="227330"/>
+            <a:off x="6656267" y="5703756"/>
+            <a:ext cx="1011197" cy="240573"/>
           </a:xfrm>
           <a:prstGeom prst="roundRect">
             <a:avLst>
@@ -4766,7 +4766,7 @@
             <a:pPr algn="ctr"/>
             <a:r>
               <a:rPr lang="en-US" sz="1000" dirty="0" smtClean="0"/>
-              <a:t>Customer Service</a:t>
+              <a:t>Confidentiality</a:t>
             </a:r>
             <a:endParaRPr lang="en-US" sz="1000" dirty="0"/>
           </a:p>
@@ -4774,14 +4774,14 @@
       </p:sp>
       <p:sp>
         <p:nvSpPr>
-          <p:cNvPr id="72" name="Rounded Rectangle 71"/>
+          <p:cNvPr id="74" name="Rounded Rectangle 73"/>
           <p:cNvSpPr/>
           <p:nvPr/>
         </p:nvSpPr>
         <p:spPr>
           <a:xfrm>
-            <a:off x="6656267" y="6084747"/>
-            <a:ext cx="1011197" cy="240573"/>
+            <a:off x="6653727" y="4477597"/>
+            <a:ext cx="2098997" cy="227330"/>
           </a:xfrm>
           <a:prstGeom prst="roundRect">
             <a:avLst>
@@ -4814,7 +4814,7 @@
             <a:pPr algn="ctr"/>
             <a:r>
               <a:rPr lang="en-US" sz="1000" dirty="0" smtClean="0"/>
-              <a:t>Confidentiality</a:t>
+              <a:t>Safety</a:t>
             </a:r>
             <a:endParaRPr lang="en-US" sz="1000" dirty="0"/>
           </a:p>
@@ -4822,14 +4822,14 @@
       </p:sp>
       <p:sp>
         <p:nvSpPr>
-          <p:cNvPr id="74" name="Rounded Rectangle 73"/>
+          <p:cNvPr id="75" name="Rounded Rectangle 74"/>
           <p:cNvSpPr/>
           <p:nvPr/>
         </p:nvSpPr>
         <p:spPr>
           <a:xfrm>
-            <a:off x="6653727" y="4858588"/>
-            <a:ext cx="2098997" cy="227330"/>
+            <a:off x="6666427" y="5400579"/>
+            <a:ext cx="1001037" cy="227330"/>
           </a:xfrm>
           <a:prstGeom prst="roundRect">
             <a:avLst>
@@ -4862,54 +4862,6 @@
             <a:pPr algn="ctr"/>
             <a:r>
               <a:rPr lang="en-US" sz="1000" dirty="0" smtClean="0"/>
-              <a:t>Safety</a:t>
-            </a:r>
-            <a:endParaRPr lang="en-US" sz="1000" dirty="0"/>
-          </a:p>
-        </p:txBody>
-      </p:sp>
-      <p:sp>
-        <p:nvSpPr>
-          <p:cNvPr id="75" name="Rounded Rectangle 74"/>
-          <p:cNvSpPr/>
-          <p:nvPr/>
-        </p:nvSpPr>
-        <p:spPr>
-          <a:xfrm>
-            <a:off x="6666427" y="5781570"/>
-            <a:ext cx="1001037" cy="227330"/>
-          </a:xfrm>
-          <a:prstGeom prst="roundRect">
-            <a:avLst>
-              <a:gd name="adj" fmla="val 0"/>
-            </a:avLst>
-          </a:prstGeom>
-          <a:solidFill>
-            <a:schemeClr val="lt1"/>
-          </a:solidFill>
-          <a:ln w="12700"/>
-        </p:spPr>
-        <p:style>
-          <a:lnRef idx="2">
-            <a:schemeClr val="dk1"/>
-          </a:lnRef>
-          <a:fillRef idx="1">
-            <a:schemeClr val="lt1"/>
-          </a:fillRef>
-          <a:effectRef idx="0">
-            <a:schemeClr val="dk1"/>
-          </a:effectRef>
-          <a:fontRef idx="minor">
-            <a:schemeClr val="dk1"/>
-          </a:fontRef>
-        </p:style>
-        <p:txBody>
-          <a:bodyPr rtlCol="0" anchor="ctr"/>
-          <a:lstStyle/>
-          <a:p>
-            <a:pPr algn="ctr"/>
-            <a:r>
-              <a:rPr lang="en-US" sz="1000" dirty="0" smtClean="0"/>
               <a:t>Integrity</a:t>
             </a:r>
             <a:endParaRPr lang="en-US" sz="1000" dirty="0"/>
@@ -4924,7 +4876,7 @@
         </p:nvSpPr>
         <p:spPr>
           <a:xfrm>
-            <a:off x="6661625" y="5195136"/>
+            <a:off x="6661625" y="4814145"/>
             <a:ext cx="1005839" cy="227330"/>
           </a:xfrm>
           <a:prstGeom prst="roundRect">
@@ -5364,40 +5316,7 @@
         <p:spPr>
           <a:xfrm flipH="1" flipV="1">
             <a:off x="6181218" y="3413812"/>
-            <a:ext cx="416564" cy="404206"/>
-          </a:xfrm>
-          <a:prstGeom prst="line">
-            <a:avLst/>
-          </a:prstGeom>
-        </p:spPr>
-        <p:style>
-          <a:lnRef idx="1">
-            <a:schemeClr val="dk1"/>
-          </a:lnRef>
-          <a:fillRef idx="0">
-            <a:schemeClr val="dk1"/>
-          </a:fillRef>
-          <a:effectRef idx="0">
-            <a:schemeClr val="dk1"/>
-          </a:effectRef>
-          <a:fontRef idx="minor">
-            <a:schemeClr val="tx1"/>
-          </a:fontRef>
-        </p:style>
-      </p:cxnSp>
-      <p:cxnSp>
-        <p:nvCxnSpPr>
-          <p:cNvPr id="91" name="Straight Connector 90"/>
-          <p:cNvCxnSpPr>
-            <a:stCxn id="71" idx="1"/>
-            <a:endCxn id="56" idx="3"/>
-          </p:cNvCxnSpPr>
-          <p:nvPr/>
-        </p:nvCxnSpPr>
-        <p:spPr>
-          <a:xfrm flipH="1" flipV="1">
-            <a:off x="6181218" y="3413812"/>
-            <a:ext cx="431805" cy="21938"/>
+            <a:ext cx="416564" cy="81829"/>
           </a:xfrm>
           <a:prstGeom prst="line">
             <a:avLst/>
@@ -5430,7 +5349,7 @@
         <p:spPr>
           <a:xfrm flipH="1" flipV="1">
             <a:off x="6181218" y="3413812"/>
-            <a:ext cx="421644" cy="910553"/>
+            <a:ext cx="421644" cy="588176"/>
           </a:xfrm>
           <a:prstGeom prst="line">
             <a:avLst/>
@@ -5453,14 +5372,16 @@
       </p:cxnSp>
       <p:cxnSp>
         <p:nvCxnSpPr>
-          <p:cNvPr id="93" name="Elbow Connector 92"/>
-          <p:cNvCxnSpPr/>
+          <p:cNvPr id="94" name="Elbow Connector 93"/>
+          <p:cNvCxnSpPr>
+            <a:stCxn id="65" idx="3"/>
+          </p:cNvCxnSpPr>
           <p:nvPr/>
         </p:nvCxnSpPr>
         <p:spPr>
           <a:xfrm flipV="1">
-            <a:off x="7806821" y="3202071"/>
-            <a:ext cx="243839" cy="259079"/>
+            <a:off x="7994780" y="3202071"/>
+            <a:ext cx="199281" cy="293570"/>
           </a:xfrm>
           <a:prstGeom prst="bentConnector2">
             <a:avLst/>
@@ -5488,18 +5409,51 @@
       </p:cxnSp>
       <p:cxnSp>
         <p:nvCxnSpPr>
-          <p:cNvPr id="94" name="Elbow Connector 93"/>
+          <p:cNvPr id="95" name="Straight Connector 94"/>
           <p:cNvCxnSpPr>
-            <a:stCxn id="65" idx="3"/>
+            <a:stCxn id="63" idx="1"/>
+            <a:endCxn id="55" idx="3"/>
           </p:cNvCxnSpPr>
           <p:nvPr/>
         </p:nvCxnSpPr>
         <p:spPr>
+          <a:xfrm flipH="1" flipV="1">
+            <a:off x="6181219" y="1905660"/>
+            <a:ext cx="518163" cy="389718"/>
+          </a:xfrm>
+          <a:prstGeom prst="line">
+            <a:avLst/>
+          </a:prstGeom>
+        </p:spPr>
+        <p:style>
+          <a:lnRef idx="1">
+            <a:schemeClr val="dk1"/>
+          </a:lnRef>
+          <a:fillRef idx="0">
+            <a:schemeClr val="dk1"/>
+          </a:fillRef>
+          <a:effectRef idx="0">
+            <a:schemeClr val="dk1"/>
+          </a:effectRef>
+          <a:fontRef idx="minor">
+            <a:schemeClr val="tx1"/>
+          </a:fontRef>
+        </p:style>
+      </p:cxnSp>
+      <p:cxnSp>
+        <p:nvCxnSpPr>
+          <p:cNvPr id="96" name="Straight Arrow Connector 95"/>
+          <p:cNvCxnSpPr>
+            <a:stCxn id="67" idx="0"/>
+          </p:cNvCxnSpPr>
+          <p:nvPr/>
+        </p:nvCxnSpPr>
+        <p:spPr>
           <a:xfrm flipV="1">
-            <a:off x="8007326" y="3202072"/>
-            <a:ext cx="250926" cy="615946"/>
-          </a:xfrm>
-          <a:prstGeom prst="bentConnector2">
+            <a:off x="7542661" y="3627721"/>
+            <a:ext cx="0" cy="243774"/>
+          </a:xfrm>
+          <a:prstGeom prst="straightConnector1">
             <a:avLst/>
           </a:prstGeom>
           <a:ln w="3175" cmpd="sng">
@@ -5525,51 +5479,18 @@
       </p:cxnSp>
       <p:cxnSp>
         <p:nvCxnSpPr>
-          <p:cNvPr id="95" name="Straight Connector 94"/>
+          <p:cNvPr id="97" name="Elbow Connector 96"/>
           <p:cNvCxnSpPr>
-            <a:stCxn id="63" idx="1"/>
-            <a:endCxn id="55" idx="3"/>
+            <a:stCxn id="76" idx="3"/>
           </p:cNvCxnSpPr>
           <p:nvPr/>
         </p:nvCxnSpPr>
         <p:spPr>
-          <a:xfrm flipH="1" flipV="1">
-            <a:off x="6181219" y="1905660"/>
-            <a:ext cx="518163" cy="389718"/>
-          </a:xfrm>
-          <a:prstGeom prst="line">
-            <a:avLst/>
-          </a:prstGeom>
-        </p:spPr>
-        <p:style>
-          <a:lnRef idx="1">
-            <a:schemeClr val="dk1"/>
-          </a:lnRef>
-          <a:fillRef idx="0">
-            <a:schemeClr val="dk1"/>
-          </a:fillRef>
-          <a:effectRef idx="0">
-            <a:schemeClr val="dk1"/>
-          </a:effectRef>
-          <a:fontRef idx="minor">
-            <a:schemeClr val="tx1"/>
-          </a:fontRef>
-        </p:style>
-      </p:cxnSp>
-      <p:cxnSp>
-        <p:nvCxnSpPr>
-          <p:cNvPr id="96" name="Straight Arrow Connector 95"/>
-          <p:cNvCxnSpPr>
-            <a:stCxn id="67" idx="0"/>
-          </p:cNvCxnSpPr>
-          <p:nvPr/>
-        </p:nvCxnSpPr>
-        <p:spPr>
           <a:xfrm flipV="1">
-            <a:off x="7542661" y="3950098"/>
-            <a:ext cx="0" cy="243774"/>
-          </a:xfrm>
-          <a:prstGeom prst="straightConnector1">
+            <a:off x="7676688" y="4704928"/>
+            <a:ext cx="184484" cy="222882"/>
+          </a:xfrm>
+          <a:prstGeom prst="bentConnector2">
             <a:avLst/>
           </a:prstGeom>
           <a:ln w="3175" cmpd="sng">
@@ -5595,16 +5516,16 @@
       </p:cxnSp>
       <p:cxnSp>
         <p:nvCxnSpPr>
-          <p:cNvPr id="97" name="Elbow Connector 96"/>
+          <p:cNvPr id="98" name="Elbow Connector 97"/>
           <p:cNvCxnSpPr>
-            <a:stCxn id="76" idx="3"/>
+            <a:stCxn id="75" idx="3"/>
           </p:cNvCxnSpPr>
           <p:nvPr/>
         </p:nvCxnSpPr>
         <p:spPr>
           <a:xfrm flipV="1">
-            <a:off x="7676688" y="5085919"/>
-            <a:ext cx="184484" cy="222882"/>
+            <a:off x="7698560" y="4704928"/>
+            <a:ext cx="621916" cy="809316"/>
           </a:xfrm>
           <a:prstGeom prst="bentConnector2">
             <a:avLst/>
@@ -5632,16 +5553,16 @@
       </p:cxnSp>
       <p:cxnSp>
         <p:nvCxnSpPr>
-          <p:cNvPr id="98" name="Elbow Connector 97"/>
+          <p:cNvPr id="99" name="Elbow Connector 98"/>
           <p:cNvCxnSpPr>
-            <a:stCxn id="75" idx="3"/>
+            <a:stCxn id="72" idx="3"/>
           </p:cNvCxnSpPr>
           <p:nvPr/>
         </p:nvCxnSpPr>
         <p:spPr>
           <a:xfrm flipV="1">
-            <a:off x="7698560" y="5085919"/>
-            <a:ext cx="621916" cy="809316"/>
+            <a:off x="7709007" y="4704929"/>
+            <a:ext cx="830851" cy="1119114"/>
           </a:xfrm>
           <a:prstGeom prst="bentConnector2">
             <a:avLst/>
@@ -5669,43 +5590,6 @@
       </p:cxnSp>
       <p:cxnSp>
         <p:nvCxnSpPr>
-          <p:cNvPr id="99" name="Elbow Connector 98"/>
-          <p:cNvCxnSpPr>
-            <a:stCxn id="72" idx="3"/>
-          </p:cNvCxnSpPr>
-          <p:nvPr/>
-        </p:nvCxnSpPr>
-        <p:spPr>
-          <a:xfrm flipV="1">
-            <a:off x="7709007" y="5085920"/>
-            <a:ext cx="830851" cy="1119114"/>
-          </a:xfrm>
-          <a:prstGeom prst="bentConnector2">
-            <a:avLst/>
-          </a:prstGeom>
-          <a:ln w="3175" cmpd="sng">
-            <a:prstDash val="lgDash"/>
-            <a:tailEnd type="arrow"/>
-          </a:ln>
-          <a:effectLst/>
-        </p:spPr>
-        <p:style>
-          <a:lnRef idx="2">
-            <a:schemeClr val="accent1"/>
-          </a:lnRef>
-          <a:fillRef idx="0">
-            <a:schemeClr val="accent1"/>
-          </a:fillRef>
-          <a:effectRef idx="1">
-            <a:schemeClr val="accent1"/>
-          </a:effectRef>
-          <a:fontRef idx="minor">
-            <a:schemeClr val="tx1"/>
-          </a:fontRef>
-        </p:style>
-      </p:cxnSp>
-      <p:cxnSp>
-        <p:nvCxnSpPr>
           <p:cNvPr id="100" name="Straight Connector 99"/>
           <p:cNvCxnSpPr>
             <a:stCxn id="74" idx="1"/>
@@ -5715,7 +5599,7 @@
         </p:nvCxnSpPr>
         <p:spPr>
           <a:xfrm flipH="1">
-            <a:off x="6181218" y="4972253"/>
+            <a:off x="6181218" y="4591262"/>
             <a:ext cx="472509" cy="631094"/>
           </a:xfrm>
           <a:prstGeom prst="line">
@@ -5748,7 +5632,7 @@
         </p:nvCxnSpPr>
         <p:spPr>
           <a:xfrm flipH="1" flipV="1">
-            <a:off x="6181218" y="5603347"/>
+            <a:off x="6181218" y="5222356"/>
             <a:ext cx="485209" cy="291888"/>
           </a:xfrm>
           <a:prstGeom prst="line">
@@ -5781,7 +5665,7 @@
         </p:nvCxnSpPr>
         <p:spPr>
           <a:xfrm flipH="1" flipV="1">
-            <a:off x="6181218" y="5603347"/>
+            <a:off x="6181218" y="5222356"/>
             <a:ext cx="475049" cy="601687"/>
           </a:xfrm>
           <a:prstGeom prst="line">
@@ -5814,7 +5698,7 @@
         </p:nvCxnSpPr>
         <p:spPr>
           <a:xfrm flipH="1">
-            <a:off x="6181218" y="5603347"/>
+            <a:off x="6181218" y="5222356"/>
             <a:ext cx="490290" cy="0"/>
           </a:xfrm>
           <a:prstGeom prst="line">
@@ -5924,7 +5808,7 @@
         </p:nvSpPr>
         <p:spPr>
           <a:xfrm>
-            <a:off x="6671508" y="5493707"/>
+            <a:off x="6671508" y="5112716"/>
             <a:ext cx="993917" cy="219279"/>
           </a:xfrm>
           <a:prstGeom prst="roundRect">
@@ -5974,7 +5858,7 @@
         </p:nvCxnSpPr>
         <p:spPr>
           <a:xfrm flipV="1">
-            <a:off x="7683740" y="5085919"/>
+            <a:off x="7683740" y="4704928"/>
             <a:ext cx="366314" cy="517428"/>
           </a:xfrm>
           <a:prstGeom prst="bentConnector2">
@@ -6009,7 +5893,7 @@
         </p:nvSpPr>
         <p:spPr>
           <a:xfrm>
-            <a:off x="5210836" y="6357677"/>
+            <a:off x="5210836" y="5976686"/>
             <a:ext cx="3541888" cy="461665"/>
           </a:xfrm>
           <a:prstGeom prst="rect">
@@ -6045,7 +5929,7 @@
         </p:nvCxnSpPr>
         <p:spPr>
           <a:xfrm flipH="1">
-            <a:off x="4957124" y="6695443"/>
+            <a:off x="4957124" y="6314452"/>
             <a:ext cx="263174" cy="0"/>
           </a:xfrm>
           <a:prstGeom prst="straightConnector1">
@@ -6080,7 +5964,7 @@
         </p:nvCxnSpPr>
         <p:spPr>
           <a:xfrm flipH="1">
-            <a:off x="4933418" y="6518876"/>
+            <a:off x="4933418" y="6137885"/>
             <a:ext cx="291815" cy="0"/>
           </a:xfrm>
           <a:prstGeom prst="straightConnector1">
@@ -6115,7 +5999,7 @@
         </p:nvSpPr>
         <p:spPr>
           <a:xfrm>
-            <a:off x="4933418" y="6104096"/>
+            <a:off x="4933418" y="5723105"/>
             <a:ext cx="452017" cy="276999"/>
           </a:xfrm>
           <a:prstGeom prst="rect">
@@ -6147,7 +6031,7 @@
         </p:nvCxnSpPr>
         <p:spPr>
           <a:xfrm flipH="1">
-            <a:off x="6181218" y="5308801"/>
+            <a:off x="6181218" y="4927810"/>
             <a:ext cx="480407" cy="294546"/>
           </a:xfrm>
           <a:prstGeom prst="line">
@@ -6177,7 +6061,7 @@
         </p:nvSpPr>
         <p:spPr>
           <a:xfrm>
-            <a:off x="7589236" y="3947651"/>
+            <a:off x="7589236" y="3625274"/>
             <a:ext cx="524302" cy="246221"/>
           </a:xfrm>
           <a:prstGeom prst="rect">
@@ -6287,13 +6171,13 @@
       </p:sp>
       <p:sp>
         <p:nvSpPr>
-          <p:cNvPr id="173" name="TextBox 172"/>
+          <p:cNvPr id="174" name="TextBox 173"/>
           <p:cNvSpPr txBox="1"/>
           <p:nvPr/>
         </p:nvSpPr>
         <p:spPr>
           <a:xfrm>
-            <a:off x="7768616" y="3403984"/>
+            <a:off x="7745175" y="5261440"/>
             <a:ext cx="524302" cy="246221"/>
           </a:xfrm>
           <a:prstGeom prst="rect">
@@ -6309,20 +6193,20 @@
           <a:p>
             <a:r>
               <a:rPr lang="en-US" sz="1000" dirty="0" smtClean="0"/>
-              <a:t>H4.8.5</a:t>
-            </a:r>
-          </a:p>
-        </p:txBody>
-      </p:sp>
-      <p:sp>
-        <p:nvSpPr>
-          <p:cNvPr id="174" name="TextBox 173"/>
+              <a:t>H4.8.7</a:t>
+            </a:r>
+          </a:p>
+        </p:txBody>
+      </p:sp>
+      <p:sp>
+        <p:nvSpPr>
+          <p:cNvPr id="175" name="TextBox 174"/>
           <p:cNvSpPr txBox="1"/>
           <p:nvPr/>
         </p:nvSpPr>
         <p:spPr>
           <a:xfrm>
-            <a:off x="7745175" y="5642431"/>
+            <a:off x="7741317" y="534194"/>
             <a:ext cx="524302" cy="246221"/>
           </a:xfrm>
           <a:prstGeom prst="rect">
@@ -6338,20 +6222,20 @@
           <a:p>
             <a:r>
               <a:rPr lang="en-US" sz="1000" dirty="0" smtClean="0"/>
-              <a:t>H4.8.7</a:t>
-            </a:r>
-          </a:p>
-        </p:txBody>
-      </p:sp>
-      <p:sp>
-        <p:nvSpPr>
-          <p:cNvPr id="175" name="TextBox 174"/>
+              <a:t>H4.8.1</a:t>
+            </a:r>
+          </a:p>
+        </p:txBody>
+      </p:sp>
+      <p:sp>
+        <p:nvSpPr>
+          <p:cNvPr id="73" name="TextBox 72"/>
           <p:cNvSpPr txBox="1"/>
           <p:nvPr/>
         </p:nvSpPr>
         <p:spPr>
           <a:xfrm>
-            <a:off x="7741317" y="534194"/>
+            <a:off x="8190196" y="3275640"/>
             <a:ext cx="524302" cy="246221"/>
           </a:xfrm>
           <a:prstGeom prst="rect">
@@ -6367,7 +6251,7 @@
           <a:p>
             <a:r>
               <a:rPr lang="en-US" sz="1000" dirty="0" smtClean="0"/>
-              <a:t>H4.8.1</a:t>
+              <a:t>H4.8.5</a:t>
             </a:r>
           </a:p>
         </p:txBody>
@@ -15374,8 +15258,8 @@
         </p:nvSpPr>
         <p:spPr>
           <a:xfrm>
-            <a:off x="5106066" y="501015"/>
-            <a:ext cx="1239519" cy="279400"/>
+            <a:off x="5174451" y="501015"/>
+            <a:ext cx="1337208" cy="279400"/>
           </a:xfrm>
           <a:prstGeom prst="roundRect">
             <a:avLst>
@@ -15418,8 +15302,8 @@
         </p:nvSpPr>
         <p:spPr>
           <a:xfrm>
-            <a:off x="5106067" y="1778660"/>
-            <a:ext cx="1239518" cy="254000"/>
+            <a:off x="5174450" y="1827505"/>
+            <a:ext cx="1345396" cy="254000"/>
           </a:xfrm>
           <a:prstGeom prst="roundRect">
             <a:avLst>
@@ -15462,7 +15346,7 @@
         </p:nvSpPr>
         <p:spPr>
           <a:xfrm>
-            <a:off x="5106067" y="3322085"/>
+            <a:off x="5174450" y="3578961"/>
             <a:ext cx="1239518" cy="231554"/>
           </a:xfrm>
           <a:prstGeom prst="roundRect">
@@ -15506,7 +15390,7 @@
         </p:nvSpPr>
         <p:spPr>
           <a:xfrm>
-            <a:off x="5106067" y="5493707"/>
+            <a:off x="5106067" y="5362319"/>
             <a:ext cx="1239518" cy="236640"/>
           </a:xfrm>
           <a:prstGeom prst="roundRect">
@@ -15733,7 +15617,7 @@
         </p:nvSpPr>
         <p:spPr>
           <a:xfrm>
-            <a:off x="2848158" y="5435707"/>
+            <a:off x="2848158" y="5326217"/>
             <a:ext cx="1267270" cy="294640"/>
           </a:xfrm>
           <a:prstGeom prst="roundRect">
@@ -15785,7 +15669,7 @@
         <p:spPr>
           <a:xfrm flipV="1">
             <a:off x="4091271" y="640715"/>
-            <a:ext cx="1014795" cy="19685"/>
+            <a:ext cx="1083180" cy="19685"/>
           </a:xfrm>
           <a:prstGeom prst="line">
             <a:avLst/>
@@ -15818,7 +15702,7 @@
         <p:spPr>
           <a:xfrm>
             <a:off x="4091271" y="660400"/>
-            <a:ext cx="1014796" cy="1245260"/>
+            <a:ext cx="1083179" cy="1294105"/>
           </a:xfrm>
           <a:prstGeom prst="line">
             <a:avLst/>
@@ -15851,7 +15735,7 @@
         <p:spPr>
           <a:xfrm flipV="1">
             <a:off x="4115428" y="640715"/>
-            <a:ext cx="990638" cy="847726"/>
+            <a:ext cx="1059023" cy="847726"/>
           </a:xfrm>
           <a:prstGeom prst="line">
             <a:avLst/>
@@ -15884,7 +15768,7 @@
         <p:spPr>
           <a:xfrm>
             <a:off x="4115428" y="1488441"/>
-            <a:ext cx="990639" cy="1949421"/>
+            <a:ext cx="1059022" cy="2206297"/>
           </a:xfrm>
           <a:prstGeom prst="line">
             <a:avLst/>
@@ -15917,7 +15801,7 @@
         <p:spPr>
           <a:xfrm>
             <a:off x="4091271" y="660400"/>
-            <a:ext cx="1014796" cy="2777462"/>
+            <a:ext cx="1083179" cy="3034338"/>
           </a:xfrm>
           <a:prstGeom prst="line">
             <a:avLst/>
@@ -15950,7 +15834,7 @@
         <p:spPr>
           <a:xfrm>
             <a:off x="4115428" y="2385695"/>
-            <a:ext cx="990639" cy="3226332"/>
+            <a:ext cx="990639" cy="3094944"/>
           </a:xfrm>
           <a:prstGeom prst="line">
             <a:avLst/>
@@ -15982,8 +15866,8 @@
         </p:nvCxnSpPr>
         <p:spPr>
           <a:xfrm flipV="1">
-            <a:off x="4091272" y="3437862"/>
-            <a:ext cx="1014795" cy="1394821"/>
+            <a:off x="4091272" y="3694738"/>
+            <a:ext cx="1083178" cy="1137945"/>
           </a:xfrm>
           <a:prstGeom prst="line">
             <a:avLst/>
@@ -16015,8 +15899,8 @@
         </p:nvCxnSpPr>
         <p:spPr>
           <a:xfrm flipV="1">
-            <a:off x="4091272" y="1905660"/>
-            <a:ext cx="1014795" cy="2927023"/>
+            <a:off x="4091272" y="1954505"/>
+            <a:ext cx="1083178" cy="2878178"/>
           </a:xfrm>
           <a:prstGeom prst="line">
             <a:avLst/>
@@ -16049,7 +15933,7 @@
         <p:spPr>
           <a:xfrm flipV="1">
             <a:off x="4091272" y="640715"/>
-            <a:ext cx="1014794" cy="4191968"/>
+            <a:ext cx="1083179" cy="4191968"/>
           </a:xfrm>
           <a:prstGeom prst="line">
             <a:avLst/>
@@ -16081,8 +15965,8 @@
         </p:nvCxnSpPr>
         <p:spPr>
           <a:xfrm>
-            <a:off x="4115428" y="5583027"/>
-            <a:ext cx="990639" cy="29000"/>
+            <a:off x="4115428" y="5473537"/>
+            <a:ext cx="990639" cy="7102"/>
           </a:xfrm>
           <a:prstGeom prst="line">
             <a:avLst/>
@@ -16303,7 +16187,7 @@
         </p:nvSpPr>
         <p:spPr>
           <a:xfrm>
-            <a:off x="6742140" y="1706877"/>
+            <a:off x="6742140" y="1772571"/>
             <a:ext cx="1066800" cy="367664"/>
           </a:xfrm>
           <a:prstGeom prst="roundRect">
@@ -16351,7 +16235,7 @@
         </p:nvSpPr>
         <p:spPr>
           <a:xfrm>
-            <a:off x="6742140" y="2142515"/>
+            <a:off x="6742140" y="2241056"/>
             <a:ext cx="1494679" cy="305726"/>
           </a:xfrm>
           <a:prstGeom prst="roundRect">
@@ -16399,7 +16283,7 @@
         </p:nvSpPr>
         <p:spPr>
           <a:xfrm>
-            <a:off x="6671020" y="2925210"/>
+            <a:off x="6671020" y="3144190"/>
             <a:ext cx="2065978" cy="276861"/>
           </a:xfrm>
           <a:prstGeom prst="roundRect">
@@ -16447,7 +16331,7 @@
         </p:nvSpPr>
         <p:spPr>
           <a:xfrm>
-            <a:off x="6640540" y="3685938"/>
+            <a:off x="6640540" y="3565499"/>
             <a:ext cx="1396998" cy="264160"/>
           </a:xfrm>
           <a:prstGeom prst="roundRect">
@@ -16495,7 +16379,7 @@
         </p:nvGrpSpPr>
         <p:grpSpPr>
           <a:xfrm>
-            <a:off x="6645620" y="4193872"/>
+            <a:off x="6645620" y="4073433"/>
             <a:ext cx="1879598" cy="491491"/>
             <a:chOff x="7721601" y="3576319"/>
             <a:chExt cx="1859278" cy="491491"/>
@@ -16654,7 +16538,7 @@
         </p:nvSpPr>
         <p:spPr>
           <a:xfrm>
-            <a:off x="6671020" y="2578500"/>
+            <a:off x="6671020" y="2797480"/>
             <a:ext cx="1851659" cy="254000"/>
           </a:xfrm>
           <a:prstGeom prst="roundRect">
@@ -16696,14 +16580,14 @@
       </p:sp>
       <p:sp>
         <p:nvSpPr>
-          <p:cNvPr id="137" name="Rounded Rectangle 136"/>
+          <p:cNvPr id="138" name="Rounded Rectangle 137"/>
           <p:cNvSpPr/>
           <p:nvPr/>
         </p:nvSpPr>
         <p:spPr>
           <a:xfrm>
-            <a:off x="6655781" y="3322085"/>
-            <a:ext cx="1178560" cy="227330"/>
+            <a:off x="6699025" y="5964308"/>
+            <a:ext cx="1011197" cy="240573"/>
           </a:xfrm>
           <a:prstGeom prst="roundRect">
             <a:avLst>
@@ -16736,7 +16620,7 @@
             <a:pPr algn="ctr"/>
             <a:r>
               <a:rPr lang="en-US" sz="1000" dirty="0" smtClean="0"/>
-              <a:t>Customer Service</a:t>
+              <a:t>Confidentiality</a:t>
             </a:r>
             <a:endParaRPr lang="en-US" sz="1000" dirty="0"/>
           </a:p>
@@ -16744,14 +16628,14 @@
       </p:sp>
       <p:sp>
         <p:nvSpPr>
-          <p:cNvPr id="138" name="Rounded Rectangle 137"/>
+          <p:cNvPr id="139" name="Rounded Rectangle 138"/>
           <p:cNvSpPr/>
           <p:nvPr/>
         </p:nvSpPr>
         <p:spPr>
           <a:xfrm>
-            <a:off x="6699025" y="6084747"/>
-            <a:ext cx="1011197" cy="240573"/>
+            <a:off x="6696485" y="4738149"/>
+            <a:ext cx="2098997" cy="227330"/>
           </a:xfrm>
           <a:prstGeom prst="roundRect">
             <a:avLst>
@@ -16784,7 +16668,7 @@
             <a:pPr algn="ctr"/>
             <a:r>
               <a:rPr lang="en-US" sz="1000" dirty="0" smtClean="0"/>
-              <a:t>Confidentiality</a:t>
+              <a:t>Safety</a:t>
             </a:r>
             <a:endParaRPr lang="en-US" sz="1000" dirty="0"/>
           </a:p>
@@ -16792,14 +16676,14 @@
       </p:sp>
       <p:sp>
         <p:nvSpPr>
-          <p:cNvPr id="139" name="Rounded Rectangle 138"/>
+          <p:cNvPr id="140" name="Rounded Rectangle 139"/>
           <p:cNvSpPr/>
           <p:nvPr/>
         </p:nvSpPr>
         <p:spPr>
           <a:xfrm>
-            <a:off x="6696485" y="4858588"/>
-            <a:ext cx="2098997" cy="227330"/>
+            <a:off x="6709185" y="5661131"/>
+            <a:ext cx="1001037" cy="227330"/>
           </a:xfrm>
           <a:prstGeom prst="roundRect">
             <a:avLst>
@@ -16832,54 +16716,6 @@
             <a:pPr algn="ctr"/>
             <a:r>
               <a:rPr lang="en-US" sz="1000" dirty="0" smtClean="0"/>
-              <a:t>Safety</a:t>
-            </a:r>
-            <a:endParaRPr lang="en-US" sz="1000" dirty="0"/>
-          </a:p>
-        </p:txBody>
-      </p:sp>
-      <p:sp>
-        <p:nvSpPr>
-          <p:cNvPr id="140" name="Rounded Rectangle 139"/>
-          <p:cNvSpPr/>
-          <p:nvPr/>
-        </p:nvSpPr>
-        <p:spPr>
-          <a:xfrm>
-            <a:off x="6709185" y="5781570"/>
-            <a:ext cx="1001037" cy="227330"/>
-          </a:xfrm>
-          <a:prstGeom prst="roundRect">
-            <a:avLst>
-              <a:gd name="adj" fmla="val 0"/>
-            </a:avLst>
-          </a:prstGeom>
-          <a:solidFill>
-            <a:schemeClr val="lt1"/>
-          </a:solidFill>
-          <a:ln w="12700"/>
-        </p:spPr>
-        <p:style>
-          <a:lnRef idx="2">
-            <a:schemeClr val="dk1"/>
-          </a:lnRef>
-          <a:fillRef idx="1">
-            <a:schemeClr val="lt1"/>
-          </a:fillRef>
-          <a:effectRef idx="0">
-            <a:schemeClr val="dk1"/>
-          </a:effectRef>
-          <a:fontRef idx="minor">
-            <a:schemeClr val="dk1"/>
-          </a:fontRef>
-        </p:style>
-        <p:txBody>
-          <a:bodyPr rtlCol="0" anchor="ctr"/>
-          <a:lstStyle/>
-          <a:p>
-            <a:pPr algn="ctr"/>
-            <a:r>
-              <a:rPr lang="en-US" sz="1000" dirty="0" smtClean="0"/>
               <a:t>Integrity</a:t>
             </a:r>
             <a:endParaRPr lang="en-US" sz="1000" dirty="0"/>
@@ -16894,7 +16730,7 @@
         </p:nvSpPr>
         <p:spPr>
           <a:xfrm>
-            <a:off x="6704383" y="5195136"/>
+            <a:off x="6704383" y="5074697"/>
             <a:ext cx="1005839" cy="227330"/>
           </a:xfrm>
           <a:prstGeom prst="roundRect">
@@ -16945,8 +16781,8 @@
         </p:nvCxnSpPr>
         <p:spPr>
           <a:xfrm flipH="1">
-            <a:off x="6345585" y="303530"/>
-            <a:ext cx="467675" cy="337185"/>
+            <a:off x="6511659" y="303530"/>
+            <a:ext cx="301601" cy="337185"/>
           </a:xfrm>
           <a:prstGeom prst="line">
             <a:avLst/>
@@ -16978,8 +16814,8 @@
         </p:nvCxnSpPr>
         <p:spPr>
           <a:xfrm flipH="1" flipV="1">
-            <a:off x="6345585" y="640715"/>
-            <a:ext cx="457515" cy="4445"/>
+            <a:off x="6511659" y="640715"/>
+            <a:ext cx="291441" cy="4445"/>
           </a:xfrm>
           <a:prstGeom prst="line">
             <a:avLst/>
@@ -17011,8 +16847,8 @@
         </p:nvCxnSpPr>
         <p:spPr>
           <a:xfrm flipH="1" flipV="1">
-            <a:off x="6345585" y="640715"/>
-            <a:ext cx="467675" cy="369752"/>
+            <a:off x="6511659" y="640715"/>
+            <a:ext cx="301601" cy="369752"/>
           </a:xfrm>
           <a:prstGeom prst="line">
             <a:avLst/>
@@ -17044,8 +16880,8 @@
         </p:nvCxnSpPr>
         <p:spPr>
           <a:xfrm flipH="1">
-            <a:off x="6345585" y="1524661"/>
-            <a:ext cx="396555" cy="380999"/>
+            <a:off x="6519846" y="1524661"/>
+            <a:ext cx="222294" cy="429844"/>
           </a:xfrm>
           <a:prstGeom prst="line">
             <a:avLst/>
@@ -17076,9 +16912,9 @@
           <p:nvPr/>
         </p:nvCxnSpPr>
         <p:spPr>
-          <a:xfrm flipH="1">
-            <a:off x="6345585" y="1890709"/>
-            <a:ext cx="396555" cy="14951"/>
+          <a:xfrm flipH="1" flipV="1">
+            <a:off x="6519846" y="1954505"/>
+            <a:ext cx="222294" cy="1898"/>
           </a:xfrm>
           <a:prstGeom prst="line">
             <a:avLst/>
@@ -17110,8 +16946,8 @@
         </p:nvCxnSpPr>
         <p:spPr>
           <a:xfrm flipH="1">
-            <a:off x="6345585" y="3063641"/>
-            <a:ext cx="325435" cy="374221"/>
+            <a:off x="6413968" y="3282621"/>
+            <a:ext cx="257052" cy="412117"/>
           </a:xfrm>
           <a:prstGeom prst="line">
             <a:avLst/>
@@ -17180,8 +17016,8 @@
         </p:nvCxnSpPr>
         <p:spPr>
           <a:xfrm flipH="1" flipV="1">
-            <a:off x="7808941" y="2032660"/>
-            <a:ext cx="427878" cy="262718"/>
+            <a:off x="7808940" y="2085686"/>
+            <a:ext cx="427879" cy="308233"/>
           </a:xfrm>
           <a:prstGeom prst="bentConnector3">
             <a:avLst>
@@ -17219,13 +17055,11 @@
         </p:nvCxnSpPr>
         <p:spPr>
           <a:xfrm flipV="1">
-            <a:off x="7808940" y="1656741"/>
-            <a:ext cx="243839" cy="233968"/>
-          </a:xfrm>
-          <a:prstGeom prst="bentConnector3">
-            <a:avLst>
-              <a:gd name="adj1" fmla="val 104827"/>
-            </a:avLst>
+            <a:off x="7808940" y="1657659"/>
+            <a:ext cx="243839" cy="298744"/>
+          </a:xfrm>
+          <a:prstGeom prst="bentConnector2">
+            <a:avLst/>
           </a:prstGeom>
           <a:ln w="3175" cmpd="sng">
             <a:prstDash val="lgDash"/>
@@ -17261,11 +17095,11 @@
         <p:spPr>
           <a:xfrm flipH="1" flipV="1">
             <a:off x="8433258" y="1010467"/>
-            <a:ext cx="303740" cy="2053174"/>
+            <a:ext cx="303740" cy="2272154"/>
           </a:xfrm>
           <a:prstGeom prst="bentConnector3">
             <a:avLst>
-              <a:gd name="adj1" fmla="val -75262"/>
+              <a:gd name="adj1" fmla="val -43098"/>
             </a:avLst>
           </a:prstGeom>
           <a:ln w="12700" cmpd="sng">
@@ -17300,8 +17134,8 @@
         </p:nvCxnSpPr>
         <p:spPr>
           <a:xfrm flipH="1">
-            <a:off x="6345585" y="2705500"/>
-            <a:ext cx="325435" cy="732362"/>
+            <a:off x="6413968" y="2924480"/>
+            <a:ext cx="257052" cy="770258"/>
           </a:xfrm>
           <a:prstGeom prst="line">
             <a:avLst/>
@@ -17333,41 +17167,8 @@
         </p:nvCxnSpPr>
         <p:spPr>
           <a:xfrm flipH="1" flipV="1">
-            <a:off x="6345585" y="3437862"/>
-            <a:ext cx="294955" cy="380156"/>
-          </a:xfrm>
-          <a:prstGeom prst="line">
-            <a:avLst/>
-          </a:prstGeom>
-        </p:spPr>
-        <p:style>
-          <a:lnRef idx="1">
-            <a:schemeClr val="dk1"/>
-          </a:lnRef>
-          <a:fillRef idx="0">
-            <a:schemeClr val="dk1"/>
-          </a:fillRef>
-          <a:effectRef idx="0">
-            <a:schemeClr val="dk1"/>
-          </a:effectRef>
-          <a:fontRef idx="minor">
-            <a:schemeClr val="tx1"/>
-          </a:fontRef>
-        </p:style>
-      </p:cxnSp>
-      <p:cxnSp>
-        <p:nvCxnSpPr>
-          <p:cNvPr id="225" name="Straight Connector 224"/>
-          <p:cNvCxnSpPr>
-            <a:stCxn id="137" idx="1"/>
-            <a:endCxn id="6" idx="3"/>
-          </p:cNvCxnSpPr>
-          <p:nvPr/>
-        </p:nvCxnSpPr>
-        <p:spPr>
-          <a:xfrm flipH="1">
-            <a:off x="6345585" y="3435750"/>
-            <a:ext cx="310196" cy="2112"/>
+            <a:off x="6413968" y="3694738"/>
+            <a:ext cx="226572" cy="2841"/>
           </a:xfrm>
           <a:prstGeom prst="line">
             <a:avLst/>
@@ -17399,8 +17200,8 @@
         </p:nvCxnSpPr>
         <p:spPr>
           <a:xfrm flipH="1" flipV="1">
-            <a:off x="6345585" y="3437862"/>
-            <a:ext cx="300035" cy="886503"/>
+            <a:off x="6413968" y="3694738"/>
+            <a:ext cx="231652" cy="509188"/>
           </a:xfrm>
           <a:prstGeom prst="line">
             <a:avLst/>
@@ -17423,17 +17224,21 @@
       </p:cxnSp>
       <p:cxnSp>
         <p:nvCxnSpPr>
-          <p:cNvPr id="313" name="Elbow Connector 312"/>
-          <p:cNvCxnSpPr/>
+          <p:cNvPr id="315" name="Elbow Connector 314"/>
+          <p:cNvCxnSpPr>
+            <a:stCxn id="131" idx="3"/>
+          </p:cNvCxnSpPr>
           <p:nvPr/>
         </p:nvCxnSpPr>
         <p:spPr>
           <a:xfrm flipV="1">
-            <a:off x="7849579" y="3202071"/>
-            <a:ext cx="243839" cy="259079"/>
-          </a:xfrm>
-          <a:prstGeom prst="bentConnector2">
-            <a:avLst/>
+            <a:off x="8037538" y="3421051"/>
+            <a:ext cx="544653" cy="276528"/>
+          </a:xfrm>
+          <a:prstGeom prst="bentConnector3">
+            <a:avLst>
+              <a:gd name="adj1" fmla="val 98241"/>
+            </a:avLst>
           </a:prstGeom>
           <a:ln w="3175" cmpd="sng">
             <a:prstDash val="lgDash"/>
@@ -17458,18 +17263,51 @@
       </p:cxnSp>
       <p:cxnSp>
         <p:nvCxnSpPr>
-          <p:cNvPr id="315" name="Elbow Connector 314"/>
+          <p:cNvPr id="333" name="Straight Connector 332"/>
           <p:cNvCxnSpPr>
-            <a:stCxn id="131" idx="3"/>
+            <a:stCxn id="129" idx="1"/>
+            <a:endCxn id="5" idx="3"/>
           </p:cNvCxnSpPr>
           <p:nvPr/>
         </p:nvCxnSpPr>
         <p:spPr>
+          <a:xfrm flipH="1" flipV="1">
+            <a:off x="6519846" y="1954505"/>
+            <a:ext cx="222294" cy="439414"/>
+          </a:xfrm>
+          <a:prstGeom prst="line">
+            <a:avLst/>
+          </a:prstGeom>
+        </p:spPr>
+        <p:style>
+          <a:lnRef idx="1">
+            <a:schemeClr val="dk1"/>
+          </a:lnRef>
+          <a:fillRef idx="0">
+            <a:schemeClr val="dk1"/>
+          </a:fillRef>
+          <a:effectRef idx="0">
+            <a:schemeClr val="dk1"/>
+          </a:effectRef>
+          <a:fontRef idx="minor">
+            <a:schemeClr val="tx1"/>
+          </a:fontRef>
+        </p:style>
+      </p:cxnSp>
+      <p:cxnSp>
+        <p:nvCxnSpPr>
+          <p:cNvPr id="379" name="Straight Arrow Connector 378"/>
+          <p:cNvCxnSpPr>
+            <a:stCxn id="132" idx="0"/>
+          </p:cNvCxnSpPr>
+          <p:nvPr/>
+        </p:nvCxnSpPr>
+        <p:spPr>
           <a:xfrm flipV="1">
-            <a:off x="8037538" y="3202071"/>
-            <a:ext cx="489229" cy="615947"/>
-          </a:xfrm>
-          <a:prstGeom prst="bentConnector2">
+            <a:off x="7585419" y="3829659"/>
+            <a:ext cx="0" cy="243774"/>
+          </a:xfrm>
+          <a:prstGeom prst="straightConnector1">
             <a:avLst/>
           </a:prstGeom>
           <a:ln w="3175" cmpd="sng">
@@ -17495,51 +17333,18 @@
       </p:cxnSp>
       <p:cxnSp>
         <p:nvCxnSpPr>
-          <p:cNvPr id="333" name="Straight Connector 332"/>
+          <p:cNvPr id="426" name="Elbow Connector 425"/>
           <p:cNvCxnSpPr>
-            <a:stCxn id="129" idx="1"/>
-            <a:endCxn id="5" idx="3"/>
+            <a:stCxn id="141" idx="3"/>
           </p:cNvCxnSpPr>
           <p:nvPr/>
         </p:nvCxnSpPr>
         <p:spPr>
-          <a:xfrm flipH="1" flipV="1">
-            <a:off x="6345585" y="1905660"/>
-            <a:ext cx="396555" cy="389718"/>
-          </a:xfrm>
-          <a:prstGeom prst="line">
-            <a:avLst/>
-          </a:prstGeom>
-        </p:spPr>
-        <p:style>
-          <a:lnRef idx="1">
-            <a:schemeClr val="dk1"/>
-          </a:lnRef>
-          <a:fillRef idx="0">
-            <a:schemeClr val="dk1"/>
-          </a:fillRef>
-          <a:effectRef idx="0">
-            <a:schemeClr val="dk1"/>
-          </a:effectRef>
-          <a:fontRef idx="minor">
-            <a:schemeClr val="tx1"/>
-          </a:fontRef>
-        </p:style>
-      </p:cxnSp>
-      <p:cxnSp>
-        <p:nvCxnSpPr>
-          <p:cNvPr id="379" name="Straight Arrow Connector 378"/>
-          <p:cNvCxnSpPr>
-            <a:stCxn id="132" idx="0"/>
-          </p:cNvCxnSpPr>
-          <p:nvPr/>
-        </p:nvCxnSpPr>
-        <p:spPr>
           <a:xfrm flipV="1">
-            <a:off x="7585419" y="3950098"/>
-            <a:ext cx="0" cy="243774"/>
-          </a:xfrm>
-          <a:prstGeom prst="straightConnector1">
+            <a:off x="7710222" y="4965479"/>
+            <a:ext cx="197842" cy="222883"/>
+          </a:xfrm>
+          <a:prstGeom prst="bentConnector2">
             <a:avLst/>
           </a:prstGeom>
           <a:ln w="3175" cmpd="sng">
@@ -17565,19 +17370,21 @@
       </p:cxnSp>
       <p:cxnSp>
         <p:nvCxnSpPr>
-          <p:cNvPr id="426" name="Elbow Connector 425"/>
+          <p:cNvPr id="427" name="Elbow Connector 426"/>
           <p:cNvCxnSpPr>
-            <a:stCxn id="141" idx="3"/>
+            <a:stCxn id="140" idx="3"/>
           </p:cNvCxnSpPr>
           <p:nvPr/>
         </p:nvCxnSpPr>
         <p:spPr>
           <a:xfrm flipV="1">
-            <a:off x="7710222" y="5085918"/>
-            <a:ext cx="197842" cy="222883"/>
-          </a:xfrm>
-          <a:prstGeom prst="bentConnector2">
-            <a:avLst/>
+            <a:off x="7710222" y="4965480"/>
+            <a:ext cx="814996" cy="809316"/>
+          </a:xfrm>
+          <a:prstGeom prst="bentConnector3">
+            <a:avLst>
+              <a:gd name="adj1" fmla="val 98480"/>
+            </a:avLst>
           </a:prstGeom>
           <a:ln w="3175" cmpd="sng">
             <a:prstDash val="lgDash"/>
@@ -17602,21 +17409,19 @@
       </p:cxnSp>
       <p:cxnSp>
         <p:nvCxnSpPr>
-          <p:cNvPr id="427" name="Elbow Connector 426"/>
+          <p:cNvPr id="438" name="Elbow Connector 437"/>
           <p:cNvCxnSpPr>
-            <a:stCxn id="140" idx="3"/>
+            <a:stCxn id="138" idx="3"/>
           </p:cNvCxnSpPr>
           <p:nvPr/>
         </p:nvCxnSpPr>
         <p:spPr>
           <a:xfrm flipV="1">
-            <a:off x="7710222" y="5085919"/>
-            <a:ext cx="814996" cy="809316"/>
-          </a:xfrm>
-          <a:prstGeom prst="bentConnector3">
-            <a:avLst>
-              <a:gd name="adj1" fmla="val 98480"/>
-            </a:avLst>
+            <a:off x="7710222" y="4965479"/>
+            <a:ext cx="1026776" cy="1119116"/>
+          </a:xfrm>
+          <a:prstGeom prst="bentConnector2">
+            <a:avLst/>
           </a:prstGeom>
           <a:ln w="3175" cmpd="sng">
             <a:prstDash val="lgDash"/>
@@ -17641,43 +17446,6 @@
       </p:cxnSp>
       <p:cxnSp>
         <p:nvCxnSpPr>
-          <p:cNvPr id="438" name="Elbow Connector 437"/>
-          <p:cNvCxnSpPr>
-            <a:stCxn id="138" idx="3"/>
-          </p:cNvCxnSpPr>
-          <p:nvPr/>
-        </p:nvCxnSpPr>
-        <p:spPr>
-          <a:xfrm flipV="1">
-            <a:off x="7710222" y="5085918"/>
-            <a:ext cx="1026776" cy="1119116"/>
-          </a:xfrm>
-          <a:prstGeom prst="bentConnector2">
-            <a:avLst/>
-          </a:prstGeom>
-          <a:ln w="3175" cmpd="sng">
-            <a:prstDash val="lgDash"/>
-            <a:tailEnd type="arrow"/>
-          </a:ln>
-          <a:effectLst/>
-        </p:spPr>
-        <p:style>
-          <a:lnRef idx="2">
-            <a:schemeClr val="accent1"/>
-          </a:lnRef>
-          <a:fillRef idx="0">
-            <a:schemeClr val="accent1"/>
-          </a:fillRef>
-          <a:effectRef idx="1">
-            <a:schemeClr val="accent1"/>
-          </a:effectRef>
-          <a:fontRef idx="minor">
-            <a:schemeClr val="tx1"/>
-          </a:fontRef>
-        </p:style>
-      </p:cxnSp>
-      <p:cxnSp>
-        <p:nvCxnSpPr>
           <p:cNvPr id="443" name="Straight Connector 442"/>
           <p:cNvCxnSpPr>
             <a:stCxn id="139" idx="1"/>
@@ -17687,8 +17455,8 @@
         </p:nvCxnSpPr>
         <p:spPr>
           <a:xfrm flipH="1">
-            <a:off x="6345585" y="4972253"/>
-            <a:ext cx="350900" cy="639774"/>
+            <a:off x="6345585" y="4851814"/>
+            <a:ext cx="350900" cy="628825"/>
           </a:xfrm>
           <a:prstGeom prst="line">
             <a:avLst/>
@@ -17720,8 +17488,8 @@
         </p:nvCxnSpPr>
         <p:spPr>
           <a:xfrm flipH="1" flipV="1">
-            <a:off x="6345585" y="5612027"/>
-            <a:ext cx="363600" cy="283208"/>
+            <a:off x="6345585" y="5480639"/>
+            <a:ext cx="363600" cy="294157"/>
           </a:xfrm>
           <a:prstGeom prst="line">
             <a:avLst/>
@@ -17753,8 +17521,8 @@
         </p:nvCxnSpPr>
         <p:spPr>
           <a:xfrm flipH="1" flipV="1">
-            <a:off x="6345585" y="5612027"/>
-            <a:ext cx="353440" cy="593007"/>
+            <a:off x="6345585" y="5480639"/>
+            <a:ext cx="353440" cy="603956"/>
           </a:xfrm>
           <a:prstGeom prst="line">
             <a:avLst/>
@@ -17785,9 +17553,9 @@
           <p:nvPr/>
         </p:nvCxnSpPr>
         <p:spPr>
-          <a:xfrm flipH="1">
-            <a:off x="6345585" y="5603347"/>
-            <a:ext cx="368681" cy="8680"/>
+          <a:xfrm flipH="1" flipV="1">
+            <a:off x="6345585" y="5480639"/>
+            <a:ext cx="368681" cy="2269"/>
           </a:xfrm>
           <a:prstGeom prst="line">
             <a:avLst/>
@@ -17816,7 +17584,7 @@
         </p:nvSpPr>
         <p:spPr>
           <a:xfrm>
-            <a:off x="2824640" y="3298569"/>
+            <a:off x="2824640" y="3537983"/>
             <a:ext cx="1255806" cy="298879"/>
           </a:xfrm>
           <a:prstGeom prst="roundRect">
@@ -17867,7 +17635,7 @@
         <p:spPr>
           <a:xfrm flipV="1">
             <a:off x="4080446" y="640715"/>
-            <a:ext cx="1025620" cy="2807294"/>
+            <a:ext cx="1094005" cy="3046708"/>
           </a:xfrm>
           <a:prstGeom prst="line">
             <a:avLst/>
@@ -17898,9 +17666,9 @@
           <p:nvPr/>
         </p:nvCxnSpPr>
         <p:spPr>
-          <a:xfrm flipV="1">
-            <a:off x="4080446" y="3437862"/>
-            <a:ext cx="1025621" cy="10147"/>
+          <a:xfrm>
+            <a:off x="4080446" y="3687423"/>
+            <a:ext cx="1094004" cy="7315"/>
           </a:xfrm>
           <a:prstGeom prst="line">
             <a:avLst/>
@@ -17932,8 +17700,8 @@
         </p:nvCxnSpPr>
         <p:spPr>
           <a:xfrm>
-            <a:off x="4080446" y="3448009"/>
-            <a:ext cx="1025621" cy="2164018"/>
+            <a:off x="4080446" y="3687423"/>
+            <a:ext cx="1025621" cy="1793216"/>
           </a:xfrm>
           <a:prstGeom prst="line">
             <a:avLst/>
@@ -17964,13 +17732,13 @@
         </p:nvCxnSpPr>
         <p:spPr>
           <a:xfrm flipH="1" flipV="1">
-            <a:off x="8433258" y="1154465"/>
-            <a:ext cx="89421" cy="1551035"/>
+            <a:off x="8461253" y="1154465"/>
+            <a:ext cx="61426" cy="1770015"/>
           </a:xfrm>
           <a:prstGeom prst="bentConnector4">
             <a:avLst>
-              <a:gd name="adj1" fmla="val -255645"/>
-              <a:gd name="adj2" fmla="val 99583"/>
+              <a:gd name="adj1" fmla="val -372155"/>
+              <a:gd name="adj2" fmla="val 99398"/>
             </a:avLst>
           </a:prstGeom>
           <a:ln w="12700" cmpd="sng">
@@ -18072,7 +17840,7 @@
         </p:nvSpPr>
         <p:spPr>
           <a:xfrm>
-            <a:off x="6714266" y="5493707"/>
+            <a:off x="6714266" y="5373268"/>
             <a:ext cx="993917" cy="219279"/>
           </a:xfrm>
           <a:prstGeom prst="roundRect">
@@ -18122,7 +17890,7 @@
         </p:nvCxnSpPr>
         <p:spPr>
           <a:xfrm flipV="1">
-            <a:off x="7708183" y="5085919"/>
+            <a:off x="7708183" y="4965480"/>
             <a:ext cx="387840" cy="517428"/>
           </a:xfrm>
           <a:prstGeom prst="bentConnector2">
@@ -18157,7 +17925,7 @@
         </p:nvSpPr>
         <p:spPr>
           <a:xfrm>
-            <a:off x="1383820" y="1027996"/>
+            <a:off x="1540124" y="1027996"/>
             <a:ext cx="1039129" cy="923330"/>
           </a:xfrm>
           <a:prstGeom prst="rect">
@@ -18217,8 +17985,8 @@
         </p:nvCxnSpPr>
         <p:spPr>
           <a:xfrm flipV="1">
-            <a:off x="2422949" y="660400"/>
-            <a:ext cx="425209" cy="829261"/>
+            <a:off x="2579253" y="660400"/>
+            <a:ext cx="268905" cy="829261"/>
           </a:xfrm>
           <a:prstGeom prst="line">
             <a:avLst/>
@@ -18250,8 +18018,8 @@
         </p:nvCxnSpPr>
         <p:spPr>
           <a:xfrm flipV="1">
-            <a:off x="2422949" y="1488441"/>
-            <a:ext cx="401691" cy="1220"/>
+            <a:off x="2579253" y="1488441"/>
+            <a:ext cx="245387" cy="1220"/>
           </a:xfrm>
           <a:prstGeom prst="line">
             <a:avLst/>
@@ -18283,8 +18051,8 @@
         </p:nvCxnSpPr>
         <p:spPr>
           <a:xfrm>
-            <a:off x="2422949" y="1489661"/>
-            <a:ext cx="402159" cy="896034"/>
+            <a:off x="2579253" y="1489661"/>
+            <a:ext cx="245855" cy="896034"/>
           </a:xfrm>
           <a:prstGeom prst="line">
             <a:avLst/>
@@ -18313,7 +18081,7 @@
         </p:nvSpPr>
         <p:spPr>
           <a:xfrm>
-            <a:off x="1392892" y="4364594"/>
+            <a:off x="1539427" y="4364594"/>
             <a:ext cx="1039129" cy="923330"/>
           </a:xfrm>
           <a:prstGeom prst="rect">
@@ -18374,8 +18142,8 @@
         </p:nvCxnSpPr>
         <p:spPr>
           <a:xfrm flipV="1">
-            <a:off x="2432021" y="3448009"/>
-            <a:ext cx="392619" cy="1378250"/>
+            <a:off x="2578556" y="3687423"/>
+            <a:ext cx="246084" cy="1138836"/>
           </a:xfrm>
           <a:prstGeom prst="line">
             <a:avLst/>
@@ -18407,8 +18175,8 @@
         </p:nvCxnSpPr>
         <p:spPr>
           <a:xfrm>
-            <a:off x="2432021" y="4826259"/>
-            <a:ext cx="392619" cy="6424"/>
+            <a:off x="2578556" y="4826259"/>
+            <a:ext cx="246084" cy="6424"/>
           </a:xfrm>
           <a:prstGeom prst="line">
             <a:avLst/>
@@ -18440,8 +18208,8 @@
         </p:nvCxnSpPr>
         <p:spPr>
           <a:xfrm>
-            <a:off x="2432021" y="4826259"/>
-            <a:ext cx="416137" cy="756768"/>
+            <a:off x="2578556" y="4826259"/>
+            <a:ext cx="269602" cy="647278"/>
           </a:xfrm>
           <a:prstGeom prst="line">
             <a:avLst/>
@@ -18470,7 +18238,7 @@
         </p:nvSpPr>
         <p:spPr>
           <a:xfrm>
-            <a:off x="2934810" y="5938345"/>
+            <a:off x="2934810" y="5806957"/>
             <a:ext cx="3541888" cy="461665"/>
           </a:xfrm>
           <a:prstGeom prst="rect">
@@ -18506,7 +18274,7 @@
         </p:nvCxnSpPr>
         <p:spPr>
           <a:xfrm flipH="1">
-            <a:off x="2681098" y="6276111"/>
+            <a:off x="2681098" y="6144723"/>
             <a:ext cx="263174" cy="0"/>
           </a:xfrm>
           <a:prstGeom prst="straightConnector1">
@@ -18541,7 +18309,7 @@
         </p:nvCxnSpPr>
         <p:spPr>
           <a:xfrm flipH="1">
-            <a:off x="2657392" y="6099544"/>
+            <a:off x="2657392" y="5968156"/>
             <a:ext cx="291815" cy="0"/>
           </a:xfrm>
           <a:prstGeom prst="straightConnector1">
@@ -18576,7 +18344,7 @@
         </p:nvSpPr>
         <p:spPr>
           <a:xfrm>
-            <a:off x="2266988" y="5755312"/>
+            <a:off x="2266988" y="5623924"/>
             <a:ext cx="452017" cy="276999"/>
           </a:xfrm>
           <a:prstGeom prst="rect">
@@ -18605,7 +18373,7 @@
         </p:nvSpPr>
         <p:spPr>
           <a:xfrm>
-            <a:off x="7600809" y="3936224"/>
+            <a:off x="7600809" y="3815785"/>
             <a:ext cx="524302" cy="246221"/>
           </a:xfrm>
           <a:prstGeom prst="rect">
@@ -18634,7 +18402,7 @@
         </p:nvSpPr>
         <p:spPr>
           <a:xfrm>
-            <a:off x="8215570" y="2278458"/>
+            <a:off x="8215570" y="2387948"/>
             <a:ext cx="524302" cy="246221"/>
           </a:xfrm>
           <a:prstGeom prst="rect">
@@ -18721,7 +18489,7 @@
         </p:nvSpPr>
         <p:spPr>
           <a:xfrm>
-            <a:off x="8002465" y="3453828"/>
+            <a:off x="8002465" y="3464777"/>
             <a:ext cx="524302" cy="246221"/>
           </a:xfrm>
           <a:prstGeom prst="rect">
@@ -18750,7 +18518,7 @@
         </p:nvSpPr>
         <p:spPr>
           <a:xfrm>
-            <a:off x="7982532" y="5614209"/>
+            <a:off x="7982532" y="5493770"/>
             <a:ext cx="524302" cy="246221"/>
           </a:xfrm>
           <a:prstGeom prst="rect">
@@ -18808,7 +18576,7 @@
         </p:nvSpPr>
         <p:spPr>
           <a:xfrm>
-            <a:off x="5134481" y="2085686"/>
+            <a:off x="5272139" y="2085686"/>
             <a:ext cx="524302" cy="246221"/>
           </a:xfrm>
           <a:prstGeom prst="rect">
@@ -18837,7 +18605,7 @@
         </p:nvSpPr>
         <p:spPr>
           <a:xfrm>
-            <a:off x="5110963" y="3581218"/>
+            <a:off x="5110963" y="3789249"/>
             <a:ext cx="524302" cy="246221"/>
           </a:xfrm>
           <a:prstGeom prst="rect">
@@ -18866,7 +18634,7 @@
         </p:nvSpPr>
         <p:spPr>
           <a:xfrm>
-            <a:off x="5106066" y="832755"/>
+            <a:off x="5272139" y="814202"/>
             <a:ext cx="524302" cy="246221"/>
           </a:xfrm>
           <a:prstGeom prst="rect">
@@ -18927,8 +18695,8 @@
         </p:nvCxnSpPr>
         <p:spPr>
           <a:xfrm flipH="1">
-            <a:off x="6345585" y="5308801"/>
-            <a:ext cx="358798" cy="303226"/>
+            <a:off x="6345585" y="5188362"/>
+            <a:ext cx="358798" cy="292277"/>
           </a:xfrm>
           <a:prstGeom prst="line">
             <a:avLst/>
@@ -38394,7 +38162,7 @@
         </p:nvSpPr>
         <p:spPr>
           <a:xfrm>
-            <a:off x="3701048" y="2087241"/>
+            <a:off x="3701048" y="2106779"/>
             <a:ext cx="1239519" cy="254000"/>
           </a:xfrm>
           <a:prstGeom prst="roundRect">
@@ -38438,7 +38206,7 @@
         </p:nvSpPr>
         <p:spPr>
           <a:xfrm>
-            <a:off x="3701048" y="3618506"/>
+            <a:off x="3701048" y="3501278"/>
             <a:ext cx="1183743" cy="254000"/>
           </a:xfrm>
           <a:prstGeom prst="roundRect">
@@ -38482,7 +38250,7 @@
         </p:nvSpPr>
         <p:spPr>
           <a:xfrm>
-            <a:off x="3701049" y="5591352"/>
+            <a:off x="3701049" y="5308051"/>
             <a:ext cx="1239518" cy="290520"/>
           </a:xfrm>
           <a:prstGeom prst="roundRect">
@@ -38670,7 +38438,7 @@
         </p:nvSpPr>
         <p:spPr>
           <a:xfrm>
-            <a:off x="5462315" y="1701162"/>
+            <a:off x="5462315" y="1691393"/>
             <a:ext cx="1780539" cy="264160"/>
           </a:xfrm>
           <a:prstGeom prst="roundRect">
@@ -38718,7 +38486,7 @@
         </p:nvSpPr>
         <p:spPr>
           <a:xfrm>
-            <a:off x="5462315" y="2015458"/>
+            <a:off x="5462315" y="2034996"/>
             <a:ext cx="1066800" cy="367664"/>
           </a:xfrm>
           <a:prstGeom prst="roundRect">
@@ -38766,7 +38534,7 @@
         </p:nvSpPr>
         <p:spPr>
           <a:xfrm>
-            <a:off x="5462315" y="2451096"/>
+            <a:off x="5462315" y="2499941"/>
             <a:ext cx="1494679" cy="305726"/>
           </a:xfrm>
           <a:prstGeom prst="roundRect">
@@ -38814,7 +38582,7 @@
         </p:nvSpPr>
         <p:spPr>
           <a:xfrm>
-            <a:off x="5508785" y="3256904"/>
+            <a:off x="5489247" y="3325287"/>
             <a:ext cx="2065978" cy="276861"/>
           </a:xfrm>
           <a:prstGeom prst="roundRect">
@@ -38862,7 +38630,7 @@
         </p:nvSpPr>
         <p:spPr>
           <a:xfrm>
-            <a:off x="5478305" y="4017632"/>
+            <a:off x="5488074" y="3714793"/>
             <a:ext cx="1396998" cy="264160"/>
           </a:xfrm>
           <a:prstGeom prst="roundRect">
@@ -38910,7 +38678,7 @@
         </p:nvGrpSpPr>
         <p:grpSpPr>
           <a:xfrm>
-            <a:off x="5483385" y="4396228"/>
+            <a:off x="5493154" y="4093389"/>
             <a:ext cx="1879598" cy="491491"/>
             <a:chOff x="7721601" y="3576319"/>
             <a:chExt cx="1859278" cy="491491"/>
@@ -39069,7 +38837,7 @@
         </p:nvSpPr>
         <p:spPr>
           <a:xfrm>
-            <a:off x="5508785" y="2910194"/>
+            <a:off x="5489247" y="2978577"/>
             <a:ext cx="1851659" cy="254000"/>
           </a:xfrm>
           <a:prstGeom prst="roundRect">
@@ -39111,14 +38879,14 @@
       </p:sp>
       <p:sp>
         <p:nvSpPr>
-          <p:cNvPr id="58" name="Rounded Rectangle 57"/>
+          <p:cNvPr id="59" name="Rounded Rectangle 58"/>
           <p:cNvSpPr/>
           <p:nvPr/>
         </p:nvSpPr>
         <p:spPr>
           <a:xfrm>
-            <a:off x="5493546" y="3653779"/>
-            <a:ext cx="1178560" cy="227330"/>
+            <a:off x="5536790" y="5970331"/>
+            <a:ext cx="1011197" cy="240573"/>
           </a:xfrm>
           <a:prstGeom prst="roundRect">
             <a:avLst>
@@ -39151,7 +38919,7 @@
             <a:pPr algn="ctr"/>
             <a:r>
               <a:rPr lang="en-US" sz="1000" dirty="0" smtClean="0"/>
-              <a:t>Customer Service</a:t>
+              <a:t>Confidentiality</a:t>
             </a:r>
             <a:endParaRPr lang="en-US" sz="1000" dirty="0"/>
           </a:p>
@@ -39159,14 +38927,14 @@
       </p:sp>
       <p:sp>
         <p:nvSpPr>
-          <p:cNvPr id="59" name="Rounded Rectangle 58"/>
+          <p:cNvPr id="60" name="Rounded Rectangle 59"/>
           <p:cNvSpPr/>
           <p:nvPr/>
         </p:nvSpPr>
         <p:spPr>
           <a:xfrm>
-            <a:off x="5536790" y="6253632"/>
-            <a:ext cx="1011197" cy="240573"/>
+            <a:off x="5534250" y="4744172"/>
+            <a:ext cx="2098997" cy="227330"/>
           </a:xfrm>
           <a:prstGeom prst="roundRect">
             <a:avLst>
@@ -39199,7 +38967,7 @@
             <a:pPr algn="ctr"/>
             <a:r>
               <a:rPr lang="en-US" sz="1000" dirty="0" smtClean="0"/>
-              <a:t>Confidentiality</a:t>
+              <a:t>Safety</a:t>
             </a:r>
             <a:endParaRPr lang="en-US" sz="1000" dirty="0"/>
           </a:p>
@@ -39207,14 +38975,14 @@
       </p:sp>
       <p:sp>
         <p:nvSpPr>
-          <p:cNvPr id="60" name="Rounded Rectangle 59"/>
+          <p:cNvPr id="61" name="Rounded Rectangle 60"/>
           <p:cNvSpPr/>
           <p:nvPr/>
         </p:nvSpPr>
         <p:spPr>
           <a:xfrm>
-            <a:off x="5534250" y="5027473"/>
-            <a:ext cx="2098997" cy="227330"/>
+            <a:off x="5546950" y="5667154"/>
+            <a:ext cx="1001037" cy="227330"/>
           </a:xfrm>
           <a:prstGeom prst="roundRect">
             <a:avLst>
@@ -39247,54 +39015,6 @@
             <a:pPr algn="ctr"/>
             <a:r>
               <a:rPr lang="en-US" sz="1000" dirty="0" smtClean="0"/>
-              <a:t>Safety</a:t>
-            </a:r>
-            <a:endParaRPr lang="en-US" sz="1000" dirty="0"/>
-          </a:p>
-        </p:txBody>
-      </p:sp>
-      <p:sp>
-        <p:nvSpPr>
-          <p:cNvPr id="61" name="Rounded Rectangle 60"/>
-          <p:cNvSpPr/>
-          <p:nvPr/>
-        </p:nvSpPr>
-        <p:spPr>
-          <a:xfrm>
-            <a:off x="5546950" y="5950455"/>
-            <a:ext cx="1001037" cy="227330"/>
-          </a:xfrm>
-          <a:prstGeom prst="roundRect">
-            <a:avLst>
-              <a:gd name="adj" fmla="val 0"/>
-            </a:avLst>
-          </a:prstGeom>
-          <a:solidFill>
-            <a:schemeClr val="lt1"/>
-          </a:solidFill>
-          <a:ln w="12700"/>
-        </p:spPr>
-        <p:style>
-          <a:lnRef idx="2">
-            <a:schemeClr val="dk1"/>
-          </a:lnRef>
-          <a:fillRef idx="1">
-            <a:schemeClr val="lt1"/>
-          </a:fillRef>
-          <a:effectRef idx="0">
-            <a:schemeClr val="dk1"/>
-          </a:effectRef>
-          <a:fontRef idx="minor">
-            <a:schemeClr val="dk1"/>
-          </a:fontRef>
-        </p:style>
-        <p:txBody>
-          <a:bodyPr rtlCol="0" anchor="ctr"/>
-          <a:lstStyle/>
-          <a:p>
-            <a:pPr algn="ctr"/>
-            <a:r>
-              <a:rPr lang="en-US" sz="1000" dirty="0" smtClean="0"/>
               <a:t>Integrity</a:t>
             </a:r>
             <a:endParaRPr lang="en-US" sz="1000" dirty="0"/>
@@ -39309,7 +39029,7 @@
         </p:nvSpPr>
         <p:spPr>
           <a:xfrm>
-            <a:off x="5542148" y="5364021"/>
+            <a:off x="5542148" y="5080720"/>
             <a:ext cx="1005839" cy="227330"/>
           </a:xfrm>
           <a:prstGeom prst="roundRect">
@@ -39459,8 +39179,8 @@
         </p:nvCxnSpPr>
         <p:spPr>
           <a:xfrm flipH="1">
-            <a:off x="4940567" y="1833242"/>
-            <a:ext cx="521748" cy="380999"/>
+            <a:off x="4940567" y="1823473"/>
+            <a:ext cx="521748" cy="410306"/>
           </a:xfrm>
           <a:prstGeom prst="line">
             <a:avLst/>
@@ -39492,7 +39212,7 @@
         </p:nvCxnSpPr>
         <p:spPr>
           <a:xfrm flipH="1">
-            <a:off x="4940567" y="2199290"/>
+            <a:off x="4940567" y="2218828"/>
             <a:ext cx="521748" cy="14951"/>
           </a:xfrm>
           <a:prstGeom prst="line">
@@ -39525,8 +39245,8 @@
         </p:nvCxnSpPr>
         <p:spPr>
           <a:xfrm flipH="1">
-            <a:off x="4884791" y="3395335"/>
-            <a:ext cx="623994" cy="350171"/>
+            <a:off x="4884791" y="3463718"/>
+            <a:ext cx="604456" cy="164560"/>
           </a:xfrm>
           <a:prstGeom prst="line">
             <a:avLst/>
@@ -39558,8 +39278,8 @@
         </p:nvCxnSpPr>
         <p:spPr>
           <a:xfrm flipH="1">
-            <a:off x="4884791" y="3037194"/>
-            <a:ext cx="623994" cy="708312"/>
+            <a:off x="4884791" y="3105577"/>
+            <a:ext cx="604456" cy="522701"/>
           </a:xfrm>
           <a:prstGeom prst="line">
             <a:avLst/>
@@ -39591,41 +39311,8 @@
         </p:nvCxnSpPr>
         <p:spPr>
           <a:xfrm flipH="1" flipV="1">
-            <a:off x="4884791" y="3745506"/>
-            <a:ext cx="593514" cy="404206"/>
-          </a:xfrm>
-          <a:prstGeom prst="line">
-            <a:avLst/>
-          </a:prstGeom>
-        </p:spPr>
-        <p:style>
-          <a:lnRef idx="1">
-            <a:schemeClr val="dk1"/>
-          </a:lnRef>
-          <a:fillRef idx="0">
-            <a:schemeClr val="dk1"/>
-          </a:fillRef>
-          <a:effectRef idx="0">
-            <a:schemeClr val="dk1"/>
-          </a:effectRef>
-          <a:fontRef idx="minor">
-            <a:schemeClr val="tx1"/>
-          </a:fontRef>
-        </p:style>
-      </p:cxnSp>
-      <p:cxnSp>
-        <p:nvCxnSpPr>
-          <p:cNvPr id="76" name="Straight Connector 75"/>
-          <p:cNvCxnSpPr>
-            <a:stCxn id="58" idx="1"/>
-            <a:endCxn id="43" idx="3"/>
-          </p:cNvCxnSpPr>
-          <p:nvPr/>
-        </p:nvCxnSpPr>
-        <p:spPr>
-          <a:xfrm flipH="1" flipV="1">
-            <a:off x="4884791" y="3745506"/>
-            <a:ext cx="608755" cy="21938"/>
+            <a:off x="4884791" y="3628278"/>
+            <a:ext cx="603283" cy="218595"/>
           </a:xfrm>
           <a:prstGeom prst="line">
             <a:avLst/>
@@ -39657,8 +39344,8 @@
         </p:nvCxnSpPr>
         <p:spPr>
           <a:xfrm flipH="1" flipV="1">
-            <a:off x="4884791" y="3745506"/>
-            <a:ext cx="598594" cy="781215"/>
+            <a:off x="4884791" y="3628278"/>
+            <a:ext cx="608363" cy="595604"/>
           </a:xfrm>
           <a:prstGeom prst="line">
             <a:avLst/>
@@ -39690,8 +39377,8 @@
         </p:nvCxnSpPr>
         <p:spPr>
           <a:xfrm flipH="1" flipV="1">
-            <a:off x="4940567" y="2214241"/>
-            <a:ext cx="521748" cy="389718"/>
+            <a:off x="4940567" y="2233779"/>
+            <a:ext cx="521748" cy="419025"/>
           </a:xfrm>
           <a:prstGeom prst="line">
             <a:avLst/>
@@ -39723,7 +39410,7 @@
         </p:nvCxnSpPr>
         <p:spPr>
           <a:xfrm flipH="1">
-            <a:off x="4940567" y="5141138"/>
+            <a:off x="4940567" y="4857837"/>
             <a:ext cx="593683" cy="595474"/>
           </a:xfrm>
           <a:prstGeom prst="line">
@@ -39756,7 +39443,7 @@
         </p:nvCxnSpPr>
         <p:spPr>
           <a:xfrm flipH="1" flipV="1">
-            <a:off x="4940567" y="5736612"/>
+            <a:off x="4940567" y="5453311"/>
             <a:ext cx="606383" cy="327508"/>
           </a:xfrm>
           <a:prstGeom prst="line">
@@ -39789,7 +39476,7 @@
         </p:nvCxnSpPr>
         <p:spPr>
           <a:xfrm flipH="1" flipV="1">
-            <a:off x="4940567" y="5736612"/>
+            <a:off x="4940567" y="5453311"/>
             <a:ext cx="596223" cy="637307"/>
           </a:xfrm>
           <a:prstGeom prst="line">
@@ -39822,7 +39509,7 @@
         </p:nvCxnSpPr>
         <p:spPr>
           <a:xfrm flipH="1" flipV="1">
-            <a:off x="4940567" y="5736612"/>
+            <a:off x="4940567" y="5453311"/>
             <a:ext cx="611464" cy="35620"/>
           </a:xfrm>
           <a:prstGeom prst="line">
@@ -39852,7 +39539,7 @@
         </p:nvSpPr>
         <p:spPr>
           <a:xfrm>
-            <a:off x="5552031" y="5662592"/>
+            <a:off x="5552031" y="5379291"/>
             <a:ext cx="993917" cy="219279"/>
           </a:xfrm>
           <a:prstGeom prst="roundRect">
@@ -39903,7 +39590,7 @@
         </p:nvCxnSpPr>
         <p:spPr>
           <a:xfrm flipH="1">
-            <a:off x="4940567" y="5477686"/>
+            <a:off x="4940567" y="5194385"/>
             <a:ext cx="601581" cy="258926"/>
           </a:xfrm>
           <a:prstGeom prst="line">

</xml_diff>

<commit_message>
Added File Methodology; added important changes.
</commit_message>
<xml_diff>
--- a/model.pptx
+++ b/model.pptx
@@ -4290,7 +4290,7 @@
           <a:graphicData uri="http://schemas.openxmlformats.org/presentationml/2006/ole">
             <mc:AlternateContent xmlns:mc="http://schemas.openxmlformats.org/markup-compatibility/2006">
               <mc:Choice xmlns:v="urn:schemas-microsoft-com:vml" Requires="v">
-                <p:oleObj spid="_x0000_s1161" name="Equation" r:id="rId3" imgW="3771900" imgH="203200" progId="Equation.3">
+                <p:oleObj spid="_x0000_s1163" name="Equation" r:id="rId3" imgW="3771900" imgH="203200" progId="Equation.3">
                   <p:embed/>
                 </p:oleObj>
               </mc:Choice>
@@ -32972,7 +32972,7 @@
       </p:grpSpPr>
       <p:pic>
         <p:nvPicPr>
-          <p:cNvPr id="14" name="Picture 13" descr="Screen Shot 2016-08-20 at 02.01.38.png"/>
+          <p:cNvPr id="16" name="Picture 15" descr="Screen Shot 2016-08-22 at 03.16.15.png"/>
           <p:cNvPicPr>
             <a:picLocks noChangeAspect="1"/>
           </p:cNvPicPr>
@@ -32993,7 +32993,7 @@
         <p:spPr>
           <a:xfrm>
             <a:off x="0" y="0"/>
-            <a:ext cx="9144000" cy="6132000"/>
+            <a:ext cx="9144000" cy="6099995"/>
           </a:xfrm>
           <a:prstGeom prst="rect">
             <a:avLst/>
@@ -33122,7 +33122,7 @@
       </p:grpSpPr>
       <p:pic>
         <p:nvPicPr>
-          <p:cNvPr id="2" name="Picture 1" descr="Screen Shot 2016-08-21 at 02.39.18.png"/>
+          <p:cNvPr id="3" name="Picture 2" descr="Screen Shot 2016-08-22 at 03.19.44.png"/>
           <p:cNvPicPr>
             <a:picLocks noChangeAspect="1"/>
           </p:cNvPicPr>
@@ -33143,7 +33143,7 @@
         <p:spPr>
           <a:xfrm>
             <a:off x="0" y="0"/>
-            <a:ext cx="9144000" cy="6168861"/>
+            <a:ext cx="9144000" cy="6176742"/>
           </a:xfrm>
           <a:prstGeom prst="rect">
             <a:avLst/>

</xml_diff>